<commit_message>
add FindEventParserTest, update Storage diagram
</commit_message>
<xml_diff>
--- a/docs/diagrams/StorageComponentClassDiagram.pptx
+++ b/docs/diagrams/StorageComponentClassDiagram.pptx
@@ -107,6 +107,22 @@
       </a:defRPr>
     </a:lvl9pPr>
   </p:defaultTextStyle>
+  <p:extLst>
+    <p:ext uri="{EFAFB233-063F-42B5-8137-9DF3F51BA10A}">
+      <p15:sldGuideLst xmlns:p15="http://schemas.microsoft.com/office/powerpoint/2012/main">
+        <p15:guide id="1" orient="horz" pos="1488">
+          <p15:clr>
+            <a:srgbClr val="A4A3A4"/>
+          </p15:clr>
+        </p15:guide>
+        <p15:guide id="2" pos="2880">
+          <p15:clr>
+            <a:srgbClr val="A4A3A4"/>
+          </p15:clr>
+        </p15:guide>
+      </p15:sldGuideLst>
+    </p:ext>
+  </p:extLst>
 </p:presentation>
 </file>
 
@@ -192,7 +208,7 @@
           <a:p>
             <a:fld id="{F5CC4B3F-88C1-4FFA-B1B6-F41C21DC6924}" type="datetimeFigureOut">
               <a:rPr lang="en-US" smtClean="0"/>
-              <a:t>10/16/2016</a:t>
+              <a:t>10/13/2018</a:t>
             </a:fld>
             <a:endParaRPr lang="en-US"/>
           </a:p>
@@ -256,38 +272,37 @@
           <a:p>
             <a:pPr lvl="0"/>
             <a:r>
-              <a:rPr lang="en-US" smtClean="0"/>
+              <a:rPr lang="en-US"/>
               <a:t>Click to edit Master text styles</a:t>
             </a:r>
           </a:p>
           <a:p>
             <a:pPr lvl="1"/>
             <a:r>
-              <a:rPr lang="en-US" smtClean="0"/>
+              <a:rPr lang="en-US"/>
               <a:t>Second level</a:t>
             </a:r>
           </a:p>
           <a:p>
             <a:pPr lvl="2"/>
             <a:r>
-              <a:rPr lang="en-US" smtClean="0"/>
+              <a:rPr lang="en-US"/>
               <a:t>Third level</a:t>
             </a:r>
           </a:p>
           <a:p>
             <a:pPr lvl="3"/>
             <a:r>
-              <a:rPr lang="en-US" smtClean="0"/>
+              <a:rPr lang="en-US"/>
               <a:t>Fourth level</a:t>
             </a:r>
           </a:p>
           <a:p>
             <a:pPr lvl="4"/>
             <a:r>
-              <a:rPr lang="en-US" smtClean="0"/>
+              <a:rPr lang="en-US"/>
               <a:t>Fifth level</a:t>
             </a:r>
-            <a:endParaRPr lang="en-US"/>
           </a:p>
         </p:txBody>
       </p:sp>
@@ -498,10 +513,9 @@
           <a:lstStyle/>
           <a:p>
             <a:r>
-              <a:rPr lang="en-US" smtClean="0"/>
+              <a:rPr lang="en-US"/>
               <a:t>Click to edit Master title style</a:t>
             </a:r>
-            <a:endParaRPr lang="en-US"/>
           </a:p>
         </p:txBody>
       </p:sp>
@@ -617,10 +631,9 @@
           </a:lstStyle>
           <a:p>
             <a:r>
-              <a:rPr lang="en-US" smtClean="0"/>
+              <a:rPr lang="en-US"/>
               <a:t>Click to edit Master subtitle style</a:t>
             </a:r>
-            <a:endParaRPr lang="en-US"/>
           </a:p>
         </p:txBody>
       </p:sp>
@@ -641,7 +654,7 @@
           <a:p>
             <a:fld id="{78C97017-6FC3-485B-9764-EAC9E56C1D49}" type="datetimeFigureOut">
               <a:rPr lang="en-US" smtClean="0"/>
-              <a:t>10/16/2016</a:t>
+              <a:t>10/13/2018</a:t>
             </a:fld>
             <a:endParaRPr lang="en-US"/>
           </a:p>
@@ -735,10 +748,9 @@
           <a:lstStyle/>
           <a:p>
             <a:r>
-              <a:rPr lang="en-US" smtClean="0"/>
+              <a:rPr lang="en-US"/>
               <a:t>Click to edit Master title style</a:t>
             </a:r>
-            <a:endParaRPr lang="en-US"/>
           </a:p>
         </p:txBody>
       </p:sp>
@@ -759,38 +771,37 @@
           <a:p>
             <a:pPr lvl="0"/>
             <a:r>
-              <a:rPr lang="en-US" smtClean="0"/>
+              <a:rPr lang="en-US"/>
               <a:t>Click to edit Master text styles</a:t>
             </a:r>
           </a:p>
           <a:p>
             <a:pPr lvl="1"/>
             <a:r>
-              <a:rPr lang="en-US" smtClean="0"/>
+              <a:rPr lang="en-US"/>
               <a:t>Second level</a:t>
             </a:r>
           </a:p>
           <a:p>
             <a:pPr lvl="2"/>
             <a:r>
-              <a:rPr lang="en-US" smtClean="0"/>
+              <a:rPr lang="en-US"/>
               <a:t>Third level</a:t>
             </a:r>
           </a:p>
           <a:p>
             <a:pPr lvl="3"/>
             <a:r>
-              <a:rPr lang="en-US" smtClean="0"/>
+              <a:rPr lang="en-US"/>
               <a:t>Fourth level</a:t>
             </a:r>
           </a:p>
           <a:p>
             <a:pPr lvl="4"/>
             <a:r>
-              <a:rPr lang="en-US" smtClean="0"/>
+              <a:rPr lang="en-US"/>
               <a:t>Fifth level</a:t>
             </a:r>
-            <a:endParaRPr lang="en-US"/>
           </a:p>
         </p:txBody>
       </p:sp>
@@ -811,7 +822,7 @@
           <a:p>
             <a:fld id="{78C97017-6FC3-485B-9764-EAC9E56C1D49}" type="datetimeFigureOut">
               <a:rPr lang="en-US" smtClean="0"/>
-              <a:t>10/16/2016</a:t>
+              <a:t>10/13/2018</a:t>
             </a:fld>
             <a:endParaRPr lang="en-US"/>
           </a:p>
@@ -910,10 +921,9 @@
           <a:lstStyle/>
           <a:p>
             <a:r>
-              <a:rPr lang="en-US" smtClean="0"/>
+              <a:rPr lang="en-US"/>
               <a:t>Click to edit Master title style</a:t>
             </a:r>
-            <a:endParaRPr lang="en-US"/>
           </a:p>
         </p:txBody>
       </p:sp>
@@ -939,38 +949,37 @@
           <a:p>
             <a:pPr lvl="0"/>
             <a:r>
-              <a:rPr lang="en-US" smtClean="0"/>
+              <a:rPr lang="en-US"/>
               <a:t>Click to edit Master text styles</a:t>
             </a:r>
           </a:p>
           <a:p>
             <a:pPr lvl="1"/>
             <a:r>
-              <a:rPr lang="en-US" smtClean="0"/>
+              <a:rPr lang="en-US"/>
               <a:t>Second level</a:t>
             </a:r>
           </a:p>
           <a:p>
             <a:pPr lvl="2"/>
             <a:r>
-              <a:rPr lang="en-US" smtClean="0"/>
+              <a:rPr lang="en-US"/>
               <a:t>Third level</a:t>
             </a:r>
           </a:p>
           <a:p>
             <a:pPr lvl="3"/>
             <a:r>
-              <a:rPr lang="en-US" smtClean="0"/>
+              <a:rPr lang="en-US"/>
               <a:t>Fourth level</a:t>
             </a:r>
           </a:p>
           <a:p>
             <a:pPr lvl="4"/>
             <a:r>
-              <a:rPr lang="en-US" smtClean="0"/>
+              <a:rPr lang="en-US"/>
               <a:t>Fifth level</a:t>
             </a:r>
-            <a:endParaRPr lang="en-US"/>
           </a:p>
         </p:txBody>
       </p:sp>
@@ -991,7 +1000,7 @@
           <a:p>
             <a:fld id="{78C97017-6FC3-485B-9764-EAC9E56C1D49}" type="datetimeFigureOut">
               <a:rPr lang="en-US" smtClean="0"/>
-              <a:t>10/16/2016</a:t>
+              <a:t>10/13/2018</a:t>
             </a:fld>
             <a:endParaRPr lang="en-US"/>
           </a:p>
@@ -1085,10 +1094,9 @@
           <a:lstStyle/>
           <a:p>
             <a:r>
-              <a:rPr lang="en-US" smtClean="0"/>
+              <a:rPr lang="en-US"/>
               <a:t>Click to edit Master title style</a:t>
             </a:r>
-            <a:endParaRPr lang="en-US"/>
           </a:p>
         </p:txBody>
       </p:sp>
@@ -1109,38 +1117,37 @@
           <a:p>
             <a:pPr lvl="0"/>
             <a:r>
-              <a:rPr lang="en-US" smtClean="0"/>
+              <a:rPr lang="en-US"/>
               <a:t>Click to edit Master text styles</a:t>
             </a:r>
           </a:p>
           <a:p>
             <a:pPr lvl="1"/>
             <a:r>
-              <a:rPr lang="en-US" smtClean="0"/>
+              <a:rPr lang="en-US"/>
               <a:t>Second level</a:t>
             </a:r>
           </a:p>
           <a:p>
             <a:pPr lvl="2"/>
             <a:r>
-              <a:rPr lang="en-US" smtClean="0"/>
+              <a:rPr lang="en-US"/>
               <a:t>Third level</a:t>
             </a:r>
           </a:p>
           <a:p>
             <a:pPr lvl="3"/>
             <a:r>
-              <a:rPr lang="en-US" smtClean="0"/>
+              <a:rPr lang="en-US"/>
               <a:t>Fourth level</a:t>
             </a:r>
           </a:p>
           <a:p>
             <a:pPr lvl="4"/>
             <a:r>
-              <a:rPr lang="en-US" smtClean="0"/>
+              <a:rPr lang="en-US"/>
               <a:t>Fifth level</a:t>
             </a:r>
-            <a:endParaRPr lang="en-US"/>
           </a:p>
         </p:txBody>
       </p:sp>
@@ -1161,7 +1168,7 @@
           <a:p>
             <a:fld id="{78C97017-6FC3-485B-9764-EAC9E56C1D49}" type="datetimeFigureOut">
               <a:rPr lang="en-US" smtClean="0"/>
-              <a:t>10/16/2016</a:t>
+              <a:t>10/13/2018</a:t>
             </a:fld>
             <a:endParaRPr lang="en-US"/>
           </a:p>
@@ -1264,10 +1271,9 @@
           </a:lstStyle>
           <a:p>
             <a:r>
-              <a:rPr lang="en-US" smtClean="0"/>
+              <a:rPr lang="en-US"/>
               <a:t>Click to edit Master title style</a:t>
             </a:r>
-            <a:endParaRPr lang="en-US"/>
           </a:p>
         </p:txBody>
       </p:sp>
@@ -1384,7 +1390,7 @@
           <a:p>
             <a:pPr lvl="0"/>
             <a:r>
-              <a:rPr lang="en-US" smtClean="0"/>
+              <a:rPr lang="en-US"/>
               <a:t>Click to edit Master text styles</a:t>
             </a:r>
           </a:p>
@@ -1407,7 +1413,7 @@
           <a:p>
             <a:fld id="{78C97017-6FC3-485B-9764-EAC9E56C1D49}" type="datetimeFigureOut">
               <a:rPr lang="en-US" smtClean="0"/>
-              <a:t>10/16/2016</a:t>
+              <a:t>10/13/2018</a:t>
             </a:fld>
             <a:endParaRPr lang="en-US"/>
           </a:p>
@@ -1501,10 +1507,9 @@
           <a:lstStyle/>
           <a:p>
             <a:r>
-              <a:rPr lang="en-US" smtClean="0"/>
+              <a:rPr lang="en-US"/>
               <a:t>Click to edit Master title style</a:t>
             </a:r>
-            <a:endParaRPr lang="en-US"/>
           </a:p>
         </p:txBody>
       </p:sp>
@@ -1558,38 +1563,37 @@
           <a:p>
             <a:pPr lvl="0"/>
             <a:r>
-              <a:rPr lang="en-US" smtClean="0"/>
+              <a:rPr lang="en-US"/>
               <a:t>Click to edit Master text styles</a:t>
             </a:r>
           </a:p>
           <a:p>
             <a:pPr lvl="1"/>
             <a:r>
-              <a:rPr lang="en-US" smtClean="0"/>
+              <a:rPr lang="en-US"/>
               <a:t>Second level</a:t>
             </a:r>
           </a:p>
           <a:p>
             <a:pPr lvl="2"/>
             <a:r>
-              <a:rPr lang="en-US" smtClean="0"/>
+              <a:rPr lang="en-US"/>
               <a:t>Third level</a:t>
             </a:r>
           </a:p>
           <a:p>
             <a:pPr lvl="3"/>
             <a:r>
-              <a:rPr lang="en-US" smtClean="0"/>
+              <a:rPr lang="en-US"/>
               <a:t>Fourth level</a:t>
             </a:r>
           </a:p>
           <a:p>
             <a:pPr lvl="4"/>
             <a:r>
-              <a:rPr lang="en-US" smtClean="0"/>
+              <a:rPr lang="en-US"/>
               <a:t>Fifth level</a:t>
             </a:r>
-            <a:endParaRPr lang="en-US"/>
           </a:p>
         </p:txBody>
       </p:sp>
@@ -1643,38 +1647,37 @@
           <a:p>
             <a:pPr lvl="0"/>
             <a:r>
-              <a:rPr lang="en-US" smtClean="0"/>
+              <a:rPr lang="en-US"/>
               <a:t>Click to edit Master text styles</a:t>
             </a:r>
           </a:p>
           <a:p>
             <a:pPr lvl="1"/>
             <a:r>
-              <a:rPr lang="en-US" smtClean="0"/>
+              <a:rPr lang="en-US"/>
               <a:t>Second level</a:t>
             </a:r>
           </a:p>
           <a:p>
             <a:pPr lvl="2"/>
             <a:r>
-              <a:rPr lang="en-US" smtClean="0"/>
+              <a:rPr lang="en-US"/>
               <a:t>Third level</a:t>
             </a:r>
           </a:p>
           <a:p>
             <a:pPr lvl="3"/>
             <a:r>
-              <a:rPr lang="en-US" smtClean="0"/>
+              <a:rPr lang="en-US"/>
               <a:t>Fourth level</a:t>
             </a:r>
           </a:p>
           <a:p>
             <a:pPr lvl="4"/>
             <a:r>
-              <a:rPr lang="en-US" smtClean="0"/>
+              <a:rPr lang="en-US"/>
               <a:t>Fifth level</a:t>
             </a:r>
-            <a:endParaRPr lang="en-US"/>
           </a:p>
         </p:txBody>
       </p:sp>
@@ -1695,7 +1698,7 @@
           <a:p>
             <a:fld id="{78C97017-6FC3-485B-9764-EAC9E56C1D49}" type="datetimeFigureOut">
               <a:rPr lang="en-US" smtClean="0"/>
-              <a:t>10/16/2016</a:t>
+              <a:t>10/13/2018</a:t>
             </a:fld>
             <a:endParaRPr lang="en-US"/>
           </a:p>
@@ -1793,10 +1796,9 @@
           </a:lstStyle>
           <a:p>
             <a:r>
-              <a:rPr lang="en-US" smtClean="0"/>
+              <a:rPr lang="en-US"/>
               <a:t>Click to edit Master title style</a:t>
             </a:r>
-            <a:endParaRPr lang="en-US"/>
           </a:p>
         </p:txBody>
       </p:sp>
@@ -1859,7 +1861,7 @@
           <a:p>
             <a:pPr lvl="0"/>
             <a:r>
-              <a:rPr lang="en-US" smtClean="0"/>
+              <a:rPr lang="en-US"/>
               <a:t>Click to edit Master text styles</a:t>
             </a:r>
           </a:p>
@@ -1915,38 +1917,37 @@
           <a:p>
             <a:pPr lvl="0"/>
             <a:r>
-              <a:rPr lang="en-US" smtClean="0"/>
+              <a:rPr lang="en-US"/>
               <a:t>Click to edit Master text styles</a:t>
             </a:r>
           </a:p>
           <a:p>
             <a:pPr lvl="1"/>
             <a:r>
-              <a:rPr lang="en-US" smtClean="0"/>
+              <a:rPr lang="en-US"/>
               <a:t>Second level</a:t>
             </a:r>
           </a:p>
           <a:p>
             <a:pPr lvl="2"/>
             <a:r>
-              <a:rPr lang="en-US" smtClean="0"/>
+              <a:rPr lang="en-US"/>
               <a:t>Third level</a:t>
             </a:r>
           </a:p>
           <a:p>
             <a:pPr lvl="3"/>
             <a:r>
-              <a:rPr lang="en-US" smtClean="0"/>
+              <a:rPr lang="en-US"/>
               <a:t>Fourth level</a:t>
             </a:r>
           </a:p>
           <a:p>
             <a:pPr lvl="4"/>
             <a:r>
-              <a:rPr lang="en-US" smtClean="0"/>
+              <a:rPr lang="en-US"/>
               <a:t>Fifth level</a:t>
             </a:r>
-            <a:endParaRPr lang="en-US"/>
           </a:p>
         </p:txBody>
       </p:sp>
@@ -2009,7 +2010,7 @@
           <a:p>
             <a:pPr lvl="0"/>
             <a:r>
-              <a:rPr lang="en-US" smtClean="0"/>
+              <a:rPr lang="en-US"/>
               <a:t>Click to edit Master text styles</a:t>
             </a:r>
           </a:p>
@@ -2065,38 +2066,37 @@
           <a:p>
             <a:pPr lvl="0"/>
             <a:r>
-              <a:rPr lang="en-US" smtClean="0"/>
+              <a:rPr lang="en-US"/>
               <a:t>Click to edit Master text styles</a:t>
             </a:r>
           </a:p>
           <a:p>
             <a:pPr lvl="1"/>
             <a:r>
-              <a:rPr lang="en-US" smtClean="0"/>
+              <a:rPr lang="en-US"/>
               <a:t>Second level</a:t>
             </a:r>
           </a:p>
           <a:p>
             <a:pPr lvl="2"/>
             <a:r>
-              <a:rPr lang="en-US" smtClean="0"/>
+              <a:rPr lang="en-US"/>
               <a:t>Third level</a:t>
             </a:r>
           </a:p>
           <a:p>
             <a:pPr lvl="3"/>
             <a:r>
-              <a:rPr lang="en-US" smtClean="0"/>
+              <a:rPr lang="en-US"/>
               <a:t>Fourth level</a:t>
             </a:r>
           </a:p>
           <a:p>
             <a:pPr lvl="4"/>
             <a:r>
-              <a:rPr lang="en-US" smtClean="0"/>
+              <a:rPr lang="en-US"/>
               <a:t>Fifth level</a:t>
             </a:r>
-            <a:endParaRPr lang="en-US"/>
           </a:p>
         </p:txBody>
       </p:sp>
@@ -2117,7 +2117,7 @@
           <a:p>
             <a:fld id="{78C97017-6FC3-485B-9764-EAC9E56C1D49}" type="datetimeFigureOut">
               <a:rPr lang="en-US" smtClean="0"/>
-              <a:t>10/16/2016</a:t>
+              <a:t>10/13/2018</a:t>
             </a:fld>
             <a:endParaRPr lang="en-US"/>
           </a:p>
@@ -2211,10 +2211,9 @@
           <a:lstStyle/>
           <a:p>
             <a:r>
-              <a:rPr lang="en-US" smtClean="0"/>
+              <a:rPr lang="en-US"/>
               <a:t>Click to edit Master title style</a:t>
             </a:r>
-            <a:endParaRPr lang="en-US"/>
           </a:p>
         </p:txBody>
       </p:sp>
@@ -2235,7 +2234,7 @@
           <a:p>
             <a:fld id="{78C97017-6FC3-485B-9764-EAC9E56C1D49}" type="datetimeFigureOut">
               <a:rPr lang="en-US" smtClean="0"/>
-              <a:t>10/16/2016</a:t>
+              <a:t>10/13/2018</a:t>
             </a:fld>
             <a:endParaRPr lang="en-US"/>
           </a:p>
@@ -2330,7 +2329,7 @@
           <a:p>
             <a:fld id="{78C97017-6FC3-485B-9764-EAC9E56C1D49}" type="datetimeFigureOut">
               <a:rPr lang="en-US" smtClean="0"/>
-              <a:t>10/16/2016</a:t>
+              <a:t>10/13/2018</a:t>
             </a:fld>
             <a:endParaRPr lang="en-US"/>
           </a:p>
@@ -2433,10 +2432,9 @@
           </a:lstStyle>
           <a:p>
             <a:r>
-              <a:rPr lang="en-US" smtClean="0"/>
+              <a:rPr lang="en-US"/>
               <a:t>Click to edit Master title style</a:t>
             </a:r>
-            <a:endParaRPr lang="en-US"/>
           </a:p>
         </p:txBody>
       </p:sp>
@@ -2490,38 +2488,37 @@
           <a:p>
             <a:pPr lvl="0"/>
             <a:r>
-              <a:rPr lang="en-US" smtClean="0"/>
+              <a:rPr lang="en-US"/>
               <a:t>Click to edit Master text styles</a:t>
             </a:r>
           </a:p>
           <a:p>
             <a:pPr lvl="1"/>
             <a:r>
-              <a:rPr lang="en-US" smtClean="0"/>
+              <a:rPr lang="en-US"/>
               <a:t>Second level</a:t>
             </a:r>
           </a:p>
           <a:p>
             <a:pPr lvl="2"/>
             <a:r>
-              <a:rPr lang="en-US" smtClean="0"/>
+              <a:rPr lang="en-US"/>
               <a:t>Third level</a:t>
             </a:r>
           </a:p>
           <a:p>
             <a:pPr lvl="3"/>
             <a:r>
-              <a:rPr lang="en-US" smtClean="0"/>
+              <a:rPr lang="en-US"/>
               <a:t>Fourth level</a:t>
             </a:r>
           </a:p>
           <a:p>
             <a:pPr lvl="4"/>
             <a:r>
-              <a:rPr lang="en-US" smtClean="0"/>
+              <a:rPr lang="en-US"/>
               <a:t>Fifth level</a:t>
             </a:r>
-            <a:endParaRPr lang="en-US"/>
           </a:p>
         </p:txBody>
       </p:sp>
@@ -2584,7 +2581,7 @@
           <a:p>
             <a:pPr lvl="0"/>
             <a:r>
-              <a:rPr lang="en-US" smtClean="0"/>
+              <a:rPr lang="en-US"/>
               <a:t>Click to edit Master text styles</a:t>
             </a:r>
           </a:p>
@@ -2607,7 +2604,7 @@
           <a:p>
             <a:fld id="{78C97017-6FC3-485B-9764-EAC9E56C1D49}" type="datetimeFigureOut">
               <a:rPr lang="en-US" smtClean="0"/>
-              <a:t>10/16/2016</a:t>
+              <a:t>10/13/2018</a:t>
             </a:fld>
             <a:endParaRPr lang="en-US"/>
           </a:p>
@@ -2710,10 +2707,9 @@
           </a:lstStyle>
           <a:p>
             <a:r>
-              <a:rPr lang="en-US" smtClean="0"/>
+              <a:rPr lang="en-US"/>
               <a:t>Click to edit Master title style</a:t>
             </a:r>
-            <a:endParaRPr lang="en-US"/>
           </a:p>
         </p:txBody>
       </p:sp>
@@ -2837,7 +2833,7 @@
           <a:p>
             <a:pPr lvl="0"/>
             <a:r>
-              <a:rPr lang="en-US" smtClean="0"/>
+              <a:rPr lang="en-US"/>
               <a:t>Click to edit Master text styles</a:t>
             </a:r>
           </a:p>
@@ -2860,7 +2856,7 @@
           <a:p>
             <a:fld id="{78C97017-6FC3-485B-9764-EAC9E56C1D49}" type="datetimeFigureOut">
               <a:rPr lang="en-US" smtClean="0"/>
-              <a:t>10/16/2016</a:t>
+              <a:t>10/13/2018</a:t>
             </a:fld>
             <a:endParaRPr lang="en-US"/>
           </a:p>
@@ -2969,10 +2965,9 @@
           <a:lstStyle/>
           <a:p>
             <a:r>
-              <a:rPr lang="en-US" smtClean="0"/>
+              <a:rPr lang="en-US"/>
               <a:t>Click to edit Master title style</a:t>
             </a:r>
-            <a:endParaRPr lang="en-US"/>
           </a:p>
         </p:txBody>
       </p:sp>
@@ -3003,38 +2998,37 @@
           <a:p>
             <a:pPr lvl="0"/>
             <a:r>
-              <a:rPr lang="en-US" smtClean="0"/>
+              <a:rPr lang="en-US"/>
               <a:t>Click to edit Master text styles</a:t>
             </a:r>
           </a:p>
           <a:p>
             <a:pPr lvl="1"/>
             <a:r>
-              <a:rPr lang="en-US" smtClean="0"/>
+              <a:rPr lang="en-US"/>
               <a:t>Second level</a:t>
             </a:r>
           </a:p>
           <a:p>
             <a:pPr lvl="2"/>
             <a:r>
-              <a:rPr lang="en-US" smtClean="0"/>
+              <a:rPr lang="en-US"/>
               <a:t>Third level</a:t>
             </a:r>
           </a:p>
           <a:p>
             <a:pPr lvl="3"/>
             <a:r>
-              <a:rPr lang="en-US" smtClean="0"/>
+              <a:rPr lang="en-US"/>
               <a:t>Fourth level</a:t>
             </a:r>
           </a:p>
           <a:p>
             <a:pPr lvl="4"/>
             <a:r>
-              <a:rPr lang="en-US" smtClean="0"/>
+              <a:rPr lang="en-US"/>
               <a:t>Fifth level</a:t>
             </a:r>
-            <a:endParaRPr lang="en-US"/>
           </a:p>
         </p:txBody>
       </p:sp>
@@ -3073,7 +3067,7 @@
           <a:p>
             <a:fld id="{78C97017-6FC3-485B-9764-EAC9E56C1D49}" type="datetimeFigureOut">
               <a:rPr lang="en-US" smtClean="0"/>
-              <a:t>10/16/2016</a:t>
+              <a:t>10/13/2018</a:t>
             </a:fld>
             <a:endParaRPr lang="en-US"/>
           </a:p>
@@ -3457,7 +3451,7 @@
         <p:spPr>
           <a:xfrm>
             <a:off x="1119865" y="2086382"/>
-            <a:ext cx="7871735" cy="1723618"/>
+            <a:ext cx="7871735" cy="3233318"/>
           </a:xfrm>
           <a:prstGeom prst="roundRect">
             <a:avLst>
@@ -3494,7 +3488,7 @@
           <a:lstStyle/>
           <a:p>
             <a:r>
-              <a:rPr lang="en-US" sz="1200" b="1" dirty="0" smtClean="0">
+              <a:rPr lang="en-US" sz="1200" b="1" dirty="0">
                 <a:solidFill>
                   <a:schemeClr val="accent6">
                     <a:lumMod val="75000"/>
@@ -3561,7 +3555,7 @@
           <a:p>
             <a:pPr algn="ctr"/>
             <a:r>
-              <a:rPr lang="en-US" sz="1050" dirty="0" smtClean="0">
+              <a:rPr lang="en-US" sz="1050" dirty="0">
                 <a:solidFill>
                   <a:schemeClr val="bg1"/>
                 </a:solidFill>
@@ -3569,14 +3563,14 @@
               <a:t>&lt;&lt;interface&gt;&gt;</a:t>
             </a:r>
             <a:br>
-              <a:rPr lang="en-US" sz="1050" dirty="0" smtClean="0">
+              <a:rPr lang="en-US" sz="1050" dirty="0">
                 <a:solidFill>
                   <a:schemeClr val="bg1"/>
                 </a:solidFill>
               </a:rPr>
             </a:br>
             <a:r>
-              <a:rPr lang="en-US" sz="1050" dirty="0" err="1" smtClean="0">
+              <a:rPr lang="en-US" sz="1050" dirty="0" err="1">
                 <a:solidFill>
                   <a:schemeClr val="bg1"/>
                 </a:solidFill>
@@ -3639,7 +3633,7 @@
           <a:p>
             <a:pPr algn="ctr"/>
             <a:r>
-              <a:rPr lang="en-US" sz="1050" dirty="0" err="1" smtClean="0">
+              <a:rPr lang="en-US" sz="1050" dirty="0" err="1">
                 <a:solidFill>
                   <a:schemeClr val="bg1"/>
                 </a:solidFill>
@@ -3713,7 +3707,7 @@
           <a:p>
             <a:pPr algn="ctr"/>
             <a:r>
-              <a:rPr lang="en-US" sz="1050" dirty="0" smtClean="0">
+              <a:rPr lang="en-US" sz="1050" dirty="0">
                 <a:solidFill>
                   <a:schemeClr val="bg1"/>
                 </a:solidFill>
@@ -4147,7 +4141,7 @@
           <a:p>
             <a:pPr algn="ctr"/>
             <a:r>
-              <a:rPr lang="en-US" sz="1050" b="1" dirty="0" err="1" smtClean="0">
+              <a:rPr lang="en-US" sz="1050" b="1" dirty="0" err="1">
                 <a:solidFill>
                   <a:schemeClr val="accent6">
                     <a:lumMod val="75000"/>
@@ -4156,18 +4150,8 @@
               </a:rPr>
               <a:t>XmlAddressBook</a:t>
             </a:r>
-            <a:r>
-              <a:rPr lang="en-US" sz="1050" b="1" dirty="0" smtClean="0">
-                <a:solidFill>
-                  <a:schemeClr val="accent6">
-                    <a:lumMod val="75000"/>
-                  </a:schemeClr>
-                </a:solidFill>
-              </a:rPr>
-              <a:t/>
-            </a:r>
             <a:br>
-              <a:rPr lang="en-US" sz="1050" b="1" dirty="0" smtClean="0">
+              <a:rPr lang="en-US" sz="1050" b="1" dirty="0">
                 <a:solidFill>
                   <a:schemeClr val="accent6">
                     <a:lumMod val="75000"/>
@@ -4176,7 +4160,7 @@
               </a:rPr>
             </a:br>
             <a:r>
-              <a:rPr lang="en-US" sz="1050" b="1" dirty="0" smtClean="0">
+              <a:rPr lang="en-US" sz="1050" b="1" dirty="0">
                 <a:solidFill>
                   <a:schemeClr val="accent6">
                     <a:lumMod val="75000"/>
@@ -4243,7 +4227,7 @@
           <a:p>
             <a:pPr algn="ctr"/>
             <a:r>
-              <a:rPr lang="en-US" sz="1050" dirty="0" smtClean="0">
+              <a:rPr lang="en-US" sz="1050" dirty="0">
                 <a:solidFill>
                   <a:schemeClr val="bg1"/>
                 </a:solidFill>
@@ -4251,14 +4235,14 @@
               <a:t>&lt;&lt;interface&gt;&gt;</a:t>
             </a:r>
             <a:br>
-              <a:rPr lang="en-US" sz="1050" dirty="0" smtClean="0">
+              <a:rPr lang="en-US" sz="1050" dirty="0">
                 <a:solidFill>
                   <a:schemeClr val="bg1"/>
                 </a:solidFill>
               </a:rPr>
             </a:br>
             <a:r>
-              <a:rPr lang="en-US" sz="1050" dirty="0" err="1" smtClean="0">
+              <a:rPr lang="en-US" sz="1050" dirty="0" err="1">
                 <a:solidFill>
                   <a:schemeClr val="bg1"/>
                 </a:solidFill>
@@ -4516,30 +4500,22 @@
           <a:p>
             <a:pPr algn="ctr"/>
             <a:r>
-              <a:rPr lang="en-US" sz="1050" dirty="0" err="1" smtClean="0">
+              <a:rPr lang="en-US" sz="1050" dirty="0" err="1">
                 <a:solidFill>
                   <a:schemeClr val="bg1"/>
                 </a:solidFill>
               </a:rPr>
               <a:t>JsonUserPrefs</a:t>
             </a:r>
-            <a:r>
-              <a:rPr lang="en-US" sz="1050" dirty="0" smtClean="0">
-                <a:solidFill>
-                  <a:schemeClr val="bg1"/>
-                </a:solidFill>
-              </a:rPr>
-              <a:t/>
-            </a:r>
             <a:br>
-              <a:rPr lang="en-US" sz="1050" dirty="0" smtClean="0">
+              <a:rPr lang="en-US" sz="1050" dirty="0">
                 <a:solidFill>
                   <a:schemeClr val="bg1"/>
                 </a:solidFill>
               </a:rPr>
             </a:br>
             <a:r>
-              <a:rPr lang="en-US" sz="1050" dirty="0" smtClean="0">
+              <a:rPr lang="en-US" sz="1050" dirty="0">
                 <a:solidFill>
                   <a:schemeClr val="bg1"/>
                 </a:solidFill>
@@ -4591,7 +4567,7 @@
           <a:p>
             <a:pPr algn="ctr"/>
             <a:r>
-              <a:rPr lang="en-US" sz="1050" b="1" dirty="0" err="1" smtClean="0">
+              <a:rPr lang="en-US" sz="1050" b="1" dirty="0" err="1">
                 <a:solidFill>
                   <a:schemeClr val="accent6">
                     <a:lumMod val="75000"/>
@@ -4600,18 +4576,8 @@
               </a:rPr>
               <a:t>XmlSerializable</a:t>
             </a:r>
-            <a:r>
-              <a:rPr lang="en-US" sz="1050" b="1" dirty="0" smtClean="0">
-                <a:solidFill>
-                  <a:schemeClr val="accent6">
-                    <a:lumMod val="75000"/>
-                  </a:schemeClr>
-                </a:solidFill>
-              </a:rPr>
-              <a:t/>
-            </a:r>
             <a:br>
-              <a:rPr lang="en-US" sz="1050" b="1" dirty="0" smtClean="0">
+              <a:rPr lang="en-US" sz="1050" b="1" dirty="0">
                 <a:solidFill>
                   <a:schemeClr val="accent6">
                     <a:lumMod val="75000"/>
@@ -4620,7 +4586,7 @@
               </a:rPr>
             </a:br>
             <a:r>
-              <a:rPr lang="en-US" sz="1050" b="1" dirty="0" err="1" smtClean="0">
+              <a:rPr lang="en-US" sz="1050" b="1" dirty="0" err="1">
                 <a:solidFill>
                   <a:schemeClr val="accent6">
                     <a:lumMod val="75000"/>
@@ -4643,15 +4609,16 @@
         <p:nvCxnSpPr>
           <p:cNvPr id="70" name="Elbow Connector 122"/>
           <p:cNvCxnSpPr>
-            <a:stCxn id="74" idx="0"/>
-            <a:endCxn id="73" idx="2"/>
+            <a:cxnSpLocks/>
+            <a:stCxn id="74" idx="2"/>
+            <a:endCxn id="73" idx="0"/>
           </p:cNvCxnSpPr>
           <p:nvPr/>
         </p:nvCxnSpPr>
         <p:spPr>
-          <a:xfrm rot="5400000" flipH="1" flipV="1">
-            <a:off x="8077993" y="2992020"/>
-            <a:ext cx="335208" cy="12700"/>
+          <a:xfrm rot="5400000">
+            <a:off x="8045825" y="3668130"/>
+            <a:ext cx="361518" cy="38027"/>
           </a:xfrm>
           <a:prstGeom prst="bentConnector3">
             <a:avLst>
@@ -4688,7 +4655,7 @@
         </p:nvSpPr>
         <p:spPr>
           <a:xfrm>
-            <a:off x="7615738" y="2477656"/>
+            <a:off x="7577711" y="3867902"/>
             <a:ext cx="1259718" cy="346760"/>
           </a:xfrm>
           <a:prstGeom prst="rect">
@@ -4717,7 +4684,7 @@
           <a:p>
             <a:pPr algn="ctr"/>
             <a:r>
-              <a:rPr lang="en-US" sz="1050" b="1" dirty="0" err="1" smtClean="0">
+              <a:rPr lang="en-US" sz="1050" b="1" dirty="0" err="1">
                 <a:solidFill>
                   <a:schemeClr val="accent6">
                     <a:lumMod val="75000"/>
@@ -4773,7 +4740,7 @@
           <a:p>
             <a:pPr algn="ctr"/>
             <a:r>
-              <a:rPr lang="en-US" sz="1050" b="1" dirty="0" err="1" smtClean="0">
+              <a:rPr lang="en-US" sz="1050" b="1" dirty="0" err="1">
                 <a:solidFill>
                   <a:schemeClr val="accent6">
                     <a:lumMod val="75000"/>
@@ -4805,6 +4772,647 @@
           <a:xfrm flipV="1">
             <a:off x="7220507" y="3333004"/>
             <a:ext cx="395231" cy="786"/>
+          </a:xfrm>
+          <a:prstGeom prst="bentConnector3">
+            <a:avLst>
+              <a:gd name="adj1" fmla="val 50000"/>
+            </a:avLst>
+          </a:prstGeom>
+          <a:ln w="19050">
+            <a:prstDash val="sysDot"/>
+            <a:headEnd type="none" w="med" len="med"/>
+            <a:tailEnd type="arrow" w="med" len="med"/>
+          </a:ln>
+          <a:effectLst/>
+        </p:spPr>
+        <p:style>
+          <a:lnRef idx="1">
+            <a:schemeClr val="accent6"/>
+          </a:lnRef>
+          <a:fillRef idx="2">
+            <a:schemeClr val="accent6"/>
+          </a:fillRef>
+          <a:effectRef idx="1">
+            <a:schemeClr val="accent6"/>
+          </a:effectRef>
+          <a:fontRef idx="minor">
+            <a:schemeClr val="dk1"/>
+          </a:fontRef>
+        </p:style>
+      </p:cxnSp>
+      <p:sp>
+        <p:nvSpPr>
+          <p:cNvPr id="39" name="Rectangle 8">
+            <a:extLst>
+              <a:ext uri="{FF2B5EF4-FFF2-40B4-BE49-F238E27FC236}">
+                <a16:creationId xmlns:a16="http://schemas.microsoft.com/office/drawing/2014/main" id="{C3CA084F-57AF-477F-AC8A-0BA6D1AE9B4E}"/>
+              </a:ext>
+            </a:extLst>
+          </p:cNvPr>
+          <p:cNvSpPr/>
+          <p:nvPr/>
+        </p:nvSpPr>
+        <p:spPr>
+          <a:xfrm>
+            <a:off x="6023344" y="3866617"/>
+            <a:ext cx="1259718" cy="346760"/>
+          </a:xfrm>
+          <a:prstGeom prst="rect">
+            <a:avLst/>
+          </a:prstGeom>
+          <a:ln w="19050"/>
+          <a:effectLst/>
+        </p:spPr>
+        <p:style>
+          <a:lnRef idx="1">
+            <a:schemeClr val="accent6"/>
+          </a:lnRef>
+          <a:fillRef idx="2">
+            <a:schemeClr val="accent6"/>
+          </a:fillRef>
+          <a:effectRef idx="1">
+            <a:schemeClr val="accent6"/>
+          </a:effectRef>
+          <a:fontRef idx="minor">
+            <a:schemeClr val="dk1"/>
+          </a:fontRef>
+        </p:style>
+        <p:txBody>
+          <a:bodyPr rtlCol="0" anchor="ctr"/>
+          <a:lstStyle/>
+          <a:p>
+            <a:pPr algn="ctr"/>
+            <a:r>
+              <a:rPr lang="en-US" sz="1050" b="1" dirty="0" err="1">
+                <a:solidFill>
+                  <a:schemeClr val="accent6">
+                    <a:lumMod val="75000"/>
+                  </a:schemeClr>
+                </a:solidFill>
+              </a:rPr>
+              <a:t>XmlAdaptedEvent</a:t>
+            </a:r>
+            <a:endParaRPr lang="en-SG" sz="1050" b="1" dirty="0">
+              <a:solidFill>
+                <a:schemeClr val="accent6">
+                  <a:lumMod val="75000"/>
+                </a:schemeClr>
+              </a:solidFill>
+            </a:endParaRPr>
+          </a:p>
+        </p:txBody>
+      </p:sp>
+      <p:cxnSp>
+        <p:nvCxnSpPr>
+          <p:cNvPr id="43" name="Elbow Connector 122">
+            <a:extLst>
+              <a:ext uri="{FF2B5EF4-FFF2-40B4-BE49-F238E27FC236}">
+                <a16:creationId xmlns:a16="http://schemas.microsoft.com/office/drawing/2014/main" id="{B67B120C-5ACC-4E5D-BB3D-77828D97E41E}"/>
+              </a:ext>
+            </a:extLst>
+          </p:cNvPr>
+          <p:cNvCxnSpPr>
+            <a:cxnSpLocks/>
+            <a:stCxn id="39" idx="2"/>
+            <a:endCxn id="63" idx="0"/>
+          </p:cNvCxnSpPr>
+          <p:nvPr/>
+        </p:nvCxnSpPr>
+        <p:spPr>
+          <a:xfrm rot="16200000" flipH="1">
+            <a:off x="7108754" y="3757825"/>
+            <a:ext cx="414194" cy="1325297"/>
+          </a:xfrm>
+          <a:prstGeom prst="bentConnector3">
+            <a:avLst>
+              <a:gd name="adj1" fmla="val 50000"/>
+            </a:avLst>
+          </a:prstGeom>
+          <a:ln w="19050">
+            <a:prstDash val="sysDot"/>
+            <a:headEnd type="none" w="med" len="med"/>
+            <a:tailEnd type="arrow" w="med" len="med"/>
+          </a:ln>
+          <a:effectLst/>
+        </p:spPr>
+        <p:style>
+          <a:lnRef idx="1">
+            <a:schemeClr val="accent6"/>
+          </a:lnRef>
+          <a:fillRef idx="2">
+            <a:schemeClr val="accent6"/>
+          </a:fillRef>
+          <a:effectRef idx="1">
+            <a:schemeClr val="accent6"/>
+          </a:effectRef>
+          <a:fontRef idx="minor">
+            <a:schemeClr val="dk1"/>
+          </a:fontRef>
+        </p:style>
+      </p:cxnSp>
+      <p:cxnSp>
+        <p:nvCxnSpPr>
+          <p:cNvPr id="51" name="Elbow Connector 122">
+            <a:extLst>
+              <a:ext uri="{FF2B5EF4-FFF2-40B4-BE49-F238E27FC236}">
+                <a16:creationId xmlns:a16="http://schemas.microsoft.com/office/drawing/2014/main" id="{5DDAC42F-782C-4FAF-ADAE-5112F97D8F94}"/>
+              </a:ext>
+            </a:extLst>
+          </p:cNvPr>
+          <p:cNvCxnSpPr>
+            <a:cxnSpLocks/>
+            <a:endCxn id="62" idx="0"/>
+          </p:cNvCxnSpPr>
+          <p:nvPr/>
+        </p:nvCxnSpPr>
+        <p:spPr>
+          <a:xfrm rot="10800000" flipV="1">
+            <a:off x="4572000" y="4026010"/>
+            <a:ext cx="1447800" cy="606960"/>
+          </a:xfrm>
+          <a:prstGeom prst="bentConnector2">
+            <a:avLst/>
+          </a:prstGeom>
+          <a:ln w="19050">
+            <a:prstDash val="sysDot"/>
+            <a:headEnd type="none" w="med" len="med"/>
+            <a:tailEnd type="arrow" w="med" len="med"/>
+          </a:ln>
+          <a:effectLst/>
+        </p:spPr>
+        <p:style>
+          <a:lnRef idx="1">
+            <a:schemeClr val="accent6"/>
+          </a:lnRef>
+          <a:fillRef idx="2">
+            <a:schemeClr val="accent6"/>
+          </a:fillRef>
+          <a:effectRef idx="1">
+            <a:schemeClr val="accent6"/>
+          </a:effectRef>
+          <a:fontRef idx="minor">
+            <a:schemeClr val="dk1"/>
+          </a:fontRef>
+        </p:style>
+      </p:cxnSp>
+      <p:cxnSp>
+        <p:nvCxnSpPr>
+          <p:cNvPr id="53" name="Elbow Connector 122">
+            <a:extLst>
+              <a:ext uri="{FF2B5EF4-FFF2-40B4-BE49-F238E27FC236}">
+                <a16:creationId xmlns:a16="http://schemas.microsoft.com/office/drawing/2014/main" id="{4BF805D6-F56C-4A59-878B-6D3AB1AA83C1}"/>
+              </a:ext>
+            </a:extLst>
+          </p:cNvPr>
+          <p:cNvCxnSpPr>
+            <a:cxnSpLocks/>
+            <a:endCxn id="73" idx="1"/>
+          </p:cNvCxnSpPr>
+          <p:nvPr/>
+        </p:nvCxnSpPr>
+        <p:spPr>
+          <a:xfrm>
+            <a:off x="7283062" y="4041282"/>
+            <a:ext cx="294649" cy="12700"/>
+          </a:xfrm>
+          <a:prstGeom prst="bentConnector3">
+            <a:avLst>
+              <a:gd name="adj1" fmla="val 50000"/>
+            </a:avLst>
+          </a:prstGeom>
+          <a:ln w="19050">
+            <a:prstDash val="sysDot"/>
+            <a:headEnd type="none" w="med" len="med"/>
+            <a:tailEnd type="arrow" w="med" len="med"/>
+          </a:ln>
+          <a:effectLst/>
+        </p:spPr>
+        <p:style>
+          <a:lnRef idx="1">
+            <a:schemeClr val="accent6"/>
+          </a:lnRef>
+          <a:fillRef idx="2">
+            <a:schemeClr val="accent6"/>
+          </a:fillRef>
+          <a:effectRef idx="1">
+            <a:schemeClr val="accent6"/>
+          </a:effectRef>
+          <a:fontRef idx="minor">
+            <a:schemeClr val="dk1"/>
+          </a:fontRef>
+        </p:style>
+      </p:cxnSp>
+      <p:sp>
+        <p:nvSpPr>
+          <p:cNvPr id="62" name="Rectangle 8">
+            <a:extLst>
+              <a:ext uri="{FF2B5EF4-FFF2-40B4-BE49-F238E27FC236}">
+                <a16:creationId xmlns:a16="http://schemas.microsoft.com/office/drawing/2014/main" id="{3770A15A-CBAA-4E96-AF1E-07AC3C4F1C91}"/>
+              </a:ext>
+            </a:extLst>
+          </p:cNvPr>
+          <p:cNvSpPr/>
+          <p:nvPr/>
+        </p:nvSpPr>
+        <p:spPr>
+          <a:xfrm>
+            <a:off x="3942141" y="4632970"/>
+            <a:ext cx="1259718" cy="346760"/>
+          </a:xfrm>
+          <a:prstGeom prst="rect">
+            <a:avLst/>
+          </a:prstGeom>
+          <a:ln w="19050"/>
+          <a:effectLst/>
+        </p:spPr>
+        <p:style>
+          <a:lnRef idx="1">
+            <a:schemeClr val="accent6"/>
+          </a:lnRef>
+          <a:fillRef idx="2">
+            <a:schemeClr val="accent6"/>
+          </a:fillRef>
+          <a:effectRef idx="1">
+            <a:schemeClr val="accent6"/>
+          </a:effectRef>
+          <a:fontRef idx="minor">
+            <a:schemeClr val="dk1"/>
+          </a:fontRef>
+        </p:style>
+        <p:txBody>
+          <a:bodyPr rtlCol="0" anchor="ctr"/>
+          <a:lstStyle/>
+          <a:p>
+            <a:pPr algn="ctr"/>
+            <a:r>
+              <a:rPr lang="en-US" sz="1050" b="1" dirty="0" err="1">
+                <a:solidFill>
+                  <a:schemeClr val="accent6">
+                    <a:lumMod val="75000"/>
+                  </a:schemeClr>
+                </a:solidFill>
+              </a:rPr>
+              <a:t>XmlAdaptedPoll</a:t>
+            </a:r>
+            <a:endParaRPr lang="en-SG" sz="1050" b="1" dirty="0">
+              <a:solidFill>
+                <a:schemeClr val="accent6">
+                  <a:lumMod val="75000"/>
+                </a:schemeClr>
+              </a:solidFill>
+            </a:endParaRPr>
+          </a:p>
+        </p:txBody>
+      </p:sp>
+      <p:sp>
+        <p:nvSpPr>
+          <p:cNvPr id="63" name="Rectangle 8">
+            <a:extLst>
+              <a:ext uri="{FF2B5EF4-FFF2-40B4-BE49-F238E27FC236}">
+                <a16:creationId xmlns:a16="http://schemas.microsoft.com/office/drawing/2014/main" id="{2BB9BC6E-0A1E-4B24-BC78-DD9B668DD5AF}"/>
+              </a:ext>
+            </a:extLst>
+          </p:cNvPr>
+          <p:cNvSpPr/>
+          <p:nvPr/>
+        </p:nvSpPr>
+        <p:spPr>
+          <a:xfrm>
+            <a:off x="7348641" y="4627571"/>
+            <a:ext cx="1259718" cy="346760"/>
+          </a:xfrm>
+          <a:prstGeom prst="rect">
+            <a:avLst/>
+          </a:prstGeom>
+          <a:ln w="19050"/>
+          <a:effectLst/>
+        </p:spPr>
+        <p:style>
+          <a:lnRef idx="1">
+            <a:schemeClr val="accent6"/>
+          </a:lnRef>
+          <a:fillRef idx="2">
+            <a:schemeClr val="accent6"/>
+          </a:fillRef>
+          <a:effectRef idx="1">
+            <a:schemeClr val="accent6"/>
+          </a:effectRef>
+          <a:fontRef idx="minor">
+            <a:schemeClr val="dk1"/>
+          </a:fontRef>
+        </p:style>
+        <p:txBody>
+          <a:bodyPr rtlCol="0" anchor="ctr"/>
+          <a:lstStyle/>
+          <a:p>
+            <a:pPr algn="ctr"/>
+            <a:r>
+              <a:rPr lang="en-US" sz="1050" b="1" dirty="0" err="1">
+                <a:solidFill>
+                  <a:schemeClr val="accent6">
+                    <a:lumMod val="75000"/>
+                  </a:schemeClr>
+                </a:solidFill>
+              </a:rPr>
+              <a:t>XmlPersonIndex</a:t>
+            </a:r>
+            <a:endParaRPr lang="en-SG" sz="1050" b="1" dirty="0">
+              <a:solidFill>
+                <a:schemeClr val="accent6">
+                  <a:lumMod val="75000"/>
+                </a:schemeClr>
+              </a:solidFill>
+            </a:endParaRPr>
+          </a:p>
+        </p:txBody>
+      </p:sp>
+      <p:cxnSp>
+        <p:nvCxnSpPr>
+          <p:cNvPr id="78" name="Elbow Connector 122">
+            <a:extLst>
+              <a:ext uri="{FF2B5EF4-FFF2-40B4-BE49-F238E27FC236}">
+                <a16:creationId xmlns:a16="http://schemas.microsoft.com/office/drawing/2014/main" id="{7F7E3864-1089-4AF4-84DB-D7CCB3006599}"/>
+              </a:ext>
+            </a:extLst>
+          </p:cNvPr>
+          <p:cNvCxnSpPr>
+            <a:cxnSpLocks/>
+            <a:stCxn id="62" idx="3"/>
+            <a:endCxn id="83" idx="1"/>
+          </p:cNvCxnSpPr>
+          <p:nvPr/>
+        </p:nvCxnSpPr>
+        <p:spPr>
+          <a:xfrm>
+            <a:off x="5201859" y="4806350"/>
+            <a:ext cx="323787" cy="1771"/>
+          </a:xfrm>
+          <a:prstGeom prst="bentConnector3">
+            <a:avLst>
+              <a:gd name="adj1" fmla="val 50000"/>
+            </a:avLst>
+          </a:prstGeom>
+          <a:ln w="19050">
+            <a:prstDash val="sysDot"/>
+            <a:headEnd type="none" w="med" len="med"/>
+            <a:tailEnd type="arrow" w="med" len="med"/>
+          </a:ln>
+          <a:effectLst/>
+        </p:spPr>
+        <p:style>
+          <a:lnRef idx="1">
+            <a:schemeClr val="accent6"/>
+          </a:lnRef>
+          <a:fillRef idx="2">
+            <a:schemeClr val="accent6"/>
+          </a:fillRef>
+          <a:effectRef idx="1">
+            <a:schemeClr val="accent6"/>
+          </a:effectRef>
+          <a:fontRef idx="minor">
+            <a:schemeClr val="dk1"/>
+          </a:fontRef>
+        </p:style>
+      </p:cxnSp>
+      <p:sp>
+        <p:nvSpPr>
+          <p:cNvPr id="83" name="Rectangle 8">
+            <a:extLst>
+              <a:ext uri="{FF2B5EF4-FFF2-40B4-BE49-F238E27FC236}">
+                <a16:creationId xmlns:a16="http://schemas.microsoft.com/office/drawing/2014/main" id="{E3F1142C-3789-4280-86D4-43C7BA79572A}"/>
+              </a:ext>
+            </a:extLst>
+          </p:cNvPr>
+          <p:cNvSpPr/>
+          <p:nvPr/>
+        </p:nvSpPr>
+        <p:spPr>
+          <a:xfrm>
+            <a:off x="5525646" y="4618653"/>
+            <a:ext cx="1407856" cy="378936"/>
+          </a:xfrm>
+          <a:prstGeom prst="rect">
+            <a:avLst/>
+          </a:prstGeom>
+          <a:ln w="19050"/>
+          <a:effectLst/>
+        </p:spPr>
+        <p:style>
+          <a:lnRef idx="1">
+            <a:schemeClr val="accent6"/>
+          </a:lnRef>
+          <a:fillRef idx="2">
+            <a:schemeClr val="accent6"/>
+          </a:fillRef>
+          <a:effectRef idx="1">
+            <a:schemeClr val="accent6"/>
+          </a:effectRef>
+          <a:fontRef idx="minor">
+            <a:schemeClr val="dk1"/>
+          </a:fontRef>
+        </p:style>
+        <p:txBody>
+          <a:bodyPr rtlCol="0" anchor="ctr"/>
+          <a:lstStyle/>
+          <a:p>
+            <a:pPr algn="ctr"/>
+            <a:r>
+              <a:rPr lang="en-US" sz="1050" b="1" dirty="0" err="1">
+                <a:solidFill>
+                  <a:schemeClr val="accent6">
+                    <a:lumMod val="75000"/>
+                  </a:schemeClr>
+                </a:solidFill>
+              </a:rPr>
+              <a:t>XmlAdaptedPollEntry</a:t>
+            </a:r>
+            <a:endParaRPr lang="en-SG" sz="1050" b="1" dirty="0">
+              <a:solidFill>
+                <a:schemeClr val="accent6">
+                  <a:lumMod val="75000"/>
+                </a:schemeClr>
+              </a:solidFill>
+            </a:endParaRPr>
+          </a:p>
+        </p:txBody>
+      </p:sp>
+      <p:cxnSp>
+        <p:nvCxnSpPr>
+          <p:cNvPr id="84" name="Elbow Connector 122">
+            <a:extLst>
+              <a:ext uri="{FF2B5EF4-FFF2-40B4-BE49-F238E27FC236}">
+                <a16:creationId xmlns:a16="http://schemas.microsoft.com/office/drawing/2014/main" id="{B72D6BC9-17C8-4E6C-B83B-3FCA347E7B70}"/>
+              </a:ext>
+            </a:extLst>
+          </p:cNvPr>
+          <p:cNvCxnSpPr>
+            <a:cxnSpLocks/>
+            <a:stCxn id="66" idx="2"/>
+            <a:endCxn id="39" idx="0"/>
+          </p:cNvCxnSpPr>
+          <p:nvPr/>
+        </p:nvCxnSpPr>
+        <p:spPr>
+          <a:xfrm rot="16200000" flipH="1">
+            <a:off x="6456955" y="3670368"/>
+            <a:ext cx="359447" cy="33049"/>
+          </a:xfrm>
+          <a:prstGeom prst="bentConnector3">
+            <a:avLst>
+              <a:gd name="adj1" fmla="val 50000"/>
+            </a:avLst>
+          </a:prstGeom>
+          <a:ln w="19050">
+            <a:prstDash val="sysDot"/>
+            <a:headEnd type="none" w="med" len="med"/>
+            <a:tailEnd type="arrow" w="med" len="med"/>
+          </a:ln>
+          <a:effectLst/>
+        </p:spPr>
+        <p:style>
+          <a:lnRef idx="1">
+            <a:schemeClr val="accent6"/>
+          </a:lnRef>
+          <a:fillRef idx="2">
+            <a:schemeClr val="accent6"/>
+          </a:fillRef>
+          <a:effectRef idx="1">
+            <a:schemeClr val="accent6"/>
+          </a:effectRef>
+          <a:fontRef idx="minor">
+            <a:schemeClr val="dk1"/>
+          </a:fontRef>
+        </p:style>
+      </p:cxnSp>
+      <p:cxnSp>
+        <p:nvCxnSpPr>
+          <p:cNvPr id="96" name="Elbow Connector 122">
+            <a:extLst>
+              <a:ext uri="{FF2B5EF4-FFF2-40B4-BE49-F238E27FC236}">
+                <a16:creationId xmlns:a16="http://schemas.microsoft.com/office/drawing/2014/main" id="{35500A84-0754-40B7-A7E2-8EF74DD0AA37}"/>
+              </a:ext>
+            </a:extLst>
+          </p:cNvPr>
+          <p:cNvCxnSpPr>
+            <a:cxnSpLocks/>
+            <a:endCxn id="63" idx="1"/>
+          </p:cNvCxnSpPr>
+          <p:nvPr/>
+        </p:nvCxnSpPr>
+        <p:spPr>
+          <a:xfrm>
+            <a:off x="6933502" y="4799370"/>
+            <a:ext cx="415139" cy="1581"/>
+          </a:xfrm>
+          <a:prstGeom prst="bentConnector3">
+            <a:avLst>
+              <a:gd name="adj1" fmla="val 50000"/>
+            </a:avLst>
+          </a:prstGeom>
+          <a:ln w="19050">
+            <a:prstDash val="sysDot"/>
+            <a:headEnd type="none" w="med" len="med"/>
+            <a:tailEnd type="arrow" w="med" len="med"/>
+          </a:ln>
+          <a:effectLst/>
+        </p:spPr>
+        <p:style>
+          <a:lnRef idx="1">
+            <a:schemeClr val="accent6"/>
+          </a:lnRef>
+          <a:fillRef idx="2">
+            <a:schemeClr val="accent6"/>
+          </a:fillRef>
+          <a:effectRef idx="1">
+            <a:schemeClr val="accent6"/>
+          </a:effectRef>
+          <a:fontRef idx="minor">
+            <a:schemeClr val="dk1"/>
+          </a:fontRef>
+        </p:style>
+      </p:cxnSp>
+      <p:sp>
+        <p:nvSpPr>
+          <p:cNvPr id="100" name="Rectangle 8">
+            <a:extLst>
+              <a:ext uri="{FF2B5EF4-FFF2-40B4-BE49-F238E27FC236}">
+                <a16:creationId xmlns:a16="http://schemas.microsoft.com/office/drawing/2014/main" id="{B36A384B-ACAA-4735-AB28-D01F3CC589B9}"/>
+              </a:ext>
+            </a:extLst>
+          </p:cNvPr>
+          <p:cNvSpPr/>
+          <p:nvPr/>
+        </p:nvSpPr>
+        <p:spPr>
+          <a:xfrm>
+            <a:off x="7533394" y="2463249"/>
+            <a:ext cx="1323049" cy="346760"/>
+          </a:xfrm>
+          <a:prstGeom prst="rect">
+            <a:avLst/>
+          </a:prstGeom>
+          <a:ln w="19050"/>
+          <a:effectLst/>
+        </p:spPr>
+        <p:style>
+          <a:lnRef idx="1">
+            <a:schemeClr val="accent6"/>
+          </a:lnRef>
+          <a:fillRef idx="2">
+            <a:schemeClr val="accent6"/>
+          </a:fillRef>
+          <a:effectRef idx="1">
+            <a:schemeClr val="accent6"/>
+          </a:effectRef>
+          <a:fontRef idx="minor">
+            <a:schemeClr val="dk1"/>
+          </a:fontRef>
+        </p:style>
+        <p:txBody>
+          <a:bodyPr rtlCol="0" anchor="ctr"/>
+          <a:lstStyle/>
+          <a:p>
+            <a:pPr algn="ctr"/>
+            <a:r>
+              <a:rPr lang="en-US" sz="1050" b="1" dirty="0" err="1">
+                <a:solidFill>
+                  <a:schemeClr val="accent6">
+                    <a:lumMod val="75000"/>
+                  </a:schemeClr>
+                </a:solidFill>
+              </a:rPr>
+              <a:t>XmlAdaptedInterest</a:t>
+            </a:r>
+            <a:endParaRPr lang="en-SG" sz="1050" b="1" dirty="0">
+              <a:solidFill>
+                <a:schemeClr val="accent6">
+                  <a:lumMod val="75000"/>
+                </a:schemeClr>
+              </a:solidFill>
+            </a:endParaRPr>
+          </a:p>
+        </p:txBody>
+      </p:sp>
+      <p:cxnSp>
+        <p:nvCxnSpPr>
+          <p:cNvPr id="101" name="Elbow Connector 122">
+            <a:extLst>
+              <a:ext uri="{FF2B5EF4-FFF2-40B4-BE49-F238E27FC236}">
+                <a16:creationId xmlns:a16="http://schemas.microsoft.com/office/drawing/2014/main" id="{6923E445-343E-4FEC-8D4B-7F7F5571D81F}"/>
+              </a:ext>
+            </a:extLst>
+          </p:cNvPr>
+          <p:cNvCxnSpPr>
+            <a:cxnSpLocks/>
+            <a:stCxn id="74" idx="0"/>
+            <a:endCxn id="100" idx="2"/>
+          </p:cNvCxnSpPr>
+          <p:nvPr/>
+        </p:nvCxnSpPr>
+        <p:spPr>
+          <a:xfrm rot="16200000" flipV="1">
+            <a:off x="8045451" y="2959478"/>
+            <a:ext cx="349615" cy="50678"/>
           </a:xfrm>
           <a:prstGeom prst="bentConnector3">
             <a:avLst>
@@ -4843,13 +5451,6 @@
   <p:clrMapOvr>
     <a:masterClrMapping/>
   </p:clrMapOvr>
-  <p:timing>
-    <p:tnLst>
-      <p:par>
-        <p:cTn id="1" dur="indefinite" restart="never" nodeType="tmRoot"/>
-      </p:par>
-    </p:tnLst>
-  </p:timing>
 </p:sld>
 </file>
 

</xml_diff>

<commit_message>
Updates to Storage and Performance Tracking for developer guide (#123)
* add storage class diagram

* add storage description to dev guide

* add performance tracking proposed implementation to dev guide
</commit_message>
<xml_diff>
--- a/docs/diagrams/StorageComponentClassDiagram.pptx
+++ b/docs/diagrams/StorageComponentClassDiagram.pptx
@@ -107,6 +107,22 @@
       </a:defRPr>
     </a:lvl9pPr>
   </p:defaultTextStyle>
+  <p:extLst>
+    <p:ext uri="{EFAFB233-063F-42B5-8137-9DF3F51BA10A}">
+      <p15:sldGuideLst xmlns:p15="http://schemas.microsoft.com/office/powerpoint/2012/main">
+        <p15:guide id="1" orient="horz" pos="1488">
+          <p15:clr>
+            <a:srgbClr val="A4A3A4"/>
+          </p15:clr>
+        </p15:guide>
+        <p15:guide id="2" pos="2880">
+          <p15:clr>
+            <a:srgbClr val="A4A3A4"/>
+          </p15:clr>
+        </p15:guide>
+      </p15:sldGuideLst>
+    </p:ext>
+  </p:extLst>
 </p:presentation>
 </file>
 
@@ -192,7 +208,7 @@
           <a:p>
             <a:fld id="{F5CC4B3F-88C1-4FFA-B1B6-F41C21DC6924}" type="datetimeFigureOut">
               <a:rPr lang="en-US" smtClean="0"/>
-              <a:t>10/16/2016</a:t>
+              <a:t>10/17/2018</a:t>
             </a:fld>
             <a:endParaRPr lang="en-US"/>
           </a:p>
@@ -256,38 +272,37 @@
           <a:p>
             <a:pPr lvl="0"/>
             <a:r>
-              <a:rPr lang="en-US" smtClean="0"/>
+              <a:rPr lang="en-US"/>
               <a:t>Click to edit Master text styles</a:t>
             </a:r>
           </a:p>
           <a:p>
             <a:pPr lvl="1"/>
             <a:r>
-              <a:rPr lang="en-US" smtClean="0"/>
+              <a:rPr lang="en-US"/>
               <a:t>Second level</a:t>
             </a:r>
           </a:p>
           <a:p>
             <a:pPr lvl="2"/>
             <a:r>
-              <a:rPr lang="en-US" smtClean="0"/>
+              <a:rPr lang="en-US"/>
               <a:t>Third level</a:t>
             </a:r>
           </a:p>
           <a:p>
             <a:pPr lvl="3"/>
             <a:r>
-              <a:rPr lang="en-US" smtClean="0"/>
+              <a:rPr lang="en-US"/>
               <a:t>Fourth level</a:t>
             </a:r>
           </a:p>
           <a:p>
             <a:pPr lvl="4"/>
             <a:r>
-              <a:rPr lang="en-US" smtClean="0"/>
+              <a:rPr lang="en-US"/>
               <a:t>Fifth level</a:t>
             </a:r>
-            <a:endParaRPr lang="en-US"/>
           </a:p>
         </p:txBody>
       </p:sp>
@@ -498,10 +513,9 @@
           <a:lstStyle/>
           <a:p>
             <a:r>
-              <a:rPr lang="en-US" smtClean="0"/>
+              <a:rPr lang="en-US"/>
               <a:t>Click to edit Master title style</a:t>
             </a:r>
-            <a:endParaRPr lang="en-US"/>
           </a:p>
         </p:txBody>
       </p:sp>
@@ -617,10 +631,9 @@
           </a:lstStyle>
           <a:p>
             <a:r>
-              <a:rPr lang="en-US" smtClean="0"/>
+              <a:rPr lang="en-US"/>
               <a:t>Click to edit Master subtitle style</a:t>
             </a:r>
-            <a:endParaRPr lang="en-US"/>
           </a:p>
         </p:txBody>
       </p:sp>
@@ -641,7 +654,7 @@
           <a:p>
             <a:fld id="{78C97017-6FC3-485B-9764-EAC9E56C1D49}" type="datetimeFigureOut">
               <a:rPr lang="en-US" smtClean="0"/>
-              <a:t>10/16/2016</a:t>
+              <a:t>10/17/2018</a:t>
             </a:fld>
             <a:endParaRPr lang="en-US"/>
           </a:p>
@@ -735,10 +748,9 @@
           <a:lstStyle/>
           <a:p>
             <a:r>
-              <a:rPr lang="en-US" smtClean="0"/>
+              <a:rPr lang="en-US"/>
               <a:t>Click to edit Master title style</a:t>
             </a:r>
-            <a:endParaRPr lang="en-US"/>
           </a:p>
         </p:txBody>
       </p:sp>
@@ -759,38 +771,37 @@
           <a:p>
             <a:pPr lvl="0"/>
             <a:r>
-              <a:rPr lang="en-US" smtClean="0"/>
+              <a:rPr lang="en-US"/>
               <a:t>Click to edit Master text styles</a:t>
             </a:r>
           </a:p>
           <a:p>
             <a:pPr lvl="1"/>
             <a:r>
-              <a:rPr lang="en-US" smtClean="0"/>
+              <a:rPr lang="en-US"/>
               <a:t>Second level</a:t>
             </a:r>
           </a:p>
           <a:p>
             <a:pPr lvl="2"/>
             <a:r>
-              <a:rPr lang="en-US" smtClean="0"/>
+              <a:rPr lang="en-US"/>
               <a:t>Third level</a:t>
             </a:r>
           </a:p>
           <a:p>
             <a:pPr lvl="3"/>
             <a:r>
-              <a:rPr lang="en-US" smtClean="0"/>
+              <a:rPr lang="en-US"/>
               <a:t>Fourth level</a:t>
             </a:r>
           </a:p>
           <a:p>
             <a:pPr lvl="4"/>
             <a:r>
-              <a:rPr lang="en-US" smtClean="0"/>
+              <a:rPr lang="en-US"/>
               <a:t>Fifth level</a:t>
             </a:r>
-            <a:endParaRPr lang="en-US"/>
           </a:p>
         </p:txBody>
       </p:sp>
@@ -811,7 +822,7 @@
           <a:p>
             <a:fld id="{78C97017-6FC3-485B-9764-EAC9E56C1D49}" type="datetimeFigureOut">
               <a:rPr lang="en-US" smtClean="0"/>
-              <a:t>10/16/2016</a:t>
+              <a:t>10/17/2018</a:t>
             </a:fld>
             <a:endParaRPr lang="en-US"/>
           </a:p>
@@ -910,10 +921,9 @@
           <a:lstStyle/>
           <a:p>
             <a:r>
-              <a:rPr lang="en-US" smtClean="0"/>
+              <a:rPr lang="en-US"/>
               <a:t>Click to edit Master title style</a:t>
             </a:r>
-            <a:endParaRPr lang="en-US"/>
           </a:p>
         </p:txBody>
       </p:sp>
@@ -939,38 +949,37 @@
           <a:p>
             <a:pPr lvl="0"/>
             <a:r>
-              <a:rPr lang="en-US" smtClean="0"/>
+              <a:rPr lang="en-US"/>
               <a:t>Click to edit Master text styles</a:t>
             </a:r>
           </a:p>
           <a:p>
             <a:pPr lvl="1"/>
             <a:r>
-              <a:rPr lang="en-US" smtClean="0"/>
+              <a:rPr lang="en-US"/>
               <a:t>Second level</a:t>
             </a:r>
           </a:p>
           <a:p>
             <a:pPr lvl="2"/>
             <a:r>
-              <a:rPr lang="en-US" smtClean="0"/>
+              <a:rPr lang="en-US"/>
               <a:t>Third level</a:t>
             </a:r>
           </a:p>
           <a:p>
             <a:pPr lvl="3"/>
             <a:r>
-              <a:rPr lang="en-US" smtClean="0"/>
+              <a:rPr lang="en-US"/>
               <a:t>Fourth level</a:t>
             </a:r>
           </a:p>
           <a:p>
             <a:pPr lvl="4"/>
             <a:r>
-              <a:rPr lang="en-US" smtClean="0"/>
+              <a:rPr lang="en-US"/>
               <a:t>Fifth level</a:t>
             </a:r>
-            <a:endParaRPr lang="en-US"/>
           </a:p>
         </p:txBody>
       </p:sp>
@@ -991,7 +1000,7 @@
           <a:p>
             <a:fld id="{78C97017-6FC3-485B-9764-EAC9E56C1D49}" type="datetimeFigureOut">
               <a:rPr lang="en-US" smtClean="0"/>
-              <a:t>10/16/2016</a:t>
+              <a:t>10/17/2018</a:t>
             </a:fld>
             <a:endParaRPr lang="en-US"/>
           </a:p>
@@ -1085,10 +1094,9 @@
           <a:lstStyle/>
           <a:p>
             <a:r>
-              <a:rPr lang="en-US" smtClean="0"/>
+              <a:rPr lang="en-US"/>
               <a:t>Click to edit Master title style</a:t>
             </a:r>
-            <a:endParaRPr lang="en-US"/>
           </a:p>
         </p:txBody>
       </p:sp>
@@ -1109,38 +1117,37 @@
           <a:p>
             <a:pPr lvl="0"/>
             <a:r>
-              <a:rPr lang="en-US" smtClean="0"/>
+              <a:rPr lang="en-US"/>
               <a:t>Click to edit Master text styles</a:t>
             </a:r>
           </a:p>
           <a:p>
             <a:pPr lvl="1"/>
             <a:r>
-              <a:rPr lang="en-US" smtClean="0"/>
+              <a:rPr lang="en-US"/>
               <a:t>Second level</a:t>
             </a:r>
           </a:p>
           <a:p>
             <a:pPr lvl="2"/>
             <a:r>
-              <a:rPr lang="en-US" smtClean="0"/>
+              <a:rPr lang="en-US"/>
               <a:t>Third level</a:t>
             </a:r>
           </a:p>
           <a:p>
             <a:pPr lvl="3"/>
             <a:r>
-              <a:rPr lang="en-US" smtClean="0"/>
+              <a:rPr lang="en-US"/>
               <a:t>Fourth level</a:t>
             </a:r>
           </a:p>
           <a:p>
             <a:pPr lvl="4"/>
             <a:r>
-              <a:rPr lang="en-US" smtClean="0"/>
+              <a:rPr lang="en-US"/>
               <a:t>Fifth level</a:t>
             </a:r>
-            <a:endParaRPr lang="en-US"/>
           </a:p>
         </p:txBody>
       </p:sp>
@@ -1161,7 +1168,7 @@
           <a:p>
             <a:fld id="{78C97017-6FC3-485B-9764-EAC9E56C1D49}" type="datetimeFigureOut">
               <a:rPr lang="en-US" smtClean="0"/>
-              <a:t>10/16/2016</a:t>
+              <a:t>10/17/2018</a:t>
             </a:fld>
             <a:endParaRPr lang="en-US"/>
           </a:p>
@@ -1264,10 +1271,9 @@
           </a:lstStyle>
           <a:p>
             <a:r>
-              <a:rPr lang="en-US" smtClean="0"/>
+              <a:rPr lang="en-US"/>
               <a:t>Click to edit Master title style</a:t>
             </a:r>
-            <a:endParaRPr lang="en-US"/>
           </a:p>
         </p:txBody>
       </p:sp>
@@ -1384,7 +1390,7 @@
           <a:p>
             <a:pPr lvl="0"/>
             <a:r>
-              <a:rPr lang="en-US" smtClean="0"/>
+              <a:rPr lang="en-US"/>
               <a:t>Click to edit Master text styles</a:t>
             </a:r>
           </a:p>
@@ -1407,7 +1413,7 @@
           <a:p>
             <a:fld id="{78C97017-6FC3-485B-9764-EAC9E56C1D49}" type="datetimeFigureOut">
               <a:rPr lang="en-US" smtClean="0"/>
-              <a:t>10/16/2016</a:t>
+              <a:t>10/17/2018</a:t>
             </a:fld>
             <a:endParaRPr lang="en-US"/>
           </a:p>
@@ -1501,10 +1507,9 @@
           <a:lstStyle/>
           <a:p>
             <a:r>
-              <a:rPr lang="en-US" smtClean="0"/>
+              <a:rPr lang="en-US"/>
               <a:t>Click to edit Master title style</a:t>
             </a:r>
-            <a:endParaRPr lang="en-US"/>
           </a:p>
         </p:txBody>
       </p:sp>
@@ -1558,38 +1563,37 @@
           <a:p>
             <a:pPr lvl="0"/>
             <a:r>
-              <a:rPr lang="en-US" smtClean="0"/>
+              <a:rPr lang="en-US"/>
               <a:t>Click to edit Master text styles</a:t>
             </a:r>
           </a:p>
           <a:p>
             <a:pPr lvl="1"/>
             <a:r>
-              <a:rPr lang="en-US" smtClean="0"/>
+              <a:rPr lang="en-US"/>
               <a:t>Second level</a:t>
             </a:r>
           </a:p>
           <a:p>
             <a:pPr lvl="2"/>
             <a:r>
-              <a:rPr lang="en-US" smtClean="0"/>
+              <a:rPr lang="en-US"/>
               <a:t>Third level</a:t>
             </a:r>
           </a:p>
           <a:p>
             <a:pPr lvl="3"/>
             <a:r>
-              <a:rPr lang="en-US" smtClean="0"/>
+              <a:rPr lang="en-US"/>
               <a:t>Fourth level</a:t>
             </a:r>
           </a:p>
           <a:p>
             <a:pPr lvl="4"/>
             <a:r>
-              <a:rPr lang="en-US" smtClean="0"/>
+              <a:rPr lang="en-US"/>
               <a:t>Fifth level</a:t>
             </a:r>
-            <a:endParaRPr lang="en-US"/>
           </a:p>
         </p:txBody>
       </p:sp>
@@ -1643,38 +1647,37 @@
           <a:p>
             <a:pPr lvl="0"/>
             <a:r>
-              <a:rPr lang="en-US" smtClean="0"/>
+              <a:rPr lang="en-US"/>
               <a:t>Click to edit Master text styles</a:t>
             </a:r>
           </a:p>
           <a:p>
             <a:pPr lvl="1"/>
             <a:r>
-              <a:rPr lang="en-US" smtClean="0"/>
+              <a:rPr lang="en-US"/>
               <a:t>Second level</a:t>
             </a:r>
           </a:p>
           <a:p>
             <a:pPr lvl="2"/>
             <a:r>
-              <a:rPr lang="en-US" smtClean="0"/>
+              <a:rPr lang="en-US"/>
               <a:t>Third level</a:t>
             </a:r>
           </a:p>
           <a:p>
             <a:pPr lvl="3"/>
             <a:r>
-              <a:rPr lang="en-US" smtClean="0"/>
+              <a:rPr lang="en-US"/>
               <a:t>Fourth level</a:t>
             </a:r>
           </a:p>
           <a:p>
             <a:pPr lvl="4"/>
             <a:r>
-              <a:rPr lang="en-US" smtClean="0"/>
+              <a:rPr lang="en-US"/>
               <a:t>Fifth level</a:t>
             </a:r>
-            <a:endParaRPr lang="en-US"/>
           </a:p>
         </p:txBody>
       </p:sp>
@@ -1695,7 +1698,7 @@
           <a:p>
             <a:fld id="{78C97017-6FC3-485B-9764-EAC9E56C1D49}" type="datetimeFigureOut">
               <a:rPr lang="en-US" smtClean="0"/>
-              <a:t>10/16/2016</a:t>
+              <a:t>10/17/2018</a:t>
             </a:fld>
             <a:endParaRPr lang="en-US"/>
           </a:p>
@@ -1793,10 +1796,9 @@
           </a:lstStyle>
           <a:p>
             <a:r>
-              <a:rPr lang="en-US" smtClean="0"/>
+              <a:rPr lang="en-US"/>
               <a:t>Click to edit Master title style</a:t>
             </a:r>
-            <a:endParaRPr lang="en-US"/>
           </a:p>
         </p:txBody>
       </p:sp>
@@ -1859,7 +1861,7 @@
           <a:p>
             <a:pPr lvl="0"/>
             <a:r>
-              <a:rPr lang="en-US" smtClean="0"/>
+              <a:rPr lang="en-US"/>
               <a:t>Click to edit Master text styles</a:t>
             </a:r>
           </a:p>
@@ -1915,38 +1917,37 @@
           <a:p>
             <a:pPr lvl="0"/>
             <a:r>
-              <a:rPr lang="en-US" smtClean="0"/>
+              <a:rPr lang="en-US"/>
               <a:t>Click to edit Master text styles</a:t>
             </a:r>
           </a:p>
           <a:p>
             <a:pPr lvl="1"/>
             <a:r>
-              <a:rPr lang="en-US" smtClean="0"/>
+              <a:rPr lang="en-US"/>
               <a:t>Second level</a:t>
             </a:r>
           </a:p>
           <a:p>
             <a:pPr lvl="2"/>
             <a:r>
-              <a:rPr lang="en-US" smtClean="0"/>
+              <a:rPr lang="en-US"/>
               <a:t>Third level</a:t>
             </a:r>
           </a:p>
           <a:p>
             <a:pPr lvl="3"/>
             <a:r>
-              <a:rPr lang="en-US" smtClean="0"/>
+              <a:rPr lang="en-US"/>
               <a:t>Fourth level</a:t>
             </a:r>
           </a:p>
           <a:p>
             <a:pPr lvl="4"/>
             <a:r>
-              <a:rPr lang="en-US" smtClean="0"/>
+              <a:rPr lang="en-US"/>
               <a:t>Fifth level</a:t>
             </a:r>
-            <a:endParaRPr lang="en-US"/>
           </a:p>
         </p:txBody>
       </p:sp>
@@ -2009,7 +2010,7 @@
           <a:p>
             <a:pPr lvl="0"/>
             <a:r>
-              <a:rPr lang="en-US" smtClean="0"/>
+              <a:rPr lang="en-US"/>
               <a:t>Click to edit Master text styles</a:t>
             </a:r>
           </a:p>
@@ -2065,38 +2066,37 @@
           <a:p>
             <a:pPr lvl="0"/>
             <a:r>
-              <a:rPr lang="en-US" smtClean="0"/>
+              <a:rPr lang="en-US"/>
               <a:t>Click to edit Master text styles</a:t>
             </a:r>
           </a:p>
           <a:p>
             <a:pPr lvl="1"/>
             <a:r>
-              <a:rPr lang="en-US" smtClean="0"/>
+              <a:rPr lang="en-US"/>
               <a:t>Second level</a:t>
             </a:r>
           </a:p>
           <a:p>
             <a:pPr lvl="2"/>
             <a:r>
-              <a:rPr lang="en-US" smtClean="0"/>
+              <a:rPr lang="en-US"/>
               <a:t>Third level</a:t>
             </a:r>
           </a:p>
           <a:p>
             <a:pPr lvl="3"/>
             <a:r>
-              <a:rPr lang="en-US" smtClean="0"/>
+              <a:rPr lang="en-US"/>
               <a:t>Fourth level</a:t>
             </a:r>
           </a:p>
           <a:p>
             <a:pPr lvl="4"/>
             <a:r>
-              <a:rPr lang="en-US" smtClean="0"/>
+              <a:rPr lang="en-US"/>
               <a:t>Fifth level</a:t>
             </a:r>
-            <a:endParaRPr lang="en-US"/>
           </a:p>
         </p:txBody>
       </p:sp>
@@ -2117,7 +2117,7 @@
           <a:p>
             <a:fld id="{78C97017-6FC3-485B-9764-EAC9E56C1D49}" type="datetimeFigureOut">
               <a:rPr lang="en-US" smtClean="0"/>
-              <a:t>10/16/2016</a:t>
+              <a:t>10/17/2018</a:t>
             </a:fld>
             <a:endParaRPr lang="en-US"/>
           </a:p>
@@ -2211,10 +2211,9 @@
           <a:lstStyle/>
           <a:p>
             <a:r>
-              <a:rPr lang="en-US" smtClean="0"/>
+              <a:rPr lang="en-US"/>
               <a:t>Click to edit Master title style</a:t>
             </a:r>
-            <a:endParaRPr lang="en-US"/>
           </a:p>
         </p:txBody>
       </p:sp>
@@ -2235,7 +2234,7 @@
           <a:p>
             <a:fld id="{78C97017-6FC3-485B-9764-EAC9E56C1D49}" type="datetimeFigureOut">
               <a:rPr lang="en-US" smtClean="0"/>
-              <a:t>10/16/2016</a:t>
+              <a:t>10/17/2018</a:t>
             </a:fld>
             <a:endParaRPr lang="en-US"/>
           </a:p>
@@ -2330,7 +2329,7 @@
           <a:p>
             <a:fld id="{78C97017-6FC3-485B-9764-EAC9E56C1D49}" type="datetimeFigureOut">
               <a:rPr lang="en-US" smtClean="0"/>
-              <a:t>10/16/2016</a:t>
+              <a:t>10/17/2018</a:t>
             </a:fld>
             <a:endParaRPr lang="en-US"/>
           </a:p>
@@ -2433,10 +2432,9 @@
           </a:lstStyle>
           <a:p>
             <a:r>
-              <a:rPr lang="en-US" smtClean="0"/>
+              <a:rPr lang="en-US"/>
               <a:t>Click to edit Master title style</a:t>
             </a:r>
-            <a:endParaRPr lang="en-US"/>
           </a:p>
         </p:txBody>
       </p:sp>
@@ -2490,38 +2488,37 @@
           <a:p>
             <a:pPr lvl="0"/>
             <a:r>
-              <a:rPr lang="en-US" smtClean="0"/>
+              <a:rPr lang="en-US"/>
               <a:t>Click to edit Master text styles</a:t>
             </a:r>
           </a:p>
           <a:p>
             <a:pPr lvl="1"/>
             <a:r>
-              <a:rPr lang="en-US" smtClean="0"/>
+              <a:rPr lang="en-US"/>
               <a:t>Second level</a:t>
             </a:r>
           </a:p>
           <a:p>
             <a:pPr lvl="2"/>
             <a:r>
-              <a:rPr lang="en-US" smtClean="0"/>
+              <a:rPr lang="en-US"/>
               <a:t>Third level</a:t>
             </a:r>
           </a:p>
           <a:p>
             <a:pPr lvl="3"/>
             <a:r>
-              <a:rPr lang="en-US" smtClean="0"/>
+              <a:rPr lang="en-US"/>
               <a:t>Fourth level</a:t>
             </a:r>
           </a:p>
           <a:p>
             <a:pPr lvl="4"/>
             <a:r>
-              <a:rPr lang="en-US" smtClean="0"/>
+              <a:rPr lang="en-US"/>
               <a:t>Fifth level</a:t>
             </a:r>
-            <a:endParaRPr lang="en-US"/>
           </a:p>
         </p:txBody>
       </p:sp>
@@ -2584,7 +2581,7 @@
           <a:p>
             <a:pPr lvl="0"/>
             <a:r>
-              <a:rPr lang="en-US" smtClean="0"/>
+              <a:rPr lang="en-US"/>
               <a:t>Click to edit Master text styles</a:t>
             </a:r>
           </a:p>
@@ -2607,7 +2604,7 @@
           <a:p>
             <a:fld id="{78C97017-6FC3-485B-9764-EAC9E56C1D49}" type="datetimeFigureOut">
               <a:rPr lang="en-US" smtClean="0"/>
-              <a:t>10/16/2016</a:t>
+              <a:t>10/17/2018</a:t>
             </a:fld>
             <a:endParaRPr lang="en-US"/>
           </a:p>
@@ -2710,10 +2707,9 @@
           </a:lstStyle>
           <a:p>
             <a:r>
-              <a:rPr lang="en-US" smtClean="0"/>
+              <a:rPr lang="en-US"/>
               <a:t>Click to edit Master title style</a:t>
             </a:r>
-            <a:endParaRPr lang="en-US"/>
           </a:p>
         </p:txBody>
       </p:sp>
@@ -2837,7 +2833,7 @@
           <a:p>
             <a:pPr lvl="0"/>
             <a:r>
-              <a:rPr lang="en-US" smtClean="0"/>
+              <a:rPr lang="en-US"/>
               <a:t>Click to edit Master text styles</a:t>
             </a:r>
           </a:p>
@@ -2860,7 +2856,7 @@
           <a:p>
             <a:fld id="{78C97017-6FC3-485B-9764-EAC9E56C1D49}" type="datetimeFigureOut">
               <a:rPr lang="en-US" smtClean="0"/>
-              <a:t>10/16/2016</a:t>
+              <a:t>10/17/2018</a:t>
             </a:fld>
             <a:endParaRPr lang="en-US"/>
           </a:p>
@@ -2969,10 +2965,9 @@
           <a:lstStyle/>
           <a:p>
             <a:r>
-              <a:rPr lang="en-US" smtClean="0"/>
+              <a:rPr lang="en-US"/>
               <a:t>Click to edit Master title style</a:t>
             </a:r>
-            <a:endParaRPr lang="en-US"/>
           </a:p>
         </p:txBody>
       </p:sp>
@@ -3003,38 +2998,37 @@
           <a:p>
             <a:pPr lvl="0"/>
             <a:r>
-              <a:rPr lang="en-US" smtClean="0"/>
+              <a:rPr lang="en-US"/>
               <a:t>Click to edit Master text styles</a:t>
             </a:r>
           </a:p>
           <a:p>
             <a:pPr lvl="1"/>
             <a:r>
-              <a:rPr lang="en-US" smtClean="0"/>
+              <a:rPr lang="en-US"/>
               <a:t>Second level</a:t>
             </a:r>
           </a:p>
           <a:p>
             <a:pPr lvl="2"/>
             <a:r>
-              <a:rPr lang="en-US" smtClean="0"/>
+              <a:rPr lang="en-US"/>
               <a:t>Third level</a:t>
             </a:r>
           </a:p>
           <a:p>
             <a:pPr lvl="3"/>
             <a:r>
-              <a:rPr lang="en-US" smtClean="0"/>
+              <a:rPr lang="en-US"/>
               <a:t>Fourth level</a:t>
             </a:r>
           </a:p>
           <a:p>
             <a:pPr lvl="4"/>
             <a:r>
-              <a:rPr lang="en-US" smtClean="0"/>
+              <a:rPr lang="en-US"/>
               <a:t>Fifth level</a:t>
             </a:r>
-            <a:endParaRPr lang="en-US"/>
           </a:p>
         </p:txBody>
       </p:sp>
@@ -3073,7 +3067,7 @@
           <a:p>
             <a:fld id="{78C97017-6FC3-485B-9764-EAC9E56C1D49}" type="datetimeFigureOut">
               <a:rPr lang="en-US" smtClean="0"/>
-              <a:t>10/16/2016</a:t>
+              <a:t>10/17/2018</a:t>
             </a:fld>
             <a:endParaRPr lang="en-US"/>
           </a:p>
@@ -3494,7 +3488,7 @@
           <a:lstStyle/>
           <a:p>
             <a:r>
-              <a:rPr lang="en-US" sz="1200" b="1" dirty="0" smtClean="0">
+              <a:rPr lang="en-US" sz="1200" b="1" dirty="0">
                 <a:solidFill>
                   <a:schemeClr val="accent6">
                     <a:lumMod val="75000"/>
@@ -3561,7 +3555,7 @@
           <a:p>
             <a:pPr algn="ctr"/>
             <a:r>
-              <a:rPr lang="en-US" sz="1050" dirty="0" smtClean="0">
+              <a:rPr lang="en-US" sz="1050" dirty="0">
                 <a:solidFill>
                   <a:schemeClr val="bg1"/>
                 </a:solidFill>
@@ -3569,19 +3563,19 @@
               <a:t>&lt;&lt;interface&gt;&gt;</a:t>
             </a:r>
             <a:br>
-              <a:rPr lang="en-US" sz="1050" dirty="0" smtClean="0">
+              <a:rPr lang="en-US" sz="1050" dirty="0">
                 <a:solidFill>
                   <a:schemeClr val="bg1"/>
                 </a:solidFill>
               </a:rPr>
             </a:br>
             <a:r>
-              <a:rPr lang="en-US" sz="1050" dirty="0" err="1" smtClean="0">
+              <a:rPr lang="en-US" sz="1050" dirty="0" err="1">
                 <a:solidFill>
                   <a:schemeClr val="bg1"/>
                 </a:solidFill>
               </a:rPr>
-              <a:t>AddressBookStorage</a:t>
+              <a:t>AnakinStorage</a:t>
             </a:r>
             <a:endParaRPr lang="en-SG" sz="1050" dirty="0">
               <a:solidFill>
@@ -3639,7 +3633,7 @@
           <a:p>
             <a:pPr algn="ctr"/>
             <a:r>
-              <a:rPr lang="en-US" sz="1050" dirty="0" err="1" smtClean="0">
+              <a:rPr lang="en-US" sz="1050" dirty="0" err="1">
                 <a:solidFill>
                   <a:schemeClr val="bg1"/>
                 </a:solidFill>
@@ -3713,7 +3707,7 @@
           <a:p>
             <a:pPr algn="ctr"/>
             <a:r>
-              <a:rPr lang="en-US" sz="1050" dirty="0" smtClean="0">
+              <a:rPr lang="en-US" sz="1050" dirty="0">
                 <a:solidFill>
                   <a:schemeClr val="bg1"/>
                 </a:solidFill>
@@ -4147,36 +4141,27 @@
           <a:p>
             <a:pPr algn="ctr"/>
             <a:r>
-              <a:rPr lang="en-US" sz="1050" b="1" dirty="0" err="1" smtClean="0">
+              <a:rPr lang="en-US" sz="1050" b="1" dirty="0" err="1">
                 <a:solidFill>
                   <a:schemeClr val="accent6">
                     <a:lumMod val="75000"/>
                   </a:schemeClr>
                 </a:solidFill>
               </a:rPr>
-              <a:t>XmlAddressBook</a:t>
-            </a:r>
-            <a:r>
-              <a:rPr lang="en-US" sz="1050" b="1" dirty="0" smtClean="0">
-                <a:solidFill>
-                  <a:schemeClr val="accent6">
-                    <a:lumMod val="75000"/>
-                  </a:schemeClr>
-                </a:solidFill>
-              </a:rPr>
-              <a:t/>
-            </a:r>
-            <a:br>
-              <a:rPr lang="en-US" sz="1050" b="1" dirty="0" smtClean="0">
-                <a:solidFill>
-                  <a:schemeClr val="accent6">
-                    <a:lumMod val="75000"/>
-                  </a:schemeClr>
-                </a:solidFill>
-              </a:rPr>
-            </a:br>
-            <a:r>
-              <a:rPr lang="en-US" sz="1050" b="1" dirty="0" smtClean="0">
+              <a:t>XmlAnakin</a:t>
+            </a:r>
+            <a:endParaRPr lang="en-US" sz="1050" b="1" dirty="0">
+              <a:solidFill>
+                <a:schemeClr val="accent6">
+                  <a:lumMod val="75000"/>
+                </a:schemeClr>
+              </a:solidFill>
+            </a:endParaRPr>
+          </a:p>
+          <a:p>
+            <a:pPr algn="ctr"/>
+            <a:r>
+              <a:rPr lang="en-US" sz="1050" b="1" dirty="0">
                 <a:solidFill>
                   <a:schemeClr val="accent6">
                     <a:lumMod val="75000"/>
@@ -4243,7 +4228,7 @@
           <a:p>
             <a:pPr algn="ctr"/>
             <a:r>
-              <a:rPr lang="en-US" sz="1050" dirty="0" smtClean="0">
+              <a:rPr lang="en-US" sz="1050" dirty="0">
                 <a:solidFill>
                   <a:schemeClr val="bg1"/>
                 </a:solidFill>
@@ -4251,14 +4236,14 @@
               <a:t>&lt;&lt;interface&gt;&gt;</a:t>
             </a:r>
             <a:br>
-              <a:rPr lang="en-US" sz="1050" dirty="0" smtClean="0">
+              <a:rPr lang="en-US" sz="1050" dirty="0">
                 <a:solidFill>
                   <a:schemeClr val="bg1"/>
                 </a:solidFill>
               </a:rPr>
             </a:br>
             <a:r>
-              <a:rPr lang="en-US" sz="1050" dirty="0" err="1" smtClean="0">
+              <a:rPr lang="en-US" sz="1050" dirty="0" err="1">
                 <a:solidFill>
                   <a:schemeClr val="bg1"/>
                 </a:solidFill>
@@ -4516,30 +4501,22 @@
           <a:p>
             <a:pPr algn="ctr"/>
             <a:r>
-              <a:rPr lang="en-US" sz="1050" dirty="0" err="1" smtClean="0">
+              <a:rPr lang="en-US" sz="1050" dirty="0" err="1">
                 <a:solidFill>
                   <a:schemeClr val="bg1"/>
                 </a:solidFill>
               </a:rPr>
               <a:t>JsonUserPrefs</a:t>
             </a:r>
-            <a:r>
-              <a:rPr lang="en-US" sz="1050" dirty="0" smtClean="0">
-                <a:solidFill>
-                  <a:schemeClr val="bg1"/>
-                </a:solidFill>
-              </a:rPr>
-              <a:t/>
-            </a:r>
             <a:br>
-              <a:rPr lang="en-US" sz="1050" dirty="0" smtClean="0">
+              <a:rPr lang="en-US" sz="1050" dirty="0">
                 <a:solidFill>
                   <a:schemeClr val="bg1"/>
                 </a:solidFill>
               </a:rPr>
             </a:br>
             <a:r>
-              <a:rPr lang="en-US" sz="1050" dirty="0" smtClean="0">
+              <a:rPr lang="en-US" sz="1050" dirty="0">
                 <a:solidFill>
                   <a:schemeClr val="bg1"/>
                 </a:solidFill>
@@ -4591,7 +4568,7 @@
           <a:p>
             <a:pPr algn="ctr"/>
             <a:r>
-              <a:rPr lang="en-US" sz="1050" b="1" dirty="0" err="1" smtClean="0">
+              <a:rPr lang="en-US" sz="1050" b="1" dirty="0" err="1">
                 <a:solidFill>
                   <a:schemeClr val="accent6">
                     <a:lumMod val="75000"/>
@@ -4600,18 +4577,8 @@
               </a:rPr>
               <a:t>XmlSerializable</a:t>
             </a:r>
-            <a:r>
-              <a:rPr lang="en-US" sz="1050" b="1" dirty="0" smtClean="0">
-                <a:solidFill>
-                  <a:schemeClr val="accent6">
-                    <a:lumMod val="75000"/>
-                  </a:schemeClr>
-                </a:solidFill>
-              </a:rPr>
-              <a:t/>
-            </a:r>
             <a:br>
-              <a:rPr lang="en-US" sz="1050" b="1" dirty="0" smtClean="0">
+              <a:rPr lang="en-US" sz="1050" b="1" dirty="0">
                 <a:solidFill>
                   <a:schemeClr val="accent6">
                     <a:lumMod val="75000"/>
@@ -4620,14 +4587,14 @@
               </a:rPr>
             </a:br>
             <a:r>
-              <a:rPr lang="en-US" sz="1050" b="1" dirty="0" err="1" smtClean="0">
+              <a:rPr lang="en-US" sz="1050" b="1" dirty="0">
                 <a:solidFill>
                   <a:schemeClr val="accent6">
                     <a:lumMod val="75000"/>
                   </a:schemeClr>
                 </a:solidFill>
               </a:rPr>
-              <a:t>AddressBook</a:t>
+              <a:t>Anakin</a:t>
             </a:r>
             <a:endParaRPr lang="en-SG" sz="1050" b="1" dirty="0">
               <a:solidFill>
@@ -4717,14 +4684,14 @@
           <a:p>
             <a:pPr algn="ctr"/>
             <a:r>
-              <a:rPr lang="en-US" sz="1050" b="1" dirty="0" err="1" smtClean="0">
+              <a:rPr lang="en-US" sz="1050" b="1" dirty="0" err="1">
                 <a:solidFill>
                   <a:schemeClr val="accent6">
                     <a:lumMod val="75000"/>
                   </a:schemeClr>
                 </a:solidFill>
               </a:rPr>
-              <a:t>XmlAdaptedTag</a:t>
+              <a:t>XmlAdaptedCard</a:t>
             </a:r>
             <a:endParaRPr lang="en-SG" sz="1050" b="1" dirty="0">
               <a:solidFill>
@@ -4773,14 +4740,14 @@
           <a:p>
             <a:pPr algn="ctr"/>
             <a:r>
-              <a:rPr lang="en-US" sz="1050" b="1" dirty="0" err="1" smtClean="0">
+              <a:rPr lang="en-US" sz="1050" b="1" dirty="0" err="1">
                 <a:solidFill>
                   <a:schemeClr val="accent6">
                     <a:lumMod val="75000"/>
                   </a:schemeClr>
                 </a:solidFill>
               </a:rPr>
-              <a:t>XmlAdaptedPerson</a:t>
+              <a:t>XmlAdaptedDeck</a:t>
             </a:r>
             <a:endParaRPr lang="en-SG" sz="1050" b="1" dirty="0">
               <a:solidFill>
@@ -4843,13 +4810,6 @@
   <p:clrMapOvr>
     <a:masterClrMapping/>
   </p:clrMapOvr>
-  <p:timing>
-    <p:tnLst>
-      <p:par>
-        <p:cTn id="1" dur="indefinite" restart="never" nodeType="tmRoot"/>
-      </p:par>
-    </p:tnLst>
-  </p:timing>
 </p:sld>
 </file>
 

</xml_diff>

<commit_message>
update storage class diagram and add tracklist feature in the userguide
</commit_message>
<xml_diff>
--- a/docs/diagrams/StorageComponentClassDiagram.pptx
+++ b/docs/diagrams/StorageComponentClassDiagram.pptx
@@ -107,6 +107,22 @@
       </a:defRPr>
     </a:lvl9pPr>
   </p:defaultTextStyle>
+  <p:extLst>
+    <p:ext uri="{EFAFB233-063F-42B5-8137-9DF3F51BA10A}">
+      <p15:sldGuideLst xmlns:p15="http://schemas.microsoft.com/office/powerpoint/2012/main">
+        <p15:guide id="1" orient="horz" pos="1488">
+          <p15:clr>
+            <a:srgbClr val="A4A3A4"/>
+          </p15:clr>
+        </p15:guide>
+        <p15:guide id="2" pos="2880">
+          <p15:clr>
+            <a:srgbClr val="A4A3A4"/>
+          </p15:clr>
+        </p15:guide>
+      </p15:sldGuideLst>
+    </p:ext>
+  </p:extLst>
 </p:presentation>
 </file>
 
@@ -192,7 +208,7 @@
           <a:p>
             <a:fld id="{F5CC4B3F-88C1-4FFA-B1B6-F41C21DC6924}" type="datetimeFigureOut">
               <a:rPr lang="en-US" smtClean="0"/>
-              <a:t>10/16/2016</a:t>
+              <a:t>10/23/18</a:t>
             </a:fld>
             <a:endParaRPr lang="en-US"/>
           </a:p>
@@ -641,7 +657,7 @@
           <a:p>
             <a:fld id="{78C97017-6FC3-485B-9764-EAC9E56C1D49}" type="datetimeFigureOut">
               <a:rPr lang="en-US" smtClean="0"/>
-              <a:t>10/16/2016</a:t>
+              <a:t>10/23/18</a:t>
             </a:fld>
             <a:endParaRPr lang="en-US"/>
           </a:p>
@@ -811,7 +827,7 @@
           <a:p>
             <a:fld id="{78C97017-6FC3-485B-9764-EAC9E56C1D49}" type="datetimeFigureOut">
               <a:rPr lang="en-US" smtClean="0"/>
-              <a:t>10/16/2016</a:t>
+              <a:t>10/23/18</a:t>
             </a:fld>
             <a:endParaRPr lang="en-US"/>
           </a:p>
@@ -991,7 +1007,7 @@
           <a:p>
             <a:fld id="{78C97017-6FC3-485B-9764-EAC9E56C1D49}" type="datetimeFigureOut">
               <a:rPr lang="en-US" smtClean="0"/>
-              <a:t>10/16/2016</a:t>
+              <a:t>10/23/18</a:t>
             </a:fld>
             <a:endParaRPr lang="en-US"/>
           </a:p>
@@ -1161,7 +1177,7 @@
           <a:p>
             <a:fld id="{78C97017-6FC3-485B-9764-EAC9E56C1D49}" type="datetimeFigureOut">
               <a:rPr lang="en-US" smtClean="0"/>
-              <a:t>10/16/2016</a:t>
+              <a:t>10/23/18</a:t>
             </a:fld>
             <a:endParaRPr lang="en-US"/>
           </a:p>
@@ -1407,7 +1423,7 @@
           <a:p>
             <a:fld id="{78C97017-6FC3-485B-9764-EAC9E56C1D49}" type="datetimeFigureOut">
               <a:rPr lang="en-US" smtClean="0"/>
-              <a:t>10/16/2016</a:t>
+              <a:t>10/23/18</a:t>
             </a:fld>
             <a:endParaRPr lang="en-US"/>
           </a:p>
@@ -1695,7 +1711,7 @@
           <a:p>
             <a:fld id="{78C97017-6FC3-485B-9764-EAC9E56C1D49}" type="datetimeFigureOut">
               <a:rPr lang="en-US" smtClean="0"/>
-              <a:t>10/16/2016</a:t>
+              <a:t>10/23/18</a:t>
             </a:fld>
             <a:endParaRPr lang="en-US"/>
           </a:p>
@@ -2117,7 +2133,7 @@
           <a:p>
             <a:fld id="{78C97017-6FC3-485B-9764-EAC9E56C1D49}" type="datetimeFigureOut">
               <a:rPr lang="en-US" smtClean="0"/>
-              <a:t>10/16/2016</a:t>
+              <a:t>10/23/18</a:t>
             </a:fld>
             <a:endParaRPr lang="en-US"/>
           </a:p>
@@ -2235,7 +2251,7 @@
           <a:p>
             <a:fld id="{78C97017-6FC3-485B-9764-EAC9E56C1D49}" type="datetimeFigureOut">
               <a:rPr lang="en-US" smtClean="0"/>
-              <a:t>10/16/2016</a:t>
+              <a:t>10/23/18</a:t>
             </a:fld>
             <a:endParaRPr lang="en-US"/>
           </a:p>
@@ -2330,7 +2346,7 @@
           <a:p>
             <a:fld id="{78C97017-6FC3-485B-9764-EAC9E56C1D49}" type="datetimeFigureOut">
               <a:rPr lang="en-US" smtClean="0"/>
-              <a:t>10/16/2016</a:t>
+              <a:t>10/23/18</a:t>
             </a:fld>
             <a:endParaRPr lang="en-US"/>
           </a:p>
@@ -2607,7 +2623,7 @@
           <a:p>
             <a:fld id="{78C97017-6FC3-485B-9764-EAC9E56C1D49}" type="datetimeFigureOut">
               <a:rPr lang="en-US" smtClean="0"/>
-              <a:t>10/16/2016</a:t>
+              <a:t>10/23/18</a:t>
             </a:fld>
             <a:endParaRPr lang="en-US"/>
           </a:p>
@@ -2860,7 +2876,7 @@
           <a:p>
             <a:fld id="{78C97017-6FC3-485B-9764-EAC9E56C1D49}" type="datetimeFigureOut">
               <a:rPr lang="en-US" smtClean="0"/>
-              <a:t>10/16/2016</a:t>
+              <a:t>10/23/18</a:t>
             </a:fld>
             <a:endParaRPr lang="en-US"/>
           </a:p>
@@ -3073,7 +3089,7 @@
           <a:p>
             <a:fld id="{78C97017-6FC3-485B-9764-EAC9E56C1D49}" type="datetimeFigureOut">
               <a:rPr lang="en-US" smtClean="0"/>
-              <a:t>10/16/2016</a:t>
+              <a:t>10/23/18</a:t>
             </a:fld>
             <a:endParaRPr lang="en-US"/>
           </a:p>
@@ -3457,7 +3473,7 @@
         <p:spPr>
           <a:xfrm>
             <a:off x="1119865" y="2086382"/>
-            <a:ext cx="7871735" cy="1723618"/>
+            <a:ext cx="6957335" cy="1723618"/>
           </a:xfrm>
           <a:prstGeom prst="roundRect">
             <a:avLst>
@@ -3561,7 +3577,7 @@
           <a:p>
             <a:pPr algn="ctr"/>
             <a:r>
-              <a:rPr lang="en-US" sz="1050" dirty="0" smtClean="0">
+              <a:rPr lang="en-US" sz="1050" dirty="0">
                 <a:solidFill>
                   <a:schemeClr val="bg1"/>
                 </a:solidFill>
@@ -3569,19 +3585,19 @@
               <a:t>&lt;&lt;interface&gt;&gt;</a:t>
             </a:r>
             <a:br>
-              <a:rPr lang="en-US" sz="1050" dirty="0" smtClean="0">
+              <a:rPr lang="en-US" sz="1050" dirty="0">
                 <a:solidFill>
                   <a:schemeClr val="bg1"/>
                 </a:solidFill>
               </a:rPr>
             </a:br>
             <a:r>
-              <a:rPr lang="en-US" sz="1050" dirty="0" err="1" smtClean="0">
+              <a:rPr lang="en-US" sz="1050" dirty="0" err="1">
                 <a:solidFill>
                   <a:schemeClr val="bg1"/>
                 </a:solidFill>
               </a:rPr>
-              <a:t>AddressBookStorage</a:t>
+              <a:t>LibraryStorage</a:t>
             </a:r>
             <a:endParaRPr lang="en-SG" sz="1050" dirty="0">
               <a:solidFill>
@@ -4076,7 +4092,7 @@
         <p:spPr>
           <a:xfrm>
             <a:off x="5791200" y="3331820"/>
-            <a:ext cx="228600" cy="1970"/>
+            <a:ext cx="838200" cy="1150"/>
           </a:xfrm>
           <a:prstGeom prst="bentConnector3">
             <a:avLst>
@@ -4147,17 +4163,17 @@
           <a:p>
             <a:pPr algn="ctr"/>
             <a:r>
-              <a:rPr lang="en-US" sz="1050" b="1" dirty="0" err="1" smtClean="0">
+              <a:rPr lang="en-US" sz="1050" b="1" dirty="0" err="1">
                 <a:solidFill>
                   <a:schemeClr val="accent6">
                     <a:lumMod val="75000"/>
                   </a:schemeClr>
                 </a:solidFill>
               </a:rPr>
-              <a:t>XmlAddressBook</a:t>
-            </a:r>
-            <a:r>
-              <a:rPr lang="en-US" sz="1050" b="1" dirty="0" smtClean="0">
+              <a:t>JsonLibrary</a:t>
+            </a:r>
+            <a:r>
+              <a:rPr lang="en-US" sz="1050" b="1" dirty="0">
                 <a:solidFill>
                   <a:schemeClr val="accent6">
                     <a:lumMod val="75000"/>
@@ -4167,7 +4183,7 @@
               <a:t/>
             </a:r>
             <a:br>
-              <a:rPr lang="en-US" sz="1050" b="1" dirty="0" smtClean="0">
+              <a:rPr lang="en-US" sz="1050" b="1" dirty="0">
                 <a:solidFill>
                   <a:schemeClr val="accent6">
                     <a:lumMod val="75000"/>
@@ -4176,7 +4192,7 @@
               </a:rPr>
             </a:br>
             <a:r>
-              <a:rPr lang="en-US" sz="1050" b="1" dirty="0" smtClean="0">
+              <a:rPr lang="en-US" sz="1050" b="1" dirty="0">
                 <a:solidFill>
                   <a:schemeClr val="accent6">
                     <a:lumMod val="75000"/>
@@ -4562,7 +4578,7 @@
         </p:nvSpPr>
         <p:spPr>
           <a:xfrm>
-            <a:off x="6019800" y="3160410"/>
+            <a:off x="6629400" y="3159590"/>
             <a:ext cx="1200707" cy="346760"/>
           </a:xfrm>
           <a:prstGeom prst="rect">
@@ -4591,43 +4607,14 @@
           <a:p>
             <a:pPr algn="ctr"/>
             <a:r>
-              <a:rPr lang="en-US" sz="1050" b="1" dirty="0" err="1" smtClean="0">
+              <a:rPr lang="en-US" sz="1050" b="1" dirty="0" err="1">
                 <a:solidFill>
                   <a:schemeClr val="accent6">
                     <a:lumMod val="75000"/>
                   </a:schemeClr>
                 </a:solidFill>
               </a:rPr>
-              <a:t>XmlSerializable</a:t>
-            </a:r>
-            <a:r>
-              <a:rPr lang="en-US" sz="1050" b="1" dirty="0" smtClean="0">
-                <a:solidFill>
-                  <a:schemeClr val="accent6">
-                    <a:lumMod val="75000"/>
-                  </a:schemeClr>
-                </a:solidFill>
-              </a:rPr>
-              <a:t/>
-            </a:r>
-            <a:br>
-              <a:rPr lang="en-US" sz="1050" b="1" dirty="0" smtClean="0">
-                <a:solidFill>
-                  <a:schemeClr val="accent6">
-                    <a:lumMod val="75000"/>
-                  </a:schemeClr>
-                </a:solidFill>
-              </a:rPr>
-            </a:br>
-            <a:r>
-              <a:rPr lang="en-US" sz="1050" b="1" dirty="0" err="1" smtClean="0">
-                <a:solidFill>
-                  <a:schemeClr val="accent6">
-                    <a:lumMod val="75000"/>
-                  </a:schemeClr>
-                </a:solidFill>
-              </a:rPr>
-              <a:t>AddressBook</a:t>
+              <a:t>LibraryRead</a:t>
             </a:r>
             <a:endParaRPr lang="en-SG" sz="1050" b="1" dirty="0">
               <a:solidFill>
@@ -4641,17 +4628,14 @@
       </p:sp>
       <p:cxnSp>
         <p:nvCxnSpPr>
-          <p:cNvPr id="70" name="Elbow Connector 122"/>
-          <p:cNvCxnSpPr>
-            <a:stCxn id="74" idx="0"/>
-            <a:endCxn id="73" idx="2"/>
-          </p:cNvCxnSpPr>
+          <p:cNvPr id="27" name="Elbow Connector 122"/>
+          <p:cNvCxnSpPr/>
           <p:nvPr/>
         </p:nvCxnSpPr>
         <p:spPr>
-          <a:xfrm rot="5400000" flipH="1" flipV="1">
-            <a:off x="8077993" y="2992020"/>
-            <a:ext cx="335208" cy="12700"/>
+          <a:xfrm flipV="1">
+            <a:off x="5791200" y="2687957"/>
+            <a:ext cx="838200" cy="638815"/>
           </a:xfrm>
           <a:prstGeom prst="bentConnector3">
             <a:avLst>
@@ -4659,6 +4643,11 @@
             </a:avLst>
           </a:prstGeom>
           <a:ln w="19050">
+            <a:solidFill>
+              <a:schemeClr val="accent6">
+                <a:lumMod val="75000"/>
+              </a:schemeClr>
+            </a:solidFill>
             <a:prstDash val="sysDot"/>
             <a:headEnd type="none" w="med" len="med"/>
             <a:tailEnd type="arrow" w="med" len="med"/>
@@ -4667,13 +4656,13 @@
         </p:spPr>
         <p:style>
           <a:lnRef idx="1">
-            <a:schemeClr val="accent6"/>
+            <a:schemeClr val="accent2"/>
           </a:lnRef>
           <a:fillRef idx="2">
-            <a:schemeClr val="accent6"/>
+            <a:schemeClr val="accent2"/>
           </a:fillRef>
           <a:effectRef idx="1">
-            <a:schemeClr val="accent6"/>
+            <a:schemeClr val="accent2"/>
           </a:effectRef>
           <a:fontRef idx="minor">
             <a:schemeClr val="dk1"/>
@@ -4682,14 +4671,14 @@
       </p:cxnSp>
       <p:sp>
         <p:nvSpPr>
-          <p:cNvPr id="73" name="Rectangle 8"/>
+          <p:cNvPr id="31" name="Rectangle 8"/>
           <p:cNvSpPr/>
           <p:nvPr/>
         </p:nvSpPr>
         <p:spPr>
           <a:xfrm>
-            <a:off x="7615738" y="2477656"/>
-            <a:ext cx="1259718" cy="346760"/>
+            <a:off x="6629400" y="2514600"/>
+            <a:ext cx="1200707" cy="346760"/>
           </a:xfrm>
           <a:prstGeom prst="rect">
             <a:avLst/>
@@ -4724,7 +4713,7 @@
                   </a:schemeClr>
                 </a:solidFill>
               </a:rPr>
-              <a:t>XmlAdaptedTag</a:t>
+              <a:t>TrackScanner</a:t>
             </a:r>
             <a:endParaRPr lang="en-SG" sz="1050" b="1" dirty="0">
               <a:solidFill>
@@ -4736,103 +4725,6 @@
           </a:p>
         </p:txBody>
       </p:sp>
-      <p:sp>
-        <p:nvSpPr>
-          <p:cNvPr id="74" name="Rectangle 8"/>
-          <p:cNvSpPr/>
-          <p:nvPr/>
-        </p:nvSpPr>
-        <p:spPr>
-          <a:xfrm>
-            <a:off x="7615738" y="3159624"/>
-            <a:ext cx="1259718" cy="346760"/>
-          </a:xfrm>
-          <a:prstGeom prst="rect">
-            <a:avLst/>
-          </a:prstGeom>
-          <a:ln w="19050"/>
-          <a:effectLst/>
-        </p:spPr>
-        <p:style>
-          <a:lnRef idx="1">
-            <a:schemeClr val="accent6"/>
-          </a:lnRef>
-          <a:fillRef idx="2">
-            <a:schemeClr val="accent6"/>
-          </a:fillRef>
-          <a:effectRef idx="1">
-            <a:schemeClr val="accent6"/>
-          </a:effectRef>
-          <a:fontRef idx="minor">
-            <a:schemeClr val="dk1"/>
-          </a:fontRef>
-        </p:style>
-        <p:txBody>
-          <a:bodyPr rtlCol="0" anchor="ctr"/>
-          <a:lstStyle/>
-          <a:p>
-            <a:pPr algn="ctr"/>
-            <a:r>
-              <a:rPr lang="en-US" sz="1050" b="1" dirty="0" err="1" smtClean="0">
-                <a:solidFill>
-                  <a:schemeClr val="accent6">
-                    <a:lumMod val="75000"/>
-                  </a:schemeClr>
-                </a:solidFill>
-              </a:rPr>
-              <a:t>XmlAdaptedPerson</a:t>
-            </a:r>
-            <a:endParaRPr lang="en-SG" sz="1050" b="1" dirty="0">
-              <a:solidFill>
-                <a:schemeClr val="accent6">
-                  <a:lumMod val="75000"/>
-                </a:schemeClr>
-              </a:solidFill>
-            </a:endParaRPr>
-          </a:p>
-        </p:txBody>
-      </p:sp>
-      <p:cxnSp>
-        <p:nvCxnSpPr>
-          <p:cNvPr id="77" name="Elbow Connector 122"/>
-          <p:cNvCxnSpPr>
-            <a:stCxn id="66" idx="3"/>
-            <a:endCxn id="74" idx="1"/>
-          </p:cNvCxnSpPr>
-          <p:nvPr/>
-        </p:nvCxnSpPr>
-        <p:spPr>
-          <a:xfrm flipV="1">
-            <a:off x="7220507" y="3333004"/>
-            <a:ext cx="395231" cy="786"/>
-          </a:xfrm>
-          <a:prstGeom prst="bentConnector3">
-            <a:avLst>
-              <a:gd name="adj1" fmla="val 50000"/>
-            </a:avLst>
-          </a:prstGeom>
-          <a:ln w="19050">
-            <a:prstDash val="sysDot"/>
-            <a:headEnd type="none" w="med" len="med"/>
-            <a:tailEnd type="arrow" w="med" len="med"/>
-          </a:ln>
-          <a:effectLst/>
-        </p:spPr>
-        <p:style>
-          <a:lnRef idx="1">
-            <a:schemeClr val="accent6"/>
-          </a:lnRef>
-          <a:fillRef idx="2">
-            <a:schemeClr val="accent6"/>
-          </a:fillRef>
-          <a:effectRef idx="1">
-            <a:schemeClr val="accent6"/>
-          </a:effectRef>
-          <a:fontRef idx="minor">
-            <a:schemeClr val="dk1"/>
-          </a:fontRef>
-        </p:style>
-      </p:cxnSp>
     </p:spTree>
     <p:extLst>
       <p:ext uri="{BB962C8B-B14F-4D97-AF65-F5344CB8AC3E}">

</xml_diff>

<commit_message>
Add documentation for Storage, register-patient and register-doctor
</commit_message>
<xml_diff>
--- a/docs/diagrams/StorageComponentClassDiagram.pptx
+++ b/docs/diagrams/StorageComponentClassDiagram.pptx
@@ -107,6 +107,22 @@
       </a:defRPr>
     </a:lvl9pPr>
   </p:defaultTextStyle>
+  <p:extLst>
+    <p:ext uri="{EFAFB233-063F-42B5-8137-9DF3F51BA10A}">
+      <p15:sldGuideLst xmlns:p15="http://schemas.microsoft.com/office/powerpoint/2012/main">
+        <p15:guide id="1" orient="horz" pos="1488">
+          <p15:clr>
+            <a:srgbClr val="A4A3A4"/>
+          </p15:clr>
+        </p15:guide>
+        <p15:guide id="2" pos="2880">
+          <p15:clr>
+            <a:srgbClr val="A4A3A4"/>
+          </p15:clr>
+        </p15:guide>
+      </p15:sldGuideLst>
+    </p:ext>
+  </p:extLst>
 </p:presentation>
 </file>
 
@@ -192,7 +208,7 @@
           <a:p>
             <a:fld id="{F5CC4B3F-88C1-4FFA-B1B6-F41C21DC6924}" type="datetimeFigureOut">
               <a:rPr lang="en-US" smtClean="0"/>
-              <a:t>10/16/2016</a:t>
+              <a:t>10/24/2018</a:t>
             </a:fld>
             <a:endParaRPr lang="en-US"/>
           </a:p>
@@ -256,38 +272,37 @@
           <a:p>
             <a:pPr lvl="0"/>
             <a:r>
-              <a:rPr lang="en-US" smtClean="0"/>
+              <a:rPr lang="en-US"/>
               <a:t>Click to edit Master text styles</a:t>
             </a:r>
           </a:p>
           <a:p>
             <a:pPr lvl="1"/>
             <a:r>
-              <a:rPr lang="en-US" smtClean="0"/>
+              <a:rPr lang="en-US"/>
               <a:t>Second level</a:t>
             </a:r>
           </a:p>
           <a:p>
             <a:pPr lvl="2"/>
             <a:r>
-              <a:rPr lang="en-US" smtClean="0"/>
+              <a:rPr lang="en-US"/>
               <a:t>Third level</a:t>
             </a:r>
           </a:p>
           <a:p>
             <a:pPr lvl="3"/>
             <a:r>
-              <a:rPr lang="en-US" smtClean="0"/>
+              <a:rPr lang="en-US"/>
               <a:t>Fourth level</a:t>
             </a:r>
           </a:p>
           <a:p>
             <a:pPr lvl="4"/>
             <a:r>
-              <a:rPr lang="en-US" smtClean="0"/>
+              <a:rPr lang="en-US"/>
               <a:t>Fifth level</a:t>
             </a:r>
-            <a:endParaRPr lang="en-US"/>
           </a:p>
         </p:txBody>
       </p:sp>
@@ -498,10 +513,9 @@
           <a:lstStyle/>
           <a:p>
             <a:r>
-              <a:rPr lang="en-US" smtClean="0"/>
+              <a:rPr lang="en-US"/>
               <a:t>Click to edit Master title style</a:t>
             </a:r>
-            <a:endParaRPr lang="en-US"/>
           </a:p>
         </p:txBody>
       </p:sp>
@@ -617,10 +631,9 @@
           </a:lstStyle>
           <a:p>
             <a:r>
-              <a:rPr lang="en-US" smtClean="0"/>
+              <a:rPr lang="en-US"/>
               <a:t>Click to edit Master subtitle style</a:t>
             </a:r>
-            <a:endParaRPr lang="en-US"/>
           </a:p>
         </p:txBody>
       </p:sp>
@@ -641,7 +654,7 @@
           <a:p>
             <a:fld id="{78C97017-6FC3-485B-9764-EAC9E56C1D49}" type="datetimeFigureOut">
               <a:rPr lang="en-US" smtClean="0"/>
-              <a:t>10/16/2016</a:t>
+              <a:t>10/24/2018</a:t>
             </a:fld>
             <a:endParaRPr lang="en-US"/>
           </a:p>
@@ -735,10 +748,9 @@
           <a:lstStyle/>
           <a:p>
             <a:r>
-              <a:rPr lang="en-US" smtClean="0"/>
+              <a:rPr lang="en-US"/>
               <a:t>Click to edit Master title style</a:t>
             </a:r>
-            <a:endParaRPr lang="en-US"/>
           </a:p>
         </p:txBody>
       </p:sp>
@@ -759,38 +771,37 @@
           <a:p>
             <a:pPr lvl="0"/>
             <a:r>
-              <a:rPr lang="en-US" smtClean="0"/>
+              <a:rPr lang="en-US"/>
               <a:t>Click to edit Master text styles</a:t>
             </a:r>
           </a:p>
           <a:p>
             <a:pPr lvl="1"/>
             <a:r>
-              <a:rPr lang="en-US" smtClean="0"/>
+              <a:rPr lang="en-US"/>
               <a:t>Second level</a:t>
             </a:r>
           </a:p>
           <a:p>
             <a:pPr lvl="2"/>
             <a:r>
-              <a:rPr lang="en-US" smtClean="0"/>
+              <a:rPr lang="en-US"/>
               <a:t>Third level</a:t>
             </a:r>
           </a:p>
           <a:p>
             <a:pPr lvl="3"/>
             <a:r>
-              <a:rPr lang="en-US" smtClean="0"/>
+              <a:rPr lang="en-US"/>
               <a:t>Fourth level</a:t>
             </a:r>
           </a:p>
           <a:p>
             <a:pPr lvl="4"/>
             <a:r>
-              <a:rPr lang="en-US" smtClean="0"/>
+              <a:rPr lang="en-US"/>
               <a:t>Fifth level</a:t>
             </a:r>
-            <a:endParaRPr lang="en-US"/>
           </a:p>
         </p:txBody>
       </p:sp>
@@ -811,7 +822,7 @@
           <a:p>
             <a:fld id="{78C97017-6FC3-485B-9764-EAC9E56C1D49}" type="datetimeFigureOut">
               <a:rPr lang="en-US" smtClean="0"/>
-              <a:t>10/16/2016</a:t>
+              <a:t>10/24/2018</a:t>
             </a:fld>
             <a:endParaRPr lang="en-US"/>
           </a:p>
@@ -910,10 +921,9 @@
           <a:lstStyle/>
           <a:p>
             <a:r>
-              <a:rPr lang="en-US" smtClean="0"/>
+              <a:rPr lang="en-US"/>
               <a:t>Click to edit Master title style</a:t>
             </a:r>
-            <a:endParaRPr lang="en-US"/>
           </a:p>
         </p:txBody>
       </p:sp>
@@ -939,38 +949,37 @@
           <a:p>
             <a:pPr lvl="0"/>
             <a:r>
-              <a:rPr lang="en-US" smtClean="0"/>
+              <a:rPr lang="en-US"/>
               <a:t>Click to edit Master text styles</a:t>
             </a:r>
           </a:p>
           <a:p>
             <a:pPr lvl="1"/>
             <a:r>
-              <a:rPr lang="en-US" smtClean="0"/>
+              <a:rPr lang="en-US"/>
               <a:t>Second level</a:t>
             </a:r>
           </a:p>
           <a:p>
             <a:pPr lvl="2"/>
             <a:r>
-              <a:rPr lang="en-US" smtClean="0"/>
+              <a:rPr lang="en-US"/>
               <a:t>Third level</a:t>
             </a:r>
           </a:p>
           <a:p>
             <a:pPr lvl="3"/>
             <a:r>
-              <a:rPr lang="en-US" smtClean="0"/>
+              <a:rPr lang="en-US"/>
               <a:t>Fourth level</a:t>
             </a:r>
           </a:p>
           <a:p>
             <a:pPr lvl="4"/>
             <a:r>
-              <a:rPr lang="en-US" smtClean="0"/>
+              <a:rPr lang="en-US"/>
               <a:t>Fifth level</a:t>
             </a:r>
-            <a:endParaRPr lang="en-US"/>
           </a:p>
         </p:txBody>
       </p:sp>
@@ -991,7 +1000,7 @@
           <a:p>
             <a:fld id="{78C97017-6FC3-485B-9764-EAC9E56C1D49}" type="datetimeFigureOut">
               <a:rPr lang="en-US" smtClean="0"/>
-              <a:t>10/16/2016</a:t>
+              <a:t>10/24/2018</a:t>
             </a:fld>
             <a:endParaRPr lang="en-US"/>
           </a:p>
@@ -1085,10 +1094,9 @@
           <a:lstStyle/>
           <a:p>
             <a:r>
-              <a:rPr lang="en-US" smtClean="0"/>
+              <a:rPr lang="en-US"/>
               <a:t>Click to edit Master title style</a:t>
             </a:r>
-            <a:endParaRPr lang="en-US"/>
           </a:p>
         </p:txBody>
       </p:sp>
@@ -1109,38 +1117,37 @@
           <a:p>
             <a:pPr lvl="0"/>
             <a:r>
-              <a:rPr lang="en-US" smtClean="0"/>
+              <a:rPr lang="en-US"/>
               <a:t>Click to edit Master text styles</a:t>
             </a:r>
           </a:p>
           <a:p>
             <a:pPr lvl="1"/>
             <a:r>
-              <a:rPr lang="en-US" smtClean="0"/>
+              <a:rPr lang="en-US"/>
               <a:t>Second level</a:t>
             </a:r>
           </a:p>
           <a:p>
             <a:pPr lvl="2"/>
             <a:r>
-              <a:rPr lang="en-US" smtClean="0"/>
+              <a:rPr lang="en-US"/>
               <a:t>Third level</a:t>
             </a:r>
           </a:p>
           <a:p>
             <a:pPr lvl="3"/>
             <a:r>
-              <a:rPr lang="en-US" smtClean="0"/>
+              <a:rPr lang="en-US"/>
               <a:t>Fourth level</a:t>
             </a:r>
           </a:p>
           <a:p>
             <a:pPr lvl="4"/>
             <a:r>
-              <a:rPr lang="en-US" smtClean="0"/>
+              <a:rPr lang="en-US"/>
               <a:t>Fifth level</a:t>
             </a:r>
-            <a:endParaRPr lang="en-US"/>
           </a:p>
         </p:txBody>
       </p:sp>
@@ -1161,7 +1168,7 @@
           <a:p>
             <a:fld id="{78C97017-6FC3-485B-9764-EAC9E56C1D49}" type="datetimeFigureOut">
               <a:rPr lang="en-US" smtClean="0"/>
-              <a:t>10/16/2016</a:t>
+              <a:t>10/24/2018</a:t>
             </a:fld>
             <a:endParaRPr lang="en-US"/>
           </a:p>
@@ -1264,10 +1271,9 @@
           </a:lstStyle>
           <a:p>
             <a:r>
-              <a:rPr lang="en-US" smtClean="0"/>
+              <a:rPr lang="en-US"/>
               <a:t>Click to edit Master title style</a:t>
             </a:r>
-            <a:endParaRPr lang="en-US"/>
           </a:p>
         </p:txBody>
       </p:sp>
@@ -1384,7 +1390,7 @@
           <a:p>
             <a:pPr lvl="0"/>
             <a:r>
-              <a:rPr lang="en-US" smtClean="0"/>
+              <a:rPr lang="en-US"/>
               <a:t>Click to edit Master text styles</a:t>
             </a:r>
           </a:p>
@@ -1407,7 +1413,7 @@
           <a:p>
             <a:fld id="{78C97017-6FC3-485B-9764-EAC9E56C1D49}" type="datetimeFigureOut">
               <a:rPr lang="en-US" smtClean="0"/>
-              <a:t>10/16/2016</a:t>
+              <a:t>10/24/2018</a:t>
             </a:fld>
             <a:endParaRPr lang="en-US"/>
           </a:p>
@@ -1501,10 +1507,9 @@
           <a:lstStyle/>
           <a:p>
             <a:r>
-              <a:rPr lang="en-US" smtClean="0"/>
+              <a:rPr lang="en-US"/>
               <a:t>Click to edit Master title style</a:t>
             </a:r>
-            <a:endParaRPr lang="en-US"/>
           </a:p>
         </p:txBody>
       </p:sp>
@@ -1558,38 +1563,37 @@
           <a:p>
             <a:pPr lvl="0"/>
             <a:r>
-              <a:rPr lang="en-US" smtClean="0"/>
+              <a:rPr lang="en-US"/>
               <a:t>Click to edit Master text styles</a:t>
             </a:r>
           </a:p>
           <a:p>
             <a:pPr lvl="1"/>
             <a:r>
-              <a:rPr lang="en-US" smtClean="0"/>
+              <a:rPr lang="en-US"/>
               <a:t>Second level</a:t>
             </a:r>
           </a:p>
           <a:p>
             <a:pPr lvl="2"/>
             <a:r>
-              <a:rPr lang="en-US" smtClean="0"/>
+              <a:rPr lang="en-US"/>
               <a:t>Third level</a:t>
             </a:r>
           </a:p>
           <a:p>
             <a:pPr lvl="3"/>
             <a:r>
-              <a:rPr lang="en-US" smtClean="0"/>
+              <a:rPr lang="en-US"/>
               <a:t>Fourth level</a:t>
             </a:r>
           </a:p>
           <a:p>
             <a:pPr lvl="4"/>
             <a:r>
-              <a:rPr lang="en-US" smtClean="0"/>
+              <a:rPr lang="en-US"/>
               <a:t>Fifth level</a:t>
             </a:r>
-            <a:endParaRPr lang="en-US"/>
           </a:p>
         </p:txBody>
       </p:sp>
@@ -1643,38 +1647,37 @@
           <a:p>
             <a:pPr lvl="0"/>
             <a:r>
-              <a:rPr lang="en-US" smtClean="0"/>
+              <a:rPr lang="en-US"/>
               <a:t>Click to edit Master text styles</a:t>
             </a:r>
           </a:p>
           <a:p>
             <a:pPr lvl="1"/>
             <a:r>
-              <a:rPr lang="en-US" smtClean="0"/>
+              <a:rPr lang="en-US"/>
               <a:t>Second level</a:t>
             </a:r>
           </a:p>
           <a:p>
             <a:pPr lvl="2"/>
             <a:r>
-              <a:rPr lang="en-US" smtClean="0"/>
+              <a:rPr lang="en-US"/>
               <a:t>Third level</a:t>
             </a:r>
           </a:p>
           <a:p>
             <a:pPr lvl="3"/>
             <a:r>
-              <a:rPr lang="en-US" smtClean="0"/>
+              <a:rPr lang="en-US"/>
               <a:t>Fourth level</a:t>
             </a:r>
           </a:p>
           <a:p>
             <a:pPr lvl="4"/>
             <a:r>
-              <a:rPr lang="en-US" smtClean="0"/>
+              <a:rPr lang="en-US"/>
               <a:t>Fifth level</a:t>
             </a:r>
-            <a:endParaRPr lang="en-US"/>
           </a:p>
         </p:txBody>
       </p:sp>
@@ -1695,7 +1698,7 @@
           <a:p>
             <a:fld id="{78C97017-6FC3-485B-9764-EAC9E56C1D49}" type="datetimeFigureOut">
               <a:rPr lang="en-US" smtClean="0"/>
-              <a:t>10/16/2016</a:t>
+              <a:t>10/24/2018</a:t>
             </a:fld>
             <a:endParaRPr lang="en-US"/>
           </a:p>
@@ -1793,10 +1796,9 @@
           </a:lstStyle>
           <a:p>
             <a:r>
-              <a:rPr lang="en-US" smtClean="0"/>
+              <a:rPr lang="en-US"/>
               <a:t>Click to edit Master title style</a:t>
             </a:r>
-            <a:endParaRPr lang="en-US"/>
           </a:p>
         </p:txBody>
       </p:sp>
@@ -1859,7 +1861,7 @@
           <a:p>
             <a:pPr lvl="0"/>
             <a:r>
-              <a:rPr lang="en-US" smtClean="0"/>
+              <a:rPr lang="en-US"/>
               <a:t>Click to edit Master text styles</a:t>
             </a:r>
           </a:p>
@@ -1915,38 +1917,37 @@
           <a:p>
             <a:pPr lvl="0"/>
             <a:r>
-              <a:rPr lang="en-US" smtClean="0"/>
+              <a:rPr lang="en-US"/>
               <a:t>Click to edit Master text styles</a:t>
             </a:r>
           </a:p>
           <a:p>
             <a:pPr lvl="1"/>
             <a:r>
-              <a:rPr lang="en-US" smtClean="0"/>
+              <a:rPr lang="en-US"/>
               <a:t>Second level</a:t>
             </a:r>
           </a:p>
           <a:p>
             <a:pPr lvl="2"/>
             <a:r>
-              <a:rPr lang="en-US" smtClean="0"/>
+              <a:rPr lang="en-US"/>
               <a:t>Third level</a:t>
             </a:r>
           </a:p>
           <a:p>
             <a:pPr lvl="3"/>
             <a:r>
-              <a:rPr lang="en-US" smtClean="0"/>
+              <a:rPr lang="en-US"/>
               <a:t>Fourth level</a:t>
             </a:r>
           </a:p>
           <a:p>
             <a:pPr lvl="4"/>
             <a:r>
-              <a:rPr lang="en-US" smtClean="0"/>
+              <a:rPr lang="en-US"/>
               <a:t>Fifth level</a:t>
             </a:r>
-            <a:endParaRPr lang="en-US"/>
           </a:p>
         </p:txBody>
       </p:sp>
@@ -2009,7 +2010,7 @@
           <a:p>
             <a:pPr lvl="0"/>
             <a:r>
-              <a:rPr lang="en-US" smtClean="0"/>
+              <a:rPr lang="en-US"/>
               <a:t>Click to edit Master text styles</a:t>
             </a:r>
           </a:p>
@@ -2065,38 +2066,37 @@
           <a:p>
             <a:pPr lvl="0"/>
             <a:r>
-              <a:rPr lang="en-US" smtClean="0"/>
+              <a:rPr lang="en-US"/>
               <a:t>Click to edit Master text styles</a:t>
             </a:r>
           </a:p>
           <a:p>
             <a:pPr lvl="1"/>
             <a:r>
-              <a:rPr lang="en-US" smtClean="0"/>
+              <a:rPr lang="en-US"/>
               <a:t>Second level</a:t>
             </a:r>
           </a:p>
           <a:p>
             <a:pPr lvl="2"/>
             <a:r>
-              <a:rPr lang="en-US" smtClean="0"/>
+              <a:rPr lang="en-US"/>
               <a:t>Third level</a:t>
             </a:r>
           </a:p>
           <a:p>
             <a:pPr lvl="3"/>
             <a:r>
-              <a:rPr lang="en-US" smtClean="0"/>
+              <a:rPr lang="en-US"/>
               <a:t>Fourth level</a:t>
             </a:r>
           </a:p>
           <a:p>
             <a:pPr lvl="4"/>
             <a:r>
-              <a:rPr lang="en-US" smtClean="0"/>
+              <a:rPr lang="en-US"/>
               <a:t>Fifth level</a:t>
             </a:r>
-            <a:endParaRPr lang="en-US"/>
           </a:p>
         </p:txBody>
       </p:sp>
@@ -2117,7 +2117,7 @@
           <a:p>
             <a:fld id="{78C97017-6FC3-485B-9764-EAC9E56C1D49}" type="datetimeFigureOut">
               <a:rPr lang="en-US" smtClean="0"/>
-              <a:t>10/16/2016</a:t>
+              <a:t>10/24/2018</a:t>
             </a:fld>
             <a:endParaRPr lang="en-US"/>
           </a:p>
@@ -2211,10 +2211,9 @@
           <a:lstStyle/>
           <a:p>
             <a:r>
-              <a:rPr lang="en-US" smtClean="0"/>
+              <a:rPr lang="en-US"/>
               <a:t>Click to edit Master title style</a:t>
             </a:r>
-            <a:endParaRPr lang="en-US"/>
           </a:p>
         </p:txBody>
       </p:sp>
@@ -2235,7 +2234,7 @@
           <a:p>
             <a:fld id="{78C97017-6FC3-485B-9764-EAC9E56C1D49}" type="datetimeFigureOut">
               <a:rPr lang="en-US" smtClean="0"/>
-              <a:t>10/16/2016</a:t>
+              <a:t>10/24/2018</a:t>
             </a:fld>
             <a:endParaRPr lang="en-US"/>
           </a:p>
@@ -2330,7 +2329,7 @@
           <a:p>
             <a:fld id="{78C97017-6FC3-485B-9764-EAC9E56C1D49}" type="datetimeFigureOut">
               <a:rPr lang="en-US" smtClean="0"/>
-              <a:t>10/16/2016</a:t>
+              <a:t>10/24/2018</a:t>
             </a:fld>
             <a:endParaRPr lang="en-US"/>
           </a:p>
@@ -2433,10 +2432,9 @@
           </a:lstStyle>
           <a:p>
             <a:r>
-              <a:rPr lang="en-US" smtClean="0"/>
+              <a:rPr lang="en-US"/>
               <a:t>Click to edit Master title style</a:t>
             </a:r>
-            <a:endParaRPr lang="en-US"/>
           </a:p>
         </p:txBody>
       </p:sp>
@@ -2490,38 +2488,37 @@
           <a:p>
             <a:pPr lvl="0"/>
             <a:r>
-              <a:rPr lang="en-US" smtClean="0"/>
+              <a:rPr lang="en-US"/>
               <a:t>Click to edit Master text styles</a:t>
             </a:r>
           </a:p>
           <a:p>
             <a:pPr lvl="1"/>
             <a:r>
-              <a:rPr lang="en-US" smtClean="0"/>
+              <a:rPr lang="en-US"/>
               <a:t>Second level</a:t>
             </a:r>
           </a:p>
           <a:p>
             <a:pPr lvl="2"/>
             <a:r>
-              <a:rPr lang="en-US" smtClean="0"/>
+              <a:rPr lang="en-US"/>
               <a:t>Third level</a:t>
             </a:r>
           </a:p>
           <a:p>
             <a:pPr lvl="3"/>
             <a:r>
-              <a:rPr lang="en-US" smtClean="0"/>
+              <a:rPr lang="en-US"/>
               <a:t>Fourth level</a:t>
             </a:r>
           </a:p>
           <a:p>
             <a:pPr lvl="4"/>
             <a:r>
-              <a:rPr lang="en-US" smtClean="0"/>
+              <a:rPr lang="en-US"/>
               <a:t>Fifth level</a:t>
             </a:r>
-            <a:endParaRPr lang="en-US"/>
           </a:p>
         </p:txBody>
       </p:sp>
@@ -2584,7 +2581,7 @@
           <a:p>
             <a:pPr lvl="0"/>
             <a:r>
-              <a:rPr lang="en-US" smtClean="0"/>
+              <a:rPr lang="en-US"/>
               <a:t>Click to edit Master text styles</a:t>
             </a:r>
           </a:p>
@@ -2607,7 +2604,7 @@
           <a:p>
             <a:fld id="{78C97017-6FC3-485B-9764-EAC9E56C1D49}" type="datetimeFigureOut">
               <a:rPr lang="en-US" smtClean="0"/>
-              <a:t>10/16/2016</a:t>
+              <a:t>10/24/2018</a:t>
             </a:fld>
             <a:endParaRPr lang="en-US"/>
           </a:p>
@@ -2710,10 +2707,9 @@
           </a:lstStyle>
           <a:p>
             <a:r>
-              <a:rPr lang="en-US" smtClean="0"/>
+              <a:rPr lang="en-US"/>
               <a:t>Click to edit Master title style</a:t>
             </a:r>
-            <a:endParaRPr lang="en-US"/>
           </a:p>
         </p:txBody>
       </p:sp>
@@ -2837,7 +2833,7 @@
           <a:p>
             <a:pPr lvl="0"/>
             <a:r>
-              <a:rPr lang="en-US" smtClean="0"/>
+              <a:rPr lang="en-US"/>
               <a:t>Click to edit Master text styles</a:t>
             </a:r>
           </a:p>
@@ -2860,7 +2856,7 @@
           <a:p>
             <a:fld id="{78C97017-6FC3-485B-9764-EAC9E56C1D49}" type="datetimeFigureOut">
               <a:rPr lang="en-US" smtClean="0"/>
-              <a:t>10/16/2016</a:t>
+              <a:t>10/24/2018</a:t>
             </a:fld>
             <a:endParaRPr lang="en-US"/>
           </a:p>
@@ -2969,10 +2965,9 @@
           <a:lstStyle/>
           <a:p>
             <a:r>
-              <a:rPr lang="en-US" smtClean="0"/>
+              <a:rPr lang="en-US"/>
               <a:t>Click to edit Master title style</a:t>
             </a:r>
-            <a:endParaRPr lang="en-US"/>
           </a:p>
         </p:txBody>
       </p:sp>
@@ -3003,38 +2998,37 @@
           <a:p>
             <a:pPr lvl="0"/>
             <a:r>
-              <a:rPr lang="en-US" smtClean="0"/>
+              <a:rPr lang="en-US"/>
               <a:t>Click to edit Master text styles</a:t>
             </a:r>
           </a:p>
           <a:p>
             <a:pPr lvl="1"/>
             <a:r>
-              <a:rPr lang="en-US" smtClean="0"/>
+              <a:rPr lang="en-US"/>
               <a:t>Second level</a:t>
             </a:r>
           </a:p>
           <a:p>
             <a:pPr lvl="2"/>
             <a:r>
-              <a:rPr lang="en-US" smtClean="0"/>
+              <a:rPr lang="en-US"/>
               <a:t>Third level</a:t>
             </a:r>
           </a:p>
           <a:p>
             <a:pPr lvl="3"/>
             <a:r>
-              <a:rPr lang="en-US" smtClean="0"/>
+              <a:rPr lang="en-US"/>
               <a:t>Fourth level</a:t>
             </a:r>
           </a:p>
           <a:p>
             <a:pPr lvl="4"/>
             <a:r>
-              <a:rPr lang="en-US" smtClean="0"/>
+              <a:rPr lang="en-US"/>
               <a:t>Fifth level</a:t>
             </a:r>
-            <a:endParaRPr lang="en-US"/>
           </a:p>
         </p:txBody>
       </p:sp>
@@ -3073,7 +3067,7 @@
           <a:p>
             <a:fld id="{78C97017-6FC3-485B-9764-EAC9E56C1D49}" type="datetimeFigureOut">
               <a:rPr lang="en-US" smtClean="0"/>
-              <a:t>10/16/2016</a:t>
+              <a:t>10/24/2018</a:t>
             </a:fld>
             <a:endParaRPr lang="en-US"/>
           </a:p>
@@ -3456,8 +3450,8 @@
         </p:nvSpPr>
         <p:spPr>
           <a:xfrm>
-            <a:off x="1119865" y="2086382"/>
-            <a:ext cx="7871735" cy="1723618"/>
+            <a:off x="381000" y="2182248"/>
+            <a:ext cx="8686800" cy="2892740"/>
           </a:xfrm>
           <a:prstGeom prst="roundRect">
             <a:avLst>
@@ -3494,7 +3488,7 @@
           <a:lstStyle/>
           <a:p>
             <a:r>
-              <a:rPr lang="en-US" sz="1200" b="1" dirty="0" smtClean="0">
+              <a:rPr lang="en-US" sz="1200" b="1" dirty="0">
                 <a:solidFill>
                   <a:schemeClr val="accent6">
                     <a:lumMod val="75000"/>
@@ -3521,7 +3515,7 @@
         </p:nvSpPr>
         <p:spPr>
           <a:xfrm>
-            <a:off x="2877180" y="3158440"/>
+            <a:off x="2214515" y="3205658"/>
             <a:ext cx="1323049" cy="346760"/>
           </a:xfrm>
           <a:prstGeom prst="rect">
@@ -3561,7 +3555,7 @@
           <a:p>
             <a:pPr algn="ctr"/>
             <a:r>
-              <a:rPr lang="en-US" sz="1050" dirty="0" smtClean="0">
+              <a:rPr lang="en-US" sz="1050" dirty="0">
                 <a:solidFill>
                   <a:schemeClr val="bg1"/>
                 </a:solidFill>
@@ -3569,19 +3563,19 @@
               <a:t>&lt;&lt;interface&gt;&gt;</a:t>
             </a:r>
             <a:br>
-              <a:rPr lang="en-US" sz="1050" dirty="0" smtClean="0">
+              <a:rPr lang="en-US" sz="1050" dirty="0">
                 <a:solidFill>
                   <a:schemeClr val="bg1"/>
                 </a:solidFill>
               </a:rPr>
             </a:br>
             <a:r>
-              <a:rPr lang="en-US" sz="1050" dirty="0" err="1" smtClean="0">
+              <a:rPr lang="en-US" sz="1050" dirty="0" err="1">
                 <a:solidFill>
                   <a:schemeClr val="bg1"/>
                 </a:solidFill>
               </a:rPr>
-              <a:t>AddressBookStorage</a:t>
+              <a:t>HealthBookStorage</a:t>
             </a:r>
             <a:endParaRPr lang="en-SG" sz="1050" dirty="0">
               <a:solidFill>
@@ -3599,7 +3593,7 @@
         </p:nvSpPr>
         <p:spPr>
           <a:xfrm rot="16200000">
-            <a:off x="1683963" y="2868687"/>
+            <a:off x="1021298" y="2915905"/>
             <a:ext cx="1093635" cy="346760"/>
           </a:xfrm>
           <a:prstGeom prst="rect">
@@ -3639,7 +3633,7 @@
           <a:p>
             <a:pPr algn="ctr"/>
             <a:r>
-              <a:rPr lang="en-US" sz="1050" dirty="0" err="1" smtClean="0">
+              <a:rPr lang="en-US" sz="1050" dirty="0" err="1">
                 <a:solidFill>
                   <a:schemeClr val="bg1"/>
                 </a:solidFill>
@@ -3662,7 +3656,7 @@
         </p:nvSpPr>
         <p:spPr>
           <a:xfrm rot="16200000">
-            <a:off x="956202" y="2861202"/>
+            <a:off x="293537" y="2908420"/>
             <a:ext cx="1093635" cy="346760"/>
           </a:xfrm>
           <a:prstGeom prst="rect">
@@ -3713,7 +3707,7 @@
           <a:p>
             <a:pPr algn="ctr"/>
             <a:r>
-              <a:rPr lang="en-US" sz="1050" dirty="0" smtClean="0">
+              <a:rPr lang="en-US" sz="1050" dirty="0">
                 <a:solidFill>
                   <a:schemeClr val="bg1"/>
                 </a:solidFill>
@@ -3736,7 +3730,7 @@
         </p:nvSpPr>
         <p:spPr>
           <a:xfrm rot="16200000">
-            <a:off x="1626910" y="2952291"/>
+            <a:off x="964245" y="2999509"/>
             <a:ext cx="270504" cy="175523"/>
           </a:xfrm>
           <a:prstGeom prst="triangle">
@@ -3794,7 +3788,7 @@
         </p:nvCxnSpPr>
         <p:spPr>
           <a:xfrm>
-            <a:off x="2656370" y="3326536"/>
+            <a:off x="1993705" y="3373754"/>
             <a:ext cx="220810" cy="5284"/>
           </a:xfrm>
           <a:prstGeom prst="straightConnector1">
@@ -3834,7 +3828,7 @@
         </p:nvCxnSpPr>
         <p:spPr>
           <a:xfrm>
-            <a:off x="910091" y="3040053"/>
+            <a:off x="247426" y="3087271"/>
             <a:ext cx="419548" cy="2860"/>
           </a:xfrm>
           <a:prstGeom prst="bentConnector3">
@@ -3879,7 +3873,7 @@
         </p:nvCxnSpPr>
         <p:spPr>
           <a:xfrm flipV="1">
-            <a:off x="1849924" y="3040052"/>
+            <a:off x="1187259" y="3087270"/>
             <a:ext cx="216105" cy="1"/>
           </a:xfrm>
           <a:prstGeom prst="line">
@@ -3920,7 +3914,7 @@
         </p:nvSpPr>
         <p:spPr>
           <a:xfrm>
-            <a:off x="2420322" y="3239846"/>
+            <a:off x="1757657" y="3287064"/>
             <a:ext cx="236048" cy="173380"/>
           </a:xfrm>
           <a:prstGeom prst="flowChartDecision">
@@ -3974,7 +3968,7 @@
         </p:nvCxnSpPr>
         <p:spPr>
           <a:xfrm flipV="1">
-            <a:off x="4398041" y="3331820"/>
+            <a:off x="3735376" y="3379038"/>
             <a:ext cx="223324" cy="1"/>
           </a:xfrm>
           <a:prstGeom prst="bentConnector3">
@@ -4017,7 +4011,7 @@
         </p:nvSpPr>
         <p:spPr>
           <a:xfrm rot="5400000" flipV="1">
-            <a:off x="4175027" y="3244059"/>
+            <a:off x="3512362" y="3291277"/>
             <a:ext cx="270504" cy="175523"/>
           </a:xfrm>
           <a:prstGeom prst="triangle">
@@ -4075,7 +4069,7 @@
         </p:nvCxnSpPr>
         <p:spPr>
           <a:xfrm>
-            <a:off x="5791200" y="3331820"/>
+            <a:off x="5128535" y="3379038"/>
             <a:ext cx="228600" cy="1970"/>
           </a:xfrm>
           <a:prstGeom prst="bentConnector3">
@@ -4118,7 +4112,7 @@
         </p:nvSpPr>
         <p:spPr>
           <a:xfrm>
-            <a:off x="4621365" y="3158440"/>
+            <a:off x="3958700" y="3205658"/>
             <a:ext cx="1169835" cy="346760"/>
           </a:xfrm>
           <a:prstGeom prst="rect">
@@ -4147,27 +4141,17 @@
           <a:p>
             <a:pPr algn="ctr"/>
             <a:r>
-              <a:rPr lang="en-US" sz="1050" b="1" dirty="0" err="1" smtClean="0">
+              <a:rPr lang="en-US" sz="1050" b="1" dirty="0" err="1">
                 <a:solidFill>
                   <a:schemeClr val="accent6">
                     <a:lumMod val="75000"/>
                   </a:schemeClr>
                 </a:solidFill>
               </a:rPr>
-              <a:t>XmlAddressBook</a:t>
-            </a:r>
-            <a:r>
-              <a:rPr lang="en-US" sz="1050" b="1" dirty="0" smtClean="0">
-                <a:solidFill>
-                  <a:schemeClr val="accent6">
-                    <a:lumMod val="75000"/>
-                  </a:schemeClr>
-                </a:solidFill>
-              </a:rPr>
-              <a:t/>
+              <a:t>XmlHealthBook</a:t>
             </a:r>
             <a:br>
-              <a:rPr lang="en-US" sz="1050" b="1" dirty="0" smtClean="0">
+              <a:rPr lang="en-US" sz="1050" b="1" dirty="0">
                 <a:solidFill>
                   <a:schemeClr val="accent6">
                     <a:lumMod val="75000"/>
@@ -4176,7 +4160,7 @@
               </a:rPr>
             </a:br>
             <a:r>
-              <a:rPr lang="en-US" sz="1050" b="1" dirty="0" smtClean="0">
+              <a:rPr lang="en-US" sz="1050" b="1" dirty="0">
                 <a:solidFill>
                   <a:schemeClr val="accent6">
                     <a:lumMod val="75000"/>
@@ -4203,7 +4187,7 @@
         </p:nvSpPr>
         <p:spPr>
           <a:xfrm>
-            <a:off x="2873943" y="2558040"/>
+            <a:off x="2211278" y="2605258"/>
             <a:ext cx="1323049" cy="346760"/>
           </a:xfrm>
           <a:prstGeom prst="rect">
@@ -4243,7 +4227,7 @@
           <a:p>
             <a:pPr algn="ctr"/>
             <a:r>
-              <a:rPr lang="en-US" sz="1050" dirty="0" smtClean="0">
+              <a:rPr lang="en-US" sz="1050" dirty="0">
                 <a:solidFill>
                   <a:schemeClr val="bg1"/>
                 </a:solidFill>
@@ -4251,14 +4235,14 @@
               <a:t>&lt;&lt;interface&gt;&gt;</a:t>
             </a:r>
             <a:br>
-              <a:rPr lang="en-US" sz="1050" dirty="0" smtClean="0">
+              <a:rPr lang="en-US" sz="1050" dirty="0">
                 <a:solidFill>
                   <a:schemeClr val="bg1"/>
                 </a:solidFill>
               </a:rPr>
             </a:br>
             <a:r>
-              <a:rPr lang="en-US" sz="1050" dirty="0" err="1" smtClean="0">
+              <a:rPr lang="en-US" sz="1050" dirty="0" err="1">
                 <a:solidFill>
                   <a:schemeClr val="bg1"/>
                 </a:solidFill>
@@ -4284,7 +4268,7 @@
         </p:nvCxnSpPr>
         <p:spPr>
           <a:xfrm>
-            <a:off x="2653133" y="2726136"/>
+            <a:off x="1990468" y="2773354"/>
             <a:ext cx="220810" cy="5284"/>
           </a:xfrm>
           <a:prstGeom prst="straightConnector1">
@@ -4324,7 +4308,7 @@
         </p:nvSpPr>
         <p:spPr>
           <a:xfrm>
-            <a:off x="2417085" y="2639446"/>
+            <a:off x="1754420" y="2686664"/>
             <a:ext cx="236048" cy="173380"/>
           </a:xfrm>
           <a:prstGeom prst="flowChartDecision">
@@ -4378,7 +4362,7 @@
         </p:nvCxnSpPr>
         <p:spPr>
           <a:xfrm flipV="1">
-            <a:off x="4394804" y="2731420"/>
+            <a:off x="3732139" y="2778638"/>
             <a:ext cx="223324" cy="1"/>
           </a:xfrm>
           <a:prstGeom prst="bentConnector3">
@@ -4421,7 +4405,7 @@
         </p:nvSpPr>
         <p:spPr>
           <a:xfrm rot="5400000" flipV="1">
-            <a:off x="4171790" y="2643659"/>
+            <a:off x="3509125" y="2690877"/>
             <a:ext cx="270504" cy="175523"/>
           </a:xfrm>
           <a:prstGeom prst="triangle">
@@ -4476,7 +4460,7 @@
         </p:nvSpPr>
         <p:spPr>
           <a:xfrm>
-            <a:off x="4618128" y="2558040"/>
+            <a:off x="3955463" y="2605258"/>
             <a:ext cx="1093635" cy="346760"/>
           </a:xfrm>
           <a:prstGeom prst="rect">
@@ -4516,30 +4500,22 @@
           <a:p>
             <a:pPr algn="ctr"/>
             <a:r>
-              <a:rPr lang="en-US" sz="1050" dirty="0" err="1" smtClean="0">
+              <a:rPr lang="en-US" sz="1050" dirty="0" err="1">
                 <a:solidFill>
                   <a:schemeClr val="bg1"/>
                 </a:solidFill>
               </a:rPr>
               <a:t>JsonUserPrefs</a:t>
             </a:r>
-            <a:r>
-              <a:rPr lang="en-US" sz="1050" dirty="0" smtClean="0">
-                <a:solidFill>
-                  <a:schemeClr val="bg1"/>
-                </a:solidFill>
-              </a:rPr>
-              <a:t/>
-            </a:r>
             <a:br>
-              <a:rPr lang="en-US" sz="1050" dirty="0" smtClean="0">
+              <a:rPr lang="en-US" sz="1050" dirty="0">
                 <a:solidFill>
                   <a:schemeClr val="bg1"/>
                 </a:solidFill>
               </a:rPr>
             </a:br>
             <a:r>
-              <a:rPr lang="en-US" sz="1050" dirty="0" smtClean="0">
+              <a:rPr lang="en-US" sz="1050" dirty="0">
                 <a:solidFill>
                   <a:schemeClr val="bg1"/>
                 </a:solidFill>
@@ -4562,7 +4538,7 @@
         </p:nvSpPr>
         <p:spPr>
           <a:xfrm>
-            <a:off x="6019800" y="3160410"/>
+            <a:off x="5357135" y="3207628"/>
             <a:ext cx="1200707" cy="346760"/>
           </a:xfrm>
           <a:prstGeom prst="rect">
@@ -4591,7 +4567,7 @@
           <a:p>
             <a:pPr algn="ctr"/>
             <a:r>
-              <a:rPr lang="en-US" sz="1050" b="1" dirty="0" err="1" smtClean="0">
+              <a:rPr lang="en-US" sz="1050" b="1" dirty="0" err="1">
                 <a:solidFill>
                   <a:schemeClr val="accent6">
                     <a:lumMod val="75000"/>
@@ -4600,18 +4576,8 @@
               </a:rPr>
               <a:t>XmlSerializable</a:t>
             </a:r>
-            <a:r>
-              <a:rPr lang="en-US" sz="1050" b="1" dirty="0" smtClean="0">
-                <a:solidFill>
-                  <a:schemeClr val="accent6">
-                    <a:lumMod val="75000"/>
-                  </a:schemeClr>
-                </a:solidFill>
-              </a:rPr>
-              <a:t/>
-            </a:r>
             <a:br>
-              <a:rPr lang="en-US" sz="1050" b="1" dirty="0" smtClean="0">
+              <a:rPr lang="en-US" sz="1050" b="1" dirty="0">
                 <a:solidFill>
                   <a:schemeClr val="accent6">
                     <a:lumMod val="75000"/>
@@ -4620,14 +4586,14 @@
               </a:rPr>
             </a:br>
             <a:r>
-              <a:rPr lang="en-US" sz="1050" b="1" dirty="0" err="1" smtClean="0">
+              <a:rPr lang="en-US" sz="1050" b="1" dirty="0" err="1">
                 <a:solidFill>
                   <a:schemeClr val="accent6">
                     <a:lumMod val="75000"/>
                   </a:schemeClr>
                 </a:solidFill>
               </a:rPr>
-              <a:t>AddressBook</a:t>
+              <a:t>HealthBook</a:t>
             </a:r>
             <a:endParaRPr lang="en-SG" sz="1050" b="1" dirty="0">
               <a:solidFill>
@@ -4643,15 +4609,16 @@
         <p:nvCxnSpPr>
           <p:cNvPr id="70" name="Elbow Connector 122"/>
           <p:cNvCxnSpPr>
+            <a:cxnSpLocks/>
             <a:stCxn id="74" idx="0"/>
             <a:endCxn id="73" idx="2"/>
           </p:cNvCxnSpPr>
           <p:nvPr/>
         </p:nvCxnSpPr>
         <p:spPr>
-          <a:xfrm rot="5400000" flipH="1" flipV="1">
-            <a:off x="8077993" y="2992020"/>
-            <a:ext cx="335208" cy="12700"/>
+          <a:xfrm rot="16200000" flipV="1">
+            <a:off x="7686997" y="3076263"/>
+            <a:ext cx="254639" cy="6519"/>
           </a:xfrm>
           <a:prstGeom prst="bentConnector3">
             <a:avLst>
@@ -4688,7 +4655,7 @@
         </p:nvSpPr>
         <p:spPr>
           <a:xfrm>
-            <a:off x="7615738" y="2477656"/>
+            <a:off x="7181197" y="2605443"/>
             <a:ext cx="1259718" cy="346760"/>
           </a:xfrm>
           <a:prstGeom prst="rect">
@@ -4717,7 +4684,7 @@
           <a:p>
             <a:pPr algn="ctr"/>
             <a:r>
-              <a:rPr lang="en-US" sz="1050" b="1" dirty="0" err="1" smtClean="0">
+              <a:rPr lang="en-US" sz="1050" b="1" dirty="0" err="1">
                 <a:solidFill>
                   <a:schemeClr val="accent6">
                     <a:lumMod val="75000"/>
@@ -4744,8 +4711,8 @@
         </p:nvSpPr>
         <p:spPr>
           <a:xfrm>
-            <a:off x="7615738" y="3159624"/>
-            <a:ext cx="1259718" cy="346760"/>
+            <a:off x="7187716" y="3206842"/>
+            <a:ext cx="1259718" cy="349158"/>
           </a:xfrm>
           <a:prstGeom prst="rect">
             <a:avLst/>
@@ -4773,7 +4740,7 @@
           <a:p>
             <a:pPr algn="ctr"/>
             <a:r>
-              <a:rPr lang="en-US" sz="1050" b="1" dirty="0" err="1" smtClean="0">
+              <a:rPr lang="en-US" sz="1050" b="1" dirty="0" err="1">
                 <a:solidFill>
                   <a:schemeClr val="accent6">
                     <a:lumMod val="75000"/>
@@ -4782,6 +4749,16 @@
               </a:rPr>
               <a:t>XmlAdaptedPerson</a:t>
             </a:r>
+            <a:r>
+              <a:rPr lang="en-US" sz="1050" b="1" dirty="0">
+                <a:solidFill>
+                  <a:schemeClr val="accent6">
+                    <a:lumMod val="75000"/>
+                  </a:schemeClr>
+                </a:solidFill>
+              </a:rPr>
+              <a:t> </a:t>
+            </a:r>
             <a:endParaRPr lang="en-SG" sz="1050" b="1" dirty="0">
               <a:solidFill>
                 <a:schemeClr val="accent6">
@@ -4796,15 +4773,16 @@
         <p:nvCxnSpPr>
           <p:cNvPr id="77" name="Elbow Connector 122"/>
           <p:cNvCxnSpPr>
+            <a:cxnSpLocks/>
             <a:stCxn id="66" idx="3"/>
             <a:endCxn id="74" idx="1"/>
           </p:cNvCxnSpPr>
           <p:nvPr/>
         </p:nvCxnSpPr>
         <p:spPr>
-          <a:xfrm flipV="1">
-            <a:off x="7220507" y="3333004"/>
-            <a:ext cx="395231" cy="786"/>
+          <a:xfrm>
+            <a:off x="6557842" y="3381008"/>
+            <a:ext cx="629874" cy="413"/>
           </a:xfrm>
           <a:prstGeom prst="bentConnector3">
             <a:avLst>
@@ -4833,6 +4811,282 @@
           </a:fontRef>
         </p:style>
       </p:cxnSp>
+      <p:sp>
+        <p:nvSpPr>
+          <p:cNvPr id="31" name="Rectangle 8">
+            <a:extLst>
+              <a:ext uri="{FF2B5EF4-FFF2-40B4-BE49-F238E27FC236}">
+                <a16:creationId xmlns:a16="http://schemas.microsoft.com/office/drawing/2014/main" id="{9D07BDE6-DD37-4981-A833-50863113AAF3}"/>
+              </a:ext>
+            </a:extLst>
+          </p:cNvPr>
+          <p:cNvSpPr/>
+          <p:nvPr/>
+        </p:nvSpPr>
+        <p:spPr>
+          <a:xfrm>
+            <a:off x="6953073" y="3812987"/>
+            <a:ext cx="1727377" cy="346760"/>
+          </a:xfrm>
+          <a:prstGeom prst="rect">
+            <a:avLst/>
+          </a:prstGeom>
+          <a:ln w="19050"/>
+          <a:effectLst/>
+        </p:spPr>
+        <p:style>
+          <a:lnRef idx="1">
+            <a:schemeClr val="accent6"/>
+          </a:lnRef>
+          <a:fillRef idx="2">
+            <a:schemeClr val="accent6"/>
+          </a:fillRef>
+          <a:effectRef idx="1">
+            <a:schemeClr val="accent6"/>
+          </a:effectRef>
+          <a:fontRef idx="minor">
+            <a:schemeClr val="dk1"/>
+          </a:fontRef>
+        </p:style>
+        <p:txBody>
+          <a:bodyPr rtlCol="0" anchor="ctr"/>
+          <a:lstStyle/>
+          <a:p>
+            <a:pPr algn="ctr"/>
+            <a:r>
+              <a:rPr lang="en-US" sz="1050" b="1" dirty="0" err="1">
+                <a:solidFill>
+                  <a:schemeClr val="accent6">
+                    <a:lumMod val="75000"/>
+                  </a:schemeClr>
+                </a:solidFill>
+              </a:rPr>
+              <a:t>XmlAdaptedAppointment</a:t>
+            </a:r>
+            <a:r>
+              <a:rPr lang="en-US" sz="1050" b="1" dirty="0">
+                <a:solidFill>
+                  <a:schemeClr val="accent6">
+                    <a:lumMod val="75000"/>
+                  </a:schemeClr>
+                </a:solidFill>
+              </a:rPr>
+              <a:t> </a:t>
+            </a:r>
+            <a:endParaRPr lang="en-SG" sz="1050" b="1" dirty="0">
+              <a:solidFill>
+                <a:schemeClr val="accent6">
+                  <a:lumMod val="75000"/>
+                </a:schemeClr>
+              </a:solidFill>
+            </a:endParaRPr>
+          </a:p>
+        </p:txBody>
+      </p:sp>
+      <p:cxnSp>
+        <p:nvCxnSpPr>
+          <p:cNvPr id="32" name="Elbow Connector 122">
+            <a:extLst>
+              <a:ext uri="{FF2B5EF4-FFF2-40B4-BE49-F238E27FC236}">
+                <a16:creationId xmlns:a16="http://schemas.microsoft.com/office/drawing/2014/main" id="{FC4C6422-5C6E-4BC8-8E2B-66004064B86E}"/>
+              </a:ext>
+            </a:extLst>
+          </p:cNvPr>
+          <p:cNvCxnSpPr>
+            <a:cxnSpLocks/>
+            <a:stCxn id="66" idx="2"/>
+            <a:endCxn id="31" idx="1"/>
+          </p:cNvCxnSpPr>
+          <p:nvPr/>
+        </p:nvCxnSpPr>
+        <p:spPr>
+          <a:xfrm rot="16200000" flipH="1">
+            <a:off x="6239292" y="3272585"/>
+            <a:ext cx="431979" cy="995584"/>
+          </a:xfrm>
+          <a:prstGeom prst="bentConnector2">
+            <a:avLst/>
+          </a:prstGeom>
+          <a:ln w="19050">
+            <a:prstDash val="sysDot"/>
+            <a:headEnd type="none" w="med" len="med"/>
+            <a:tailEnd type="arrow" w="med" len="med"/>
+          </a:ln>
+          <a:effectLst/>
+        </p:spPr>
+        <p:style>
+          <a:lnRef idx="1">
+            <a:schemeClr val="accent6"/>
+          </a:lnRef>
+          <a:fillRef idx="2">
+            <a:schemeClr val="accent6"/>
+          </a:fillRef>
+          <a:effectRef idx="1">
+            <a:schemeClr val="accent6"/>
+          </a:effectRef>
+          <a:fontRef idx="minor">
+            <a:schemeClr val="dk1"/>
+          </a:fontRef>
+        </p:style>
+      </p:cxnSp>
+      <p:cxnSp>
+        <p:nvCxnSpPr>
+          <p:cNvPr id="39" name="Elbow Connector 122">
+            <a:extLst>
+              <a:ext uri="{FF2B5EF4-FFF2-40B4-BE49-F238E27FC236}">
+                <a16:creationId xmlns:a16="http://schemas.microsoft.com/office/drawing/2014/main" id="{CB10AC26-5506-4E1A-A5E5-F70AF11225DE}"/>
+              </a:ext>
+            </a:extLst>
+          </p:cNvPr>
+          <p:cNvCxnSpPr>
+            <a:cxnSpLocks/>
+            <a:stCxn id="74" idx="2"/>
+            <a:endCxn id="31" idx="0"/>
+          </p:cNvCxnSpPr>
+          <p:nvPr/>
+        </p:nvCxnSpPr>
+        <p:spPr>
+          <a:xfrm rot="5400000">
+            <a:off x="7688676" y="3684087"/>
+            <a:ext cx="256987" cy="813"/>
+          </a:xfrm>
+          <a:prstGeom prst="bentConnector3">
+            <a:avLst>
+              <a:gd name="adj1" fmla="val 50000"/>
+            </a:avLst>
+          </a:prstGeom>
+          <a:ln w="19050">
+            <a:prstDash val="sysDot"/>
+            <a:headEnd type="none" w="med" len="med"/>
+            <a:tailEnd type="arrow" w="med" len="med"/>
+          </a:ln>
+          <a:effectLst/>
+        </p:spPr>
+        <p:style>
+          <a:lnRef idx="1">
+            <a:schemeClr val="accent6"/>
+          </a:lnRef>
+          <a:fillRef idx="2">
+            <a:schemeClr val="accent6"/>
+          </a:fillRef>
+          <a:effectRef idx="1">
+            <a:schemeClr val="accent6"/>
+          </a:effectRef>
+          <a:fontRef idx="minor">
+            <a:schemeClr val="dk1"/>
+          </a:fontRef>
+        </p:style>
+      </p:cxnSp>
+      <p:cxnSp>
+        <p:nvCxnSpPr>
+          <p:cNvPr id="49" name="Elbow Connector 122">
+            <a:extLst>
+              <a:ext uri="{FF2B5EF4-FFF2-40B4-BE49-F238E27FC236}">
+                <a16:creationId xmlns:a16="http://schemas.microsoft.com/office/drawing/2014/main" id="{43620162-7D91-4754-9B65-F0B9E6F09C54}"/>
+              </a:ext>
+            </a:extLst>
+          </p:cNvPr>
+          <p:cNvCxnSpPr>
+            <a:cxnSpLocks/>
+            <a:stCxn id="31" idx="2"/>
+            <a:endCxn id="51" idx="0"/>
+          </p:cNvCxnSpPr>
+          <p:nvPr/>
+        </p:nvCxnSpPr>
+        <p:spPr>
+          <a:xfrm rot="16200000" flipH="1">
+            <a:off x="7709402" y="4267107"/>
+            <a:ext cx="217894" cy="3174"/>
+          </a:xfrm>
+          <a:prstGeom prst="bentConnector3">
+            <a:avLst>
+              <a:gd name="adj1" fmla="val 50000"/>
+            </a:avLst>
+          </a:prstGeom>
+          <a:ln w="19050">
+            <a:prstDash val="sysDot"/>
+            <a:headEnd type="none" w="med" len="med"/>
+            <a:tailEnd type="arrow" w="med" len="med"/>
+          </a:ln>
+          <a:effectLst/>
+        </p:spPr>
+        <p:style>
+          <a:lnRef idx="1">
+            <a:schemeClr val="accent6"/>
+          </a:lnRef>
+          <a:fillRef idx="2">
+            <a:schemeClr val="accent6"/>
+          </a:fillRef>
+          <a:effectRef idx="1">
+            <a:schemeClr val="accent6"/>
+          </a:effectRef>
+          <a:fontRef idx="minor">
+            <a:schemeClr val="dk1"/>
+          </a:fontRef>
+        </p:style>
+      </p:cxnSp>
+      <p:sp>
+        <p:nvSpPr>
+          <p:cNvPr id="51" name="Rectangle 8">
+            <a:extLst>
+              <a:ext uri="{FF2B5EF4-FFF2-40B4-BE49-F238E27FC236}">
+                <a16:creationId xmlns:a16="http://schemas.microsoft.com/office/drawing/2014/main" id="{C168B83C-7480-4A7C-805C-BD48FE9CAD07}"/>
+              </a:ext>
+            </a:extLst>
+          </p:cNvPr>
+          <p:cNvSpPr/>
+          <p:nvPr/>
+        </p:nvSpPr>
+        <p:spPr>
+          <a:xfrm>
+            <a:off x="6959422" y="4377641"/>
+            <a:ext cx="1721027" cy="346760"/>
+          </a:xfrm>
+          <a:prstGeom prst="rect">
+            <a:avLst/>
+          </a:prstGeom>
+          <a:ln w="19050"/>
+          <a:effectLst/>
+        </p:spPr>
+        <p:style>
+          <a:lnRef idx="1">
+            <a:schemeClr val="accent6"/>
+          </a:lnRef>
+          <a:fillRef idx="2">
+            <a:schemeClr val="accent6"/>
+          </a:fillRef>
+          <a:effectRef idx="1">
+            <a:schemeClr val="accent6"/>
+          </a:effectRef>
+          <a:fontRef idx="minor">
+            <a:schemeClr val="dk1"/>
+          </a:fontRef>
+        </p:style>
+        <p:txBody>
+          <a:bodyPr rtlCol="0" anchor="ctr"/>
+          <a:lstStyle/>
+          <a:p>
+            <a:pPr algn="ctr"/>
+            <a:r>
+              <a:rPr lang="en-US" sz="1050" b="1" dirty="0" err="1">
+                <a:solidFill>
+                  <a:schemeClr val="accent6">
+                    <a:lumMod val="75000"/>
+                  </a:schemeClr>
+                </a:solidFill>
+              </a:rPr>
+              <a:t>XmlAdaptedPrescription</a:t>
+            </a:r>
+            <a:endParaRPr lang="en-SG" sz="1050" b="1" dirty="0">
+              <a:solidFill>
+                <a:schemeClr val="accent6">
+                  <a:lumMod val="75000"/>
+                </a:schemeClr>
+              </a:solidFill>
+            </a:endParaRPr>
+          </a:p>
+        </p:txBody>
+      </p:sp>
     </p:spTree>
     <p:extLst>
       <p:ext uri="{BB962C8B-B14F-4D97-AF65-F5344CB8AC3E}">
@@ -4843,13 +5097,6 @@
   <p:clrMapOvr>
     <a:masterClrMapping/>
   </p:clrMapOvr>
-  <p:timing>
-    <p:tnLst>
-      <p:par>
-        <p:cTn id="1" dur="indefinite" restart="never" nodeType="tmRoot"/>
-      </p:par>
-    </p:tnLst>
-  </p:timing>
 </p:sld>
 </file>
 

</xml_diff>

<commit_message>
docs/diagrams/StorageComponentClassDiagram.pptx & docs/images/StorageClassDiagram.png: - Update interface AddressBookStorage to   SchedulerStorage - Update class XmlAdressBookStorage to   XmlSchedulerStorage - Update class XmlSerializableAddressBook to   XmlSerializableScheduler - Update class XmlAdaptedPerson to XmlAdaptedEvent
</commit_message>
<xml_diff>
--- a/docs/diagrams/StorageComponentClassDiagram.pptx
+++ b/docs/diagrams/StorageComponentClassDiagram.pptx
@@ -107,6 +107,22 @@
       </a:defRPr>
     </a:lvl9pPr>
   </p:defaultTextStyle>
+  <p:extLst>
+    <p:ext uri="{EFAFB233-063F-42B5-8137-9DF3F51BA10A}">
+      <p15:sldGuideLst xmlns:p15="http://schemas.microsoft.com/office/powerpoint/2012/main">
+        <p15:guide id="1" orient="horz" pos="1488">
+          <p15:clr>
+            <a:srgbClr val="A4A3A4"/>
+          </p15:clr>
+        </p15:guide>
+        <p15:guide id="2" pos="2880">
+          <p15:clr>
+            <a:srgbClr val="A4A3A4"/>
+          </p15:clr>
+        </p15:guide>
+      </p15:sldGuideLst>
+    </p:ext>
+  </p:extLst>
 </p:presentation>
 </file>
 
@@ -192,7 +208,7 @@
           <a:p>
             <a:fld id="{F5CC4B3F-88C1-4FFA-B1B6-F41C21DC6924}" type="datetimeFigureOut">
               <a:rPr lang="en-US" smtClean="0"/>
-              <a:t>10/16/2016</a:t>
+              <a:t>10/25/2018</a:t>
             </a:fld>
             <a:endParaRPr lang="en-US"/>
           </a:p>
@@ -256,38 +272,37 @@
           <a:p>
             <a:pPr lvl="0"/>
             <a:r>
-              <a:rPr lang="en-US" smtClean="0"/>
+              <a:rPr lang="en-US"/>
               <a:t>Click to edit Master text styles</a:t>
             </a:r>
           </a:p>
           <a:p>
             <a:pPr lvl="1"/>
             <a:r>
-              <a:rPr lang="en-US" smtClean="0"/>
+              <a:rPr lang="en-US"/>
               <a:t>Second level</a:t>
             </a:r>
           </a:p>
           <a:p>
             <a:pPr lvl="2"/>
             <a:r>
-              <a:rPr lang="en-US" smtClean="0"/>
+              <a:rPr lang="en-US"/>
               <a:t>Third level</a:t>
             </a:r>
           </a:p>
           <a:p>
             <a:pPr lvl="3"/>
             <a:r>
-              <a:rPr lang="en-US" smtClean="0"/>
+              <a:rPr lang="en-US"/>
               <a:t>Fourth level</a:t>
             </a:r>
           </a:p>
           <a:p>
             <a:pPr lvl="4"/>
             <a:r>
-              <a:rPr lang="en-US" smtClean="0"/>
+              <a:rPr lang="en-US"/>
               <a:t>Fifth level</a:t>
             </a:r>
-            <a:endParaRPr lang="en-US"/>
           </a:p>
         </p:txBody>
       </p:sp>
@@ -498,10 +513,9 @@
           <a:lstStyle/>
           <a:p>
             <a:r>
-              <a:rPr lang="en-US" smtClean="0"/>
+              <a:rPr lang="en-US"/>
               <a:t>Click to edit Master title style</a:t>
             </a:r>
-            <a:endParaRPr lang="en-US"/>
           </a:p>
         </p:txBody>
       </p:sp>
@@ -617,10 +631,9 @@
           </a:lstStyle>
           <a:p>
             <a:r>
-              <a:rPr lang="en-US" smtClean="0"/>
+              <a:rPr lang="en-US"/>
               <a:t>Click to edit Master subtitle style</a:t>
             </a:r>
-            <a:endParaRPr lang="en-US"/>
           </a:p>
         </p:txBody>
       </p:sp>
@@ -641,7 +654,7 @@
           <a:p>
             <a:fld id="{78C97017-6FC3-485B-9764-EAC9E56C1D49}" type="datetimeFigureOut">
               <a:rPr lang="en-US" smtClean="0"/>
-              <a:t>10/16/2016</a:t>
+              <a:t>10/25/2018</a:t>
             </a:fld>
             <a:endParaRPr lang="en-US"/>
           </a:p>
@@ -735,10 +748,9 @@
           <a:lstStyle/>
           <a:p>
             <a:r>
-              <a:rPr lang="en-US" smtClean="0"/>
+              <a:rPr lang="en-US"/>
               <a:t>Click to edit Master title style</a:t>
             </a:r>
-            <a:endParaRPr lang="en-US"/>
           </a:p>
         </p:txBody>
       </p:sp>
@@ -759,38 +771,37 @@
           <a:p>
             <a:pPr lvl="0"/>
             <a:r>
-              <a:rPr lang="en-US" smtClean="0"/>
+              <a:rPr lang="en-US"/>
               <a:t>Click to edit Master text styles</a:t>
             </a:r>
           </a:p>
           <a:p>
             <a:pPr lvl="1"/>
             <a:r>
-              <a:rPr lang="en-US" smtClean="0"/>
+              <a:rPr lang="en-US"/>
               <a:t>Second level</a:t>
             </a:r>
           </a:p>
           <a:p>
             <a:pPr lvl="2"/>
             <a:r>
-              <a:rPr lang="en-US" smtClean="0"/>
+              <a:rPr lang="en-US"/>
               <a:t>Third level</a:t>
             </a:r>
           </a:p>
           <a:p>
             <a:pPr lvl="3"/>
             <a:r>
-              <a:rPr lang="en-US" smtClean="0"/>
+              <a:rPr lang="en-US"/>
               <a:t>Fourth level</a:t>
             </a:r>
           </a:p>
           <a:p>
             <a:pPr lvl="4"/>
             <a:r>
-              <a:rPr lang="en-US" smtClean="0"/>
+              <a:rPr lang="en-US"/>
               <a:t>Fifth level</a:t>
             </a:r>
-            <a:endParaRPr lang="en-US"/>
           </a:p>
         </p:txBody>
       </p:sp>
@@ -811,7 +822,7 @@
           <a:p>
             <a:fld id="{78C97017-6FC3-485B-9764-EAC9E56C1D49}" type="datetimeFigureOut">
               <a:rPr lang="en-US" smtClean="0"/>
-              <a:t>10/16/2016</a:t>
+              <a:t>10/25/2018</a:t>
             </a:fld>
             <a:endParaRPr lang="en-US"/>
           </a:p>
@@ -910,10 +921,9 @@
           <a:lstStyle/>
           <a:p>
             <a:r>
-              <a:rPr lang="en-US" smtClean="0"/>
+              <a:rPr lang="en-US"/>
               <a:t>Click to edit Master title style</a:t>
             </a:r>
-            <a:endParaRPr lang="en-US"/>
           </a:p>
         </p:txBody>
       </p:sp>
@@ -939,38 +949,37 @@
           <a:p>
             <a:pPr lvl="0"/>
             <a:r>
-              <a:rPr lang="en-US" smtClean="0"/>
+              <a:rPr lang="en-US"/>
               <a:t>Click to edit Master text styles</a:t>
             </a:r>
           </a:p>
           <a:p>
             <a:pPr lvl="1"/>
             <a:r>
-              <a:rPr lang="en-US" smtClean="0"/>
+              <a:rPr lang="en-US"/>
               <a:t>Second level</a:t>
             </a:r>
           </a:p>
           <a:p>
             <a:pPr lvl="2"/>
             <a:r>
-              <a:rPr lang="en-US" smtClean="0"/>
+              <a:rPr lang="en-US"/>
               <a:t>Third level</a:t>
             </a:r>
           </a:p>
           <a:p>
             <a:pPr lvl="3"/>
             <a:r>
-              <a:rPr lang="en-US" smtClean="0"/>
+              <a:rPr lang="en-US"/>
               <a:t>Fourth level</a:t>
             </a:r>
           </a:p>
           <a:p>
             <a:pPr lvl="4"/>
             <a:r>
-              <a:rPr lang="en-US" smtClean="0"/>
+              <a:rPr lang="en-US"/>
               <a:t>Fifth level</a:t>
             </a:r>
-            <a:endParaRPr lang="en-US"/>
           </a:p>
         </p:txBody>
       </p:sp>
@@ -991,7 +1000,7 @@
           <a:p>
             <a:fld id="{78C97017-6FC3-485B-9764-EAC9E56C1D49}" type="datetimeFigureOut">
               <a:rPr lang="en-US" smtClean="0"/>
-              <a:t>10/16/2016</a:t>
+              <a:t>10/25/2018</a:t>
             </a:fld>
             <a:endParaRPr lang="en-US"/>
           </a:p>
@@ -1085,10 +1094,9 @@
           <a:lstStyle/>
           <a:p>
             <a:r>
-              <a:rPr lang="en-US" smtClean="0"/>
+              <a:rPr lang="en-US"/>
               <a:t>Click to edit Master title style</a:t>
             </a:r>
-            <a:endParaRPr lang="en-US"/>
           </a:p>
         </p:txBody>
       </p:sp>
@@ -1109,38 +1117,37 @@
           <a:p>
             <a:pPr lvl="0"/>
             <a:r>
-              <a:rPr lang="en-US" smtClean="0"/>
+              <a:rPr lang="en-US"/>
               <a:t>Click to edit Master text styles</a:t>
             </a:r>
           </a:p>
           <a:p>
             <a:pPr lvl="1"/>
             <a:r>
-              <a:rPr lang="en-US" smtClean="0"/>
+              <a:rPr lang="en-US"/>
               <a:t>Second level</a:t>
             </a:r>
           </a:p>
           <a:p>
             <a:pPr lvl="2"/>
             <a:r>
-              <a:rPr lang="en-US" smtClean="0"/>
+              <a:rPr lang="en-US"/>
               <a:t>Third level</a:t>
             </a:r>
           </a:p>
           <a:p>
             <a:pPr lvl="3"/>
             <a:r>
-              <a:rPr lang="en-US" smtClean="0"/>
+              <a:rPr lang="en-US"/>
               <a:t>Fourth level</a:t>
             </a:r>
           </a:p>
           <a:p>
             <a:pPr lvl="4"/>
             <a:r>
-              <a:rPr lang="en-US" smtClean="0"/>
+              <a:rPr lang="en-US"/>
               <a:t>Fifth level</a:t>
             </a:r>
-            <a:endParaRPr lang="en-US"/>
           </a:p>
         </p:txBody>
       </p:sp>
@@ -1161,7 +1168,7 @@
           <a:p>
             <a:fld id="{78C97017-6FC3-485B-9764-EAC9E56C1D49}" type="datetimeFigureOut">
               <a:rPr lang="en-US" smtClean="0"/>
-              <a:t>10/16/2016</a:t>
+              <a:t>10/25/2018</a:t>
             </a:fld>
             <a:endParaRPr lang="en-US"/>
           </a:p>
@@ -1264,10 +1271,9 @@
           </a:lstStyle>
           <a:p>
             <a:r>
-              <a:rPr lang="en-US" smtClean="0"/>
+              <a:rPr lang="en-US"/>
               <a:t>Click to edit Master title style</a:t>
             </a:r>
-            <a:endParaRPr lang="en-US"/>
           </a:p>
         </p:txBody>
       </p:sp>
@@ -1384,7 +1390,7 @@
           <a:p>
             <a:pPr lvl="0"/>
             <a:r>
-              <a:rPr lang="en-US" smtClean="0"/>
+              <a:rPr lang="en-US"/>
               <a:t>Click to edit Master text styles</a:t>
             </a:r>
           </a:p>
@@ -1407,7 +1413,7 @@
           <a:p>
             <a:fld id="{78C97017-6FC3-485B-9764-EAC9E56C1D49}" type="datetimeFigureOut">
               <a:rPr lang="en-US" smtClean="0"/>
-              <a:t>10/16/2016</a:t>
+              <a:t>10/25/2018</a:t>
             </a:fld>
             <a:endParaRPr lang="en-US"/>
           </a:p>
@@ -1501,10 +1507,9 @@
           <a:lstStyle/>
           <a:p>
             <a:r>
-              <a:rPr lang="en-US" smtClean="0"/>
+              <a:rPr lang="en-US"/>
               <a:t>Click to edit Master title style</a:t>
             </a:r>
-            <a:endParaRPr lang="en-US"/>
           </a:p>
         </p:txBody>
       </p:sp>
@@ -1558,38 +1563,37 @@
           <a:p>
             <a:pPr lvl="0"/>
             <a:r>
-              <a:rPr lang="en-US" smtClean="0"/>
+              <a:rPr lang="en-US"/>
               <a:t>Click to edit Master text styles</a:t>
             </a:r>
           </a:p>
           <a:p>
             <a:pPr lvl="1"/>
             <a:r>
-              <a:rPr lang="en-US" smtClean="0"/>
+              <a:rPr lang="en-US"/>
               <a:t>Second level</a:t>
             </a:r>
           </a:p>
           <a:p>
             <a:pPr lvl="2"/>
             <a:r>
-              <a:rPr lang="en-US" smtClean="0"/>
+              <a:rPr lang="en-US"/>
               <a:t>Third level</a:t>
             </a:r>
           </a:p>
           <a:p>
             <a:pPr lvl="3"/>
             <a:r>
-              <a:rPr lang="en-US" smtClean="0"/>
+              <a:rPr lang="en-US"/>
               <a:t>Fourth level</a:t>
             </a:r>
           </a:p>
           <a:p>
             <a:pPr lvl="4"/>
             <a:r>
-              <a:rPr lang="en-US" smtClean="0"/>
+              <a:rPr lang="en-US"/>
               <a:t>Fifth level</a:t>
             </a:r>
-            <a:endParaRPr lang="en-US"/>
           </a:p>
         </p:txBody>
       </p:sp>
@@ -1643,38 +1647,37 @@
           <a:p>
             <a:pPr lvl="0"/>
             <a:r>
-              <a:rPr lang="en-US" smtClean="0"/>
+              <a:rPr lang="en-US"/>
               <a:t>Click to edit Master text styles</a:t>
             </a:r>
           </a:p>
           <a:p>
             <a:pPr lvl="1"/>
             <a:r>
-              <a:rPr lang="en-US" smtClean="0"/>
+              <a:rPr lang="en-US"/>
               <a:t>Second level</a:t>
             </a:r>
           </a:p>
           <a:p>
             <a:pPr lvl="2"/>
             <a:r>
-              <a:rPr lang="en-US" smtClean="0"/>
+              <a:rPr lang="en-US"/>
               <a:t>Third level</a:t>
             </a:r>
           </a:p>
           <a:p>
             <a:pPr lvl="3"/>
             <a:r>
-              <a:rPr lang="en-US" smtClean="0"/>
+              <a:rPr lang="en-US"/>
               <a:t>Fourth level</a:t>
             </a:r>
           </a:p>
           <a:p>
             <a:pPr lvl="4"/>
             <a:r>
-              <a:rPr lang="en-US" smtClean="0"/>
+              <a:rPr lang="en-US"/>
               <a:t>Fifth level</a:t>
             </a:r>
-            <a:endParaRPr lang="en-US"/>
           </a:p>
         </p:txBody>
       </p:sp>
@@ -1695,7 +1698,7 @@
           <a:p>
             <a:fld id="{78C97017-6FC3-485B-9764-EAC9E56C1D49}" type="datetimeFigureOut">
               <a:rPr lang="en-US" smtClean="0"/>
-              <a:t>10/16/2016</a:t>
+              <a:t>10/25/2018</a:t>
             </a:fld>
             <a:endParaRPr lang="en-US"/>
           </a:p>
@@ -1793,10 +1796,9 @@
           </a:lstStyle>
           <a:p>
             <a:r>
-              <a:rPr lang="en-US" smtClean="0"/>
+              <a:rPr lang="en-US"/>
               <a:t>Click to edit Master title style</a:t>
             </a:r>
-            <a:endParaRPr lang="en-US"/>
           </a:p>
         </p:txBody>
       </p:sp>
@@ -1859,7 +1861,7 @@
           <a:p>
             <a:pPr lvl="0"/>
             <a:r>
-              <a:rPr lang="en-US" smtClean="0"/>
+              <a:rPr lang="en-US"/>
               <a:t>Click to edit Master text styles</a:t>
             </a:r>
           </a:p>
@@ -1915,38 +1917,37 @@
           <a:p>
             <a:pPr lvl="0"/>
             <a:r>
-              <a:rPr lang="en-US" smtClean="0"/>
+              <a:rPr lang="en-US"/>
               <a:t>Click to edit Master text styles</a:t>
             </a:r>
           </a:p>
           <a:p>
             <a:pPr lvl="1"/>
             <a:r>
-              <a:rPr lang="en-US" smtClean="0"/>
+              <a:rPr lang="en-US"/>
               <a:t>Second level</a:t>
             </a:r>
           </a:p>
           <a:p>
             <a:pPr lvl="2"/>
             <a:r>
-              <a:rPr lang="en-US" smtClean="0"/>
+              <a:rPr lang="en-US"/>
               <a:t>Third level</a:t>
             </a:r>
           </a:p>
           <a:p>
             <a:pPr lvl="3"/>
             <a:r>
-              <a:rPr lang="en-US" smtClean="0"/>
+              <a:rPr lang="en-US"/>
               <a:t>Fourth level</a:t>
             </a:r>
           </a:p>
           <a:p>
             <a:pPr lvl="4"/>
             <a:r>
-              <a:rPr lang="en-US" smtClean="0"/>
+              <a:rPr lang="en-US"/>
               <a:t>Fifth level</a:t>
             </a:r>
-            <a:endParaRPr lang="en-US"/>
           </a:p>
         </p:txBody>
       </p:sp>
@@ -2009,7 +2010,7 @@
           <a:p>
             <a:pPr lvl="0"/>
             <a:r>
-              <a:rPr lang="en-US" smtClean="0"/>
+              <a:rPr lang="en-US"/>
               <a:t>Click to edit Master text styles</a:t>
             </a:r>
           </a:p>
@@ -2065,38 +2066,37 @@
           <a:p>
             <a:pPr lvl="0"/>
             <a:r>
-              <a:rPr lang="en-US" smtClean="0"/>
+              <a:rPr lang="en-US"/>
               <a:t>Click to edit Master text styles</a:t>
             </a:r>
           </a:p>
           <a:p>
             <a:pPr lvl="1"/>
             <a:r>
-              <a:rPr lang="en-US" smtClean="0"/>
+              <a:rPr lang="en-US"/>
               <a:t>Second level</a:t>
             </a:r>
           </a:p>
           <a:p>
             <a:pPr lvl="2"/>
             <a:r>
-              <a:rPr lang="en-US" smtClean="0"/>
+              <a:rPr lang="en-US"/>
               <a:t>Third level</a:t>
             </a:r>
           </a:p>
           <a:p>
             <a:pPr lvl="3"/>
             <a:r>
-              <a:rPr lang="en-US" smtClean="0"/>
+              <a:rPr lang="en-US"/>
               <a:t>Fourth level</a:t>
             </a:r>
           </a:p>
           <a:p>
             <a:pPr lvl="4"/>
             <a:r>
-              <a:rPr lang="en-US" smtClean="0"/>
+              <a:rPr lang="en-US"/>
               <a:t>Fifth level</a:t>
             </a:r>
-            <a:endParaRPr lang="en-US"/>
           </a:p>
         </p:txBody>
       </p:sp>
@@ -2117,7 +2117,7 @@
           <a:p>
             <a:fld id="{78C97017-6FC3-485B-9764-EAC9E56C1D49}" type="datetimeFigureOut">
               <a:rPr lang="en-US" smtClean="0"/>
-              <a:t>10/16/2016</a:t>
+              <a:t>10/25/2018</a:t>
             </a:fld>
             <a:endParaRPr lang="en-US"/>
           </a:p>
@@ -2211,10 +2211,9 @@
           <a:lstStyle/>
           <a:p>
             <a:r>
-              <a:rPr lang="en-US" smtClean="0"/>
+              <a:rPr lang="en-US"/>
               <a:t>Click to edit Master title style</a:t>
             </a:r>
-            <a:endParaRPr lang="en-US"/>
           </a:p>
         </p:txBody>
       </p:sp>
@@ -2235,7 +2234,7 @@
           <a:p>
             <a:fld id="{78C97017-6FC3-485B-9764-EAC9E56C1D49}" type="datetimeFigureOut">
               <a:rPr lang="en-US" smtClean="0"/>
-              <a:t>10/16/2016</a:t>
+              <a:t>10/25/2018</a:t>
             </a:fld>
             <a:endParaRPr lang="en-US"/>
           </a:p>
@@ -2330,7 +2329,7 @@
           <a:p>
             <a:fld id="{78C97017-6FC3-485B-9764-EAC9E56C1D49}" type="datetimeFigureOut">
               <a:rPr lang="en-US" smtClean="0"/>
-              <a:t>10/16/2016</a:t>
+              <a:t>10/25/2018</a:t>
             </a:fld>
             <a:endParaRPr lang="en-US"/>
           </a:p>
@@ -2433,10 +2432,9 @@
           </a:lstStyle>
           <a:p>
             <a:r>
-              <a:rPr lang="en-US" smtClean="0"/>
+              <a:rPr lang="en-US"/>
               <a:t>Click to edit Master title style</a:t>
             </a:r>
-            <a:endParaRPr lang="en-US"/>
           </a:p>
         </p:txBody>
       </p:sp>
@@ -2490,38 +2488,37 @@
           <a:p>
             <a:pPr lvl="0"/>
             <a:r>
-              <a:rPr lang="en-US" smtClean="0"/>
+              <a:rPr lang="en-US"/>
               <a:t>Click to edit Master text styles</a:t>
             </a:r>
           </a:p>
           <a:p>
             <a:pPr lvl="1"/>
             <a:r>
-              <a:rPr lang="en-US" smtClean="0"/>
+              <a:rPr lang="en-US"/>
               <a:t>Second level</a:t>
             </a:r>
           </a:p>
           <a:p>
             <a:pPr lvl="2"/>
             <a:r>
-              <a:rPr lang="en-US" smtClean="0"/>
+              <a:rPr lang="en-US"/>
               <a:t>Third level</a:t>
             </a:r>
           </a:p>
           <a:p>
             <a:pPr lvl="3"/>
             <a:r>
-              <a:rPr lang="en-US" smtClean="0"/>
+              <a:rPr lang="en-US"/>
               <a:t>Fourth level</a:t>
             </a:r>
           </a:p>
           <a:p>
             <a:pPr lvl="4"/>
             <a:r>
-              <a:rPr lang="en-US" smtClean="0"/>
+              <a:rPr lang="en-US"/>
               <a:t>Fifth level</a:t>
             </a:r>
-            <a:endParaRPr lang="en-US"/>
           </a:p>
         </p:txBody>
       </p:sp>
@@ -2584,7 +2581,7 @@
           <a:p>
             <a:pPr lvl="0"/>
             <a:r>
-              <a:rPr lang="en-US" smtClean="0"/>
+              <a:rPr lang="en-US"/>
               <a:t>Click to edit Master text styles</a:t>
             </a:r>
           </a:p>
@@ -2607,7 +2604,7 @@
           <a:p>
             <a:fld id="{78C97017-6FC3-485B-9764-EAC9E56C1D49}" type="datetimeFigureOut">
               <a:rPr lang="en-US" smtClean="0"/>
-              <a:t>10/16/2016</a:t>
+              <a:t>10/25/2018</a:t>
             </a:fld>
             <a:endParaRPr lang="en-US"/>
           </a:p>
@@ -2710,10 +2707,9 @@
           </a:lstStyle>
           <a:p>
             <a:r>
-              <a:rPr lang="en-US" smtClean="0"/>
+              <a:rPr lang="en-US"/>
               <a:t>Click to edit Master title style</a:t>
             </a:r>
-            <a:endParaRPr lang="en-US"/>
           </a:p>
         </p:txBody>
       </p:sp>
@@ -2837,7 +2833,7 @@
           <a:p>
             <a:pPr lvl="0"/>
             <a:r>
-              <a:rPr lang="en-US" smtClean="0"/>
+              <a:rPr lang="en-US"/>
               <a:t>Click to edit Master text styles</a:t>
             </a:r>
           </a:p>
@@ -2860,7 +2856,7 @@
           <a:p>
             <a:fld id="{78C97017-6FC3-485B-9764-EAC9E56C1D49}" type="datetimeFigureOut">
               <a:rPr lang="en-US" smtClean="0"/>
-              <a:t>10/16/2016</a:t>
+              <a:t>10/25/2018</a:t>
             </a:fld>
             <a:endParaRPr lang="en-US"/>
           </a:p>
@@ -2969,10 +2965,9 @@
           <a:lstStyle/>
           <a:p>
             <a:r>
-              <a:rPr lang="en-US" smtClean="0"/>
+              <a:rPr lang="en-US"/>
               <a:t>Click to edit Master title style</a:t>
             </a:r>
-            <a:endParaRPr lang="en-US"/>
           </a:p>
         </p:txBody>
       </p:sp>
@@ -3003,38 +2998,37 @@
           <a:p>
             <a:pPr lvl="0"/>
             <a:r>
-              <a:rPr lang="en-US" smtClean="0"/>
+              <a:rPr lang="en-US"/>
               <a:t>Click to edit Master text styles</a:t>
             </a:r>
           </a:p>
           <a:p>
             <a:pPr lvl="1"/>
             <a:r>
-              <a:rPr lang="en-US" smtClean="0"/>
+              <a:rPr lang="en-US"/>
               <a:t>Second level</a:t>
             </a:r>
           </a:p>
           <a:p>
             <a:pPr lvl="2"/>
             <a:r>
-              <a:rPr lang="en-US" smtClean="0"/>
+              <a:rPr lang="en-US"/>
               <a:t>Third level</a:t>
             </a:r>
           </a:p>
           <a:p>
             <a:pPr lvl="3"/>
             <a:r>
-              <a:rPr lang="en-US" smtClean="0"/>
+              <a:rPr lang="en-US"/>
               <a:t>Fourth level</a:t>
             </a:r>
           </a:p>
           <a:p>
             <a:pPr lvl="4"/>
             <a:r>
-              <a:rPr lang="en-US" smtClean="0"/>
+              <a:rPr lang="en-US"/>
               <a:t>Fifth level</a:t>
             </a:r>
-            <a:endParaRPr lang="en-US"/>
           </a:p>
         </p:txBody>
       </p:sp>
@@ -3073,7 +3067,7 @@
           <a:p>
             <a:fld id="{78C97017-6FC3-485B-9764-EAC9E56C1D49}" type="datetimeFigureOut">
               <a:rPr lang="en-US" smtClean="0"/>
-              <a:t>10/16/2016</a:t>
+              <a:t>10/25/2018</a:t>
             </a:fld>
             <a:endParaRPr lang="en-US"/>
           </a:p>
@@ -3494,7 +3488,7 @@
           <a:lstStyle/>
           <a:p>
             <a:r>
-              <a:rPr lang="en-US" sz="1200" b="1" dirty="0" smtClean="0">
+              <a:rPr lang="en-US" sz="1200" b="1" dirty="0">
                 <a:solidFill>
                   <a:schemeClr val="accent6">
                     <a:lumMod val="75000"/>
@@ -3561,7 +3555,7 @@
           <a:p>
             <a:pPr algn="ctr"/>
             <a:r>
-              <a:rPr lang="en-US" sz="1050" dirty="0" smtClean="0">
+              <a:rPr lang="en-US" sz="1050" dirty="0">
                 <a:solidFill>
                   <a:schemeClr val="bg1"/>
                 </a:solidFill>
@@ -3569,19 +3563,19 @@
               <a:t>&lt;&lt;interface&gt;&gt;</a:t>
             </a:r>
             <a:br>
-              <a:rPr lang="en-US" sz="1050" dirty="0" smtClean="0">
+              <a:rPr lang="en-US" sz="1050" dirty="0">
                 <a:solidFill>
                   <a:schemeClr val="bg1"/>
                 </a:solidFill>
               </a:rPr>
             </a:br>
             <a:r>
-              <a:rPr lang="en-US" sz="1050" dirty="0" err="1" smtClean="0">
+              <a:rPr lang="en-US" sz="1050" dirty="0" err="1">
                 <a:solidFill>
                   <a:schemeClr val="bg1"/>
                 </a:solidFill>
               </a:rPr>
-              <a:t>AddressBookStorage</a:t>
+              <a:t>SchedulerStorage</a:t>
             </a:r>
             <a:endParaRPr lang="en-SG" sz="1050" dirty="0">
               <a:solidFill>
@@ -3639,7 +3633,7 @@
           <a:p>
             <a:pPr algn="ctr"/>
             <a:r>
-              <a:rPr lang="en-US" sz="1050" dirty="0" err="1" smtClean="0">
+              <a:rPr lang="en-US" sz="1050" dirty="0" err="1">
                 <a:solidFill>
                   <a:schemeClr val="bg1"/>
                 </a:solidFill>
@@ -3713,7 +3707,7 @@
           <a:p>
             <a:pPr algn="ctr"/>
             <a:r>
-              <a:rPr lang="en-US" sz="1050" dirty="0" smtClean="0">
+              <a:rPr lang="en-US" sz="1050" dirty="0">
                 <a:solidFill>
                   <a:schemeClr val="bg1"/>
                 </a:solidFill>
@@ -4147,27 +4141,17 @@
           <a:p>
             <a:pPr algn="ctr"/>
             <a:r>
-              <a:rPr lang="en-US" sz="1050" b="1" dirty="0" err="1" smtClean="0">
+              <a:rPr lang="en-US" sz="1050" b="1" dirty="0" err="1">
                 <a:solidFill>
                   <a:schemeClr val="accent6">
                     <a:lumMod val="75000"/>
                   </a:schemeClr>
                 </a:solidFill>
               </a:rPr>
-              <a:t>XmlAddressBook</a:t>
-            </a:r>
-            <a:r>
-              <a:rPr lang="en-US" sz="1050" b="1" dirty="0" smtClean="0">
-                <a:solidFill>
-                  <a:schemeClr val="accent6">
-                    <a:lumMod val="75000"/>
-                  </a:schemeClr>
-                </a:solidFill>
-              </a:rPr>
-              <a:t/>
+              <a:t>XmlScheduler</a:t>
             </a:r>
             <a:br>
-              <a:rPr lang="en-US" sz="1050" b="1" dirty="0" smtClean="0">
+              <a:rPr lang="en-US" sz="1050" b="1" dirty="0">
                 <a:solidFill>
                   <a:schemeClr val="accent6">
                     <a:lumMod val="75000"/>
@@ -4176,7 +4160,7 @@
               </a:rPr>
             </a:br>
             <a:r>
-              <a:rPr lang="en-US" sz="1050" b="1" dirty="0" smtClean="0">
+              <a:rPr lang="en-US" sz="1050" b="1" dirty="0">
                 <a:solidFill>
                   <a:schemeClr val="accent6">
                     <a:lumMod val="75000"/>
@@ -4243,7 +4227,7 @@
           <a:p>
             <a:pPr algn="ctr"/>
             <a:r>
-              <a:rPr lang="en-US" sz="1050" dirty="0" smtClean="0">
+              <a:rPr lang="en-US" sz="1050" dirty="0">
                 <a:solidFill>
                   <a:schemeClr val="bg1"/>
                 </a:solidFill>
@@ -4251,14 +4235,14 @@
               <a:t>&lt;&lt;interface&gt;&gt;</a:t>
             </a:r>
             <a:br>
-              <a:rPr lang="en-US" sz="1050" dirty="0" smtClean="0">
+              <a:rPr lang="en-US" sz="1050" dirty="0">
                 <a:solidFill>
                   <a:schemeClr val="bg1"/>
                 </a:solidFill>
               </a:rPr>
             </a:br>
             <a:r>
-              <a:rPr lang="en-US" sz="1050" dirty="0" err="1" smtClean="0">
+              <a:rPr lang="en-US" sz="1050" dirty="0" err="1">
                 <a:solidFill>
                   <a:schemeClr val="bg1"/>
                 </a:solidFill>
@@ -4516,30 +4500,22 @@
           <a:p>
             <a:pPr algn="ctr"/>
             <a:r>
-              <a:rPr lang="en-US" sz="1050" dirty="0" err="1" smtClean="0">
+              <a:rPr lang="en-US" sz="1050" dirty="0" err="1">
                 <a:solidFill>
                   <a:schemeClr val="bg1"/>
                 </a:solidFill>
               </a:rPr>
               <a:t>JsonUserPrefs</a:t>
             </a:r>
-            <a:r>
-              <a:rPr lang="en-US" sz="1050" dirty="0" smtClean="0">
-                <a:solidFill>
-                  <a:schemeClr val="bg1"/>
-                </a:solidFill>
-              </a:rPr>
-              <a:t/>
-            </a:r>
             <a:br>
-              <a:rPr lang="en-US" sz="1050" dirty="0" smtClean="0">
+              <a:rPr lang="en-US" sz="1050" dirty="0">
                 <a:solidFill>
                   <a:schemeClr val="bg1"/>
                 </a:solidFill>
               </a:rPr>
             </a:br>
             <a:r>
-              <a:rPr lang="en-US" sz="1050" dirty="0" smtClean="0">
+              <a:rPr lang="en-US" sz="1050" dirty="0">
                 <a:solidFill>
                   <a:schemeClr val="bg1"/>
                 </a:solidFill>
@@ -4591,7 +4567,7 @@
           <a:p>
             <a:pPr algn="ctr"/>
             <a:r>
-              <a:rPr lang="en-US" sz="1050" b="1" dirty="0" err="1" smtClean="0">
+              <a:rPr lang="en-US" sz="1050" b="1" dirty="0" err="1">
                 <a:solidFill>
                   <a:schemeClr val="accent6">
                     <a:lumMod val="75000"/>
@@ -4600,18 +4576,8 @@
               </a:rPr>
               <a:t>XmlSerializable</a:t>
             </a:r>
-            <a:r>
-              <a:rPr lang="en-US" sz="1050" b="1" dirty="0" smtClean="0">
-                <a:solidFill>
-                  <a:schemeClr val="accent6">
-                    <a:lumMod val="75000"/>
-                  </a:schemeClr>
-                </a:solidFill>
-              </a:rPr>
-              <a:t/>
-            </a:r>
             <a:br>
-              <a:rPr lang="en-US" sz="1050" b="1" dirty="0" smtClean="0">
+              <a:rPr lang="en-US" sz="1050" b="1" dirty="0">
                 <a:solidFill>
                   <a:schemeClr val="accent6">
                     <a:lumMod val="75000"/>
@@ -4620,14 +4586,14 @@
               </a:rPr>
             </a:br>
             <a:r>
-              <a:rPr lang="en-US" sz="1050" b="1" dirty="0" err="1" smtClean="0">
+              <a:rPr lang="en-US" sz="1050" b="1" dirty="0">
                 <a:solidFill>
                   <a:schemeClr val="accent6">
                     <a:lumMod val="75000"/>
                   </a:schemeClr>
                 </a:solidFill>
               </a:rPr>
-              <a:t>AddressBook</a:t>
+              <a:t>Scheduler</a:t>
             </a:r>
             <a:endParaRPr lang="en-SG" sz="1050" b="1" dirty="0">
               <a:solidFill>
@@ -4717,7 +4683,7 @@
           <a:p>
             <a:pPr algn="ctr"/>
             <a:r>
-              <a:rPr lang="en-US" sz="1050" b="1" dirty="0" err="1" smtClean="0">
+              <a:rPr lang="en-US" sz="1050" b="1" dirty="0" err="1">
                 <a:solidFill>
                   <a:schemeClr val="accent6">
                     <a:lumMod val="75000"/>
@@ -4773,14 +4739,14 @@
           <a:p>
             <a:pPr algn="ctr"/>
             <a:r>
-              <a:rPr lang="en-US" sz="1050" b="1" dirty="0" err="1" smtClean="0">
+              <a:rPr lang="en-US" sz="1050" b="1" dirty="0" err="1">
                 <a:solidFill>
                   <a:schemeClr val="accent6">
                     <a:lumMod val="75000"/>
                   </a:schemeClr>
                 </a:solidFill>
               </a:rPr>
-              <a:t>XmlAdaptedPerson</a:t>
+              <a:t>XmlAdaptedEvent</a:t>
             </a:r>
             <a:endParaRPr lang="en-SG" sz="1050" b="1" dirty="0">
               <a:solidFill>
@@ -4843,13 +4809,6 @@
   <p:clrMapOvr>
     <a:masterClrMapping/>
   </p:clrMapOvr>
-  <p:timing>
-    <p:tnLst>
-      <p:par>
-        <p:cTn id="1" dur="indefinite" restart="never" nodeType="tmRoot"/>
-      </p:par>
-    </p:tnLst>
-  </p:timing>
 </p:sld>
 </file>
 

</xml_diff>

<commit_message>
Update Tasks Find and Storage sections of Dev Guide (#169)
* Update tasks list find diagrams

* Update dev guide for tasks list find

* Update Storage component of DG

* Update user guide with additional tasks find instructions

* Fix tasks assigned text in UG

* Add lifelines to command result

* Minor changes to UG

* Add instance names to AppParser and LogicManager
</commit_message>
<xml_diff>
--- a/docs/diagrams/StorageComponentClassDiagram.pptx
+++ b/docs/diagrams/StorageComponentClassDiagram.pptx
@@ -107,6 +107,22 @@
       </a:defRPr>
     </a:lvl9pPr>
   </p:defaultTextStyle>
+  <p:extLst>
+    <p:ext uri="{EFAFB233-063F-42B5-8137-9DF3F51BA10A}">
+      <p15:sldGuideLst xmlns:p15="http://schemas.microsoft.com/office/powerpoint/2012/main">
+        <p15:guide id="1" orient="horz" pos="1488">
+          <p15:clr>
+            <a:srgbClr val="A4A3A4"/>
+          </p15:clr>
+        </p15:guide>
+        <p15:guide id="2" pos="2880">
+          <p15:clr>
+            <a:srgbClr val="A4A3A4"/>
+          </p15:clr>
+        </p15:guide>
+      </p15:sldGuideLst>
+    </p:ext>
+  </p:extLst>
 </p:presentation>
 </file>
 
@@ -192,7 +208,7 @@
           <a:p>
             <a:fld id="{F5CC4B3F-88C1-4FFA-B1B6-F41C21DC6924}" type="datetimeFigureOut">
               <a:rPr lang="en-US" smtClean="0"/>
-              <a:t>10/16/2016</a:t>
+              <a:t>11/11/2018</a:t>
             </a:fld>
             <a:endParaRPr lang="en-US"/>
           </a:p>
@@ -256,38 +272,37 @@
           <a:p>
             <a:pPr lvl="0"/>
             <a:r>
-              <a:rPr lang="en-US" smtClean="0"/>
+              <a:rPr lang="en-US"/>
               <a:t>Click to edit Master text styles</a:t>
             </a:r>
           </a:p>
           <a:p>
             <a:pPr lvl="1"/>
             <a:r>
-              <a:rPr lang="en-US" smtClean="0"/>
+              <a:rPr lang="en-US"/>
               <a:t>Second level</a:t>
             </a:r>
           </a:p>
           <a:p>
             <a:pPr lvl="2"/>
             <a:r>
-              <a:rPr lang="en-US" smtClean="0"/>
+              <a:rPr lang="en-US"/>
               <a:t>Third level</a:t>
             </a:r>
           </a:p>
           <a:p>
             <a:pPr lvl="3"/>
             <a:r>
-              <a:rPr lang="en-US" smtClean="0"/>
+              <a:rPr lang="en-US"/>
               <a:t>Fourth level</a:t>
             </a:r>
           </a:p>
           <a:p>
             <a:pPr lvl="4"/>
             <a:r>
-              <a:rPr lang="en-US" smtClean="0"/>
+              <a:rPr lang="en-US"/>
               <a:t>Fifth level</a:t>
             </a:r>
-            <a:endParaRPr lang="en-US"/>
           </a:p>
         </p:txBody>
       </p:sp>
@@ -460,6 +475,90 @@
 </p:notesMaster>
 </file>
 
+<file path=ppt/notesSlides/notesSlide1.xml><?xml version="1.0" encoding="utf-8"?>
+<p:notes xmlns:a="http://schemas.openxmlformats.org/drawingml/2006/main" xmlns:r="http://schemas.openxmlformats.org/officeDocument/2006/relationships" xmlns:p="http://schemas.openxmlformats.org/presentationml/2006/main">
+  <p:cSld>
+    <p:spTree>
+      <p:nvGrpSpPr>
+        <p:cNvPr id="1" name=""/>
+        <p:cNvGrpSpPr/>
+        <p:nvPr/>
+      </p:nvGrpSpPr>
+      <p:grpSpPr>
+        <a:xfrm>
+          <a:off x="0" y="0"/>
+          <a:ext cx="0" cy="0"/>
+          <a:chOff x="0" y="0"/>
+          <a:chExt cx="0" cy="0"/>
+        </a:xfrm>
+      </p:grpSpPr>
+      <p:sp>
+        <p:nvSpPr>
+          <p:cNvPr id="2" name="Slide Image Placeholder 1"/>
+          <p:cNvSpPr>
+            <a:spLocks noGrp="1" noRot="1" noChangeAspect="1"/>
+          </p:cNvSpPr>
+          <p:nvPr>
+            <p:ph type="sldImg"/>
+          </p:nvPr>
+        </p:nvSpPr>
+        <p:spPr/>
+      </p:sp>
+      <p:sp>
+        <p:nvSpPr>
+          <p:cNvPr id="3" name="Notes Placeholder 2"/>
+          <p:cNvSpPr>
+            <a:spLocks noGrp="1"/>
+          </p:cNvSpPr>
+          <p:nvPr>
+            <p:ph type="body" idx="1"/>
+          </p:nvPr>
+        </p:nvSpPr>
+        <p:spPr/>
+        <p:txBody>
+          <a:bodyPr/>
+          <a:lstStyle/>
+          <a:p>
+            <a:endParaRPr lang="en-SG" dirty="0"/>
+          </a:p>
+        </p:txBody>
+      </p:sp>
+      <p:sp>
+        <p:nvSpPr>
+          <p:cNvPr id="4" name="Slide Number Placeholder 3"/>
+          <p:cNvSpPr>
+            <a:spLocks noGrp="1"/>
+          </p:cNvSpPr>
+          <p:nvPr>
+            <p:ph type="sldNum" sz="quarter" idx="5"/>
+          </p:nvPr>
+        </p:nvSpPr>
+        <p:spPr/>
+        <p:txBody>
+          <a:bodyPr/>
+          <a:lstStyle/>
+          <a:p>
+            <a:fld id="{5A7AB025-77E3-4BD1-A2FD-B3183DBA47A3}" type="slidenum">
+              <a:rPr lang="en-US" smtClean="0"/>
+              <a:t>1</a:t>
+            </a:fld>
+            <a:endParaRPr lang="en-US"/>
+          </a:p>
+        </p:txBody>
+      </p:sp>
+    </p:spTree>
+    <p:extLst>
+      <p:ext uri="{BB962C8B-B14F-4D97-AF65-F5344CB8AC3E}">
+        <p14:creationId xmlns:p14="http://schemas.microsoft.com/office/powerpoint/2010/main" val="2825902672"/>
+      </p:ext>
+    </p:extLst>
+  </p:cSld>
+  <p:clrMapOvr>
+    <a:masterClrMapping/>
+  </p:clrMapOvr>
+</p:notes>
+</file>
+
 <file path=ppt/slideLayouts/slideLayout1.xml><?xml version="1.0" encoding="utf-8"?>
 <p:sldLayout xmlns:a="http://schemas.openxmlformats.org/drawingml/2006/main" xmlns:r="http://schemas.openxmlformats.org/officeDocument/2006/relationships" xmlns:p="http://schemas.openxmlformats.org/presentationml/2006/main" type="title" preserve="1">
   <p:cSld name="Title Slide">
@@ -498,10 +597,9 @@
           <a:lstStyle/>
           <a:p>
             <a:r>
-              <a:rPr lang="en-US" smtClean="0"/>
+              <a:rPr lang="en-US"/>
               <a:t>Click to edit Master title style</a:t>
             </a:r>
-            <a:endParaRPr lang="en-US"/>
           </a:p>
         </p:txBody>
       </p:sp>
@@ -617,10 +715,9 @@
           </a:lstStyle>
           <a:p>
             <a:r>
-              <a:rPr lang="en-US" smtClean="0"/>
+              <a:rPr lang="en-US"/>
               <a:t>Click to edit Master subtitle style</a:t>
             </a:r>
-            <a:endParaRPr lang="en-US"/>
           </a:p>
         </p:txBody>
       </p:sp>
@@ -641,7 +738,7 @@
           <a:p>
             <a:fld id="{78C97017-6FC3-485B-9764-EAC9E56C1D49}" type="datetimeFigureOut">
               <a:rPr lang="en-US" smtClean="0"/>
-              <a:t>10/16/2016</a:t>
+              <a:t>11/11/2018</a:t>
             </a:fld>
             <a:endParaRPr lang="en-US"/>
           </a:p>
@@ -735,10 +832,9 @@
           <a:lstStyle/>
           <a:p>
             <a:r>
-              <a:rPr lang="en-US" smtClean="0"/>
+              <a:rPr lang="en-US"/>
               <a:t>Click to edit Master title style</a:t>
             </a:r>
-            <a:endParaRPr lang="en-US"/>
           </a:p>
         </p:txBody>
       </p:sp>
@@ -759,38 +855,37 @@
           <a:p>
             <a:pPr lvl="0"/>
             <a:r>
-              <a:rPr lang="en-US" smtClean="0"/>
+              <a:rPr lang="en-US"/>
               <a:t>Click to edit Master text styles</a:t>
             </a:r>
           </a:p>
           <a:p>
             <a:pPr lvl="1"/>
             <a:r>
-              <a:rPr lang="en-US" smtClean="0"/>
+              <a:rPr lang="en-US"/>
               <a:t>Second level</a:t>
             </a:r>
           </a:p>
           <a:p>
             <a:pPr lvl="2"/>
             <a:r>
-              <a:rPr lang="en-US" smtClean="0"/>
+              <a:rPr lang="en-US"/>
               <a:t>Third level</a:t>
             </a:r>
           </a:p>
           <a:p>
             <a:pPr lvl="3"/>
             <a:r>
-              <a:rPr lang="en-US" smtClean="0"/>
+              <a:rPr lang="en-US"/>
               <a:t>Fourth level</a:t>
             </a:r>
           </a:p>
           <a:p>
             <a:pPr lvl="4"/>
             <a:r>
-              <a:rPr lang="en-US" smtClean="0"/>
+              <a:rPr lang="en-US"/>
               <a:t>Fifth level</a:t>
             </a:r>
-            <a:endParaRPr lang="en-US"/>
           </a:p>
         </p:txBody>
       </p:sp>
@@ -811,7 +906,7 @@
           <a:p>
             <a:fld id="{78C97017-6FC3-485B-9764-EAC9E56C1D49}" type="datetimeFigureOut">
               <a:rPr lang="en-US" smtClean="0"/>
-              <a:t>10/16/2016</a:t>
+              <a:t>11/11/2018</a:t>
             </a:fld>
             <a:endParaRPr lang="en-US"/>
           </a:p>
@@ -910,10 +1005,9 @@
           <a:lstStyle/>
           <a:p>
             <a:r>
-              <a:rPr lang="en-US" smtClean="0"/>
+              <a:rPr lang="en-US"/>
               <a:t>Click to edit Master title style</a:t>
             </a:r>
-            <a:endParaRPr lang="en-US"/>
           </a:p>
         </p:txBody>
       </p:sp>
@@ -939,38 +1033,37 @@
           <a:p>
             <a:pPr lvl="0"/>
             <a:r>
-              <a:rPr lang="en-US" smtClean="0"/>
+              <a:rPr lang="en-US"/>
               <a:t>Click to edit Master text styles</a:t>
             </a:r>
           </a:p>
           <a:p>
             <a:pPr lvl="1"/>
             <a:r>
-              <a:rPr lang="en-US" smtClean="0"/>
+              <a:rPr lang="en-US"/>
               <a:t>Second level</a:t>
             </a:r>
           </a:p>
           <a:p>
             <a:pPr lvl="2"/>
             <a:r>
-              <a:rPr lang="en-US" smtClean="0"/>
+              <a:rPr lang="en-US"/>
               <a:t>Third level</a:t>
             </a:r>
           </a:p>
           <a:p>
             <a:pPr lvl="3"/>
             <a:r>
-              <a:rPr lang="en-US" smtClean="0"/>
+              <a:rPr lang="en-US"/>
               <a:t>Fourth level</a:t>
             </a:r>
           </a:p>
           <a:p>
             <a:pPr lvl="4"/>
             <a:r>
-              <a:rPr lang="en-US" smtClean="0"/>
+              <a:rPr lang="en-US"/>
               <a:t>Fifth level</a:t>
             </a:r>
-            <a:endParaRPr lang="en-US"/>
           </a:p>
         </p:txBody>
       </p:sp>
@@ -991,7 +1084,7 @@
           <a:p>
             <a:fld id="{78C97017-6FC3-485B-9764-EAC9E56C1D49}" type="datetimeFigureOut">
               <a:rPr lang="en-US" smtClean="0"/>
-              <a:t>10/16/2016</a:t>
+              <a:t>11/11/2018</a:t>
             </a:fld>
             <a:endParaRPr lang="en-US"/>
           </a:p>
@@ -1085,10 +1178,9 @@
           <a:lstStyle/>
           <a:p>
             <a:r>
-              <a:rPr lang="en-US" smtClean="0"/>
+              <a:rPr lang="en-US"/>
               <a:t>Click to edit Master title style</a:t>
             </a:r>
-            <a:endParaRPr lang="en-US"/>
           </a:p>
         </p:txBody>
       </p:sp>
@@ -1109,38 +1201,37 @@
           <a:p>
             <a:pPr lvl="0"/>
             <a:r>
-              <a:rPr lang="en-US" smtClean="0"/>
+              <a:rPr lang="en-US"/>
               <a:t>Click to edit Master text styles</a:t>
             </a:r>
           </a:p>
           <a:p>
             <a:pPr lvl="1"/>
             <a:r>
-              <a:rPr lang="en-US" smtClean="0"/>
+              <a:rPr lang="en-US"/>
               <a:t>Second level</a:t>
             </a:r>
           </a:p>
           <a:p>
             <a:pPr lvl="2"/>
             <a:r>
-              <a:rPr lang="en-US" smtClean="0"/>
+              <a:rPr lang="en-US"/>
               <a:t>Third level</a:t>
             </a:r>
           </a:p>
           <a:p>
             <a:pPr lvl="3"/>
             <a:r>
-              <a:rPr lang="en-US" smtClean="0"/>
+              <a:rPr lang="en-US"/>
               <a:t>Fourth level</a:t>
             </a:r>
           </a:p>
           <a:p>
             <a:pPr lvl="4"/>
             <a:r>
-              <a:rPr lang="en-US" smtClean="0"/>
+              <a:rPr lang="en-US"/>
               <a:t>Fifth level</a:t>
             </a:r>
-            <a:endParaRPr lang="en-US"/>
           </a:p>
         </p:txBody>
       </p:sp>
@@ -1161,7 +1252,7 @@
           <a:p>
             <a:fld id="{78C97017-6FC3-485B-9764-EAC9E56C1D49}" type="datetimeFigureOut">
               <a:rPr lang="en-US" smtClean="0"/>
-              <a:t>10/16/2016</a:t>
+              <a:t>11/11/2018</a:t>
             </a:fld>
             <a:endParaRPr lang="en-US"/>
           </a:p>
@@ -1264,10 +1355,9 @@
           </a:lstStyle>
           <a:p>
             <a:r>
-              <a:rPr lang="en-US" smtClean="0"/>
+              <a:rPr lang="en-US"/>
               <a:t>Click to edit Master title style</a:t>
             </a:r>
-            <a:endParaRPr lang="en-US"/>
           </a:p>
         </p:txBody>
       </p:sp>
@@ -1384,7 +1474,7 @@
           <a:p>
             <a:pPr lvl="0"/>
             <a:r>
-              <a:rPr lang="en-US" smtClean="0"/>
+              <a:rPr lang="en-US"/>
               <a:t>Click to edit Master text styles</a:t>
             </a:r>
           </a:p>
@@ -1407,7 +1497,7 @@
           <a:p>
             <a:fld id="{78C97017-6FC3-485B-9764-EAC9E56C1D49}" type="datetimeFigureOut">
               <a:rPr lang="en-US" smtClean="0"/>
-              <a:t>10/16/2016</a:t>
+              <a:t>11/11/2018</a:t>
             </a:fld>
             <a:endParaRPr lang="en-US"/>
           </a:p>
@@ -1501,10 +1591,9 @@
           <a:lstStyle/>
           <a:p>
             <a:r>
-              <a:rPr lang="en-US" smtClean="0"/>
+              <a:rPr lang="en-US"/>
               <a:t>Click to edit Master title style</a:t>
             </a:r>
-            <a:endParaRPr lang="en-US"/>
           </a:p>
         </p:txBody>
       </p:sp>
@@ -1558,38 +1647,37 @@
           <a:p>
             <a:pPr lvl="0"/>
             <a:r>
-              <a:rPr lang="en-US" smtClean="0"/>
+              <a:rPr lang="en-US"/>
               <a:t>Click to edit Master text styles</a:t>
             </a:r>
           </a:p>
           <a:p>
             <a:pPr lvl="1"/>
             <a:r>
-              <a:rPr lang="en-US" smtClean="0"/>
+              <a:rPr lang="en-US"/>
               <a:t>Second level</a:t>
             </a:r>
           </a:p>
           <a:p>
             <a:pPr lvl="2"/>
             <a:r>
-              <a:rPr lang="en-US" smtClean="0"/>
+              <a:rPr lang="en-US"/>
               <a:t>Third level</a:t>
             </a:r>
           </a:p>
           <a:p>
             <a:pPr lvl="3"/>
             <a:r>
-              <a:rPr lang="en-US" smtClean="0"/>
+              <a:rPr lang="en-US"/>
               <a:t>Fourth level</a:t>
             </a:r>
           </a:p>
           <a:p>
             <a:pPr lvl="4"/>
             <a:r>
-              <a:rPr lang="en-US" smtClean="0"/>
+              <a:rPr lang="en-US"/>
               <a:t>Fifth level</a:t>
             </a:r>
-            <a:endParaRPr lang="en-US"/>
           </a:p>
         </p:txBody>
       </p:sp>
@@ -1643,38 +1731,37 @@
           <a:p>
             <a:pPr lvl="0"/>
             <a:r>
-              <a:rPr lang="en-US" smtClean="0"/>
+              <a:rPr lang="en-US"/>
               <a:t>Click to edit Master text styles</a:t>
             </a:r>
           </a:p>
           <a:p>
             <a:pPr lvl="1"/>
             <a:r>
-              <a:rPr lang="en-US" smtClean="0"/>
+              <a:rPr lang="en-US"/>
               <a:t>Second level</a:t>
             </a:r>
           </a:p>
           <a:p>
             <a:pPr lvl="2"/>
             <a:r>
-              <a:rPr lang="en-US" smtClean="0"/>
+              <a:rPr lang="en-US"/>
               <a:t>Third level</a:t>
             </a:r>
           </a:p>
           <a:p>
             <a:pPr lvl="3"/>
             <a:r>
-              <a:rPr lang="en-US" smtClean="0"/>
+              <a:rPr lang="en-US"/>
               <a:t>Fourth level</a:t>
             </a:r>
           </a:p>
           <a:p>
             <a:pPr lvl="4"/>
             <a:r>
-              <a:rPr lang="en-US" smtClean="0"/>
+              <a:rPr lang="en-US"/>
               <a:t>Fifth level</a:t>
             </a:r>
-            <a:endParaRPr lang="en-US"/>
           </a:p>
         </p:txBody>
       </p:sp>
@@ -1695,7 +1782,7 @@
           <a:p>
             <a:fld id="{78C97017-6FC3-485B-9764-EAC9E56C1D49}" type="datetimeFigureOut">
               <a:rPr lang="en-US" smtClean="0"/>
-              <a:t>10/16/2016</a:t>
+              <a:t>11/11/2018</a:t>
             </a:fld>
             <a:endParaRPr lang="en-US"/>
           </a:p>
@@ -1793,10 +1880,9 @@
           </a:lstStyle>
           <a:p>
             <a:r>
-              <a:rPr lang="en-US" smtClean="0"/>
+              <a:rPr lang="en-US"/>
               <a:t>Click to edit Master title style</a:t>
             </a:r>
-            <a:endParaRPr lang="en-US"/>
           </a:p>
         </p:txBody>
       </p:sp>
@@ -1859,7 +1945,7 @@
           <a:p>
             <a:pPr lvl="0"/>
             <a:r>
-              <a:rPr lang="en-US" smtClean="0"/>
+              <a:rPr lang="en-US"/>
               <a:t>Click to edit Master text styles</a:t>
             </a:r>
           </a:p>
@@ -1915,38 +2001,37 @@
           <a:p>
             <a:pPr lvl="0"/>
             <a:r>
-              <a:rPr lang="en-US" smtClean="0"/>
+              <a:rPr lang="en-US"/>
               <a:t>Click to edit Master text styles</a:t>
             </a:r>
           </a:p>
           <a:p>
             <a:pPr lvl="1"/>
             <a:r>
-              <a:rPr lang="en-US" smtClean="0"/>
+              <a:rPr lang="en-US"/>
               <a:t>Second level</a:t>
             </a:r>
           </a:p>
           <a:p>
             <a:pPr lvl="2"/>
             <a:r>
-              <a:rPr lang="en-US" smtClean="0"/>
+              <a:rPr lang="en-US"/>
               <a:t>Third level</a:t>
             </a:r>
           </a:p>
           <a:p>
             <a:pPr lvl="3"/>
             <a:r>
-              <a:rPr lang="en-US" smtClean="0"/>
+              <a:rPr lang="en-US"/>
               <a:t>Fourth level</a:t>
             </a:r>
           </a:p>
           <a:p>
             <a:pPr lvl="4"/>
             <a:r>
-              <a:rPr lang="en-US" smtClean="0"/>
+              <a:rPr lang="en-US"/>
               <a:t>Fifth level</a:t>
             </a:r>
-            <a:endParaRPr lang="en-US"/>
           </a:p>
         </p:txBody>
       </p:sp>
@@ -2009,7 +2094,7 @@
           <a:p>
             <a:pPr lvl="0"/>
             <a:r>
-              <a:rPr lang="en-US" smtClean="0"/>
+              <a:rPr lang="en-US"/>
               <a:t>Click to edit Master text styles</a:t>
             </a:r>
           </a:p>
@@ -2065,38 +2150,37 @@
           <a:p>
             <a:pPr lvl="0"/>
             <a:r>
-              <a:rPr lang="en-US" smtClean="0"/>
+              <a:rPr lang="en-US"/>
               <a:t>Click to edit Master text styles</a:t>
             </a:r>
           </a:p>
           <a:p>
             <a:pPr lvl="1"/>
             <a:r>
-              <a:rPr lang="en-US" smtClean="0"/>
+              <a:rPr lang="en-US"/>
               <a:t>Second level</a:t>
             </a:r>
           </a:p>
           <a:p>
             <a:pPr lvl="2"/>
             <a:r>
-              <a:rPr lang="en-US" smtClean="0"/>
+              <a:rPr lang="en-US"/>
               <a:t>Third level</a:t>
             </a:r>
           </a:p>
           <a:p>
             <a:pPr lvl="3"/>
             <a:r>
-              <a:rPr lang="en-US" smtClean="0"/>
+              <a:rPr lang="en-US"/>
               <a:t>Fourth level</a:t>
             </a:r>
           </a:p>
           <a:p>
             <a:pPr lvl="4"/>
             <a:r>
-              <a:rPr lang="en-US" smtClean="0"/>
+              <a:rPr lang="en-US"/>
               <a:t>Fifth level</a:t>
             </a:r>
-            <a:endParaRPr lang="en-US"/>
           </a:p>
         </p:txBody>
       </p:sp>
@@ -2117,7 +2201,7 @@
           <a:p>
             <a:fld id="{78C97017-6FC3-485B-9764-EAC9E56C1D49}" type="datetimeFigureOut">
               <a:rPr lang="en-US" smtClean="0"/>
-              <a:t>10/16/2016</a:t>
+              <a:t>11/11/2018</a:t>
             </a:fld>
             <a:endParaRPr lang="en-US"/>
           </a:p>
@@ -2211,10 +2295,9 @@
           <a:lstStyle/>
           <a:p>
             <a:r>
-              <a:rPr lang="en-US" smtClean="0"/>
+              <a:rPr lang="en-US"/>
               <a:t>Click to edit Master title style</a:t>
             </a:r>
-            <a:endParaRPr lang="en-US"/>
           </a:p>
         </p:txBody>
       </p:sp>
@@ -2235,7 +2318,7 @@
           <a:p>
             <a:fld id="{78C97017-6FC3-485B-9764-EAC9E56C1D49}" type="datetimeFigureOut">
               <a:rPr lang="en-US" smtClean="0"/>
-              <a:t>10/16/2016</a:t>
+              <a:t>11/11/2018</a:t>
             </a:fld>
             <a:endParaRPr lang="en-US"/>
           </a:p>
@@ -2330,7 +2413,7 @@
           <a:p>
             <a:fld id="{78C97017-6FC3-485B-9764-EAC9E56C1D49}" type="datetimeFigureOut">
               <a:rPr lang="en-US" smtClean="0"/>
-              <a:t>10/16/2016</a:t>
+              <a:t>11/11/2018</a:t>
             </a:fld>
             <a:endParaRPr lang="en-US"/>
           </a:p>
@@ -2433,10 +2516,9 @@
           </a:lstStyle>
           <a:p>
             <a:r>
-              <a:rPr lang="en-US" smtClean="0"/>
+              <a:rPr lang="en-US"/>
               <a:t>Click to edit Master title style</a:t>
             </a:r>
-            <a:endParaRPr lang="en-US"/>
           </a:p>
         </p:txBody>
       </p:sp>
@@ -2490,38 +2572,37 @@
           <a:p>
             <a:pPr lvl="0"/>
             <a:r>
-              <a:rPr lang="en-US" smtClean="0"/>
+              <a:rPr lang="en-US"/>
               <a:t>Click to edit Master text styles</a:t>
             </a:r>
           </a:p>
           <a:p>
             <a:pPr lvl="1"/>
             <a:r>
-              <a:rPr lang="en-US" smtClean="0"/>
+              <a:rPr lang="en-US"/>
               <a:t>Second level</a:t>
             </a:r>
           </a:p>
           <a:p>
             <a:pPr lvl="2"/>
             <a:r>
-              <a:rPr lang="en-US" smtClean="0"/>
+              <a:rPr lang="en-US"/>
               <a:t>Third level</a:t>
             </a:r>
           </a:p>
           <a:p>
             <a:pPr lvl="3"/>
             <a:r>
-              <a:rPr lang="en-US" smtClean="0"/>
+              <a:rPr lang="en-US"/>
               <a:t>Fourth level</a:t>
             </a:r>
           </a:p>
           <a:p>
             <a:pPr lvl="4"/>
             <a:r>
-              <a:rPr lang="en-US" smtClean="0"/>
+              <a:rPr lang="en-US"/>
               <a:t>Fifth level</a:t>
             </a:r>
-            <a:endParaRPr lang="en-US"/>
           </a:p>
         </p:txBody>
       </p:sp>
@@ -2584,7 +2665,7 @@
           <a:p>
             <a:pPr lvl="0"/>
             <a:r>
-              <a:rPr lang="en-US" smtClean="0"/>
+              <a:rPr lang="en-US"/>
               <a:t>Click to edit Master text styles</a:t>
             </a:r>
           </a:p>
@@ -2607,7 +2688,7 @@
           <a:p>
             <a:fld id="{78C97017-6FC3-485B-9764-EAC9E56C1D49}" type="datetimeFigureOut">
               <a:rPr lang="en-US" smtClean="0"/>
-              <a:t>10/16/2016</a:t>
+              <a:t>11/11/2018</a:t>
             </a:fld>
             <a:endParaRPr lang="en-US"/>
           </a:p>
@@ -2710,10 +2791,9 @@
           </a:lstStyle>
           <a:p>
             <a:r>
-              <a:rPr lang="en-US" smtClean="0"/>
+              <a:rPr lang="en-US"/>
               <a:t>Click to edit Master title style</a:t>
             </a:r>
-            <a:endParaRPr lang="en-US"/>
           </a:p>
         </p:txBody>
       </p:sp>
@@ -2837,7 +2917,7 @@
           <a:p>
             <a:pPr lvl="0"/>
             <a:r>
-              <a:rPr lang="en-US" smtClean="0"/>
+              <a:rPr lang="en-US"/>
               <a:t>Click to edit Master text styles</a:t>
             </a:r>
           </a:p>
@@ -2860,7 +2940,7 @@
           <a:p>
             <a:fld id="{78C97017-6FC3-485B-9764-EAC9E56C1D49}" type="datetimeFigureOut">
               <a:rPr lang="en-US" smtClean="0"/>
-              <a:t>10/16/2016</a:t>
+              <a:t>11/11/2018</a:t>
             </a:fld>
             <a:endParaRPr lang="en-US"/>
           </a:p>
@@ -2969,10 +3049,9 @@
           <a:lstStyle/>
           <a:p>
             <a:r>
-              <a:rPr lang="en-US" smtClean="0"/>
+              <a:rPr lang="en-US"/>
               <a:t>Click to edit Master title style</a:t>
             </a:r>
-            <a:endParaRPr lang="en-US"/>
           </a:p>
         </p:txBody>
       </p:sp>
@@ -3003,38 +3082,37 @@
           <a:p>
             <a:pPr lvl="0"/>
             <a:r>
-              <a:rPr lang="en-US" smtClean="0"/>
+              <a:rPr lang="en-US"/>
               <a:t>Click to edit Master text styles</a:t>
             </a:r>
           </a:p>
           <a:p>
             <a:pPr lvl="1"/>
             <a:r>
-              <a:rPr lang="en-US" smtClean="0"/>
+              <a:rPr lang="en-US"/>
               <a:t>Second level</a:t>
             </a:r>
           </a:p>
           <a:p>
             <a:pPr lvl="2"/>
             <a:r>
-              <a:rPr lang="en-US" smtClean="0"/>
+              <a:rPr lang="en-US"/>
               <a:t>Third level</a:t>
             </a:r>
           </a:p>
           <a:p>
             <a:pPr lvl="3"/>
             <a:r>
-              <a:rPr lang="en-US" smtClean="0"/>
+              <a:rPr lang="en-US"/>
               <a:t>Fourth level</a:t>
             </a:r>
           </a:p>
           <a:p>
             <a:pPr lvl="4"/>
             <a:r>
-              <a:rPr lang="en-US" smtClean="0"/>
+              <a:rPr lang="en-US"/>
               <a:t>Fifth level</a:t>
             </a:r>
-            <a:endParaRPr lang="en-US"/>
           </a:p>
         </p:txBody>
       </p:sp>
@@ -3073,7 +3151,7 @@
           <a:p>
             <a:fld id="{78C97017-6FC3-485B-9764-EAC9E56C1D49}" type="datetimeFigureOut">
               <a:rPr lang="en-US" smtClean="0"/>
-              <a:t>10/16/2016</a:t>
+              <a:t>11/11/2018</a:t>
             </a:fld>
             <a:endParaRPr lang="en-US"/>
           </a:p>
@@ -3456,8 +3534,8 @@
         </p:nvSpPr>
         <p:spPr>
           <a:xfrm>
-            <a:off x="1119865" y="2086382"/>
-            <a:ext cx="7871735" cy="1723618"/>
+            <a:off x="164520" y="1817108"/>
+            <a:ext cx="8744626" cy="2737732"/>
           </a:xfrm>
           <a:prstGeom prst="roundRect">
             <a:avLst>
@@ -3494,7 +3572,7 @@
           <a:lstStyle/>
           <a:p>
             <a:r>
-              <a:rPr lang="en-US" sz="1200" b="1" dirty="0" smtClean="0">
+              <a:rPr lang="en-US" sz="1200" b="1" dirty="0">
                 <a:solidFill>
                   <a:schemeClr val="accent6">
                     <a:lumMod val="75000"/>
@@ -3521,7 +3599,7 @@
         </p:nvSpPr>
         <p:spPr>
           <a:xfrm>
-            <a:off x="2877180" y="3158440"/>
+            <a:off x="2043242" y="3017605"/>
             <a:ext cx="1323049" cy="346760"/>
           </a:xfrm>
           <a:prstGeom prst="rect">
@@ -3561,7 +3639,7 @@
           <a:p>
             <a:pPr algn="ctr"/>
             <a:r>
-              <a:rPr lang="en-US" sz="1050" dirty="0" smtClean="0">
+              <a:rPr lang="en-US" sz="1050" dirty="0">
                 <a:solidFill>
                   <a:schemeClr val="bg1"/>
                 </a:solidFill>
@@ -3569,14 +3647,14 @@
               <a:t>&lt;&lt;interface&gt;&gt;</a:t>
             </a:r>
             <a:br>
-              <a:rPr lang="en-US" sz="1050" dirty="0" smtClean="0">
+              <a:rPr lang="en-US" sz="1050" dirty="0">
                 <a:solidFill>
                   <a:schemeClr val="bg1"/>
                 </a:solidFill>
               </a:rPr>
             </a:br>
             <a:r>
-              <a:rPr lang="en-US" sz="1050" dirty="0" err="1" smtClean="0">
+              <a:rPr lang="en-US" sz="1050" dirty="0" err="1">
                 <a:solidFill>
                   <a:schemeClr val="bg1"/>
                 </a:solidFill>
@@ -3599,7 +3677,7 @@
         </p:nvSpPr>
         <p:spPr>
           <a:xfrm rot="16200000">
-            <a:off x="1683963" y="2868687"/>
+            <a:off x="850025" y="2727852"/>
             <a:ext cx="1093635" cy="346760"/>
           </a:xfrm>
           <a:prstGeom prst="rect">
@@ -3639,7 +3717,7 @@
           <a:p>
             <a:pPr algn="ctr"/>
             <a:r>
-              <a:rPr lang="en-US" sz="1050" dirty="0" err="1" smtClean="0">
+              <a:rPr lang="en-US" sz="1050" dirty="0" err="1">
                 <a:solidFill>
                   <a:schemeClr val="bg1"/>
                 </a:solidFill>
@@ -3662,7 +3740,7 @@
         </p:nvSpPr>
         <p:spPr>
           <a:xfrm rot="16200000">
-            <a:off x="956202" y="2861202"/>
+            <a:off x="122264" y="2720367"/>
             <a:ext cx="1093635" cy="346760"/>
           </a:xfrm>
           <a:prstGeom prst="rect">
@@ -3713,7 +3791,7 @@
           <a:p>
             <a:pPr algn="ctr"/>
             <a:r>
-              <a:rPr lang="en-US" sz="1050" dirty="0" smtClean="0">
+              <a:rPr lang="en-US" sz="1050" dirty="0">
                 <a:solidFill>
                   <a:schemeClr val="bg1"/>
                 </a:solidFill>
@@ -3736,7 +3814,7 @@
         </p:nvSpPr>
         <p:spPr>
           <a:xfrm rot="16200000">
-            <a:off x="1626910" y="2952291"/>
+            <a:off x="792972" y="2811456"/>
             <a:ext cx="270504" cy="175523"/>
           </a:xfrm>
           <a:prstGeom prst="triangle">
@@ -3794,7 +3872,7 @@
         </p:nvCxnSpPr>
         <p:spPr>
           <a:xfrm>
-            <a:off x="2656370" y="3326536"/>
+            <a:off x="1822432" y="3185701"/>
             <a:ext cx="220810" cy="5284"/>
           </a:xfrm>
           <a:prstGeom prst="straightConnector1">
@@ -3834,7 +3912,7 @@
         </p:nvCxnSpPr>
         <p:spPr>
           <a:xfrm>
-            <a:off x="910091" y="3040053"/>
+            <a:off x="76153" y="2899218"/>
             <a:ext cx="419548" cy="2860"/>
           </a:xfrm>
           <a:prstGeom prst="bentConnector3">
@@ -3879,7 +3957,7 @@
         </p:nvCxnSpPr>
         <p:spPr>
           <a:xfrm flipV="1">
-            <a:off x="1849924" y="3040052"/>
+            <a:off x="1015986" y="2899217"/>
             <a:ext cx="216105" cy="1"/>
           </a:xfrm>
           <a:prstGeom prst="line">
@@ -3920,7 +3998,7 @@
         </p:nvSpPr>
         <p:spPr>
           <a:xfrm>
-            <a:off x="2420322" y="3239846"/>
+            <a:off x="1586384" y="3099011"/>
             <a:ext cx="236048" cy="173380"/>
           </a:xfrm>
           <a:prstGeom prst="flowChartDecision">
@@ -3974,7 +4052,7 @@
         </p:nvCxnSpPr>
         <p:spPr>
           <a:xfrm flipV="1">
-            <a:off x="4398041" y="3331820"/>
+            <a:off x="3564103" y="3190985"/>
             <a:ext cx="223324" cy="1"/>
           </a:xfrm>
           <a:prstGeom prst="bentConnector3">
@@ -4017,7 +4095,7 @@
         </p:nvSpPr>
         <p:spPr>
           <a:xfrm rot="5400000" flipV="1">
-            <a:off x="4175027" y="3244059"/>
+            <a:off x="3341089" y="3103224"/>
             <a:ext cx="270504" cy="175523"/>
           </a:xfrm>
           <a:prstGeom prst="triangle">
@@ -4075,7 +4153,7 @@
         </p:nvCxnSpPr>
         <p:spPr>
           <a:xfrm>
-            <a:off x="5791200" y="3331820"/>
+            <a:off x="4957262" y="3190985"/>
             <a:ext cx="228600" cy="1970"/>
           </a:xfrm>
           <a:prstGeom prst="bentConnector3">
@@ -4118,7 +4196,7 @@
         </p:nvSpPr>
         <p:spPr>
           <a:xfrm>
-            <a:off x="4621365" y="3158440"/>
+            <a:off x="3787427" y="3017605"/>
             <a:ext cx="1169835" cy="346760"/>
           </a:xfrm>
           <a:prstGeom prst="rect">
@@ -4147,7 +4225,7 @@
           <a:p>
             <a:pPr algn="ctr"/>
             <a:r>
-              <a:rPr lang="en-US" sz="1050" b="1" dirty="0" err="1" smtClean="0">
+              <a:rPr lang="en-US" sz="1050" b="1" dirty="0" err="1">
                 <a:solidFill>
                   <a:schemeClr val="accent6">
                     <a:lumMod val="75000"/>
@@ -4156,18 +4234,8 @@
               </a:rPr>
               <a:t>XmlAddressBook</a:t>
             </a:r>
-            <a:r>
-              <a:rPr lang="en-US" sz="1050" b="1" dirty="0" smtClean="0">
-                <a:solidFill>
-                  <a:schemeClr val="accent6">
-                    <a:lumMod val="75000"/>
-                  </a:schemeClr>
-                </a:solidFill>
-              </a:rPr>
-              <a:t/>
-            </a:r>
             <a:br>
-              <a:rPr lang="en-US" sz="1050" b="1" dirty="0" smtClean="0">
+              <a:rPr lang="en-US" sz="1050" b="1" dirty="0">
                 <a:solidFill>
                   <a:schemeClr val="accent6">
                     <a:lumMod val="75000"/>
@@ -4176,7 +4244,7 @@
               </a:rPr>
             </a:br>
             <a:r>
-              <a:rPr lang="en-US" sz="1050" b="1" dirty="0" smtClean="0">
+              <a:rPr lang="en-US" sz="1050" b="1" dirty="0">
                 <a:solidFill>
                   <a:schemeClr val="accent6">
                     <a:lumMod val="75000"/>
@@ -4203,7 +4271,7 @@
         </p:nvSpPr>
         <p:spPr>
           <a:xfrm>
-            <a:off x="2873943" y="2558040"/>
+            <a:off x="2040005" y="2417205"/>
             <a:ext cx="1323049" cy="346760"/>
           </a:xfrm>
           <a:prstGeom prst="rect">
@@ -4243,7 +4311,7 @@
           <a:p>
             <a:pPr algn="ctr"/>
             <a:r>
-              <a:rPr lang="en-US" sz="1050" dirty="0" smtClean="0">
+              <a:rPr lang="en-US" sz="1050" dirty="0">
                 <a:solidFill>
                   <a:schemeClr val="bg1"/>
                 </a:solidFill>
@@ -4251,14 +4319,14 @@
               <a:t>&lt;&lt;interface&gt;&gt;</a:t>
             </a:r>
             <a:br>
-              <a:rPr lang="en-US" sz="1050" dirty="0" smtClean="0">
+              <a:rPr lang="en-US" sz="1050" dirty="0">
                 <a:solidFill>
                   <a:schemeClr val="bg1"/>
                 </a:solidFill>
               </a:rPr>
             </a:br>
             <a:r>
-              <a:rPr lang="en-US" sz="1050" dirty="0" err="1" smtClean="0">
+              <a:rPr lang="en-US" sz="1050" dirty="0" err="1">
                 <a:solidFill>
                   <a:schemeClr val="bg1"/>
                 </a:solidFill>
@@ -4284,7 +4352,7 @@
         </p:nvCxnSpPr>
         <p:spPr>
           <a:xfrm>
-            <a:off x="2653133" y="2726136"/>
+            <a:off x="1819195" y="2585301"/>
             <a:ext cx="220810" cy="5284"/>
           </a:xfrm>
           <a:prstGeom prst="straightConnector1">
@@ -4324,7 +4392,7 @@
         </p:nvSpPr>
         <p:spPr>
           <a:xfrm>
-            <a:off x="2417085" y="2639446"/>
+            <a:off x="1583147" y="2498611"/>
             <a:ext cx="236048" cy="173380"/>
           </a:xfrm>
           <a:prstGeom prst="flowChartDecision">
@@ -4378,7 +4446,7 @@
         </p:nvCxnSpPr>
         <p:spPr>
           <a:xfrm flipV="1">
-            <a:off x="4394804" y="2731420"/>
+            <a:off x="3560866" y="2590585"/>
             <a:ext cx="223324" cy="1"/>
           </a:xfrm>
           <a:prstGeom prst="bentConnector3">
@@ -4421,7 +4489,7 @@
         </p:nvSpPr>
         <p:spPr>
           <a:xfrm rot="5400000" flipV="1">
-            <a:off x="4171790" y="2643659"/>
+            <a:off x="3337852" y="2502824"/>
             <a:ext cx="270504" cy="175523"/>
           </a:xfrm>
           <a:prstGeom prst="triangle">
@@ -4476,7 +4544,7 @@
         </p:nvSpPr>
         <p:spPr>
           <a:xfrm>
-            <a:off x="4618128" y="2558040"/>
+            <a:off x="3784190" y="2417205"/>
             <a:ext cx="1093635" cy="346760"/>
           </a:xfrm>
           <a:prstGeom prst="rect">
@@ -4516,30 +4584,22 @@
           <a:p>
             <a:pPr algn="ctr"/>
             <a:r>
-              <a:rPr lang="en-US" sz="1050" dirty="0" err="1" smtClean="0">
+              <a:rPr lang="en-US" sz="1050" dirty="0" err="1">
                 <a:solidFill>
                   <a:schemeClr val="bg1"/>
                 </a:solidFill>
               </a:rPr>
               <a:t>JsonUserPrefs</a:t>
             </a:r>
-            <a:r>
-              <a:rPr lang="en-US" sz="1050" dirty="0" smtClean="0">
-                <a:solidFill>
-                  <a:schemeClr val="bg1"/>
-                </a:solidFill>
-              </a:rPr>
-              <a:t/>
-            </a:r>
             <a:br>
-              <a:rPr lang="en-US" sz="1050" dirty="0" smtClean="0">
+              <a:rPr lang="en-US" sz="1050" dirty="0">
                 <a:solidFill>
                   <a:schemeClr val="bg1"/>
                 </a:solidFill>
               </a:rPr>
             </a:br>
             <a:r>
-              <a:rPr lang="en-US" sz="1050" dirty="0" smtClean="0">
+              <a:rPr lang="en-US" sz="1050" dirty="0">
                 <a:solidFill>
                   <a:schemeClr val="bg1"/>
                 </a:solidFill>
@@ -4562,7 +4622,7 @@
         </p:nvSpPr>
         <p:spPr>
           <a:xfrm>
-            <a:off x="6019800" y="3160410"/>
+            <a:off x="5185862" y="3019575"/>
             <a:ext cx="1200707" cy="346760"/>
           </a:xfrm>
           <a:prstGeom prst="rect">
@@ -4591,7 +4651,7 @@
           <a:p>
             <a:pPr algn="ctr"/>
             <a:r>
-              <a:rPr lang="en-US" sz="1050" b="1" dirty="0" err="1" smtClean="0">
+              <a:rPr lang="en-US" sz="1050" b="1" dirty="0" err="1">
                 <a:solidFill>
                   <a:schemeClr val="accent6">
                     <a:lumMod val="75000"/>
@@ -4600,18 +4660,8 @@
               </a:rPr>
               <a:t>XmlSerializable</a:t>
             </a:r>
-            <a:r>
-              <a:rPr lang="en-US" sz="1050" b="1" dirty="0" smtClean="0">
-                <a:solidFill>
-                  <a:schemeClr val="accent6">
-                    <a:lumMod val="75000"/>
-                  </a:schemeClr>
-                </a:solidFill>
-              </a:rPr>
-              <a:t/>
-            </a:r>
             <a:br>
-              <a:rPr lang="en-US" sz="1050" b="1" dirty="0" smtClean="0">
+              <a:rPr lang="en-US" sz="1050" b="1" dirty="0">
                 <a:solidFill>
                   <a:schemeClr val="accent6">
                     <a:lumMod val="75000"/>
@@ -4620,7 +4670,7 @@
               </a:rPr>
             </a:br>
             <a:r>
-              <a:rPr lang="en-US" sz="1050" b="1" dirty="0" err="1" smtClean="0">
+              <a:rPr lang="en-US" sz="1050" b="1" dirty="0" err="1">
                 <a:solidFill>
                   <a:schemeClr val="accent6">
                     <a:lumMod val="75000"/>
@@ -4643,19 +4693,20 @@
         <p:nvCxnSpPr>
           <p:cNvPr id="70" name="Elbow Connector 122"/>
           <p:cNvCxnSpPr>
+            <a:cxnSpLocks/>
             <a:stCxn id="74" idx="0"/>
-            <a:endCxn id="73" idx="2"/>
+            <a:endCxn id="73" idx="0"/>
           </p:cNvCxnSpPr>
           <p:nvPr/>
         </p:nvCxnSpPr>
         <p:spPr>
-          <a:xfrm rot="5400000" flipH="1" flipV="1">
-            <a:off x="8077993" y="2992020"/>
-            <a:ext cx="335208" cy="12700"/>
+          <a:xfrm rot="16200000" flipH="1">
+            <a:off x="6670816" y="1485650"/>
+            <a:ext cx="659215" cy="2423437"/>
           </a:xfrm>
           <a:prstGeom prst="bentConnector3">
             <a:avLst>
-              <a:gd name="adj1" fmla="val 50000"/>
+              <a:gd name="adj1" fmla="val -34678"/>
             </a:avLst>
           </a:prstGeom>
           <a:ln w="19050">
@@ -4688,7 +4739,7 @@
         </p:nvSpPr>
         <p:spPr>
           <a:xfrm>
-            <a:off x="7615738" y="2477656"/>
+            <a:off x="7582284" y="3026976"/>
             <a:ext cx="1259718" cy="346760"/>
           </a:xfrm>
           <a:prstGeom prst="rect">
@@ -4717,7 +4768,7 @@
           <a:p>
             <a:pPr algn="ctr"/>
             <a:r>
-              <a:rPr lang="en-US" sz="1050" b="1" dirty="0" err="1" smtClean="0">
+              <a:rPr lang="en-US" sz="1050" b="1" dirty="0" err="1">
                 <a:solidFill>
                   <a:schemeClr val="accent6">
                     <a:lumMod val="75000"/>
@@ -4744,7 +4795,7 @@
         </p:nvSpPr>
         <p:spPr>
           <a:xfrm>
-            <a:off x="7615738" y="3159624"/>
+            <a:off x="5158847" y="2367761"/>
             <a:ext cx="1259718" cy="346760"/>
           </a:xfrm>
           <a:prstGeom prst="rect">
@@ -4773,7 +4824,7 @@
           <a:p>
             <a:pPr algn="ctr"/>
             <a:r>
-              <a:rPr lang="en-US" sz="1050" b="1" dirty="0" err="1" smtClean="0">
+              <a:rPr lang="en-US" sz="1050" b="1" dirty="0" err="1">
                 <a:solidFill>
                   <a:schemeClr val="accent6">
                     <a:lumMod val="75000"/>
@@ -4796,15 +4847,394 @@
         <p:nvCxnSpPr>
           <p:cNvPr id="77" name="Elbow Connector 122"/>
           <p:cNvCxnSpPr>
-            <a:stCxn id="66" idx="3"/>
-            <a:endCxn id="74" idx="1"/>
+            <a:cxnSpLocks/>
+            <a:stCxn id="66" idx="0"/>
+            <a:endCxn id="74" idx="2"/>
           </p:cNvCxnSpPr>
           <p:nvPr/>
         </p:nvCxnSpPr>
         <p:spPr>
-          <a:xfrm flipV="1">
-            <a:off x="7220507" y="3333004"/>
-            <a:ext cx="395231" cy="786"/>
+          <a:xfrm rot="5400000" flipH="1" flipV="1">
+            <a:off x="5634934" y="2865803"/>
+            <a:ext cx="305054" cy="2490"/>
+          </a:xfrm>
+          <a:prstGeom prst="bentConnector3">
+            <a:avLst>
+              <a:gd name="adj1" fmla="val 50000"/>
+            </a:avLst>
+          </a:prstGeom>
+          <a:ln w="19050">
+            <a:prstDash val="sysDot"/>
+            <a:headEnd type="none" w="med" len="med"/>
+            <a:tailEnd type="arrow" w="med" len="med"/>
+          </a:ln>
+          <a:effectLst/>
+        </p:spPr>
+        <p:style>
+          <a:lnRef idx="1">
+            <a:schemeClr val="accent6"/>
+          </a:lnRef>
+          <a:fillRef idx="2">
+            <a:schemeClr val="accent6"/>
+          </a:fillRef>
+          <a:effectRef idx="1">
+            <a:schemeClr val="accent6"/>
+          </a:effectRef>
+          <a:fontRef idx="minor">
+            <a:schemeClr val="dk1"/>
+          </a:fontRef>
+        </p:style>
+      </p:cxnSp>
+      <p:sp>
+        <p:nvSpPr>
+          <p:cNvPr id="35" name="Rectangle 8">
+            <a:extLst>
+              <a:ext uri="{FF2B5EF4-FFF2-40B4-BE49-F238E27FC236}">
+                <a16:creationId xmlns:a16="http://schemas.microsoft.com/office/drawing/2014/main" id="{3E1CA83C-D5C2-4990-AB50-C41E0F77EEB6}"/>
+              </a:ext>
+            </a:extLst>
+          </p:cNvPr>
+          <p:cNvSpPr/>
+          <p:nvPr/>
+        </p:nvSpPr>
+        <p:spPr>
+          <a:xfrm>
+            <a:off x="5156356" y="3667792"/>
+            <a:ext cx="1259718" cy="346760"/>
+          </a:xfrm>
+          <a:prstGeom prst="rect">
+            <a:avLst/>
+          </a:prstGeom>
+          <a:ln w="19050"/>
+          <a:effectLst/>
+        </p:spPr>
+        <p:style>
+          <a:lnRef idx="1">
+            <a:schemeClr val="accent6"/>
+          </a:lnRef>
+          <a:fillRef idx="2">
+            <a:schemeClr val="accent6"/>
+          </a:fillRef>
+          <a:effectRef idx="1">
+            <a:schemeClr val="accent6"/>
+          </a:effectRef>
+          <a:fontRef idx="minor">
+            <a:schemeClr val="dk1"/>
+          </a:fontRef>
+        </p:style>
+        <p:txBody>
+          <a:bodyPr rtlCol="0" anchor="ctr"/>
+          <a:lstStyle/>
+          <a:p>
+            <a:pPr algn="ctr"/>
+            <a:r>
+              <a:rPr lang="en-US" sz="1050" b="1" dirty="0" err="1">
+                <a:solidFill>
+                  <a:schemeClr val="accent6">
+                    <a:lumMod val="75000"/>
+                  </a:schemeClr>
+                </a:solidFill>
+              </a:rPr>
+              <a:t>XmlAdaptedTask</a:t>
+            </a:r>
+            <a:endParaRPr lang="en-SG" sz="1050" b="1" dirty="0">
+              <a:solidFill>
+                <a:schemeClr val="accent6">
+                  <a:lumMod val="75000"/>
+                </a:schemeClr>
+              </a:solidFill>
+            </a:endParaRPr>
+          </a:p>
+        </p:txBody>
+      </p:sp>
+      <p:cxnSp>
+        <p:nvCxnSpPr>
+          <p:cNvPr id="36" name="Elbow Connector 122">
+            <a:extLst>
+              <a:ext uri="{FF2B5EF4-FFF2-40B4-BE49-F238E27FC236}">
+                <a16:creationId xmlns:a16="http://schemas.microsoft.com/office/drawing/2014/main" id="{7B33699A-AC32-4A2F-9395-D5DA72A7ED8B}"/>
+              </a:ext>
+            </a:extLst>
+          </p:cNvPr>
+          <p:cNvCxnSpPr>
+            <a:cxnSpLocks/>
+            <a:stCxn id="66" idx="2"/>
+            <a:endCxn id="35" idx="0"/>
+          </p:cNvCxnSpPr>
+          <p:nvPr/>
+        </p:nvCxnSpPr>
+        <p:spPr>
+          <a:xfrm rot="5400000">
+            <a:off x="5635488" y="3517063"/>
+            <a:ext cx="301457" cy="1"/>
+          </a:xfrm>
+          <a:prstGeom prst="bentConnector3">
+            <a:avLst>
+              <a:gd name="adj1" fmla="val 50000"/>
+            </a:avLst>
+          </a:prstGeom>
+          <a:ln w="19050">
+            <a:prstDash val="sysDot"/>
+            <a:headEnd type="none" w="med" len="med"/>
+            <a:tailEnd type="arrow" w="med" len="med"/>
+          </a:ln>
+          <a:effectLst/>
+        </p:spPr>
+        <p:style>
+          <a:lnRef idx="1">
+            <a:schemeClr val="accent6"/>
+          </a:lnRef>
+          <a:fillRef idx="2">
+            <a:schemeClr val="accent6"/>
+          </a:fillRef>
+          <a:effectRef idx="1">
+            <a:schemeClr val="accent6"/>
+          </a:effectRef>
+          <a:fontRef idx="minor">
+            <a:schemeClr val="dk1"/>
+          </a:fontRef>
+        </p:style>
+      </p:cxnSp>
+      <p:cxnSp>
+        <p:nvCxnSpPr>
+          <p:cNvPr id="41" name="Elbow Connector 122">
+            <a:extLst>
+              <a:ext uri="{FF2B5EF4-FFF2-40B4-BE49-F238E27FC236}">
+                <a16:creationId xmlns:a16="http://schemas.microsoft.com/office/drawing/2014/main" id="{63455163-89A8-4982-B2C9-BF150DFCFBC4}"/>
+              </a:ext>
+            </a:extLst>
+          </p:cNvPr>
+          <p:cNvCxnSpPr>
+            <a:cxnSpLocks/>
+            <a:stCxn id="35" idx="2"/>
+            <a:endCxn id="73" idx="2"/>
+          </p:cNvCxnSpPr>
+          <p:nvPr/>
+        </p:nvCxnSpPr>
+        <p:spPr>
+          <a:xfrm rot="5400000" flipH="1" flipV="1">
+            <a:off x="6678771" y="2481180"/>
+            <a:ext cx="640816" cy="2425928"/>
+          </a:xfrm>
+          <a:prstGeom prst="bentConnector3">
+            <a:avLst>
+              <a:gd name="adj1" fmla="val -35673"/>
+            </a:avLst>
+          </a:prstGeom>
+          <a:ln w="19050">
+            <a:prstDash val="sysDot"/>
+            <a:headEnd type="none" w="med" len="med"/>
+            <a:tailEnd type="arrow" w="med" len="med"/>
+          </a:ln>
+          <a:effectLst/>
+        </p:spPr>
+        <p:style>
+          <a:lnRef idx="1">
+            <a:schemeClr val="accent6"/>
+          </a:lnRef>
+          <a:fillRef idx="2">
+            <a:schemeClr val="accent6"/>
+          </a:fillRef>
+          <a:effectRef idx="1">
+            <a:schemeClr val="accent6"/>
+          </a:effectRef>
+          <a:fontRef idx="minor">
+            <a:schemeClr val="dk1"/>
+          </a:fontRef>
+        </p:style>
+      </p:cxnSp>
+      <p:sp>
+        <p:nvSpPr>
+          <p:cNvPr id="47" name="Rectangle 8">
+            <a:extLst>
+              <a:ext uri="{FF2B5EF4-FFF2-40B4-BE49-F238E27FC236}">
+                <a16:creationId xmlns:a16="http://schemas.microsoft.com/office/drawing/2014/main" id="{3294508B-21A0-4FF6-9CCD-13476D4439B1}"/>
+              </a:ext>
+            </a:extLst>
+          </p:cNvPr>
+          <p:cNvSpPr/>
+          <p:nvPr/>
+        </p:nvSpPr>
+        <p:spPr>
+          <a:xfrm>
+            <a:off x="6856771" y="2367761"/>
+            <a:ext cx="1259718" cy="346760"/>
+          </a:xfrm>
+          <a:prstGeom prst="rect">
+            <a:avLst/>
+          </a:prstGeom>
+          <a:ln w="19050"/>
+          <a:effectLst/>
+        </p:spPr>
+        <p:style>
+          <a:lnRef idx="1">
+            <a:schemeClr val="accent6"/>
+          </a:lnRef>
+          <a:fillRef idx="2">
+            <a:schemeClr val="accent6"/>
+          </a:fillRef>
+          <a:effectRef idx="1">
+            <a:schemeClr val="accent6"/>
+          </a:effectRef>
+          <a:fontRef idx="minor">
+            <a:schemeClr val="dk1"/>
+          </a:fontRef>
+        </p:style>
+        <p:txBody>
+          <a:bodyPr rtlCol="0" anchor="ctr"/>
+          <a:lstStyle/>
+          <a:p>
+            <a:pPr algn="ctr"/>
+            <a:r>
+              <a:rPr lang="en-US" sz="1050" b="1" dirty="0" err="1">
+                <a:solidFill>
+                  <a:schemeClr val="accent6">
+                    <a:lumMod val="75000"/>
+                  </a:schemeClr>
+                </a:solidFill>
+              </a:rPr>
+              <a:t>XmlAdaptedTaskId</a:t>
+            </a:r>
+            <a:endParaRPr lang="en-SG" sz="1050" b="1" dirty="0">
+              <a:solidFill>
+                <a:schemeClr val="accent6">
+                  <a:lumMod val="75000"/>
+                </a:schemeClr>
+              </a:solidFill>
+            </a:endParaRPr>
+          </a:p>
+        </p:txBody>
+      </p:sp>
+      <p:sp>
+        <p:nvSpPr>
+          <p:cNvPr id="48" name="Rectangle 8">
+            <a:extLst>
+              <a:ext uri="{FF2B5EF4-FFF2-40B4-BE49-F238E27FC236}">
+                <a16:creationId xmlns:a16="http://schemas.microsoft.com/office/drawing/2014/main" id="{738A426D-C717-467A-9C68-756759973239}"/>
+              </a:ext>
+            </a:extLst>
+          </p:cNvPr>
+          <p:cNvSpPr/>
+          <p:nvPr/>
+        </p:nvSpPr>
+        <p:spPr>
+          <a:xfrm>
+            <a:off x="6856771" y="3667792"/>
+            <a:ext cx="1259718" cy="346760"/>
+          </a:xfrm>
+          <a:prstGeom prst="rect">
+            <a:avLst/>
+          </a:prstGeom>
+          <a:ln w="19050"/>
+          <a:effectLst/>
+        </p:spPr>
+        <p:style>
+          <a:lnRef idx="1">
+            <a:schemeClr val="accent6"/>
+          </a:lnRef>
+          <a:fillRef idx="2">
+            <a:schemeClr val="accent6"/>
+          </a:fillRef>
+          <a:effectRef idx="1">
+            <a:schemeClr val="accent6"/>
+          </a:effectRef>
+          <a:fontRef idx="minor">
+            <a:schemeClr val="dk1"/>
+          </a:fontRef>
+        </p:style>
+        <p:txBody>
+          <a:bodyPr rtlCol="0" anchor="ctr"/>
+          <a:lstStyle/>
+          <a:p>
+            <a:pPr algn="ctr"/>
+            <a:r>
+              <a:rPr lang="en-US" sz="900" b="1" dirty="0" err="1">
+                <a:solidFill>
+                  <a:schemeClr val="accent6">
+                    <a:lumMod val="75000"/>
+                  </a:schemeClr>
+                </a:solidFill>
+              </a:rPr>
+              <a:t>XmlAdaptedPersonId</a:t>
+            </a:r>
+            <a:endParaRPr lang="en-SG" sz="1200" b="1" dirty="0">
+              <a:solidFill>
+                <a:schemeClr val="accent6">
+                  <a:lumMod val="75000"/>
+                </a:schemeClr>
+              </a:solidFill>
+            </a:endParaRPr>
+          </a:p>
+        </p:txBody>
+      </p:sp>
+      <p:cxnSp>
+        <p:nvCxnSpPr>
+          <p:cNvPr id="49" name="Elbow Connector 122">
+            <a:extLst>
+              <a:ext uri="{FF2B5EF4-FFF2-40B4-BE49-F238E27FC236}">
+                <a16:creationId xmlns:a16="http://schemas.microsoft.com/office/drawing/2014/main" id="{12E52D8E-FA71-4FD8-B24A-54D9AD724B43}"/>
+              </a:ext>
+            </a:extLst>
+          </p:cNvPr>
+          <p:cNvCxnSpPr>
+            <a:cxnSpLocks/>
+            <a:stCxn id="74" idx="3"/>
+            <a:endCxn id="47" idx="1"/>
+          </p:cNvCxnSpPr>
+          <p:nvPr/>
+        </p:nvCxnSpPr>
+        <p:spPr>
+          <a:xfrm>
+            <a:off x="6418565" y="2541141"/>
+            <a:ext cx="438206" cy="12700"/>
+          </a:xfrm>
+          <a:prstGeom prst="bentConnector3">
+            <a:avLst>
+              <a:gd name="adj1" fmla="val 50000"/>
+            </a:avLst>
+          </a:prstGeom>
+          <a:ln w="19050">
+            <a:prstDash val="sysDot"/>
+            <a:headEnd type="none" w="med" len="med"/>
+            <a:tailEnd type="arrow" w="med" len="med"/>
+          </a:ln>
+          <a:effectLst/>
+        </p:spPr>
+        <p:style>
+          <a:lnRef idx="1">
+            <a:schemeClr val="accent6"/>
+          </a:lnRef>
+          <a:fillRef idx="2">
+            <a:schemeClr val="accent6"/>
+          </a:fillRef>
+          <a:effectRef idx="1">
+            <a:schemeClr val="accent6"/>
+          </a:effectRef>
+          <a:fontRef idx="minor">
+            <a:schemeClr val="dk1"/>
+          </a:fontRef>
+        </p:style>
+      </p:cxnSp>
+      <p:cxnSp>
+        <p:nvCxnSpPr>
+          <p:cNvPr id="57" name="Elbow Connector 122">
+            <a:extLst>
+              <a:ext uri="{FF2B5EF4-FFF2-40B4-BE49-F238E27FC236}">
+                <a16:creationId xmlns:a16="http://schemas.microsoft.com/office/drawing/2014/main" id="{9FFBB4BC-08A9-4B42-9C0E-089CE1572EF3}"/>
+              </a:ext>
+            </a:extLst>
+          </p:cNvPr>
+          <p:cNvCxnSpPr>
+            <a:cxnSpLocks/>
+            <a:stCxn id="35" idx="3"/>
+            <a:endCxn id="48" idx="1"/>
+          </p:cNvCxnSpPr>
+          <p:nvPr/>
+        </p:nvCxnSpPr>
+        <p:spPr>
+          <a:xfrm>
+            <a:off x="6416074" y="3841172"/>
+            <a:ext cx="440697" cy="12700"/>
           </a:xfrm>
           <a:prstGeom prst="bentConnector3">
             <a:avLst>
@@ -4843,13 +5273,6 @@
   <p:clrMapOvr>
     <a:masterClrMapping/>
   </p:clrMapOvr>
-  <p:timing>
-    <p:tnLst>
-      <p:par>
-        <p:cTn id="1" dur="indefinite" restart="never" nodeType="tmRoot"/>
-      </p:par>
-    </p:tnLst>
-  </p:timing>
 </p:sld>
 </file>
 

</xml_diff>

<commit_message>
docs/diagrams: Fix storage component
Added missing navigability.
</commit_message>
<xml_diff>
--- a/docs/diagrams/StorageComponentClassDiagram.pptx
+++ b/docs/diagrams/StorageComponentClassDiagram.pptx
@@ -208,7 +208,7 @@
           <a:p>
             <a:fld id="{F5CC4B3F-88C1-4FFA-B1B6-F41C21DC6924}" type="datetimeFigureOut">
               <a:rPr lang="en-US" smtClean="0"/>
-              <a:t>10/24/2018</a:t>
+              <a:t>11/11/2018</a:t>
             </a:fld>
             <a:endParaRPr lang="en-US"/>
           </a:p>
@@ -654,7 +654,7 @@
           <a:p>
             <a:fld id="{78C97017-6FC3-485B-9764-EAC9E56C1D49}" type="datetimeFigureOut">
               <a:rPr lang="en-US" smtClean="0"/>
-              <a:t>10/24/2018</a:t>
+              <a:t>11/11/2018</a:t>
             </a:fld>
             <a:endParaRPr lang="en-US"/>
           </a:p>
@@ -822,7 +822,7 @@
           <a:p>
             <a:fld id="{78C97017-6FC3-485B-9764-EAC9E56C1D49}" type="datetimeFigureOut">
               <a:rPr lang="en-US" smtClean="0"/>
-              <a:t>10/24/2018</a:t>
+              <a:t>11/11/2018</a:t>
             </a:fld>
             <a:endParaRPr lang="en-US"/>
           </a:p>
@@ -1000,7 +1000,7 @@
           <a:p>
             <a:fld id="{78C97017-6FC3-485B-9764-EAC9E56C1D49}" type="datetimeFigureOut">
               <a:rPr lang="en-US" smtClean="0"/>
-              <a:t>10/24/2018</a:t>
+              <a:t>11/11/2018</a:t>
             </a:fld>
             <a:endParaRPr lang="en-US"/>
           </a:p>
@@ -1168,7 +1168,7 @@
           <a:p>
             <a:fld id="{78C97017-6FC3-485B-9764-EAC9E56C1D49}" type="datetimeFigureOut">
               <a:rPr lang="en-US" smtClean="0"/>
-              <a:t>10/24/2018</a:t>
+              <a:t>11/11/2018</a:t>
             </a:fld>
             <a:endParaRPr lang="en-US"/>
           </a:p>
@@ -1413,7 +1413,7 @@
           <a:p>
             <a:fld id="{78C97017-6FC3-485B-9764-EAC9E56C1D49}" type="datetimeFigureOut">
               <a:rPr lang="en-US" smtClean="0"/>
-              <a:t>10/24/2018</a:t>
+              <a:t>11/11/2018</a:t>
             </a:fld>
             <a:endParaRPr lang="en-US"/>
           </a:p>
@@ -1698,7 +1698,7 @@
           <a:p>
             <a:fld id="{78C97017-6FC3-485B-9764-EAC9E56C1D49}" type="datetimeFigureOut">
               <a:rPr lang="en-US" smtClean="0"/>
-              <a:t>10/24/2018</a:t>
+              <a:t>11/11/2018</a:t>
             </a:fld>
             <a:endParaRPr lang="en-US"/>
           </a:p>
@@ -2117,7 +2117,7 @@
           <a:p>
             <a:fld id="{78C97017-6FC3-485B-9764-EAC9E56C1D49}" type="datetimeFigureOut">
               <a:rPr lang="en-US" smtClean="0"/>
-              <a:t>10/24/2018</a:t>
+              <a:t>11/11/2018</a:t>
             </a:fld>
             <a:endParaRPr lang="en-US"/>
           </a:p>
@@ -2234,7 +2234,7 @@
           <a:p>
             <a:fld id="{78C97017-6FC3-485B-9764-EAC9E56C1D49}" type="datetimeFigureOut">
               <a:rPr lang="en-US" smtClean="0"/>
-              <a:t>10/24/2018</a:t>
+              <a:t>11/11/2018</a:t>
             </a:fld>
             <a:endParaRPr lang="en-US"/>
           </a:p>
@@ -2329,7 +2329,7 @@
           <a:p>
             <a:fld id="{78C97017-6FC3-485B-9764-EAC9E56C1D49}" type="datetimeFigureOut">
               <a:rPr lang="en-US" smtClean="0"/>
-              <a:t>10/24/2018</a:t>
+              <a:t>11/11/2018</a:t>
             </a:fld>
             <a:endParaRPr lang="en-US"/>
           </a:p>
@@ -2604,7 +2604,7 @@
           <a:p>
             <a:fld id="{78C97017-6FC3-485B-9764-EAC9E56C1D49}" type="datetimeFigureOut">
               <a:rPr lang="en-US" smtClean="0"/>
-              <a:t>10/24/2018</a:t>
+              <a:t>11/11/2018</a:t>
             </a:fld>
             <a:endParaRPr lang="en-US"/>
           </a:p>
@@ -2856,7 +2856,7 @@
           <a:p>
             <a:fld id="{78C97017-6FC3-485B-9764-EAC9E56C1D49}" type="datetimeFigureOut">
               <a:rPr lang="en-US" smtClean="0"/>
-              <a:t>10/24/2018</a:t>
+              <a:t>11/11/2018</a:t>
             </a:fld>
             <a:endParaRPr lang="en-US"/>
           </a:p>
@@ -3067,7 +3067,7 @@
           <a:p>
             <a:fld id="{78C97017-6FC3-485B-9764-EAC9E56C1D49}" type="datetimeFigureOut">
               <a:rPr lang="en-US" smtClean="0"/>
-              <a:t>10/24/2018</a:t>
+              <a:t>11/11/2018</a:t>
             </a:fld>
             <a:endParaRPr lang="en-US"/>
           </a:p>
@@ -4615,7 +4615,7 @@
         </p:nvSpPr>
         <p:spPr>
           <a:xfrm>
-            <a:off x="6978884" y="3159624"/>
+            <a:off x="6978884" y="3169357"/>
             <a:ext cx="1551866" cy="346760"/>
           </a:xfrm>
           <a:prstGeom prst="rect">
@@ -4668,14 +4668,13 @@
           <p:cNvPr id="77" name="Elbow Connector 122"/>
           <p:cNvCxnSpPr>
             <a:cxnSpLocks/>
-            <a:stCxn id="66" idx="3"/>
             <a:endCxn id="74" idx="1"/>
           </p:cNvCxnSpPr>
           <p:nvPr/>
         </p:nvCxnSpPr>
         <p:spPr>
           <a:xfrm flipV="1">
-            <a:off x="6655590" y="3333004"/>
+            <a:off x="6655590" y="3342737"/>
             <a:ext cx="323294" cy="786"/>
           </a:xfrm>
           <a:prstGeom prst="bentConnector3">
@@ -4719,7 +4718,7 @@
         </p:nvSpPr>
         <p:spPr>
           <a:xfrm>
-            <a:off x="6978884" y="3638184"/>
+            <a:off x="6978884" y="3647917"/>
             <a:ext cx="1551866" cy="346760"/>
           </a:xfrm>
           <a:prstGeom prst="rect">
@@ -4781,7 +4780,7 @@
         </p:nvSpPr>
         <p:spPr>
           <a:xfrm>
-            <a:off x="6978884" y="4116744"/>
+            <a:off x="6978884" y="4126477"/>
             <a:ext cx="1551866" cy="346760"/>
           </a:xfrm>
           <a:prstGeom prst="rect">
@@ -4843,7 +4842,7 @@
         </p:nvSpPr>
         <p:spPr>
           <a:xfrm>
-            <a:off x="6978884" y="4596507"/>
+            <a:off x="6978884" y="4606240"/>
             <a:ext cx="1551866" cy="346760"/>
           </a:xfrm>
           <a:prstGeom prst="rect">
@@ -4905,7 +4904,7 @@
         </p:nvSpPr>
         <p:spPr>
           <a:xfrm>
-            <a:off x="6976845" y="2681850"/>
+            <a:off x="6976845" y="2691583"/>
             <a:ext cx="1553905" cy="346760"/>
           </a:xfrm>
           <a:prstGeom prst="rect">
@@ -4953,6 +4952,194 @@
           </a:p>
         </p:txBody>
       </p:sp>
+      <p:cxnSp>
+        <p:nvCxnSpPr>
+          <p:cNvPr id="29" name="Elbow Connector 122">
+            <a:extLst>
+              <a:ext uri="{FF2B5EF4-FFF2-40B4-BE49-F238E27FC236}">
+                <a16:creationId xmlns:a16="http://schemas.microsoft.com/office/drawing/2014/main" id="{A10FDAFE-008B-48B9-9C08-F19499DC576E}"/>
+              </a:ext>
+            </a:extLst>
+          </p:cNvPr>
+          <p:cNvCxnSpPr>
+            <a:cxnSpLocks/>
+            <a:endCxn id="36" idx="1"/>
+          </p:cNvCxnSpPr>
+          <p:nvPr/>
+        </p:nvCxnSpPr>
+        <p:spPr>
+          <a:xfrm flipV="1">
+            <a:off x="6655590" y="2864963"/>
+            <a:ext cx="321255" cy="478560"/>
+          </a:xfrm>
+          <a:prstGeom prst="bentConnector3">
+            <a:avLst>
+              <a:gd name="adj1" fmla="val 50000"/>
+            </a:avLst>
+          </a:prstGeom>
+          <a:ln w="19050">
+            <a:prstDash val="sysDot"/>
+            <a:headEnd type="none" w="med" len="med"/>
+            <a:tailEnd type="arrow" w="med" len="med"/>
+          </a:ln>
+          <a:effectLst/>
+        </p:spPr>
+        <p:style>
+          <a:lnRef idx="1">
+            <a:schemeClr val="accent6"/>
+          </a:lnRef>
+          <a:fillRef idx="2">
+            <a:schemeClr val="accent6"/>
+          </a:fillRef>
+          <a:effectRef idx="1">
+            <a:schemeClr val="accent6"/>
+          </a:effectRef>
+          <a:fontRef idx="minor">
+            <a:schemeClr val="dk1"/>
+          </a:fontRef>
+        </p:style>
+      </p:cxnSp>
+      <p:cxnSp>
+        <p:nvCxnSpPr>
+          <p:cNvPr id="31" name="Elbow Connector 122">
+            <a:extLst>
+              <a:ext uri="{FF2B5EF4-FFF2-40B4-BE49-F238E27FC236}">
+                <a16:creationId xmlns:a16="http://schemas.microsoft.com/office/drawing/2014/main" id="{AED7B8B2-A845-43FF-B822-B9F9665830F8}"/>
+              </a:ext>
+            </a:extLst>
+          </p:cNvPr>
+          <p:cNvCxnSpPr>
+            <a:cxnSpLocks/>
+            <a:endCxn id="26" idx="1"/>
+          </p:cNvCxnSpPr>
+          <p:nvPr/>
+        </p:nvCxnSpPr>
+        <p:spPr>
+          <a:xfrm>
+            <a:off x="6655590" y="3343523"/>
+            <a:ext cx="323294" cy="477774"/>
+          </a:xfrm>
+          <a:prstGeom prst="bentConnector3">
+            <a:avLst>
+              <a:gd name="adj1" fmla="val 50000"/>
+            </a:avLst>
+          </a:prstGeom>
+          <a:ln w="19050">
+            <a:prstDash val="sysDot"/>
+            <a:headEnd type="none" w="med" len="med"/>
+            <a:tailEnd type="arrow" w="med" len="med"/>
+          </a:ln>
+          <a:effectLst/>
+        </p:spPr>
+        <p:style>
+          <a:lnRef idx="1">
+            <a:schemeClr val="accent6"/>
+          </a:lnRef>
+          <a:fillRef idx="2">
+            <a:schemeClr val="accent6"/>
+          </a:fillRef>
+          <a:effectRef idx="1">
+            <a:schemeClr val="accent6"/>
+          </a:effectRef>
+          <a:fontRef idx="minor">
+            <a:schemeClr val="dk1"/>
+          </a:fontRef>
+        </p:style>
+      </p:cxnSp>
+      <p:cxnSp>
+        <p:nvCxnSpPr>
+          <p:cNvPr id="34" name="Elbow Connector 122">
+            <a:extLst>
+              <a:ext uri="{FF2B5EF4-FFF2-40B4-BE49-F238E27FC236}">
+                <a16:creationId xmlns:a16="http://schemas.microsoft.com/office/drawing/2014/main" id="{E84D9CF0-0A72-4951-A6B9-408B1F626F92}"/>
+              </a:ext>
+            </a:extLst>
+          </p:cNvPr>
+          <p:cNvCxnSpPr>
+            <a:cxnSpLocks/>
+            <a:endCxn id="27" idx="1"/>
+          </p:cNvCxnSpPr>
+          <p:nvPr/>
+        </p:nvCxnSpPr>
+        <p:spPr>
+          <a:xfrm>
+            <a:off x="6655590" y="3343523"/>
+            <a:ext cx="323294" cy="956334"/>
+          </a:xfrm>
+          <a:prstGeom prst="bentConnector3">
+            <a:avLst>
+              <a:gd name="adj1" fmla="val 50000"/>
+            </a:avLst>
+          </a:prstGeom>
+          <a:ln w="19050">
+            <a:prstDash val="sysDot"/>
+            <a:headEnd type="none" w="med" len="med"/>
+            <a:tailEnd type="arrow" w="med" len="med"/>
+          </a:ln>
+          <a:effectLst/>
+        </p:spPr>
+        <p:style>
+          <a:lnRef idx="1">
+            <a:schemeClr val="accent6"/>
+          </a:lnRef>
+          <a:fillRef idx="2">
+            <a:schemeClr val="accent6"/>
+          </a:fillRef>
+          <a:effectRef idx="1">
+            <a:schemeClr val="accent6"/>
+          </a:effectRef>
+          <a:fontRef idx="minor">
+            <a:schemeClr val="dk1"/>
+          </a:fontRef>
+        </p:style>
+      </p:cxnSp>
+      <p:cxnSp>
+        <p:nvCxnSpPr>
+          <p:cNvPr id="37" name="Elbow Connector 122">
+            <a:extLst>
+              <a:ext uri="{FF2B5EF4-FFF2-40B4-BE49-F238E27FC236}">
+                <a16:creationId xmlns:a16="http://schemas.microsoft.com/office/drawing/2014/main" id="{C07636C8-8FFC-4A24-B5FF-F77257F53221}"/>
+              </a:ext>
+            </a:extLst>
+          </p:cNvPr>
+          <p:cNvCxnSpPr>
+            <a:cxnSpLocks/>
+            <a:endCxn id="28" idx="1"/>
+          </p:cNvCxnSpPr>
+          <p:nvPr/>
+        </p:nvCxnSpPr>
+        <p:spPr>
+          <a:xfrm>
+            <a:off x="6655590" y="3343523"/>
+            <a:ext cx="323294" cy="1436097"/>
+          </a:xfrm>
+          <a:prstGeom prst="bentConnector3">
+            <a:avLst>
+              <a:gd name="adj1" fmla="val 50000"/>
+            </a:avLst>
+          </a:prstGeom>
+          <a:ln w="19050">
+            <a:prstDash val="sysDot"/>
+            <a:headEnd type="none" w="med" len="med"/>
+            <a:tailEnd type="arrow" w="med" len="med"/>
+          </a:ln>
+          <a:effectLst/>
+        </p:spPr>
+        <p:style>
+          <a:lnRef idx="1">
+            <a:schemeClr val="accent6"/>
+          </a:lnRef>
+          <a:fillRef idx="2">
+            <a:schemeClr val="accent6"/>
+          </a:fillRef>
+          <a:effectRef idx="1">
+            <a:schemeClr val="accent6"/>
+          </a:effectRef>
+          <a:fontRef idx="minor">
+            <a:schemeClr val="dk1"/>
+          </a:fontRef>
+        </p:style>
+      </p:cxnSp>
     </p:spTree>
     <p:extLst>
       <p:ext uri="{BB962C8B-B14F-4D97-AF65-F5344CB8AC3E}">

</xml_diff>

<commit_message>
Updated StorageClassDiagram in DG
</commit_message>
<xml_diff>
--- a/docs/diagrams/StorageComponentClassDiagram.pptx
+++ b/docs/diagrams/StorageComponentClassDiagram.pptx
@@ -107,6 +107,22 @@
       </a:defRPr>
     </a:lvl9pPr>
   </p:defaultTextStyle>
+  <p:extLst>
+    <p:ext uri="{EFAFB233-063F-42B5-8137-9DF3F51BA10A}">
+      <p15:sldGuideLst xmlns:p15="http://schemas.microsoft.com/office/powerpoint/2012/main">
+        <p15:guide id="1" orient="horz" pos="1488">
+          <p15:clr>
+            <a:srgbClr val="A4A3A4"/>
+          </p15:clr>
+        </p15:guide>
+        <p15:guide id="2" pos="2880">
+          <p15:clr>
+            <a:srgbClr val="A4A3A4"/>
+          </p15:clr>
+        </p15:guide>
+      </p15:sldGuideLst>
+    </p:ext>
+  </p:extLst>
 </p:presentation>
 </file>
 
@@ -192,7 +208,7 @@
           <a:p>
             <a:fld id="{F5CC4B3F-88C1-4FFA-B1B6-F41C21DC6924}" type="datetimeFigureOut">
               <a:rPr lang="en-US" smtClean="0"/>
-              <a:t>10/16/2016</a:t>
+              <a:t>11/12/2018</a:t>
             </a:fld>
             <a:endParaRPr lang="en-US"/>
           </a:p>
@@ -256,38 +272,37 @@
           <a:p>
             <a:pPr lvl="0"/>
             <a:r>
-              <a:rPr lang="en-US" smtClean="0"/>
+              <a:rPr lang="en-US"/>
               <a:t>Click to edit Master text styles</a:t>
             </a:r>
           </a:p>
           <a:p>
             <a:pPr lvl="1"/>
             <a:r>
-              <a:rPr lang="en-US" smtClean="0"/>
+              <a:rPr lang="en-US"/>
               <a:t>Second level</a:t>
             </a:r>
           </a:p>
           <a:p>
             <a:pPr lvl="2"/>
             <a:r>
-              <a:rPr lang="en-US" smtClean="0"/>
+              <a:rPr lang="en-US"/>
               <a:t>Third level</a:t>
             </a:r>
           </a:p>
           <a:p>
             <a:pPr lvl="3"/>
             <a:r>
-              <a:rPr lang="en-US" smtClean="0"/>
+              <a:rPr lang="en-US"/>
               <a:t>Fourth level</a:t>
             </a:r>
           </a:p>
           <a:p>
             <a:pPr lvl="4"/>
             <a:r>
-              <a:rPr lang="en-US" smtClean="0"/>
+              <a:rPr lang="en-US"/>
               <a:t>Fifth level</a:t>
             </a:r>
-            <a:endParaRPr lang="en-US"/>
           </a:p>
         </p:txBody>
       </p:sp>
@@ -498,10 +513,9 @@
           <a:lstStyle/>
           <a:p>
             <a:r>
-              <a:rPr lang="en-US" smtClean="0"/>
+              <a:rPr lang="en-US"/>
               <a:t>Click to edit Master title style</a:t>
             </a:r>
-            <a:endParaRPr lang="en-US"/>
           </a:p>
         </p:txBody>
       </p:sp>
@@ -617,10 +631,9 @@
           </a:lstStyle>
           <a:p>
             <a:r>
-              <a:rPr lang="en-US" smtClean="0"/>
+              <a:rPr lang="en-US"/>
               <a:t>Click to edit Master subtitle style</a:t>
             </a:r>
-            <a:endParaRPr lang="en-US"/>
           </a:p>
         </p:txBody>
       </p:sp>
@@ -641,7 +654,7 @@
           <a:p>
             <a:fld id="{78C97017-6FC3-485B-9764-EAC9E56C1D49}" type="datetimeFigureOut">
               <a:rPr lang="en-US" smtClean="0"/>
-              <a:t>10/16/2016</a:t>
+              <a:t>11/12/2018</a:t>
             </a:fld>
             <a:endParaRPr lang="en-US"/>
           </a:p>
@@ -735,10 +748,9 @@
           <a:lstStyle/>
           <a:p>
             <a:r>
-              <a:rPr lang="en-US" smtClean="0"/>
+              <a:rPr lang="en-US"/>
               <a:t>Click to edit Master title style</a:t>
             </a:r>
-            <a:endParaRPr lang="en-US"/>
           </a:p>
         </p:txBody>
       </p:sp>
@@ -759,38 +771,37 @@
           <a:p>
             <a:pPr lvl="0"/>
             <a:r>
-              <a:rPr lang="en-US" smtClean="0"/>
+              <a:rPr lang="en-US"/>
               <a:t>Click to edit Master text styles</a:t>
             </a:r>
           </a:p>
           <a:p>
             <a:pPr lvl="1"/>
             <a:r>
-              <a:rPr lang="en-US" smtClean="0"/>
+              <a:rPr lang="en-US"/>
               <a:t>Second level</a:t>
             </a:r>
           </a:p>
           <a:p>
             <a:pPr lvl="2"/>
             <a:r>
-              <a:rPr lang="en-US" smtClean="0"/>
+              <a:rPr lang="en-US"/>
               <a:t>Third level</a:t>
             </a:r>
           </a:p>
           <a:p>
             <a:pPr lvl="3"/>
             <a:r>
-              <a:rPr lang="en-US" smtClean="0"/>
+              <a:rPr lang="en-US"/>
               <a:t>Fourth level</a:t>
             </a:r>
           </a:p>
           <a:p>
             <a:pPr lvl="4"/>
             <a:r>
-              <a:rPr lang="en-US" smtClean="0"/>
+              <a:rPr lang="en-US"/>
               <a:t>Fifth level</a:t>
             </a:r>
-            <a:endParaRPr lang="en-US"/>
           </a:p>
         </p:txBody>
       </p:sp>
@@ -811,7 +822,7 @@
           <a:p>
             <a:fld id="{78C97017-6FC3-485B-9764-EAC9E56C1D49}" type="datetimeFigureOut">
               <a:rPr lang="en-US" smtClean="0"/>
-              <a:t>10/16/2016</a:t>
+              <a:t>11/12/2018</a:t>
             </a:fld>
             <a:endParaRPr lang="en-US"/>
           </a:p>
@@ -910,10 +921,9 @@
           <a:lstStyle/>
           <a:p>
             <a:r>
-              <a:rPr lang="en-US" smtClean="0"/>
+              <a:rPr lang="en-US"/>
               <a:t>Click to edit Master title style</a:t>
             </a:r>
-            <a:endParaRPr lang="en-US"/>
           </a:p>
         </p:txBody>
       </p:sp>
@@ -939,38 +949,37 @@
           <a:p>
             <a:pPr lvl="0"/>
             <a:r>
-              <a:rPr lang="en-US" smtClean="0"/>
+              <a:rPr lang="en-US"/>
               <a:t>Click to edit Master text styles</a:t>
             </a:r>
           </a:p>
           <a:p>
             <a:pPr lvl="1"/>
             <a:r>
-              <a:rPr lang="en-US" smtClean="0"/>
+              <a:rPr lang="en-US"/>
               <a:t>Second level</a:t>
             </a:r>
           </a:p>
           <a:p>
             <a:pPr lvl="2"/>
             <a:r>
-              <a:rPr lang="en-US" smtClean="0"/>
+              <a:rPr lang="en-US"/>
               <a:t>Third level</a:t>
             </a:r>
           </a:p>
           <a:p>
             <a:pPr lvl="3"/>
             <a:r>
-              <a:rPr lang="en-US" smtClean="0"/>
+              <a:rPr lang="en-US"/>
               <a:t>Fourth level</a:t>
             </a:r>
           </a:p>
           <a:p>
             <a:pPr lvl="4"/>
             <a:r>
-              <a:rPr lang="en-US" smtClean="0"/>
+              <a:rPr lang="en-US"/>
               <a:t>Fifth level</a:t>
             </a:r>
-            <a:endParaRPr lang="en-US"/>
           </a:p>
         </p:txBody>
       </p:sp>
@@ -991,7 +1000,7 @@
           <a:p>
             <a:fld id="{78C97017-6FC3-485B-9764-EAC9E56C1D49}" type="datetimeFigureOut">
               <a:rPr lang="en-US" smtClean="0"/>
-              <a:t>10/16/2016</a:t>
+              <a:t>11/12/2018</a:t>
             </a:fld>
             <a:endParaRPr lang="en-US"/>
           </a:p>
@@ -1085,10 +1094,9 @@
           <a:lstStyle/>
           <a:p>
             <a:r>
-              <a:rPr lang="en-US" smtClean="0"/>
+              <a:rPr lang="en-US"/>
               <a:t>Click to edit Master title style</a:t>
             </a:r>
-            <a:endParaRPr lang="en-US"/>
           </a:p>
         </p:txBody>
       </p:sp>
@@ -1109,38 +1117,37 @@
           <a:p>
             <a:pPr lvl="0"/>
             <a:r>
-              <a:rPr lang="en-US" smtClean="0"/>
+              <a:rPr lang="en-US"/>
               <a:t>Click to edit Master text styles</a:t>
             </a:r>
           </a:p>
           <a:p>
             <a:pPr lvl="1"/>
             <a:r>
-              <a:rPr lang="en-US" smtClean="0"/>
+              <a:rPr lang="en-US"/>
               <a:t>Second level</a:t>
             </a:r>
           </a:p>
           <a:p>
             <a:pPr lvl="2"/>
             <a:r>
-              <a:rPr lang="en-US" smtClean="0"/>
+              <a:rPr lang="en-US"/>
               <a:t>Third level</a:t>
             </a:r>
           </a:p>
           <a:p>
             <a:pPr lvl="3"/>
             <a:r>
-              <a:rPr lang="en-US" smtClean="0"/>
+              <a:rPr lang="en-US"/>
               <a:t>Fourth level</a:t>
             </a:r>
           </a:p>
           <a:p>
             <a:pPr lvl="4"/>
             <a:r>
-              <a:rPr lang="en-US" smtClean="0"/>
+              <a:rPr lang="en-US"/>
               <a:t>Fifth level</a:t>
             </a:r>
-            <a:endParaRPr lang="en-US"/>
           </a:p>
         </p:txBody>
       </p:sp>
@@ -1161,7 +1168,7 @@
           <a:p>
             <a:fld id="{78C97017-6FC3-485B-9764-EAC9E56C1D49}" type="datetimeFigureOut">
               <a:rPr lang="en-US" smtClean="0"/>
-              <a:t>10/16/2016</a:t>
+              <a:t>11/12/2018</a:t>
             </a:fld>
             <a:endParaRPr lang="en-US"/>
           </a:p>
@@ -1264,10 +1271,9 @@
           </a:lstStyle>
           <a:p>
             <a:r>
-              <a:rPr lang="en-US" smtClean="0"/>
+              <a:rPr lang="en-US"/>
               <a:t>Click to edit Master title style</a:t>
             </a:r>
-            <a:endParaRPr lang="en-US"/>
           </a:p>
         </p:txBody>
       </p:sp>
@@ -1384,7 +1390,7 @@
           <a:p>
             <a:pPr lvl="0"/>
             <a:r>
-              <a:rPr lang="en-US" smtClean="0"/>
+              <a:rPr lang="en-US"/>
               <a:t>Click to edit Master text styles</a:t>
             </a:r>
           </a:p>
@@ -1407,7 +1413,7 @@
           <a:p>
             <a:fld id="{78C97017-6FC3-485B-9764-EAC9E56C1D49}" type="datetimeFigureOut">
               <a:rPr lang="en-US" smtClean="0"/>
-              <a:t>10/16/2016</a:t>
+              <a:t>11/12/2018</a:t>
             </a:fld>
             <a:endParaRPr lang="en-US"/>
           </a:p>
@@ -1501,10 +1507,9 @@
           <a:lstStyle/>
           <a:p>
             <a:r>
-              <a:rPr lang="en-US" smtClean="0"/>
+              <a:rPr lang="en-US"/>
               <a:t>Click to edit Master title style</a:t>
             </a:r>
-            <a:endParaRPr lang="en-US"/>
           </a:p>
         </p:txBody>
       </p:sp>
@@ -1558,38 +1563,37 @@
           <a:p>
             <a:pPr lvl="0"/>
             <a:r>
-              <a:rPr lang="en-US" smtClean="0"/>
+              <a:rPr lang="en-US"/>
               <a:t>Click to edit Master text styles</a:t>
             </a:r>
           </a:p>
           <a:p>
             <a:pPr lvl="1"/>
             <a:r>
-              <a:rPr lang="en-US" smtClean="0"/>
+              <a:rPr lang="en-US"/>
               <a:t>Second level</a:t>
             </a:r>
           </a:p>
           <a:p>
             <a:pPr lvl="2"/>
             <a:r>
-              <a:rPr lang="en-US" smtClean="0"/>
+              <a:rPr lang="en-US"/>
               <a:t>Third level</a:t>
             </a:r>
           </a:p>
           <a:p>
             <a:pPr lvl="3"/>
             <a:r>
-              <a:rPr lang="en-US" smtClean="0"/>
+              <a:rPr lang="en-US"/>
               <a:t>Fourth level</a:t>
             </a:r>
           </a:p>
           <a:p>
             <a:pPr lvl="4"/>
             <a:r>
-              <a:rPr lang="en-US" smtClean="0"/>
+              <a:rPr lang="en-US"/>
               <a:t>Fifth level</a:t>
             </a:r>
-            <a:endParaRPr lang="en-US"/>
           </a:p>
         </p:txBody>
       </p:sp>
@@ -1643,38 +1647,37 @@
           <a:p>
             <a:pPr lvl="0"/>
             <a:r>
-              <a:rPr lang="en-US" smtClean="0"/>
+              <a:rPr lang="en-US"/>
               <a:t>Click to edit Master text styles</a:t>
             </a:r>
           </a:p>
           <a:p>
             <a:pPr lvl="1"/>
             <a:r>
-              <a:rPr lang="en-US" smtClean="0"/>
+              <a:rPr lang="en-US"/>
               <a:t>Second level</a:t>
             </a:r>
           </a:p>
           <a:p>
             <a:pPr lvl="2"/>
             <a:r>
-              <a:rPr lang="en-US" smtClean="0"/>
+              <a:rPr lang="en-US"/>
               <a:t>Third level</a:t>
             </a:r>
           </a:p>
           <a:p>
             <a:pPr lvl="3"/>
             <a:r>
-              <a:rPr lang="en-US" smtClean="0"/>
+              <a:rPr lang="en-US"/>
               <a:t>Fourth level</a:t>
             </a:r>
           </a:p>
           <a:p>
             <a:pPr lvl="4"/>
             <a:r>
-              <a:rPr lang="en-US" smtClean="0"/>
+              <a:rPr lang="en-US"/>
               <a:t>Fifth level</a:t>
             </a:r>
-            <a:endParaRPr lang="en-US"/>
           </a:p>
         </p:txBody>
       </p:sp>
@@ -1695,7 +1698,7 @@
           <a:p>
             <a:fld id="{78C97017-6FC3-485B-9764-EAC9E56C1D49}" type="datetimeFigureOut">
               <a:rPr lang="en-US" smtClean="0"/>
-              <a:t>10/16/2016</a:t>
+              <a:t>11/12/2018</a:t>
             </a:fld>
             <a:endParaRPr lang="en-US"/>
           </a:p>
@@ -1793,10 +1796,9 @@
           </a:lstStyle>
           <a:p>
             <a:r>
-              <a:rPr lang="en-US" smtClean="0"/>
+              <a:rPr lang="en-US"/>
               <a:t>Click to edit Master title style</a:t>
             </a:r>
-            <a:endParaRPr lang="en-US"/>
           </a:p>
         </p:txBody>
       </p:sp>
@@ -1859,7 +1861,7 @@
           <a:p>
             <a:pPr lvl="0"/>
             <a:r>
-              <a:rPr lang="en-US" smtClean="0"/>
+              <a:rPr lang="en-US"/>
               <a:t>Click to edit Master text styles</a:t>
             </a:r>
           </a:p>
@@ -1915,38 +1917,37 @@
           <a:p>
             <a:pPr lvl="0"/>
             <a:r>
-              <a:rPr lang="en-US" smtClean="0"/>
+              <a:rPr lang="en-US"/>
               <a:t>Click to edit Master text styles</a:t>
             </a:r>
           </a:p>
           <a:p>
             <a:pPr lvl="1"/>
             <a:r>
-              <a:rPr lang="en-US" smtClean="0"/>
+              <a:rPr lang="en-US"/>
               <a:t>Second level</a:t>
             </a:r>
           </a:p>
           <a:p>
             <a:pPr lvl="2"/>
             <a:r>
-              <a:rPr lang="en-US" smtClean="0"/>
+              <a:rPr lang="en-US"/>
               <a:t>Third level</a:t>
             </a:r>
           </a:p>
           <a:p>
             <a:pPr lvl="3"/>
             <a:r>
-              <a:rPr lang="en-US" smtClean="0"/>
+              <a:rPr lang="en-US"/>
               <a:t>Fourth level</a:t>
             </a:r>
           </a:p>
           <a:p>
             <a:pPr lvl="4"/>
             <a:r>
-              <a:rPr lang="en-US" smtClean="0"/>
+              <a:rPr lang="en-US"/>
               <a:t>Fifth level</a:t>
             </a:r>
-            <a:endParaRPr lang="en-US"/>
           </a:p>
         </p:txBody>
       </p:sp>
@@ -2009,7 +2010,7 @@
           <a:p>
             <a:pPr lvl="0"/>
             <a:r>
-              <a:rPr lang="en-US" smtClean="0"/>
+              <a:rPr lang="en-US"/>
               <a:t>Click to edit Master text styles</a:t>
             </a:r>
           </a:p>
@@ -2065,38 +2066,37 @@
           <a:p>
             <a:pPr lvl="0"/>
             <a:r>
-              <a:rPr lang="en-US" smtClean="0"/>
+              <a:rPr lang="en-US"/>
               <a:t>Click to edit Master text styles</a:t>
             </a:r>
           </a:p>
           <a:p>
             <a:pPr lvl="1"/>
             <a:r>
-              <a:rPr lang="en-US" smtClean="0"/>
+              <a:rPr lang="en-US"/>
               <a:t>Second level</a:t>
             </a:r>
           </a:p>
           <a:p>
             <a:pPr lvl="2"/>
             <a:r>
-              <a:rPr lang="en-US" smtClean="0"/>
+              <a:rPr lang="en-US"/>
               <a:t>Third level</a:t>
             </a:r>
           </a:p>
           <a:p>
             <a:pPr lvl="3"/>
             <a:r>
-              <a:rPr lang="en-US" smtClean="0"/>
+              <a:rPr lang="en-US"/>
               <a:t>Fourth level</a:t>
             </a:r>
           </a:p>
           <a:p>
             <a:pPr lvl="4"/>
             <a:r>
-              <a:rPr lang="en-US" smtClean="0"/>
+              <a:rPr lang="en-US"/>
               <a:t>Fifth level</a:t>
             </a:r>
-            <a:endParaRPr lang="en-US"/>
           </a:p>
         </p:txBody>
       </p:sp>
@@ -2117,7 +2117,7 @@
           <a:p>
             <a:fld id="{78C97017-6FC3-485B-9764-EAC9E56C1D49}" type="datetimeFigureOut">
               <a:rPr lang="en-US" smtClean="0"/>
-              <a:t>10/16/2016</a:t>
+              <a:t>11/12/2018</a:t>
             </a:fld>
             <a:endParaRPr lang="en-US"/>
           </a:p>
@@ -2211,10 +2211,9 @@
           <a:lstStyle/>
           <a:p>
             <a:r>
-              <a:rPr lang="en-US" smtClean="0"/>
+              <a:rPr lang="en-US"/>
               <a:t>Click to edit Master title style</a:t>
             </a:r>
-            <a:endParaRPr lang="en-US"/>
           </a:p>
         </p:txBody>
       </p:sp>
@@ -2235,7 +2234,7 @@
           <a:p>
             <a:fld id="{78C97017-6FC3-485B-9764-EAC9E56C1D49}" type="datetimeFigureOut">
               <a:rPr lang="en-US" smtClean="0"/>
-              <a:t>10/16/2016</a:t>
+              <a:t>11/12/2018</a:t>
             </a:fld>
             <a:endParaRPr lang="en-US"/>
           </a:p>
@@ -2330,7 +2329,7 @@
           <a:p>
             <a:fld id="{78C97017-6FC3-485B-9764-EAC9E56C1D49}" type="datetimeFigureOut">
               <a:rPr lang="en-US" smtClean="0"/>
-              <a:t>10/16/2016</a:t>
+              <a:t>11/12/2018</a:t>
             </a:fld>
             <a:endParaRPr lang="en-US"/>
           </a:p>
@@ -2433,10 +2432,9 @@
           </a:lstStyle>
           <a:p>
             <a:r>
-              <a:rPr lang="en-US" smtClean="0"/>
+              <a:rPr lang="en-US"/>
               <a:t>Click to edit Master title style</a:t>
             </a:r>
-            <a:endParaRPr lang="en-US"/>
           </a:p>
         </p:txBody>
       </p:sp>
@@ -2490,38 +2488,37 @@
           <a:p>
             <a:pPr lvl="0"/>
             <a:r>
-              <a:rPr lang="en-US" smtClean="0"/>
+              <a:rPr lang="en-US"/>
               <a:t>Click to edit Master text styles</a:t>
             </a:r>
           </a:p>
           <a:p>
             <a:pPr lvl="1"/>
             <a:r>
-              <a:rPr lang="en-US" smtClean="0"/>
+              <a:rPr lang="en-US"/>
               <a:t>Second level</a:t>
             </a:r>
           </a:p>
           <a:p>
             <a:pPr lvl="2"/>
             <a:r>
-              <a:rPr lang="en-US" smtClean="0"/>
+              <a:rPr lang="en-US"/>
               <a:t>Third level</a:t>
             </a:r>
           </a:p>
           <a:p>
             <a:pPr lvl="3"/>
             <a:r>
-              <a:rPr lang="en-US" smtClean="0"/>
+              <a:rPr lang="en-US"/>
               <a:t>Fourth level</a:t>
             </a:r>
           </a:p>
           <a:p>
             <a:pPr lvl="4"/>
             <a:r>
-              <a:rPr lang="en-US" smtClean="0"/>
+              <a:rPr lang="en-US"/>
               <a:t>Fifth level</a:t>
             </a:r>
-            <a:endParaRPr lang="en-US"/>
           </a:p>
         </p:txBody>
       </p:sp>
@@ -2584,7 +2581,7 @@
           <a:p>
             <a:pPr lvl="0"/>
             <a:r>
-              <a:rPr lang="en-US" smtClean="0"/>
+              <a:rPr lang="en-US"/>
               <a:t>Click to edit Master text styles</a:t>
             </a:r>
           </a:p>
@@ -2607,7 +2604,7 @@
           <a:p>
             <a:fld id="{78C97017-6FC3-485B-9764-EAC9E56C1D49}" type="datetimeFigureOut">
               <a:rPr lang="en-US" smtClean="0"/>
-              <a:t>10/16/2016</a:t>
+              <a:t>11/12/2018</a:t>
             </a:fld>
             <a:endParaRPr lang="en-US"/>
           </a:p>
@@ -2710,10 +2707,9 @@
           </a:lstStyle>
           <a:p>
             <a:r>
-              <a:rPr lang="en-US" smtClean="0"/>
+              <a:rPr lang="en-US"/>
               <a:t>Click to edit Master title style</a:t>
             </a:r>
-            <a:endParaRPr lang="en-US"/>
           </a:p>
         </p:txBody>
       </p:sp>
@@ -2837,7 +2833,7 @@
           <a:p>
             <a:pPr lvl="0"/>
             <a:r>
-              <a:rPr lang="en-US" smtClean="0"/>
+              <a:rPr lang="en-US"/>
               <a:t>Click to edit Master text styles</a:t>
             </a:r>
           </a:p>
@@ -2860,7 +2856,7 @@
           <a:p>
             <a:fld id="{78C97017-6FC3-485B-9764-EAC9E56C1D49}" type="datetimeFigureOut">
               <a:rPr lang="en-US" smtClean="0"/>
-              <a:t>10/16/2016</a:t>
+              <a:t>11/12/2018</a:t>
             </a:fld>
             <a:endParaRPr lang="en-US"/>
           </a:p>
@@ -2969,10 +2965,9 @@
           <a:lstStyle/>
           <a:p>
             <a:r>
-              <a:rPr lang="en-US" smtClean="0"/>
+              <a:rPr lang="en-US"/>
               <a:t>Click to edit Master title style</a:t>
             </a:r>
-            <a:endParaRPr lang="en-US"/>
           </a:p>
         </p:txBody>
       </p:sp>
@@ -3003,38 +2998,37 @@
           <a:p>
             <a:pPr lvl="0"/>
             <a:r>
-              <a:rPr lang="en-US" smtClean="0"/>
+              <a:rPr lang="en-US"/>
               <a:t>Click to edit Master text styles</a:t>
             </a:r>
           </a:p>
           <a:p>
             <a:pPr lvl="1"/>
             <a:r>
-              <a:rPr lang="en-US" smtClean="0"/>
+              <a:rPr lang="en-US"/>
               <a:t>Second level</a:t>
             </a:r>
           </a:p>
           <a:p>
             <a:pPr lvl="2"/>
             <a:r>
-              <a:rPr lang="en-US" smtClean="0"/>
+              <a:rPr lang="en-US"/>
               <a:t>Third level</a:t>
             </a:r>
           </a:p>
           <a:p>
             <a:pPr lvl="3"/>
             <a:r>
-              <a:rPr lang="en-US" smtClean="0"/>
+              <a:rPr lang="en-US"/>
               <a:t>Fourth level</a:t>
             </a:r>
           </a:p>
           <a:p>
             <a:pPr lvl="4"/>
             <a:r>
-              <a:rPr lang="en-US" smtClean="0"/>
+              <a:rPr lang="en-US"/>
               <a:t>Fifth level</a:t>
             </a:r>
-            <a:endParaRPr lang="en-US"/>
           </a:p>
         </p:txBody>
       </p:sp>
@@ -3073,7 +3067,7 @@
           <a:p>
             <a:fld id="{78C97017-6FC3-485B-9764-EAC9E56C1D49}" type="datetimeFigureOut">
               <a:rPr lang="en-US" smtClean="0"/>
-              <a:t>10/16/2016</a:t>
+              <a:t>11/12/2018</a:t>
             </a:fld>
             <a:endParaRPr lang="en-US"/>
           </a:p>
@@ -3457,7 +3451,7 @@
         <p:spPr>
           <a:xfrm>
             <a:off x="1119865" y="2086382"/>
-            <a:ext cx="7871735" cy="1723618"/>
+            <a:ext cx="7871735" cy="3983878"/>
           </a:xfrm>
           <a:prstGeom prst="roundRect">
             <a:avLst>
@@ -3494,7 +3488,7 @@
           <a:lstStyle/>
           <a:p>
             <a:r>
-              <a:rPr lang="en-US" sz="1200" b="1" dirty="0" smtClean="0">
+              <a:rPr lang="en-US" sz="1200" b="1" dirty="0">
                 <a:solidFill>
                   <a:schemeClr val="accent6">
                     <a:lumMod val="75000"/>
@@ -3561,7 +3555,7 @@
           <a:p>
             <a:pPr algn="ctr"/>
             <a:r>
-              <a:rPr lang="en-US" sz="1050" dirty="0" smtClean="0">
+              <a:rPr lang="en-US" sz="1050" dirty="0">
                 <a:solidFill>
                   <a:schemeClr val="bg1"/>
                 </a:solidFill>
@@ -3569,14 +3563,14 @@
               <a:t>&lt;&lt;interface&gt;&gt;</a:t>
             </a:r>
             <a:br>
-              <a:rPr lang="en-US" sz="1050" dirty="0" smtClean="0">
+              <a:rPr lang="en-US" sz="1050" dirty="0">
                 <a:solidFill>
                   <a:schemeClr val="bg1"/>
                 </a:solidFill>
               </a:rPr>
             </a:br>
             <a:r>
-              <a:rPr lang="en-US" sz="1050" dirty="0" err="1" smtClean="0">
+              <a:rPr lang="en-US" sz="1050" dirty="0" err="1">
                 <a:solidFill>
                   <a:schemeClr val="bg1"/>
                 </a:solidFill>
@@ -3599,8 +3593,8 @@
         </p:nvSpPr>
         <p:spPr>
           <a:xfrm rot="16200000">
-            <a:off x="1683963" y="2868687"/>
-            <a:ext cx="1093635" cy="346760"/>
+            <a:off x="506412" y="4042302"/>
+            <a:ext cx="3455838" cy="346760"/>
           </a:xfrm>
           <a:prstGeom prst="rect">
             <a:avLst/>
@@ -3639,7 +3633,7 @@
           <a:p>
             <a:pPr algn="ctr"/>
             <a:r>
-              <a:rPr lang="en-US" sz="1050" dirty="0" err="1" smtClean="0">
+              <a:rPr lang="en-US" sz="1050" dirty="0" err="1">
                 <a:solidFill>
                   <a:schemeClr val="bg1"/>
                 </a:solidFill>
@@ -3662,8 +3656,8 @@
         </p:nvSpPr>
         <p:spPr>
           <a:xfrm rot="16200000">
-            <a:off x="956202" y="2861202"/>
-            <a:ext cx="1093635" cy="346760"/>
+            <a:off x="-209256" y="4035158"/>
+            <a:ext cx="3441549" cy="346760"/>
           </a:xfrm>
           <a:prstGeom prst="rect">
             <a:avLst/>
@@ -3713,7 +3707,7 @@
           <a:p>
             <a:pPr algn="ctr"/>
             <a:r>
-              <a:rPr lang="en-US" sz="1050" dirty="0" smtClean="0">
+              <a:rPr lang="en-US" sz="1050" dirty="0">
                 <a:solidFill>
                   <a:schemeClr val="bg1"/>
                 </a:solidFill>
@@ -3736,7 +3730,7 @@
         </p:nvSpPr>
         <p:spPr>
           <a:xfrm rot="16200000">
-            <a:off x="1626910" y="2952291"/>
+            <a:off x="1643457" y="4141973"/>
             <a:ext cx="270504" cy="175523"/>
           </a:xfrm>
           <a:prstGeom prst="triangle">
@@ -3834,7 +3828,7 @@
         </p:nvCxnSpPr>
         <p:spPr>
           <a:xfrm>
-            <a:off x="910091" y="3040053"/>
+            <a:off x="905101" y="4215682"/>
             <a:ext cx="419548" cy="2860"/>
           </a:xfrm>
           <a:prstGeom prst="bentConnector3">
@@ -3873,13 +3867,13 @@
         <p:nvCxnSpPr>
           <p:cNvPr id="21" name="Straight Connector 20"/>
           <p:cNvCxnSpPr>
-            <a:stCxn id="120" idx="3"/>
+            <a:cxnSpLocks/>
           </p:cNvCxnSpPr>
           <p:nvPr/>
         </p:nvCxnSpPr>
         <p:spPr>
           <a:xfrm flipV="1">
-            <a:off x="1849924" y="3040052"/>
+            <a:off x="1877614" y="4215682"/>
             <a:ext cx="216105" cy="1"/>
           </a:xfrm>
           <a:prstGeom prst="line">
@@ -4147,7 +4141,7 @@
           <a:p>
             <a:pPr algn="ctr"/>
             <a:r>
-              <a:rPr lang="en-US" sz="1050" b="1" dirty="0" err="1" smtClean="0">
+              <a:rPr lang="en-US" sz="1050" b="1" dirty="0" err="1">
                 <a:solidFill>
                   <a:schemeClr val="accent6">
                     <a:lumMod val="75000"/>
@@ -4156,18 +4150,8 @@
               </a:rPr>
               <a:t>XmlAddressBook</a:t>
             </a:r>
-            <a:r>
-              <a:rPr lang="en-US" sz="1050" b="1" dirty="0" smtClean="0">
-                <a:solidFill>
-                  <a:schemeClr val="accent6">
-                    <a:lumMod val="75000"/>
-                  </a:schemeClr>
-                </a:solidFill>
-              </a:rPr>
-              <a:t/>
-            </a:r>
             <a:br>
-              <a:rPr lang="en-US" sz="1050" b="1" dirty="0" smtClean="0">
+              <a:rPr lang="en-US" sz="1050" b="1" dirty="0">
                 <a:solidFill>
                   <a:schemeClr val="accent6">
                     <a:lumMod val="75000"/>
@@ -4176,7 +4160,7 @@
               </a:rPr>
             </a:br>
             <a:r>
-              <a:rPr lang="en-US" sz="1050" b="1" dirty="0" smtClean="0">
+              <a:rPr lang="en-US" sz="1050" b="1" dirty="0">
                 <a:solidFill>
                   <a:schemeClr val="accent6">
                     <a:lumMod val="75000"/>
@@ -4243,7 +4227,7 @@
           <a:p>
             <a:pPr algn="ctr"/>
             <a:r>
-              <a:rPr lang="en-US" sz="1050" dirty="0" smtClean="0">
+              <a:rPr lang="en-US" sz="1050" dirty="0">
                 <a:solidFill>
                   <a:schemeClr val="bg1"/>
                 </a:solidFill>
@@ -4251,14 +4235,14 @@
               <a:t>&lt;&lt;interface&gt;&gt;</a:t>
             </a:r>
             <a:br>
-              <a:rPr lang="en-US" sz="1050" dirty="0" smtClean="0">
+              <a:rPr lang="en-US" sz="1050" dirty="0">
                 <a:solidFill>
                   <a:schemeClr val="bg1"/>
                 </a:solidFill>
               </a:rPr>
             </a:br>
             <a:r>
-              <a:rPr lang="en-US" sz="1050" dirty="0" err="1" smtClean="0">
+              <a:rPr lang="en-US" sz="1050" dirty="0" err="1">
                 <a:solidFill>
                   <a:schemeClr val="bg1"/>
                 </a:solidFill>
@@ -4516,30 +4500,22 @@
           <a:p>
             <a:pPr algn="ctr"/>
             <a:r>
-              <a:rPr lang="en-US" sz="1050" dirty="0" err="1" smtClean="0">
+              <a:rPr lang="en-US" sz="1050" dirty="0" err="1">
                 <a:solidFill>
                   <a:schemeClr val="bg1"/>
                 </a:solidFill>
               </a:rPr>
               <a:t>JsonUserPrefs</a:t>
             </a:r>
-            <a:r>
-              <a:rPr lang="en-US" sz="1050" dirty="0" smtClean="0">
-                <a:solidFill>
-                  <a:schemeClr val="bg1"/>
-                </a:solidFill>
-              </a:rPr>
-              <a:t/>
-            </a:r>
             <a:br>
-              <a:rPr lang="en-US" sz="1050" dirty="0" smtClean="0">
+              <a:rPr lang="en-US" sz="1050" dirty="0">
                 <a:solidFill>
                   <a:schemeClr val="bg1"/>
                 </a:solidFill>
               </a:rPr>
             </a:br>
             <a:r>
-              <a:rPr lang="en-US" sz="1050" dirty="0" smtClean="0">
+              <a:rPr lang="en-US" sz="1050" dirty="0">
                 <a:solidFill>
                   <a:schemeClr val="bg1"/>
                 </a:solidFill>
@@ -4591,7 +4567,7 @@
           <a:p>
             <a:pPr algn="ctr"/>
             <a:r>
-              <a:rPr lang="en-US" sz="1050" b="1" dirty="0" err="1" smtClean="0">
+              <a:rPr lang="en-US" sz="1050" b="1" dirty="0" err="1">
                 <a:solidFill>
                   <a:schemeClr val="accent6">
                     <a:lumMod val="75000"/>
@@ -4600,18 +4576,8 @@
               </a:rPr>
               <a:t>XmlSerializable</a:t>
             </a:r>
-            <a:r>
-              <a:rPr lang="en-US" sz="1050" b="1" dirty="0" smtClean="0">
-                <a:solidFill>
-                  <a:schemeClr val="accent6">
-                    <a:lumMod val="75000"/>
-                  </a:schemeClr>
-                </a:solidFill>
-              </a:rPr>
-              <a:t/>
-            </a:r>
             <a:br>
-              <a:rPr lang="en-US" sz="1050" b="1" dirty="0" smtClean="0">
+              <a:rPr lang="en-US" sz="1050" b="1" dirty="0">
                 <a:solidFill>
                   <a:schemeClr val="accent6">
                     <a:lumMod val="75000"/>
@@ -4620,7 +4586,7 @@
               </a:rPr>
             </a:br>
             <a:r>
-              <a:rPr lang="en-US" sz="1050" b="1" dirty="0" err="1" smtClean="0">
+              <a:rPr lang="en-US" sz="1050" b="1" dirty="0" err="1">
                 <a:solidFill>
                   <a:schemeClr val="accent6">
                     <a:lumMod val="75000"/>
@@ -4717,7 +4683,7 @@
           <a:p>
             <a:pPr algn="ctr"/>
             <a:r>
-              <a:rPr lang="en-US" sz="1050" b="1" dirty="0" err="1" smtClean="0">
+              <a:rPr lang="en-US" sz="1050" b="1" dirty="0" err="1">
                 <a:solidFill>
                   <a:schemeClr val="accent6">
                     <a:lumMod val="75000"/>
@@ -4773,7 +4739,7 @@
           <a:p>
             <a:pPr algn="ctr"/>
             <a:r>
-              <a:rPr lang="en-US" sz="1050" b="1" dirty="0" err="1" smtClean="0">
+              <a:rPr lang="en-US" sz="1050" b="1" dirty="0" err="1">
                 <a:solidFill>
                   <a:schemeClr val="accent6">
                     <a:lumMod val="75000"/>
@@ -4804,6 +4770,1883 @@
         <p:spPr>
           <a:xfrm flipV="1">
             <a:off x="7220507" y="3333004"/>
+            <a:ext cx="395231" cy="786"/>
+          </a:xfrm>
+          <a:prstGeom prst="bentConnector3">
+            <a:avLst>
+              <a:gd name="adj1" fmla="val 50000"/>
+            </a:avLst>
+          </a:prstGeom>
+          <a:ln w="19050">
+            <a:prstDash val="sysDot"/>
+            <a:headEnd type="none" w="med" len="med"/>
+            <a:tailEnd type="arrow" w="med" len="med"/>
+          </a:ln>
+          <a:effectLst/>
+        </p:spPr>
+        <p:style>
+          <a:lnRef idx="1">
+            <a:schemeClr val="accent6"/>
+          </a:lnRef>
+          <a:fillRef idx="2">
+            <a:schemeClr val="accent6"/>
+          </a:fillRef>
+          <a:effectRef idx="1">
+            <a:schemeClr val="accent6"/>
+          </a:effectRef>
+          <a:fontRef idx="minor">
+            <a:schemeClr val="dk1"/>
+          </a:fontRef>
+        </p:style>
+      </p:cxnSp>
+      <p:sp>
+        <p:nvSpPr>
+          <p:cNvPr id="26" name="Rectangle 8">
+            <a:extLst>
+              <a:ext uri="{FF2B5EF4-FFF2-40B4-BE49-F238E27FC236}">
+                <a16:creationId xmlns:a16="http://schemas.microsoft.com/office/drawing/2014/main" id="{B6C53FE2-B81F-4A9C-ACDB-68D33DA2EC64}"/>
+              </a:ext>
+            </a:extLst>
+          </p:cNvPr>
+          <p:cNvSpPr/>
+          <p:nvPr/>
+        </p:nvSpPr>
+        <p:spPr>
+          <a:xfrm>
+            <a:off x="2873943" y="3740023"/>
+            <a:ext cx="1323049" cy="346760"/>
+          </a:xfrm>
+          <a:prstGeom prst="rect">
+            <a:avLst/>
+          </a:prstGeom>
+          <a:solidFill>
+            <a:schemeClr val="accent6">
+              <a:lumMod val="75000"/>
+            </a:schemeClr>
+          </a:solidFill>
+          <a:ln w="19050">
+            <a:solidFill>
+              <a:schemeClr val="accent6">
+                <a:lumMod val="75000"/>
+              </a:schemeClr>
+            </a:solidFill>
+          </a:ln>
+          <a:effectLst/>
+        </p:spPr>
+        <p:style>
+          <a:lnRef idx="1">
+            <a:schemeClr val="accent2"/>
+          </a:lnRef>
+          <a:fillRef idx="2">
+            <a:schemeClr val="accent2"/>
+          </a:fillRef>
+          <a:effectRef idx="1">
+            <a:schemeClr val="accent2"/>
+          </a:effectRef>
+          <a:fontRef idx="minor">
+            <a:schemeClr val="dk1"/>
+          </a:fontRef>
+        </p:style>
+        <p:txBody>
+          <a:bodyPr rtlCol="0" anchor="ctr"/>
+          <a:lstStyle/>
+          <a:p>
+            <a:pPr algn="ctr"/>
+            <a:r>
+              <a:rPr lang="en-US" sz="1050" dirty="0">
+                <a:solidFill>
+                  <a:schemeClr val="bg1"/>
+                </a:solidFill>
+              </a:rPr>
+              <a:t>&lt;&lt;interface&gt;&gt;</a:t>
+            </a:r>
+            <a:br>
+              <a:rPr lang="en-US" sz="1050" dirty="0">
+                <a:solidFill>
+                  <a:schemeClr val="bg1"/>
+                </a:solidFill>
+              </a:rPr>
+            </a:br>
+            <a:r>
+              <a:rPr lang="en-US" sz="1050" dirty="0" err="1">
+                <a:solidFill>
+                  <a:schemeClr val="bg1"/>
+                </a:solidFill>
+              </a:rPr>
+              <a:t>CalendarStorage</a:t>
+            </a:r>
+            <a:endParaRPr lang="en-SG" sz="1050" dirty="0">
+              <a:solidFill>
+                <a:schemeClr val="bg1"/>
+              </a:solidFill>
+            </a:endParaRPr>
+          </a:p>
+        </p:txBody>
+      </p:sp>
+      <p:cxnSp>
+        <p:nvCxnSpPr>
+          <p:cNvPr id="27" name="Straight Arrow Connector 26">
+            <a:extLst>
+              <a:ext uri="{FF2B5EF4-FFF2-40B4-BE49-F238E27FC236}">
+                <a16:creationId xmlns:a16="http://schemas.microsoft.com/office/drawing/2014/main" id="{903B92AB-EDB2-49E9-9DDC-2F27ABC7E532}"/>
+              </a:ext>
+            </a:extLst>
+          </p:cNvPr>
+          <p:cNvCxnSpPr>
+            <a:stCxn id="28" idx="3"/>
+            <a:endCxn id="26" idx="1"/>
+          </p:cNvCxnSpPr>
+          <p:nvPr/>
+        </p:nvCxnSpPr>
+        <p:spPr>
+          <a:xfrm>
+            <a:off x="2653133" y="3908119"/>
+            <a:ext cx="220810" cy="5284"/>
+          </a:xfrm>
+          <a:prstGeom prst="straightConnector1">
+            <a:avLst/>
+          </a:prstGeom>
+          <a:ln w="19050">
+            <a:solidFill>
+              <a:schemeClr val="accent6">
+                <a:lumMod val="75000"/>
+              </a:schemeClr>
+            </a:solidFill>
+            <a:headEnd type="none" w="med" len="med"/>
+            <a:tailEnd type="arrow" w="med" len="med"/>
+          </a:ln>
+          <a:effectLst/>
+        </p:spPr>
+        <p:style>
+          <a:lnRef idx="1">
+            <a:schemeClr val="accent2"/>
+          </a:lnRef>
+          <a:fillRef idx="2">
+            <a:schemeClr val="accent2"/>
+          </a:fillRef>
+          <a:effectRef idx="1">
+            <a:schemeClr val="accent2"/>
+          </a:effectRef>
+          <a:fontRef idx="minor">
+            <a:schemeClr val="dk1"/>
+          </a:fontRef>
+        </p:style>
+      </p:cxnSp>
+      <p:sp>
+        <p:nvSpPr>
+          <p:cNvPr id="28" name="Flowchart: Decision 96">
+            <a:extLst>
+              <a:ext uri="{FF2B5EF4-FFF2-40B4-BE49-F238E27FC236}">
+                <a16:creationId xmlns:a16="http://schemas.microsoft.com/office/drawing/2014/main" id="{7E7B48CA-655A-4A10-B791-4E35ADEF70EB}"/>
+              </a:ext>
+            </a:extLst>
+          </p:cNvPr>
+          <p:cNvSpPr/>
+          <p:nvPr/>
+        </p:nvSpPr>
+        <p:spPr>
+          <a:xfrm>
+            <a:off x="2417085" y="3821429"/>
+            <a:ext cx="236048" cy="173380"/>
+          </a:xfrm>
+          <a:prstGeom prst="flowChartDecision">
+            <a:avLst/>
+          </a:prstGeom>
+          <a:noFill/>
+          <a:ln w="19050">
+            <a:solidFill>
+              <a:schemeClr val="accent6">
+                <a:lumMod val="75000"/>
+              </a:schemeClr>
+            </a:solidFill>
+          </a:ln>
+          <a:effectLst/>
+        </p:spPr>
+        <p:style>
+          <a:lnRef idx="1">
+            <a:schemeClr val="accent2"/>
+          </a:lnRef>
+          <a:fillRef idx="2">
+            <a:schemeClr val="accent2"/>
+          </a:fillRef>
+          <a:effectRef idx="1">
+            <a:schemeClr val="accent2"/>
+          </a:effectRef>
+          <a:fontRef idx="minor">
+            <a:schemeClr val="dk1"/>
+          </a:fontRef>
+        </p:style>
+        <p:txBody>
+          <a:bodyPr rtlCol="0" anchor="ctr"/>
+          <a:lstStyle/>
+          <a:p>
+            <a:pPr algn="ctr"/>
+            <a:endParaRPr lang="en-US" sz="1050">
+              <a:solidFill>
+                <a:schemeClr val="bg1"/>
+              </a:solidFill>
+            </a:endParaRPr>
+          </a:p>
+        </p:txBody>
+      </p:sp>
+      <p:cxnSp>
+        <p:nvCxnSpPr>
+          <p:cNvPr id="29" name="Elbow Connector 63">
+            <a:extLst>
+              <a:ext uri="{FF2B5EF4-FFF2-40B4-BE49-F238E27FC236}">
+                <a16:creationId xmlns:a16="http://schemas.microsoft.com/office/drawing/2014/main" id="{564C5AFA-509B-45A3-BF78-F8632CC75C15}"/>
+              </a:ext>
+            </a:extLst>
+          </p:cNvPr>
+          <p:cNvCxnSpPr>
+            <a:stCxn id="30" idx="3"/>
+            <a:endCxn id="31" idx="1"/>
+          </p:cNvCxnSpPr>
+          <p:nvPr/>
+        </p:nvCxnSpPr>
+        <p:spPr>
+          <a:xfrm flipV="1">
+            <a:off x="4394804" y="3913403"/>
+            <a:ext cx="223324" cy="1"/>
+          </a:xfrm>
+          <a:prstGeom prst="bentConnector3">
+            <a:avLst>
+              <a:gd name="adj1" fmla="val 50000"/>
+            </a:avLst>
+          </a:prstGeom>
+          <a:ln w="19050">
+            <a:solidFill>
+              <a:schemeClr val="accent6">
+                <a:lumMod val="75000"/>
+              </a:schemeClr>
+            </a:solidFill>
+            <a:prstDash val="sysDot"/>
+            <a:headEnd type="none" w="med" len="med"/>
+            <a:tailEnd type="none" w="med" len="med"/>
+          </a:ln>
+          <a:effectLst/>
+        </p:spPr>
+        <p:style>
+          <a:lnRef idx="1">
+            <a:schemeClr val="accent2"/>
+          </a:lnRef>
+          <a:fillRef idx="2">
+            <a:schemeClr val="accent2"/>
+          </a:fillRef>
+          <a:effectRef idx="1">
+            <a:schemeClr val="accent2"/>
+          </a:effectRef>
+          <a:fontRef idx="minor">
+            <a:schemeClr val="dk1"/>
+          </a:fontRef>
+        </p:style>
+      </p:cxnSp>
+      <p:sp>
+        <p:nvSpPr>
+          <p:cNvPr id="30" name="Isosceles Triangle 102">
+            <a:extLst>
+              <a:ext uri="{FF2B5EF4-FFF2-40B4-BE49-F238E27FC236}">
+                <a16:creationId xmlns:a16="http://schemas.microsoft.com/office/drawing/2014/main" id="{1429E53F-13AD-49A3-91E4-C9972D46AA8B}"/>
+              </a:ext>
+            </a:extLst>
+          </p:cNvPr>
+          <p:cNvSpPr/>
+          <p:nvPr/>
+        </p:nvSpPr>
+        <p:spPr>
+          <a:xfrm rot="5400000" flipV="1">
+            <a:off x="4171790" y="3825642"/>
+            <a:ext cx="270504" cy="175523"/>
+          </a:xfrm>
+          <a:prstGeom prst="triangle">
+            <a:avLst/>
+          </a:prstGeom>
+          <a:solidFill>
+            <a:schemeClr val="accent6">
+              <a:lumMod val="75000"/>
+            </a:schemeClr>
+          </a:solidFill>
+          <a:ln w="19050">
+            <a:solidFill>
+              <a:schemeClr val="accent6">
+                <a:lumMod val="75000"/>
+              </a:schemeClr>
+            </a:solidFill>
+          </a:ln>
+          <a:effectLst/>
+        </p:spPr>
+        <p:style>
+          <a:lnRef idx="1">
+            <a:schemeClr val="accent2"/>
+          </a:lnRef>
+          <a:fillRef idx="2">
+            <a:schemeClr val="accent2"/>
+          </a:fillRef>
+          <a:effectRef idx="1">
+            <a:schemeClr val="accent2"/>
+          </a:effectRef>
+          <a:fontRef idx="minor">
+            <a:schemeClr val="dk1"/>
+          </a:fontRef>
+        </p:style>
+        <p:txBody>
+          <a:bodyPr rtlCol="0" anchor="ctr"/>
+          <a:lstStyle/>
+          <a:p>
+            <a:pPr algn="ctr"/>
+            <a:endParaRPr lang="en-SG" sz="1050">
+              <a:solidFill>
+                <a:schemeClr val="bg1"/>
+              </a:solidFill>
+            </a:endParaRPr>
+          </a:p>
+        </p:txBody>
+      </p:sp>
+      <p:sp>
+        <p:nvSpPr>
+          <p:cNvPr id="31" name="Rectangle 8">
+            <a:extLst>
+              <a:ext uri="{FF2B5EF4-FFF2-40B4-BE49-F238E27FC236}">
+                <a16:creationId xmlns:a16="http://schemas.microsoft.com/office/drawing/2014/main" id="{C8F942F3-A516-4288-B4B7-45AA38B8BDA3}"/>
+              </a:ext>
+            </a:extLst>
+          </p:cNvPr>
+          <p:cNvSpPr/>
+          <p:nvPr/>
+        </p:nvSpPr>
+        <p:spPr>
+          <a:xfrm>
+            <a:off x="4618128" y="3740023"/>
+            <a:ext cx="1093635" cy="346760"/>
+          </a:xfrm>
+          <a:prstGeom prst="rect">
+            <a:avLst/>
+          </a:prstGeom>
+          <a:solidFill>
+            <a:schemeClr val="accent6">
+              <a:lumMod val="75000"/>
+            </a:schemeClr>
+          </a:solidFill>
+          <a:ln w="19050">
+            <a:solidFill>
+              <a:schemeClr val="accent6">
+                <a:lumMod val="75000"/>
+              </a:schemeClr>
+            </a:solidFill>
+          </a:ln>
+          <a:effectLst/>
+        </p:spPr>
+        <p:style>
+          <a:lnRef idx="1">
+            <a:schemeClr val="accent2"/>
+          </a:lnRef>
+          <a:fillRef idx="2">
+            <a:schemeClr val="accent2"/>
+          </a:fillRef>
+          <a:effectRef idx="1">
+            <a:schemeClr val="accent2"/>
+          </a:effectRef>
+          <a:fontRef idx="minor">
+            <a:schemeClr val="dk1"/>
+          </a:fontRef>
+        </p:style>
+        <p:txBody>
+          <a:bodyPr rtlCol="0" anchor="ctr"/>
+          <a:lstStyle/>
+          <a:p>
+            <a:pPr algn="ctr"/>
+            <a:r>
+              <a:rPr lang="en-US" sz="1050" dirty="0" err="1">
+                <a:solidFill>
+                  <a:schemeClr val="bg1"/>
+                </a:solidFill>
+              </a:rPr>
+              <a:t>IcsCalendar</a:t>
+            </a:r>
+            <a:endParaRPr lang="en-US" sz="1050" dirty="0">
+              <a:solidFill>
+                <a:schemeClr val="bg1"/>
+              </a:solidFill>
+            </a:endParaRPr>
+          </a:p>
+          <a:p>
+            <a:pPr algn="ctr"/>
+            <a:r>
+              <a:rPr lang="en-US" sz="1050" dirty="0">
+                <a:solidFill>
+                  <a:schemeClr val="bg1"/>
+                </a:solidFill>
+              </a:rPr>
+              <a:t>Storage</a:t>
+            </a:r>
+            <a:endParaRPr lang="en-SG" sz="1050" dirty="0">
+              <a:solidFill>
+                <a:schemeClr val="bg1"/>
+              </a:solidFill>
+            </a:endParaRPr>
+          </a:p>
+        </p:txBody>
+      </p:sp>
+      <p:sp>
+        <p:nvSpPr>
+          <p:cNvPr id="32" name="Rectangle 8">
+            <a:extLst>
+              <a:ext uri="{FF2B5EF4-FFF2-40B4-BE49-F238E27FC236}">
+                <a16:creationId xmlns:a16="http://schemas.microsoft.com/office/drawing/2014/main" id="{44AAE26F-7EBF-47A7-9AD3-AF383CBEB7EC}"/>
+              </a:ext>
+            </a:extLst>
+          </p:cNvPr>
+          <p:cNvSpPr/>
+          <p:nvPr/>
+        </p:nvSpPr>
+        <p:spPr>
+          <a:xfrm>
+            <a:off x="2872662" y="4283581"/>
+            <a:ext cx="1323049" cy="346760"/>
+          </a:xfrm>
+          <a:prstGeom prst="rect">
+            <a:avLst/>
+          </a:prstGeom>
+          <a:solidFill>
+            <a:schemeClr val="accent6">
+              <a:lumMod val="75000"/>
+            </a:schemeClr>
+          </a:solidFill>
+          <a:ln w="19050">
+            <a:solidFill>
+              <a:schemeClr val="accent6">
+                <a:lumMod val="75000"/>
+              </a:schemeClr>
+            </a:solidFill>
+          </a:ln>
+          <a:effectLst/>
+        </p:spPr>
+        <p:style>
+          <a:lnRef idx="1">
+            <a:schemeClr val="accent2"/>
+          </a:lnRef>
+          <a:fillRef idx="2">
+            <a:schemeClr val="accent2"/>
+          </a:fillRef>
+          <a:effectRef idx="1">
+            <a:schemeClr val="accent2"/>
+          </a:effectRef>
+          <a:fontRef idx="minor">
+            <a:schemeClr val="dk1"/>
+          </a:fontRef>
+        </p:style>
+        <p:txBody>
+          <a:bodyPr rtlCol="0" anchor="ctr"/>
+          <a:lstStyle/>
+          <a:p>
+            <a:pPr algn="ctr"/>
+            <a:r>
+              <a:rPr lang="en-US" sz="1050" dirty="0">
+                <a:solidFill>
+                  <a:schemeClr val="bg1"/>
+                </a:solidFill>
+              </a:rPr>
+              <a:t>&lt;&lt;interface&gt;&gt;</a:t>
+            </a:r>
+            <a:br>
+              <a:rPr lang="en-US" sz="1050" dirty="0">
+                <a:solidFill>
+                  <a:schemeClr val="bg1"/>
+                </a:solidFill>
+              </a:rPr>
+            </a:br>
+            <a:r>
+              <a:rPr lang="en-US" sz="1050" dirty="0" err="1">
+                <a:solidFill>
+                  <a:schemeClr val="bg1"/>
+                </a:solidFill>
+              </a:rPr>
+              <a:t>EmailStorage</a:t>
+            </a:r>
+            <a:endParaRPr lang="en-SG" sz="1050" dirty="0">
+              <a:solidFill>
+                <a:schemeClr val="bg1"/>
+              </a:solidFill>
+            </a:endParaRPr>
+          </a:p>
+        </p:txBody>
+      </p:sp>
+      <p:cxnSp>
+        <p:nvCxnSpPr>
+          <p:cNvPr id="33" name="Straight Arrow Connector 32">
+            <a:extLst>
+              <a:ext uri="{FF2B5EF4-FFF2-40B4-BE49-F238E27FC236}">
+                <a16:creationId xmlns:a16="http://schemas.microsoft.com/office/drawing/2014/main" id="{FA7B32E7-03A6-4998-BB46-5DABFA797326}"/>
+              </a:ext>
+            </a:extLst>
+          </p:cNvPr>
+          <p:cNvCxnSpPr>
+            <a:stCxn id="34" idx="3"/>
+            <a:endCxn id="32" idx="1"/>
+          </p:cNvCxnSpPr>
+          <p:nvPr/>
+        </p:nvCxnSpPr>
+        <p:spPr>
+          <a:xfrm>
+            <a:off x="2651852" y="4451677"/>
+            <a:ext cx="220810" cy="5284"/>
+          </a:xfrm>
+          <a:prstGeom prst="straightConnector1">
+            <a:avLst/>
+          </a:prstGeom>
+          <a:ln w="19050">
+            <a:solidFill>
+              <a:schemeClr val="accent6">
+                <a:lumMod val="75000"/>
+              </a:schemeClr>
+            </a:solidFill>
+            <a:headEnd type="none" w="med" len="med"/>
+            <a:tailEnd type="arrow" w="med" len="med"/>
+          </a:ln>
+          <a:effectLst/>
+        </p:spPr>
+        <p:style>
+          <a:lnRef idx="1">
+            <a:schemeClr val="accent2"/>
+          </a:lnRef>
+          <a:fillRef idx="2">
+            <a:schemeClr val="accent2"/>
+          </a:fillRef>
+          <a:effectRef idx="1">
+            <a:schemeClr val="accent2"/>
+          </a:effectRef>
+          <a:fontRef idx="minor">
+            <a:schemeClr val="dk1"/>
+          </a:fontRef>
+        </p:style>
+      </p:cxnSp>
+      <p:sp>
+        <p:nvSpPr>
+          <p:cNvPr id="34" name="Flowchart: Decision 96">
+            <a:extLst>
+              <a:ext uri="{FF2B5EF4-FFF2-40B4-BE49-F238E27FC236}">
+                <a16:creationId xmlns:a16="http://schemas.microsoft.com/office/drawing/2014/main" id="{24ACCF21-DB7E-431E-A30F-9B340265983F}"/>
+              </a:ext>
+            </a:extLst>
+          </p:cNvPr>
+          <p:cNvSpPr/>
+          <p:nvPr/>
+        </p:nvSpPr>
+        <p:spPr>
+          <a:xfrm>
+            <a:off x="2415804" y="4364987"/>
+            <a:ext cx="236048" cy="173380"/>
+          </a:xfrm>
+          <a:prstGeom prst="flowChartDecision">
+            <a:avLst/>
+          </a:prstGeom>
+          <a:noFill/>
+          <a:ln w="19050">
+            <a:solidFill>
+              <a:schemeClr val="accent6">
+                <a:lumMod val="75000"/>
+              </a:schemeClr>
+            </a:solidFill>
+          </a:ln>
+          <a:effectLst/>
+        </p:spPr>
+        <p:style>
+          <a:lnRef idx="1">
+            <a:schemeClr val="accent2"/>
+          </a:lnRef>
+          <a:fillRef idx="2">
+            <a:schemeClr val="accent2"/>
+          </a:fillRef>
+          <a:effectRef idx="1">
+            <a:schemeClr val="accent2"/>
+          </a:effectRef>
+          <a:fontRef idx="minor">
+            <a:schemeClr val="dk1"/>
+          </a:fontRef>
+        </p:style>
+        <p:txBody>
+          <a:bodyPr rtlCol="0" anchor="ctr"/>
+          <a:lstStyle/>
+          <a:p>
+            <a:pPr algn="ctr"/>
+            <a:endParaRPr lang="en-US" sz="1050">
+              <a:solidFill>
+                <a:schemeClr val="bg1"/>
+              </a:solidFill>
+            </a:endParaRPr>
+          </a:p>
+        </p:txBody>
+      </p:sp>
+      <p:cxnSp>
+        <p:nvCxnSpPr>
+          <p:cNvPr id="35" name="Elbow Connector 63">
+            <a:extLst>
+              <a:ext uri="{FF2B5EF4-FFF2-40B4-BE49-F238E27FC236}">
+                <a16:creationId xmlns:a16="http://schemas.microsoft.com/office/drawing/2014/main" id="{3AFF04D7-E950-4590-9F6F-31B2B1BF51F4}"/>
+              </a:ext>
+            </a:extLst>
+          </p:cNvPr>
+          <p:cNvCxnSpPr>
+            <a:stCxn id="36" idx="3"/>
+            <a:endCxn id="37" idx="1"/>
+          </p:cNvCxnSpPr>
+          <p:nvPr/>
+        </p:nvCxnSpPr>
+        <p:spPr>
+          <a:xfrm flipV="1">
+            <a:off x="4393523" y="4456961"/>
+            <a:ext cx="223324" cy="1"/>
+          </a:xfrm>
+          <a:prstGeom prst="bentConnector3">
+            <a:avLst>
+              <a:gd name="adj1" fmla="val 50000"/>
+            </a:avLst>
+          </a:prstGeom>
+          <a:ln w="19050">
+            <a:solidFill>
+              <a:schemeClr val="accent6">
+                <a:lumMod val="75000"/>
+              </a:schemeClr>
+            </a:solidFill>
+            <a:prstDash val="sysDot"/>
+            <a:headEnd type="none" w="med" len="med"/>
+            <a:tailEnd type="none" w="med" len="med"/>
+          </a:ln>
+          <a:effectLst/>
+        </p:spPr>
+        <p:style>
+          <a:lnRef idx="1">
+            <a:schemeClr val="accent2"/>
+          </a:lnRef>
+          <a:fillRef idx="2">
+            <a:schemeClr val="accent2"/>
+          </a:fillRef>
+          <a:effectRef idx="1">
+            <a:schemeClr val="accent2"/>
+          </a:effectRef>
+          <a:fontRef idx="minor">
+            <a:schemeClr val="dk1"/>
+          </a:fontRef>
+        </p:style>
+      </p:cxnSp>
+      <p:sp>
+        <p:nvSpPr>
+          <p:cNvPr id="36" name="Isosceles Triangle 102">
+            <a:extLst>
+              <a:ext uri="{FF2B5EF4-FFF2-40B4-BE49-F238E27FC236}">
+                <a16:creationId xmlns:a16="http://schemas.microsoft.com/office/drawing/2014/main" id="{61B57E67-6B48-4517-93AB-0C1E9B972D9B}"/>
+              </a:ext>
+            </a:extLst>
+          </p:cNvPr>
+          <p:cNvSpPr/>
+          <p:nvPr/>
+        </p:nvSpPr>
+        <p:spPr>
+          <a:xfrm rot="5400000" flipV="1">
+            <a:off x="4170509" y="4369200"/>
+            <a:ext cx="270504" cy="175523"/>
+          </a:xfrm>
+          <a:prstGeom prst="triangle">
+            <a:avLst/>
+          </a:prstGeom>
+          <a:solidFill>
+            <a:schemeClr val="accent6">
+              <a:lumMod val="75000"/>
+            </a:schemeClr>
+          </a:solidFill>
+          <a:ln w="19050">
+            <a:solidFill>
+              <a:schemeClr val="accent6">
+                <a:lumMod val="75000"/>
+              </a:schemeClr>
+            </a:solidFill>
+          </a:ln>
+          <a:effectLst/>
+        </p:spPr>
+        <p:style>
+          <a:lnRef idx="1">
+            <a:schemeClr val="accent2"/>
+          </a:lnRef>
+          <a:fillRef idx="2">
+            <a:schemeClr val="accent2"/>
+          </a:fillRef>
+          <a:effectRef idx="1">
+            <a:schemeClr val="accent2"/>
+          </a:effectRef>
+          <a:fontRef idx="minor">
+            <a:schemeClr val="dk1"/>
+          </a:fontRef>
+        </p:style>
+        <p:txBody>
+          <a:bodyPr rtlCol="0" anchor="ctr"/>
+          <a:lstStyle/>
+          <a:p>
+            <a:pPr algn="ctr"/>
+            <a:endParaRPr lang="en-SG" sz="1050">
+              <a:solidFill>
+                <a:schemeClr val="bg1"/>
+              </a:solidFill>
+            </a:endParaRPr>
+          </a:p>
+        </p:txBody>
+      </p:sp>
+      <p:sp>
+        <p:nvSpPr>
+          <p:cNvPr id="37" name="Rectangle 8">
+            <a:extLst>
+              <a:ext uri="{FF2B5EF4-FFF2-40B4-BE49-F238E27FC236}">
+                <a16:creationId xmlns:a16="http://schemas.microsoft.com/office/drawing/2014/main" id="{EEFE3555-C5B5-47D0-ABCF-71A22834F3D5}"/>
+              </a:ext>
+            </a:extLst>
+          </p:cNvPr>
+          <p:cNvSpPr/>
+          <p:nvPr/>
+        </p:nvSpPr>
+        <p:spPr>
+          <a:xfrm>
+            <a:off x="4616847" y="4283581"/>
+            <a:ext cx="1093635" cy="346760"/>
+          </a:xfrm>
+          <a:prstGeom prst="rect">
+            <a:avLst/>
+          </a:prstGeom>
+          <a:solidFill>
+            <a:schemeClr val="accent6">
+              <a:lumMod val="75000"/>
+            </a:schemeClr>
+          </a:solidFill>
+          <a:ln w="19050">
+            <a:solidFill>
+              <a:schemeClr val="accent6">
+                <a:lumMod val="75000"/>
+              </a:schemeClr>
+            </a:solidFill>
+          </a:ln>
+          <a:effectLst/>
+        </p:spPr>
+        <p:style>
+          <a:lnRef idx="1">
+            <a:schemeClr val="accent2"/>
+          </a:lnRef>
+          <a:fillRef idx="2">
+            <a:schemeClr val="accent2"/>
+          </a:fillRef>
+          <a:effectRef idx="1">
+            <a:schemeClr val="accent2"/>
+          </a:effectRef>
+          <a:fontRef idx="minor">
+            <a:schemeClr val="dk1"/>
+          </a:fontRef>
+        </p:style>
+        <p:txBody>
+          <a:bodyPr rtlCol="0" anchor="ctr"/>
+          <a:lstStyle/>
+          <a:p>
+            <a:pPr algn="ctr"/>
+            <a:r>
+              <a:rPr lang="en-US" sz="1050" dirty="0" err="1">
+                <a:solidFill>
+                  <a:schemeClr val="bg1"/>
+                </a:solidFill>
+              </a:rPr>
+              <a:t>EmailDir</a:t>
+            </a:r>
+            <a:endParaRPr lang="en-US" sz="1050" dirty="0">
+              <a:solidFill>
+                <a:schemeClr val="bg1"/>
+              </a:solidFill>
+            </a:endParaRPr>
+          </a:p>
+          <a:p>
+            <a:pPr algn="ctr"/>
+            <a:r>
+              <a:rPr lang="en-US" sz="1050" dirty="0">
+                <a:solidFill>
+                  <a:schemeClr val="bg1"/>
+                </a:solidFill>
+              </a:rPr>
+              <a:t>Storage</a:t>
+            </a:r>
+            <a:endParaRPr lang="en-SG" sz="1050" dirty="0">
+              <a:solidFill>
+                <a:schemeClr val="bg1"/>
+              </a:solidFill>
+            </a:endParaRPr>
+          </a:p>
+        </p:txBody>
+      </p:sp>
+      <p:sp>
+        <p:nvSpPr>
+          <p:cNvPr id="38" name="Rectangle 8">
+            <a:extLst>
+              <a:ext uri="{FF2B5EF4-FFF2-40B4-BE49-F238E27FC236}">
+                <a16:creationId xmlns:a16="http://schemas.microsoft.com/office/drawing/2014/main" id="{6E3EE044-7EFE-460D-8858-2C431E2ADDF9}"/>
+              </a:ext>
+            </a:extLst>
+          </p:cNvPr>
+          <p:cNvSpPr/>
+          <p:nvPr/>
+        </p:nvSpPr>
+        <p:spPr>
+          <a:xfrm>
+            <a:off x="2878058" y="5459773"/>
+            <a:ext cx="1323049" cy="346760"/>
+          </a:xfrm>
+          <a:prstGeom prst="rect">
+            <a:avLst/>
+          </a:prstGeom>
+          <a:solidFill>
+            <a:schemeClr val="accent6">
+              <a:lumMod val="75000"/>
+            </a:schemeClr>
+          </a:solidFill>
+          <a:ln w="19050">
+            <a:solidFill>
+              <a:schemeClr val="accent6">
+                <a:lumMod val="75000"/>
+              </a:schemeClr>
+            </a:solidFill>
+          </a:ln>
+          <a:effectLst/>
+        </p:spPr>
+        <p:style>
+          <a:lnRef idx="1">
+            <a:schemeClr val="accent2"/>
+          </a:lnRef>
+          <a:fillRef idx="2">
+            <a:schemeClr val="accent2"/>
+          </a:fillRef>
+          <a:effectRef idx="1">
+            <a:schemeClr val="accent2"/>
+          </a:effectRef>
+          <a:fontRef idx="minor">
+            <a:schemeClr val="dk1"/>
+          </a:fontRef>
+        </p:style>
+        <p:txBody>
+          <a:bodyPr rtlCol="0" anchor="ctr"/>
+          <a:lstStyle/>
+          <a:p>
+            <a:pPr algn="ctr"/>
+            <a:r>
+              <a:rPr lang="en-US" sz="1050" dirty="0">
+                <a:solidFill>
+                  <a:schemeClr val="bg1"/>
+                </a:solidFill>
+              </a:rPr>
+              <a:t>&lt;&lt;interface&gt;&gt;</a:t>
+            </a:r>
+          </a:p>
+          <a:p>
+            <a:pPr algn="ctr"/>
+            <a:r>
+              <a:rPr lang="en-US" sz="1050" dirty="0" err="1">
+                <a:solidFill>
+                  <a:schemeClr val="bg1"/>
+                </a:solidFill>
+              </a:rPr>
+              <a:t>BudgetBookStorage</a:t>
+            </a:r>
+            <a:endParaRPr lang="en-SG" sz="1050" dirty="0">
+              <a:solidFill>
+                <a:schemeClr val="bg1"/>
+              </a:solidFill>
+            </a:endParaRPr>
+          </a:p>
+        </p:txBody>
+      </p:sp>
+      <p:cxnSp>
+        <p:nvCxnSpPr>
+          <p:cNvPr id="39" name="Straight Arrow Connector 38">
+            <a:extLst>
+              <a:ext uri="{FF2B5EF4-FFF2-40B4-BE49-F238E27FC236}">
+                <a16:creationId xmlns:a16="http://schemas.microsoft.com/office/drawing/2014/main" id="{2E7079F3-CC30-4415-85CE-D866DC1F1D2E}"/>
+              </a:ext>
+            </a:extLst>
+          </p:cNvPr>
+          <p:cNvCxnSpPr>
+            <a:stCxn id="40" idx="3"/>
+            <a:endCxn id="38" idx="1"/>
+          </p:cNvCxnSpPr>
+          <p:nvPr/>
+        </p:nvCxnSpPr>
+        <p:spPr>
+          <a:xfrm>
+            <a:off x="2657248" y="5627869"/>
+            <a:ext cx="220810" cy="5284"/>
+          </a:xfrm>
+          <a:prstGeom prst="straightConnector1">
+            <a:avLst/>
+          </a:prstGeom>
+          <a:ln w="19050">
+            <a:solidFill>
+              <a:schemeClr val="accent6">
+                <a:lumMod val="75000"/>
+              </a:schemeClr>
+            </a:solidFill>
+            <a:headEnd type="none" w="med" len="med"/>
+            <a:tailEnd type="arrow" w="med" len="med"/>
+          </a:ln>
+          <a:effectLst/>
+        </p:spPr>
+        <p:style>
+          <a:lnRef idx="1">
+            <a:schemeClr val="accent2"/>
+          </a:lnRef>
+          <a:fillRef idx="2">
+            <a:schemeClr val="accent2"/>
+          </a:fillRef>
+          <a:effectRef idx="1">
+            <a:schemeClr val="accent2"/>
+          </a:effectRef>
+          <a:fontRef idx="minor">
+            <a:schemeClr val="dk1"/>
+          </a:fontRef>
+        </p:style>
+      </p:cxnSp>
+      <p:sp>
+        <p:nvSpPr>
+          <p:cNvPr id="40" name="Flowchart: Decision 96">
+            <a:extLst>
+              <a:ext uri="{FF2B5EF4-FFF2-40B4-BE49-F238E27FC236}">
+                <a16:creationId xmlns:a16="http://schemas.microsoft.com/office/drawing/2014/main" id="{AF1ADD3B-1A3C-4DE6-91F6-E190AD95A43E}"/>
+              </a:ext>
+            </a:extLst>
+          </p:cNvPr>
+          <p:cNvSpPr/>
+          <p:nvPr/>
+        </p:nvSpPr>
+        <p:spPr>
+          <a:xfrm>
+            <a:off x="2421200" y="5541179"/>
+            <a:ext cx="236048" cy="173380"/>
+          </a:xfrm>
+          <a:prstGeom prst="flowChartDecision">
+            <a:avLst/>
+          </a:prstGeom>
+          <a:noFill/>
+          <a:ln w="19050">
+            <a:solidFill>
+              <a:schemeClr val="accent6">
+                <a:lumMod val="75000"/>
+              </a:schemeClr>
+            </a:solidFill>
+          </a:ln>
+          <a:effectLst/>
+        </p:spPr>
+        <p:style>
+          <a:lnRef idx="1">
+            <a:schemeClr val="accent2"/>
+          </a:lnRef>
+          <a:fillRef idx="2">
+            <a:schemeClr val="accent2"/>
+          </a:fillRef>
+          <a:effectRef idx="1">
+            <a:schemeClr val="accent2"/>
+          </a:effectRef>
+          <a:fontRef idx="minor">
+            <a:schemeClr val="dk1"/>
+          </a:fontRef>
+        </p:style>
+        <p:txBody>
+          <a:bodyPr rtlCol="0" anchor="ctr"/>
+          <a:lstStyle/>
+          <a:p>
+            <a:pPr algn="ctr"/>
+            <a:endParaRPr lang="en-US" sz="1050">
+              <a:solidFill>
+                <a:schemeClr val="bg1"/>
+              </a:solidFill>
+            </a:endParaRPr>
+          </a:p>
+        </p:txBody>
+      </p:sp>
+      <p:cxnSp>
+        <p:nvCxnSpPr>
+          <p:cNvPr id="41" name="Elbow Connector 63">
+            <a:extLst>
+              <a:ext uri="{FF2B5EF4-FFF2-40B4-BE49-F238E27FC236}">
+                <a16:creationId xmlns:a16="http://schemas.microsoft.com/office/drawing/2014/main" id="{79BEB1C1-1B00-4370-9EB5-4C729B3612B0}"/>
+              </a:ext>
+            </a:extLst>
+          </p:cNvPr>
+          <p:cNvCxnSpPr>
+            <a:stCxn id="43" idx="3"/>
+            <a:endCxn id="45" idx="1"/>
+          </p:cNvCxnSpPr>
+          <p:nvPr/>
+        </p:nvCxnSpPr>
+        <p:spPr>
+          <a:xfrm flipV="1">
+            <a:off x="4398919" y="5633153"/>
+            <a:ext cx="223324" cy="1"/>
+          </a:xfrm>
+          <a:prstGeom prst="bentConnector3">
+            <a:avLst>
+              <a:gd name="adj1" fmla="val 50000"/>
+            </a:avLst>
+          </a:prstGeom>
+          <a:ln w="19050">
+            <a:solidFill>
+              <a:schemeClr val="accent6">
+                <a:lumMod val="75000"/>
+              </a:schemeClr>
+            </a:solidFill>
+            <a:prstDash val="sysDot"/>
+            <a:headEnd type="none" w="med" len="med"/>
+            <a:tailEnd type="none" w="med" len="med"/>
+          </a:ln>
+          <a:effectLst/>
+        </p:spPr>
+        <p:style>
+          <a:lnRef idx="1">
+            <a:schemeClr val="accent2"/>
+          </a:lnRef>
+          <a:fillRef idx="2">
+            <a:schemeClr val="accent2"/>
+          </a:fillRef>
+          <a:effectRef idx="1">
+            <a:schemeClr val="accent2"/>
+          </a:effectRef>
+          <a:fontRef idx="minor">
+            <a:schemeClr val="dk1"/>
+          </a:fontRef>
+        </p:style>
+      </p:cxnSp>
+      <p:sp>
+        <p:nvSpPr>
+          <p:cNvPr id="43" name="Isosceles Triangle 102">
+            <a:extLst>
+              <a:ext uri="{FF2B5EF4-FFF2-40B4-BE49-F238E27FC236}">
+                <a16:creationId xmlns:a16="http://schemas.microsoft.com/office/drawing/2014/main" id="{C94BAC32-1D0E-4755-ACA6-AFFE25BF15E4}"/>
+              </a:ext>
+            </a:extLst>
+          </p:cNvPr>
+          <p:cNvSpPr/>
+          <p:nvPr/>
+        </p:nvSpPr>
+        <p:spPr>
+          <a:xfrm rot="5400000" flipV="1">
+            <a:off x="4175905" y="5545392"/>
+            <a:ext cx="270504" cy="175523"/>
+          </a:xfrm>
+          <a:prstGeom prst="triangle">
+            <a:avLst/>
+          </a:prstGeom>
+          <a:solidFill>
+            <a:schemeClr val="accent6">
+              <a:lumMod val="75000"/>
+            </a:schemeClr>
+          </a:solidFill>
+          <a:ln w="19050">
+            <a:solidFill>
+              <a:schemeClr val="accent6">
+                <a:lumMod val="75000"/>
+              </a:schemeClr>
+            </a:solidFill>
+          </a:ln>
+          <a:effectLst/>
+        </p:spPr>
+        <p:style>
+          <a:lnRef idx="1">
+            <a:schemeClr val="accent2"/>
+          </a:lnRef>
+          <a:fillRef idx="2">
+            <a:schemeClr val="accent2"/>
+          </a:fillRef>
+          <a:effectRef idx="1">
+            <a:schemeClr val="accent2"/>
+          </a:effectRef>
+          <a:fontRef idx="minor">
+            <a:schemeClr val="dk1"/>
+          </a:fontRef>
+        </p:style>
+        <p:txBody>
+          <a:bodyPr rtlCol="0" anchor="ctr"/>
+          <a:lstStyle/>
+          <a:p>
+            <a:pPr algn="ctr"/>
+            <a:endParaRPr lang="en-SG" sz="1050">
+              <a:solidFill>
+                <a:schemeClr val="bg1"/>
+              </a:solidFill>
+            </a:endParaRPr>
+          </a:p>
+        </p:txBody>
+      </p:sp>
+      <p:cxnSp>
+        <p:nvCxnSpPr>
+          <p:cNvPr id="44" name="Elbow Connector 122">
+            <a:extLst>
+              <a:ext uri="{FF2B5EF4-FFF2-40B4-BE49-F238E27FC236}">
+                <a16:creationId xmlns:a16="http://schemas.microsoft.com/office/drawing/2014/main" id="{7542BAE2-FF11-4300-90E2-BDFB954DEE61}"/>
+              </a:ext>
+            </a:extLst>
+          </p:cNvPr>
+          <p:cNvCxnSpPr>
+            <a:stCxn id="45" idx="3"/>
+            <a:endCxn id="55" idx="1"/>
+          </p:cNvCxnSpPr>
+          <p:nvPr/>
+        </p:nvCxnSpPr>
+        <p:spPr>
+          <a:xfrm>
+            <a:off x="5792078" y="5633153"/>
+            <a:ext cx="228600" cy="1970"/>
+          </a:xfrm>
+          <a:prstGeom prst="bentConnector3">
+            <a:avLst>
+              <a:gd name="adj1" fmla="val 50000"/>
+            </a:avLst>
+          </a:prstGeom>
+          <a:ln w="19050">
+            <a:solidFill>
+              <a:schemeClr val="accent6">
+                <a:lumMod val="75000"/>
+              </a:schemeClr>
+            </a:solidFill>
+            <a:prstDash val="sysDot"/>
+            <a:headEnd type="none" w="med" len="med"/>
+            <a:tailEnd type="arrow" w="med" len="med"/>
+          </a:ln>
+          <a:effectLst/>
+        </p:spPr>
+        <p:style>
+          <a:lnRef idx="1">
+            <a:schemeClr val="accent2"/>
+          </a:lnRef>
+          <a:fillRef idx="2">
+            <a:schemeClr val="accent2"/>
+          </a:fillRef>
+          <a:effectRef idx="1">
+            <a:schemeClr val="accent2"/>
+          </a:effectRef>
+          <a:fontRef idx="minor">
+            <a:schemeClr val="dk1"/>
+          </a:fontRef>
+        </p:style>
+      </p:cxnSp>
+      <p:sp>
+        <p:nvSpPr>
+          <p:cNvPr id="45" name="Rectangle 8">
+            <a:extLst>
+              <a:ext uri="{FF2B5EF4-FFF2-40B4-BE49-F238E27FC236}">
+                <a16:creationId xmlns:a16="http://schemas.microsoft.com/office/drawing/2014/main" id="{4AA4C0AE-2CFF-4A56-9D9D-E9D1FE372117}"/>
+              </a:ext>
+            </a:extLst>
+          </p:cNvPr>
+          <p:cNvSpPr/>
+          <p:nvPr/>
+        </p:nvSpPr>
+        <p:spPr>
+          <a:xfrm>
+            <a:off x="4622243" y="5459773"/>
+            <a:ext cx="1169835" cy="346760"/>
+          </a:xfrm>
+          <a:prstGeom prst="rect">
+            <a:avLst/>
+          </a:prstGeom>
+          <a:ln w="19050"/>
+          <a:effectLst/>
+        </p:spPr>
+        <p:style>
+          <a:lnRef idx="1">
+            <a:schemeClr val="accent6"/>
+          </a:lnRef>
+          <a:fillRef idx="2">
+            <a:schemeClr val="accent6"/>
+          </a:fillRef>
+          <a:effectRef idx="1">
+            <a:schemeClr val="accent6"/>
+          </a:effectRef>
+          <a:fontRef idx="minor">
+            <a:schemeClr val="dk1"/>
+          </a:fontRef>
+        </p:style>
+        <p:txBody>
+          <a:bodyPr rtlCol="0" anchor="ctr"/>
+          <a:lstStyle/>
+          <a:p>
+            <a:pPr algn="ctr"/>
+            <a:r>
+              <a:rPr lang="en-US" sz="1050" b="1" dirty="0" err="1">
+                <a:solidFill>
+                  <a:schemeClr val="accent6">
+                    <a:lumMod val="75000"/>
+                  </a:schemeClr>
+                </a:solidFill>
+              </a:rPr>
+              <a:t>XmlBudgetBook</a:t>
+            </a:r>
+            <a:br>
+              <a:rPr lang="en-US" sz="1050" b="1" dirty="0">
+                <a:solidFill>
+                  <a:schemeClr val="accent6">
+                    <a:lumMod val="75000"/>
+                  </a:schemeClr>
+                </a:solidFill>
+              </a:rPr>
+            </a:br>
+            <a:r>
+              <a:rPr lang="en-US" sz="1050" b="1" dirty="0">
+                <a:solidFill>
+                  <a:schemeClr val="accent6">
+                    <a:lumMod val="75000"/>
+                  </a:schemeClr>
+                </a:solidFill>
+              </a:rPr>
+              <a:t>Storage</a:t>
+            </a:r>
+            <a:endParaRPr lang="en-SG" sz="1050" b="1" dirty="0">
+              <a:solidFill>
+                <a:schemeClr val="accent6">
+                  <a:lumMod val="75000"/>
+                </a:schemeClr>
+              </a:solidFill>
+            </a:endParaRPr>
+          </a:p>
+        </p:txBody>
+      </p:sp>
+      <p:sp>
+        <p:nvSpPr>
+          <p:cNvPr id="46" name="Rectangle 8">
+            <a:extLst>
+              <a:ext uri="{FF2B5EF4-FFF2-40B4-BE49-F238E27FC236}">
+                <a16:creationId xmlns:a16="http://schemas.microsoft.com/office/drawing/2014/main" id="{6E6666B6-9C46-4D12-8BF8-9AEE8CD94438}"/>
+              </a:ext>
+            </a:extLst>
+          </p:cNvPr>
+          <p:cNvSpPr/>
+          <p:nvPr/>
+        </p:nvSpPr>
+        <p:spPr>
+          <a:xfrm>
+            <a:off x="2874821" y="4859373"/>
+            <a:ext cx="1323049" cy="346760"/>
+          </a:xfrm>
+          <a:prstGeom prst="rect">
+            <a:avLst/>
+          </a:prstGeom>
+          <a:solidFill>
+            <a:schemeClr val="accent6">
+              <a:lumMod val="75000"/>
+            </a:schemeClr>
+          </a:solidFill>
+          <a:ln w="19050">
+            <a:solidFill>
+              <a:schemeClr val="accent6">
+                <a:lumMod val="75000"/>
+              </a:schemeClr>
+            </a:solidFill>
+          </a:ln>
+          <a:effectLst/>
+        </p:spPr>
+        <p:style>
+          <a:lnRef idx="1">
+            <a:schemeClr val="accent2"/>
+          </a:lnRef>
+          <a:fillRef idx="2">
+            <a:schemeClr val="accent2"/>
+          </a:fillRef>
+          <a:effectRef idx="1">
+            <a:schemeClr val="accent2"/>
+          </a:effectRef>
+          <a:fontRef idx="minor">
+            <a:schemeClr val="dk1"/>
+          </a:fontRef>
+        </p:style>
+        <p:txBody>
+          <a:bodyPr rtlCol="0" anchor="ctr"/>
+          <a:lstStyle/>
+          <a:p>
+            <a:pPr algn="ctr"/>
+            <a:r>
+              <a:rPr lang="en-US" sz="1050" dirty="0">
+                <a:solidFill>
+                  <a:schemeClr val="bg1"/>
+                </a:solidFill>
+              </a:rPr>
+              <a:t>&lt;&lt;interface&gt;&gt;</a:t>
+            </a:r>
+          </a:p>
+          <a:p>
+            <a:pPr algn="ctr"/>
+            <a:r>
+              <a:rPr lang="en-US" sz="1000" dirty="0" err="1">
+                <a:solidFill>
+                  <a:schemeClr val="bg1"/>
+                </a:solidFill>
+              </a:rPr>
+              <a:t>ProfilePictureStorage</a:t>
+            </a:r>
+            <a:endParaRPr lang="en-SG" sz="1000" dirty="0">
+              <a:solidFill>
+                <a:schemeClr val="bg1"/>
+              </a:solidFill>
+            </a:endParaRPr>
+          </a:p>
+        </p:txBody>
+      </p:sp>
+      <p:cxnSp>
+        <p:nvCxnSpPr>
+          <p:cNvPr id="47" name="Straight Arrow Connector 46">
+            <a:extLst>
+              <a:ext uri="{FF2B5EF4-FFF2-40B4-BE49-F238E27FC236}">
+                <a16:creationId xmlns:a16="http://schemas.microsoft.com/office/drawing/2014/main" id="{B7505D38-C7AB-423D-9437-2A37CECEC119}"/>
+              </a:ext>
+            </a:extLst>
+          </p:cNvPr>
+          <p:cNvCxnSpPr>
+            <a:cxnSpLocks/>
+            <a:stCxn id="48" idx="3"/>
+            <a:endCxn id="46" idx="1"/>
+          </p:cNvCxnSpPr>
+          <p:nvPr/>
+        </p:nvCxnSpPr>
+        <p:spPr>
+          <a:xfrm>
+            <a:off x="2654011" y="5027469"/>
+            <a:ext cx="220810" cy="5284"/>
+          </a:xfrm>
+          <a:prstGeom prst="straightConnector1">
+            <a:avLst/>
+          </a:prstGeom>
+          <a:ln w="19050">
+            <a:solidFill>
+              <a:schemeClr val="accent6">
+                <a:lumMod val="75000"/>
+              </a:schemeClr>
+            </a:solidFill>
+            <a:headEnd type="none" w="med" len="med"/>
+            <a:tailEnd type="arrow" w="med" len="med"/>
+          </a:ln>
+          <a:effectLst/>
+        </p:spPr>
+        <p:style>
+          <a:lnRef idx="1">
+            <a:schemeClr val="accent2"/>
+          </a:lnRef>
+          <a:fillRef idx="2">
+            <a:schemeClr val="accent2"/>
+          </a:fillRef>
+          <a:effectRef idx="1">
+            <a:schemeClr val="accent2"/>
+          </a:effectRef>
+          <a:fontRef idx="minor">
+            <a:schemeClr val="dk1"/>
+          </a:fontRef>
+        </p:style>
+      </p:cxnSp>
+      <p:sp>
+        <p:nvSpPr>
+          <p:cNvPr id="48" name="Flowchart: Decision 96">
+            <a:extLst>
+              <a:ext uri="{FF2B5EF4-FFF2-40B4-BE49-F238E27FC236}">
+                <a16:creationId xmlns:a16="http://schemas.microsoft.com/office/drawing/2014/main" id="{BF20A59F-D73E-4560-8D02-8B3627FA2474}"/>
+              </a:ext>
+            </a:extLst>
+          </p:cNvPr>
+          <p:cNvSpPr/>
+          <p:nvPr/>
+        </p:nvSpPr>
+        <p:spPr>
+          <a:xfrm>
+            <a:off x="2417963" y="4940779"/>
+            <a:ext cx="236048" cy="173380"/>
+          </a:xfrm>
+          <a:prstGeom prst="flowChartDecision">
+            <a:avLst/>
+          </a:prstGeom>
+          <a:noFill/>
+          <a:ln w="19050">
+            <a:solidFill>
+              <a:schemeClr val="accent6">
+                <a:lumMod val="75000"/>
+              </a:schemeClr>
+            </a:solidFill>
+          </a:ln>
+          <a:effectLst/>
+        </p:spPr>
+        <p:style>
+          <a:lnRef idx="1">
+            <a:schemeClr val="accent2"/>
+          </a:lnRef>
+          <a:fillRef idx="2">
+            <a:schemeClr val="accent2"/>
+          </a:fillRef>
+          <a:effectRef idx="1">
+            <a:schemeClr val="accent2"/>
+          </a:effectRef>
+          <a:fontRef idx="minor">
+            <a:schemeClr val="dk1"/>
+          </a:fontRef>
+        </p:style>
+        <p:txBody>
+          <a:bodyPr rtlCol="0" anchor="ctr"/>
+          <a:lstStyle/>
+          <a:p>
+            <a:pPr algn="ctr"/>
+            <a:endParaRPr lang="en-US" sz="1050">
+              <a:solidFill>
+                <a:schemeClr val="bg1"/>
+              </a:solidFill>
+            </a:endParaRPr>
+          </a:p>
+        </p:txBody>
+      </p:sp>
+      <p:cxnSp>
+        <p:nvCxnSpPr>
+          <p:cNvPr id="49" name="Elbow Connector 63">
+            <a:extLst>
+              <a:ext uri="{FF2B5EF4-FFF2-40B4-BE49-F238E27FC236}">
+                <a16:creationId xmlns:a16="http://schemas.microsoft.com/office/drawing/2014/main" id="{8D34732A-8D63-407D-8299-B384398952DE}"/>
+              </a:ext>
+            </a:extLst>
+          </p:cNvPr>
+          <p:cNvCxnSpPr>
+            <a:cxnSpLocks/>
+            <a:stCxn id="51" idx="3"/>
+            <a:endCxn id="53" idx="1"/>
+          </p:cNvCxnSpPr>
+          <p:nvPr/>
+        </p:nvCxnSpPr>
+        <p:spPr>
+          <a:xfrm flipV="1">
+            <a:off x="4395682" y="5032753"/>
+            <a:ext cx="223324" cy="1"/>
+          </a:xfrm>
+          <a:prstGeom prst="bentConnector3">
+            <a:avLst>
+              <a:gd name="adj1" fmla="val 50000"/>
+            </a:avLst>
+          </a:prstGeom>
+          <a:ln w="19050">
+            <a:solidFill>
+              <a:schemeClr val="accent6">
+                <a:lumMod val="75000"/>
+              </a:schemeClr>
+            </a:solidFill>
+            <a:prstDash val="sysDot"/>
+            <a:headEnd type="none" w="med" len="med"/>
+            <a:tailEnd type="none" w="med" len="med"/>
+          </a:ln>
+          <a:effectLst/>
+        </p:spPr>
+        <p:style>
+          <a:lnRef idx="1">
+            <a:schemeClr val="accent2"/>
+          </a:lnRef>
+          <a:fillRef idx="2">
+            <a:schemeClr val="accent2"/>
+          </a:fillRef>
+          <a:effectRef idx="1">
+            <a:schemeClr val="accent2"/>
+          </a:effectRef>
+          <a:fontRef idx="minor">
+            <a:schemeClr val="dk1"/>
+          </a:fontRef>
+        </p:style>
+      </p:cxnSp>
+      <p:sp>
+        <p:nvSpPr>
+          <p:cNvPr id="51" name="Isosceles Triangle 102">
+            <a:extLst>
+              <a:ext uri="{FF2B5EF4-FFF2-40B4-BE49-F238E27FC236}">
+                <a16:creationId xmlns:a16="http://schemas.microsoft.com/office/drawing/2014/main" id="{C9E5FC42-4C63-4D74-A11D-AE985AAB53D9}"/>
+              </a:ext>
+            </a:extLst>
+          </p:cNvPr>
+          <p:cNvSpPr/>
+          <p:nvPr/>
+        </p:nvSpPr>
+        <p:spPr>
+          <a:xfrm rot="5400000" flipV="1">
+            <a:off x="4172668" y="4944992"/>
+            <a:ext cx="270504" cy="175523"/>
+          </a:xfrm>
+          <a:prstGeom prst="triangle">
+            <a:avLst/>
+          </a:prstGeom>
+          <a:solidFill>
+            <a:schemeClr val="accent6">
+              <a:lumMod val="75000"/>
+            </a:schemeClr>
+          </a:solidFill>
+          <a:ln w="19050">
+            <a:solidFill>
+              <a:schemeClr val="accent6">
+                <a:lumMod val="75000"/>
+              </a:schemeClr>
+            </a:solidFill>
+          </a:ln>
+          <a:effectLst/>
+        </p:spPr>
+        <p:style>
+          <a:lnRef idx="1">
+            <a:schemeClr val="accent2"/>
+          </a:lnRef>
+          <a:fillRef idx="2">
+            <a:schemeClr val="accent2"/>
+          </a:fillRef>
+          <a:effectRef idx="1">
+            <a:schemeClr val="accent2"/>
+          </a:effectRef>
+          <a:fontRef idx="minor">
+            <a:schemeClr val="dk1"/>
+          </a:fontRef>
+        </p:style>
+        <p:txBody>
+          <a:bodyPr rtlCol="0" anchor="ctr"/>
+          <a:lstStyle/>
+          <a:p>
+            <a:pPr algn="ctr"/>
+            <a:endParaRPr lang="en-SG" sz="1050">
+              <a:solidFill>
+                <a:schemeClr val="bg1"/>
+              </a:solidFill>
+            </a:endParaRPr>
+          </a:p>
+        </p:txBody>
+      </p:sp>
+      <p:sp>
+        <p:nvSpPr>
+          <p:cNvPr id="53" name="Rectangle 8">
+            <a:extLst>
+              <a:ext uri="{FF2B5EF4-FFF2-40B4-BE49-F238E27FC236}">
+                <a16:creationId xmlns:a16="http://schemas.microsoft.com/office/drawing/2014/main" id="{B93A23D9-3630-41B2-B3E5-7131B3A06ECF}"/>
+              </a:ext>
+            </a:extLst>
+          </p:cNvPr>
+          <p:cNvSpPr/>
+          <p:nvPr/>
+        </p:nvSpPr>
+        <p:spPr>
+          <a:xfrm>
+            <a:off x="4619006" y="4859373"/>
+            <a:ext cx="1093635" cy="346760"/>
+          </a:xfrm>
+          <a:prstGeom prst="rect">
+            <a:avLst/>
+          </a:prstGeom>
+          <a:solidFill>
+            <a:schemeClr val="accent6">
+              <a:lumMod val="75000"/>
+            </a:schemeClr>
+          </a:solidFill>
+          <a:ln w="19050">
+            <a:solidFill>
+              <a:schemeClr val="accent6">
+                <a:lumMod val="75000"/>
+              </a:schemeClr>
+            </a:solidFill>
+          </a:ln>
+          <a:effectLst/>
+        </p:spPr>
+        <p:style>
+          <a:lnRef idx="1">
+            <a:schemeClr val="accent2"/>
+          </a:lnRef>
+          <a:fillRef idx="2">
+            <a:schemeClr val="accent2"/>
+          </a:fillRef>
+          <a:effectRef idx="1">
+            <a:schemeClr val="accent2"/>
+          </a:effectRef>
+          <a:fontRef idx="minor">
+            <a:schemeClr val="dk1"/>
+          </a:fontRef>
+        </p:style>
+        <p:txBody>
+          <a:bodyPr rtlCol="0" anchor="ctr"/>
+          <a:lstStyle/>
+          <a:p>
+            <a:pPr algn="ctr"/>
+            <a:r>
+              <a:rPr lang="en-US" sz="1050" dirty="0" err="1">
+                <a:solidFill>
+                  <a:schemeClr val="bg1"/>
+                </a:solidFill>
+              </a:rPr>
+              <a:t>ProfilePictureDirStorage</a:t>
+            </a:r>
+            <a:endParaRPr lang="en-SG" sz="1050" dirty="0">
+              <a:solidFill>
+                <a:schemeClr val="bg1"/>
+              </a:solidFill>
+            </a:endParaRPr>
+          </a:p>
+        </p:txBody>
+      </p:sp>
+      <p:sp>
+        <p:nvSpPr>
+          <p:cNvPr id="55" name="Rectangle 8">
+            <a:extLst>
+              <a:ext uri="{FF2B5EF4-FFF2-40B4-BE49-F238E27FC236}">
+                <a16:creationId xmlns:a16="http://schemas.microsoft.com/office/drawing/2014/main" id="{8A7F8F73-9D9F-407C-8CBE-95AE5D870561}"/>
+              </a:ext>
+            </a:extLst>
+          </p:cNvPr>
+          <p:cNvSpPr/>
+          <p:nvPr/>
+        </p:nvSpPr>
+        <p:spPr>
+          <a:xfrm>
+            <a:off x="6020678" y="5461743"/>
+            <a:ext cx="1200707" cy="346760"/>
+          </a:xfrm>
+          <a:prstGeom prst="rect">
+            <a:avLst/>
+          </a:prstGeom>
+          <a:ln w="19050"/>
+          <a:effectLst/>
+        </p:spPr>
+        <p:style>
+          <a:lnRef idx="1">
+            <a:schemeClr val="accent6"/>
+          </a:lnRef>
+          <a:fillRef idx="2">
+            <a:schemeClr val="accent6"/>
+          </a:fillRef>
+          <a:effectRef idx="1">
+            <a:schemeClr val="accent6"/>
+          </a:effectRef>
+          <a:fontRef idx="minor">
+            <a:schemeClr val="dk1"/>
+          </a:fontRef>
+        </p:style>
+        <p:txBody>
+          <a:bodyPr rtlCol="0" anchor="ctr"/>
+          <a:lstStyle/>
+          <a:p>
+            <a:pPr algn="ctr"/>
+            <a:r>
+              <a:rPr lang="en-US" sz="1050" b="1" dirty="0" err="1">
+                <a:solidFill>
+                  <a:schemeClr val="accent6">
+                    <a:lumMod val="75000"/>
+                  </a:schemeClr>
+                </a:solidFill>
+              </a:rPr>
+              <a:t>XmlSerializable</a:t>
+            </a:r>
+            <a:br>
+              <a:rPr lang="en-US" sz="1050" b="1" dirty="0">
+                <a:solidFill>
+                  <a:schemeClr val="accent6">
+                    <a:lumMod val="75000"/>
+                  </a:schemeClr>
+                </a:solidFill>
+              </a:rPr>
+            </a:br>
+            <a:r>
+              <a:rPr lang="en-US" sz="1050" b="1" dirty="0" err="1">
+                <a:solidFill>
+                  <a:schemeClr val="accent6">
+                    <a:lumMod val="75000"/>
+                  </a:schemeClr>
+                </a:solidFill>
+              </a:rPr>
+              <a:t>BudgetBook</a:t>
+            </a:r>
+            <a:endParaRPr lang="en-SG" sz="1050" b="1" dirty="0">
+              <a:solidFill>
+                <a:schemeClr val="accent6">
+                  <a:lumMod val="75000"/>
+                </a:schemeClr>
+              </a:solidFill>
+            </a:endParaRPr>
+          </a:p>
+        </p:txBody>
+      </p:sp>
+      <p:cxnSp>
+        <p:nvCxnSpPr>
+          <p:cNvPr id="57" name="Elbow Connector 122">
+            <a:extLst>
+              <a:ext uri="{FF2B5EF4-FFF2-40B4-BE49-F238E27FC236}">
+                <a16:creationId xmlns:a16="http://schemas.microsoft.com/office/drawing/2014/main" id="{EC050297-F8D8-463D-B166-3D9EFE68B137}"/>
+              </a:ext>
+            </a:extLst>
+          </p:cNvPr>
+          <p:cNvCxnSpPr>
+            <a:stCxn id="62" idx="0"/>
+            <a:endCxn id="59" idx="2"/>
+          </p:cNvCxnSpPr>
+          <p:nvPr/>
+        </p:nvCxnSpPr>
+        <p:spPr>
+          <a:xfrm rot="5400000" flipH="1" flipV="1">
+            <a:off x="8078871" y="5293353"/>
+            <a:ext cx="335208" cy="12700"/>
+          </a:xfrm>
+          <a:prstGeom prst="bentConnector3">
+            <a:avLst>
+              <a:gd name="adj1" fmla="val 50000"/>
+            </a:avLst>
+          </a:prstGeom>
+          <a:ln w="19050">
+            <a:prstDash val="sysDot"/>
+            <a:headEnd type="none" w="med" len="med"/>
+            <a:tailEnd type="arrow" w="med" len="med"/>
+          </a:ln>
+          <a:effectLst/>
+        </p:spPr>
+        <p:style>
+          <a:lnRef idx="1">
+            <a:schemeClr val="accent6"/>
+          </a:lnRef>
+          <a:fillRef idx="2">
+            <a:schemeClr val="accent6"/>
+          </a:fillRef>
+          <a:effectRef idx="1">
+            <a:schemeClr val="accent6"/>
+          </a:effectRef>
+          <a:fontRef idx="minor">
+            <a:schemeClr val="dk1"/>
+          </a:fontRef>
+        </p:style>
+      </p:cxnSp>
+      <p:sp>
+        <p:nvSpPr>
+          <p:cNvPr id="59" name="Rectangle 8">
+            <a:extLst>
+              <a:ext uri="{FF2B5EF4-FFF2-40B4-BE49-F238E27FC236}">
+                <a16:creationId xmlns:a16="http://schemas.microsoft.com/office/drawing/2014/main" id="{B5FA9745-E244-4EF7-8D94-4AC34AC01AB8}"/>
+              </a:ext>
+            </a:extLst>
+          </p:cNvPr>
+          <p:cNvSpPr/>
+          <p:nvPr/>
+        </p:nvSpPr>
+        <p:spPr>
+          <a:xfrm>
+            <a:off x="7616616" y="4778989"/>
+            <a:ext cx="1259718" cy="346760"/>
+          </a:xfrm>
+          <a:prstGeom prst="rect">
+            <a:avLst/>
+          </a:prstGeom>
+          <a:ln w="19050"/>
+          <a:effectLst/>
+        </p:spPr>
+        <p:style>
+          <a:lnRef idx="1">
+            <a:schemeClr val="accent6"/>
+          </a:lnRef>
+          <a:fillRef idx="2">
+            <a:schemeClr val="accent6"/>
+          </a:fillRef>
+          <a:effectRef idx="1">
+            <a:schemeClr val="accent6"/>
+          </a:effectRef>
+          <a:fontRef idx="minor">
+            <a:schemeClr val="dk1"/>
+          </a:fontRef>
+        </p:style>
+        <p:txBody>
+          <a:bodyPr rtlCol="0" anchor="ctr"/>
+          <a:lstStyle/>
+          <a:p>
+            <a:pPr algn="ctr"/>
+            <a:r>
+              <a:rPr lang="en-US" sz="1050" b="1" dirty="0" err="1">
+                <a:solidFill>
+                  <a:schemeClr val="accent6">
+                    <a:lumMod val="75000"/>
+                  </a:schemeClr>
+                </a:solidFill>
+              </a:rPr>
+              <a:t>XmlAdaptedEntry</a:t>
+            </a:r>
+            <a:endParaRPr lang="en-SG" sz="1050" b="1" dirty="0">
+              <a:solidFill>
+                <a:schemeClr val="accent6">
+                  <a:lumMod val="75000"/>
+                </a:schemeClr>
+              </a:solidFill>
+            </a:endParaRPr>
+          </a:p>
+        </p:txBody>
+      </p:sp>
+      <p:sp>
+        <p:nvSpPr>
+          <p:cNvPr id="62" name="Rectangle 8">
+            <a:extLst>
+              <a:ext uri="{FF2B5EF4-FFF2-40B4-BE49-F238E27FC236}">
+                <a16:creationId xmlns:a16="http://schemas.microsoft.com/office/drawing/2014/main" id="{7FD7CEA8-6393-40B8-BF02-96BE1B33896D}"/>
+              </a:ext>
+            </a:extLst>
+          </p:cNvPr>
+          <p:cNvSpPr/>
+          <p:nvPr/>
+        </p:nvSpPr>
+        <p:spPr>
+          <a:xfrm>
+            <a:off x="7616616" y="5460957"/>
+            <a:ext cx="1259718" cy="346760"/>
+          </a:xfrm>
+          <a:prstGeom prst="rect">
+            <a:avLst/>
+          </a:prstGeom>
+          <a:ln w="19050"/>
+          <a:effectLst/>
+        </p:spPr>
+        <p:style>
+          <a:lnRef idx="1">
+            <a:schemeClr val="accent6"/>
+          </a:lnRef>
+          <a:fillRef idx="2">
+            <a:schemeClr val="accent6"/>
+          </a:fillRef>
+          <a:effectRef idx="1">
+            <a:schemeClr val="accent6"/>
+          </a:effectRef>
+          <a:fontRef idx="minor">
+            <a:schemeClr val="dk1"/>
+          </a:fontRef>
+        </p:style>
+        <p:txBody>
+          <a:bodyPr rtlCol="0" anchor="ctr"/>
+          <a:lstStyle/>
+          <a:p>
+            <a:pPr algn="ctr"/>
+            <a:r>
+              <a:rPr lang="en-US" sz="1050" b="1" dirty="0" err="1">
+                <a:solidFill>
+                  <a:schemeClr val="accent6">
+                    <a:lumMod val="75000"/>
+                  </a:schemeClr>
+                </a:solidFill>
+              </a:rPr>
+              <a:t>XmlAdaptedCca</a:t>
+            </a:r>
+            <a:endParaRPr lang="en-SG" sz="1050" b="1" dirty="0">
+              <a:solidFill>
+                <a:schemeClr val="accent6">
+                  <a:lumMod val="75000"/>
+                </a:schemeClr>
+              </a:solidFill>
+            </a:endParaRPr>
+          </a:p>
+        </p:txBody>
+      </p:sp>
+      <p:cxnSp>
+        <p:nvCxnSpPr>
+          <p:cNvPr id="63" name="Elbow Connector 122">
+            <a:extLst>
+              <a:ext uri="{FF2B5EF4-FFF2-40B4-BE49-F238E27FC236}">
+                <a16:creationId xmlns:a16="http://schemas.microsoft.com/office/drawing/2014/main" id="{05678647-88A0-4AA2-8780-F34E72F8806A}"/>
+              </a:ext>
+            </a:extLst>
+          </p:cNvPr>
+          <p:cNvCxnSpPr>
+            <a:stCxn id="55" idx="3"/>
+            <a:endCxn id="62" idx="1"/>
+          </p:cNvCxnSpPr>
+          <p:nvPr/>
+        </p:nvCxnSpPr>
+        <p:spPr>
+          <a:xfrm flipV="1">
+            <a:off x="7221385" y="5634337"/>
             <a:ext cx="395231" cy="786"/>
           </a:xfrm>
           <a:prstGeom prst="bentConnector3">
@@ -4843,13 +6686,6 @@
   <p:clrMapOvr>
     <a:masterClrMapping/>
   </p:clrMapOvr>
-  <p:timing>
-    <p:tnLst>
-      <p:par>
-        <p:cTn id="1" dur="indefinite" restart="never" nodeType="tmRoot"/>
-      </p:par>
-    </p:tnLst>
-  </p:timing>
 </p:sld>
 </file>
 

</xml_diff>

<commit_message>
edit import conflicts documentation
</commit_message>
<xml_diff>
--- a/docs/diagrams/StorageComponentClassDiagram.pptx
+++ b/docs/diagrams/StorageComponentClassDiagram.pptx
@@ -107,6 +107,22 @@
       </a:defRPr>
     </a:lvl9pPr>
   </p:defaultTextStyle>
+  <p:extLst>
+    <p:ext uri="{EFAFB233-063F-42B5-8137-9DF3F51BA10A}">
+      <p15:sldGuideLst xmlns:p15="http://schemas.microsoft.com/office/powerpoint/2012/main">
+        <p15:guide id="1" orient="horz" pos="1488">
+          <p15:clr>
+            <a:srgbClr val="A4A3A4"/>
+          </p15:clr>
+        </p15:guide>
+        <p15:guide id="2" pos="2880">
+          <p15:clr>
+            <a:srgbClr val="A4A3A4"/>
+          </p15:clr>
+        </p15:guide>
+      </p15:sldGuideLst>
+    </p:ext>
+  </p:extLst>
 </p:presentation>
 </file>
 
@@ -192,7 +208,7 @@
           <a:p>
             <a:fld id="{F5CC4B3F-88C1-4FFA-B1B6-F41C21DC6924}" type="datetimeFigureOut">
               <a:rPr lang="en-US" smtClean="0"/>
-              <a:t>10/16/2016</a:t>
+              <a:t>11/12/18</a:t>
             </a:fld>
             <a:endParaRPr lang="en-US"/>
           </a:p>
@@ -256,38 +272,37 @@
           <a:p>
             <a:pPr lvl="0"/>
             <a:r>
-              <a:rPr lang="en-US" smtClean="0"/>
+              <a:rPr lang="en-US"/>
               <a:t>Click to edit Master text styles</a:t>
             </a:r>
           </a:p>
           <a:p>
             <a:pPr lvl="1"/>
             <a:r>
-              <a:rPr lang="en-US" smtClean="0"/>
+              <a:rPr lang="en-US"/>
               <a:t>Second level</a:t>
             </a:r>
           </a:p>
           <a:p>
             <a:pPr lvl="2"/>
             <a:r>
-              <a:rPr lang="en-US" smtClean="0"/>
+              <a:rPr lang="en-US"/>
               <a:t>Third level</a:t>
             </a:r>
           </a:p>
           <a:p>
             <a:pPr lvl="3"/>
             <a:r>
-              <a:rPr lang="en-US" smtClean="0"/>
+              <a:rPr lang="en-US"/>
               <a:t>Fourth level</a:t>
             </a:r>
           </a:p>
           <a:p>
             <a:pPr lvl="4"/>
             <a:r>
-              <a:rPr lang="en-US" smtClean="0"/>
+              <a:rPr lang="en-US"/>
               <a:t>Fifth level</a:t>
             </a:r>
-            <a:endParaRPr lang="en-US"/>
           </a:p>
         </p:txBody>
       </p:sp>
@@ -498,10 +513,9 @@
           <a:lstStyle/>
           <a:p>
             <a:r>
-              <a:rPr lang="en-US" smtClean="0"/>
+              <a:rPr lang="en-US"/>
               <a:t>Click to edit Master title style</a:t>
             </a:r>
-            <a:endParaRPr lang="en-US"/>
           </a:p>
         </p:txBody>
       </p:sp>
@@ -617,10 +631,9 @@
           </a:lstStyle>
           <a:p>
             <a:r>
-              <a:rPr lang="en-US" smtClean="0"/>
+              <a:rPr lang="en-US"/>
               <a:t>Click to edit Master subtitle style</a:t>
             </a:r>
-            <a:endParaRPr lang="en-US"/>
           </a:p>
         </p:txBody>
       </p:sp>
@@ -641,7 +654,7 @@
           <a:p>
             <a:fld id="{78C97017-6FC3-485B-9764-EAC9E56C1D49}" type="datetimeFigureOut">
               <a:rPr lang="en-US" smtClean="0"/>
-              <a:t>10/16/2016</a:t>
+              <a:t>11/12/18</a:t>
             </a:fld>
             <a:endParaRPr lang="en-US"/>
           </a:p>
@@ -735,10 +748,9 @@
           <a:lstStyle/>
           <a:p>
             <a:r>
-              <a:rPr lang="en-US" smtClean="0"/>
+              <a:rPr lang="en-US"/>
               <a:t>Click to edit Master title style</a:t>
             </a:r>
-            <a:endParaRPr lang="en-US"/>
           </a:p>
         </p:txBody>
       </p:sp>
@@ -759,38 +771,37 @@
           <a:p>
             <a:pPr lvl="0"/>
             <a:r>
-              <a:rPr lang="en-US" smtClean="0"/>
+              <a:rPr lang="en-US"/>
               <a:t>Click to edit Master text styles</a:t>
             </a:r>
           </a:p>
           <a:p>
             <a:pPr lvl="1"/>
             <a:r>
-              <a:rPr lang="en-US" smtClean="0"/>
+              <a:rPr lang="en-US"/>
               <a:t>Second level</a:t>
             </a:r>
           </a:p>
           <a:p>
             <a:pPr lvl="2"/>
             <a:r>
-              <a:rPr lang="en-US" smtClean="0"/>
+              <a:rPr lang="en-US"/>
               <a:t>Third level</a:t>
             </a:r>
           </a:p>
           <a:p>
             <a:pPr lvl="3"/>
             <a:r>
-              <a:rPr lang="en-US" smtClean="0"/>
+              <a:rPr lang="en-US"/>
               <a:t>Fourth level</a:t>
             </a:r>
           </a:p>
           <a:p>
             <a:pPr lvl="4"/>
             <a:r>
-              <a:rPr lang="en-US" smtClean="0"/>
+              <a:rPr lang="en-US"/>
               <a:t>Fifth level</a:t>
             </a:r>
-            <a:endParaRPr lang="en-US"/>
           </a:p>
         </p:txBody>
       </p:sp>
@@ -811,7 +822,7 @@
           <a:p>
             <a:fld id="{78C97017-6FC3-485B-9764-EAC9E56C1D49}" type="datetimeFigureOut">
               <a:rPr lang="en-US" smtClean="0"/>
-              <a:t>10/16/2016</a:t>
+              <a:t>11/12/18</a:t>
             </a:fld>
             <a:endParaRPr lang="en-US"/>
           </a:p>
@@ -910,10 +921,9 @@
           <a:lstStyle/>
           <a:p>
             <a:r>
-              <a:rPr lang="en-US" smtClean="0"/>
+              <a:rPr lang="en-US"/>
               <a:t>Click to edit Master title style</a:t>
             </a:r>
-            <a:endParaRPr lang="en-US"/>
           </a:p>
         </p:txBody>
       </p:sp>
@@ -939,38 +949,37 @@
           <a:p>
             <a:pPr lvl="0"/>
             <a:r>
-              <a:rPr lang="en-US" smtClean="0"/>
+              <a:rPr lang="en-US"/>
               <a:t>Click to edit Master text styles</a:t>
             </a:r>
           </a:p>
           <a:p>
             <a:pPr lvl="1"/>
             <a:r>
-              <a:rPr lang="en-US" smtClean="0"/>
+              <a:rPr lang="en-US"/>
               <a:t>Second level</a:t>
             </a:r>
           </a:p>
           <a:p>
             <a:pPr lvl="2"/>
             <a:r>
-              <a:rPr lang="en-US" smtClean="0"/>
+              <a:rPr lang="en-US"/>
               <a:t>Third level</a:t>
             </a:r>
           </a:p>
           <a:p>
             <a:pPr lvl="3"/>
             <a:r>
-              <a:rPr lang="en-US" smtClean="0"/>
+              <a:rPr lang="en-US"/>
               <a:t>Fourth level</a:t>
             </a:r>
           </a:p>
           <a:p>
             <a:pPr lvl="4"/>
             <a:r>
-              <a:rPr lang="en-US" smtClean="0"/>
+              <a:rPr lang="en-US"/>
               <a:t>Fifth level</a:t>
             </a:r>
-            <a:endParaRPr lang="en-US"/>
           </a:p>
         </p:txBody>
       </p:sp>
@@ -991,7 +1000,7 @@
           <a:p>
             <a:fld id="{78C97017-6FC3-485B-9764-EAC9E56C1D49}" type="datetimeFigureOut">
               <a:rPr lang="en-US" smtClean="0"/>
-              <a:t>10/16/2016</a:t>
+              <a:t>11/12/18</a:t>
             </a:fld>
             <a:endParaRPr lang="en-US"/>
           </a:p>
@@ -1085,10 +1094,9 @@
           <a:lstStyle/>
           <a:p>
             <a:r>
-              <a:rPr lang="en-US" smtClean="0"/>
+              <a:rPr lang="en-US"/>
               <a:t>Click to edit Master title style</a:t>
             </a:r>
-            <a:endParaRPr lang="en-US"/>
           </a:p>
         </p:txBody>
       </p:sp>
@@ -1109,38 +1117,37 @@
           <a:p>
             <a:pPr lvl="0"/>
             <a:r>
-              <a:rPr lang="en-US" smtClean="0"/>
+              <a:rPr lang="en-US"/>
               <a:t>Click to edit Master text styles</a:t>
             </a:r>
           </a:p>
           <a:p>
             <a:pPr lvl="1"/>
             <a:r>
-              <a:rPr lang="en-US" smtClean="0"/>
+              <a:rPr lang="en-US"/>
               <a:t>Second level</a:t>
             </a:r>
           </a:p>
           <a:p>
             <a:pPr lvl="2"/>
             <a:r>
-              <a:rPr lang="en-US" smtClean="0"/>
+              <a:rPr lang="en-US"/>
               <a:t>Third level</a:t>
             </a:r>
           </a:p>
           <a:p>
             <a:pPr lvl="3"/>
             <a:r>
-              <a:rPr lang="en-US" smtClean="0"/>
+              <a:rPr lang="en-US"/>
               <a:t>Fourth level</a:t>
             </a:r>
           </a:p>
           <a:p>
             <a:pPr lvl="4"/>
             <a:r>
-              <a:rPr lang="en-US" smtClean="0"/>
+              <a:rPr lang="en-US"/>
               <a:t>Fifth level</a:t>
             </a:r>
-            <a:endParaRPr lang="en-US"/>
           </a:p>
         </p:txBody>
       </p:sp>
@@ -1161,7 +1168,7 @@
           <a:p>
             <a:fld id="{78C97017-6FC3-485B-9764-EAC9E56C1D49}" type="datetimeFigureOut">
               <a:rPr lang="en-US" smtClean="0"/>
-              <a:t>10/16/2016</a:t>
+              <a:t>11/12/18</a:t>
             </a:fld>
             <a:endParaRPr lang="en-US"/>
           </a:p>
@@ -1264,10 +1271,9 @@
           </a:lstStyle>
           <a:p>
             <a:r>
-              <a:rPr lang="en-US" smtClean="0"/>
+              <a:rPr lang="en-US"/>
               <a:t>Click to edit Master title style</a:t>
             </a:r>
-            <a:endParaRPr lang="en-US"/>
           </a:p>
         </p:txBody>
       </p:sp>
@@ -1384,7 +1390,7 @@
           <a:p>
             <a:pPr lvl="0"/>
             <a:r>
-              <a:rPr lang="en-US" smtClean="0"/>
+              <a:rPr lang="en-US"/>
               <a:t>Click to edit Master text styles</a:t>
             </a:r>
           </a:p>
@@ -1407,7 +1413,7 @@
           <a:p>
             <a:fld id="{78C97017-6FC3-485B-9764-EAC9E56C1D49}" type="datetimeFigureOut">
               <a:rPr lang="en-US" smtClean="0"/>
-              <a:t>10/16/2016</a:t>
+              <a:t>11/12/18</a:t>
             </a:fld>
             <a:endParaRPr lang="en-US"/>
           </a:p>
@@ -1501,10 +1507,9 @@
           <a:lstStyle/>
           <a:p>
             <a:r>
-              <a:rPr lang="en-US" smtClean="0"/>
+              <a:rPr lang="en-US"/>
               <a:t>Click to edit Master title style</a:t>
             </a:r>
-            <a:endParaRPr lang="en-US"/>
           </a:p>
         </p:txBody>
       </p:sp>
@@ -1558,38 +1563,37 @@
           <a:p>
             <a:pPr lvl="0"/>
             <a:r>
-              <a:rPr lang="en-US" smtClean="0"/>
+              <a:rPr lang="en-US"/>
               <a:t>Click to edit Master text styles</a:t>
             </a:r>
           </a:p>
           <a:p>
             <a:pPr lvl="1"/>
             <a:r>
-              <a:rPr lang="en-US" smtClean="0"/>
+              <a:rPr lang="en-US"/>
               <a:t>Second level</a:t>
             </a:r>
           </a:p>
           <a:p>
             <a:pPr lvl="2"/>
             <a:r>
-              <a:rPr lang="en-US" smtClean="0"/>
+              <a:rPr lang="en-US"/>
               <a:t>Third level</a:t>
             </a:r>
           </a:p>
           <a:p>
             <a:pPr lvl="3"/>
             <a:r>
-              <a:rPr lang="en-US" smtClean="0"/>
+              <a:rPr lang="en-US"/>
               <a:t>Fourth level</a:t>
             </a:r>
           </a:p>
           <a:p>
             <a:pPr lvl="4"/>
             <a:r>
-              <a:rPr lang="en-US" smtClean="0"/>
+              <a:rPr lang="en-US"/>
               <a:t>Fifth level</a:t>
             </a:r>
-            <a:endParaRPr lang="en-US"/>
           </a:p>
         </p:txBody>
       </p:sp>
@@ -1643,38 +1647,37 @@
           <a:p>
             <a:pPr lvl="0"/>
             <a:r>
-              <a:rPr lang="en-US" smtClean="0"/>
+              <a:rPr lang="en-US"/>
               <a:t>Click to edit Master text styles</a:t>
             </a:r>
           </a:p>
           <a:p>
             <a:pPr lvl="1"/>
             <a:r>
-              <a:rPr lang="en-US" smtClean="0"/>
+              <a:rPr lang="en-US"/>
               <a:t>Second level</a:t>
             </a:r>
           </a:p>
           <a:p>
             <a:pPr lvl="2"/>
             <a:r>
-              <a:rPr lang="en-US" smtClean="0"/>
+              <a:rPr lang="en-US"/>
               <a:t>Third level</a:t>
             </a:r>
           </a:p>
           <a:p>
             <a:pPr lvl="3"/>
             <a:r>
-              <a:rPr lang="en-US" smtClean="0"/>
+              <a:rPr lang="en-US"/>
               <a:t>Fourth level</a:t>
             </a:r>
           </a:p>
           <a:p>
             <a:pPr lvl="4"/>
             <a:r>
-              <a:rPr lang="en-US" smtClean="0"/>
+              <a:rPr lang="en-US"/>
               <a:t>Fifth level</a:t>
             </a:r>
-            <a:endParaRPr lang="en-US"/>
           </a:p>
         </p:txBody>
       </p:sp>
@@ -1695,7 +1698,7 @@
           <a:p>
             <a:fld id="{78C97017-6FC3-485B-9764-EAC9E56C1D49}" type="datetimeFigureOut">
               <a:rPr lang="en-US" smtClean="0"/>
-              <a:t>10/16/2016</a:t>
+              <a:t>11/12/18</a:t>
             </a:fld>
             <a:endParaRPr lang="en-US"/>
           </a:p>
@@ -1793,10 +1796,9 @@
           </a:lstStyle>
           <a:p>
             <a:r>
-              <a:rPr lang="en-US" smtClean="0"/>
+              <a:rPr lang="en-US"/>
               <a:t>Click to edit Master title style</a:t>
             </a:r>
-            <a:endParaRPr lang="en-US"/>
           </a:p>
         </p:txBody>
       </p:sp>
@@ -1859,7 +1861,7 @@
           <a:p>
             <a:pPr lvl="0"/>
             <a:r>
-              <a:rPr lang="en-US" smtClean="0"/>
+              <a:rPr lang="en-US"/>
               <a:t>Click to edit Master text styles</a:t>
             </a:r>
           </a:p>
@@ -1915,38 +1917,37 @@
           <a:p>
             <a:pPr lvl="0"/>
             <a:r>
-              <a:rPr lang="en-US" smtClean="0"/>
+              <a:rPr lang="en-US"/>
               <a:t>Click to edit Master text styles</a:t>
             </a:r>
           </a:p>
           <a:p>
             <a:pPr lvl="1"/>
             <a:r>
-              <a:rPr lang="en-US" smtClean="0"/>
+              <a:rPr lang="en-US"/>
               <a:t>Second level</a:t>
             </a:r>
           </a:p>
           <a:p>
             <a:pPr lvl="2"/>
             <a:r>
-              <a:rPr lang="en-US" smtClean="0"/>
+              <a:rPr lang="en-US"/>
               <a:t>Third level</a:t>
             </a:r>
           </a:p>
           <a:p>
             <a:pPr lvl="3"/>
             <a:r>
-              <a:rPr lang="en-US" smtClean="0"/>
+              <a:rPr lang="en-US"/>
               <a:t>Fourth level</a:t>
             </a:r>
           </a:p>
           <a:p>
             <a:pPr lvl="4"/>
             <a:r>
-              <a:rPr lang="en-US" smtClean="0"/>
+              <a:rPr lang="en-US"/>
               <a:t>Fifth level</a:t>
             </a:r>
-            <a:endParaRPr lang="en-US"/>
           </a:p>
         </p:txBody>
       </p:sp>
@@ -2009,7 +2010,7 @@
           <a:p>
             <a:pPr lvl="0"/>
             <a:r>
-              <a:rPr lang="en-US" smtClean="0"/>
+              <a:rPr lang="en-US"/>
               <a:t>Click to edit Master text styles</a:t>
             </a:r>
           </a:p>
@@ -2065,38 +2066,37 @@
           <a:p>
             <a:pPr lvl="0"/>
             <a:r>
-              <a:rPr lang="en-US" smtClean="0"/>
+              <a:rPr lang="en-US"/>
               <a:t>Click to edit Master text styles</a:t>
             </a:r>
           </a:p>
           <a:p>
             <a:pPr lvl="1"/>
             <a:r>
-              <a:rPr lang="en-US" smtClean="0"/>
+              <a:rPr lang="en-US"/>
               <a:t>Second level</a:t>
             </a:r>
           </a:p>
           <a:p>
             <a:pPr lvl="2"/>
             <a:r>
-              <a:rPr lang="en-US" smtClean="0"/>
+              <a:rPr lang="en-US"/>
               <a:t>Third level</a:t>
             </a:r>
           </a:p>
           <a:p>
             <a:pPr lvl="3"/>
             <a:r>
-              <a:rPr lang="en-US" smtClean="0"/>
+              <a:rPr lang="en-US"/>
               <a:t>Fourth level</a:t>
             </a:r>
           </a:p>
           <a:p>
             <a:pPr lvl="4"/>
             <a:r>
-              <a:rPr lang="en-US" smtClean="0"/>
+              <a:rPr lang="en-US"/>
               <a:t>Fifth level</a:t>
             </a:r>
-            <a:endParaRPr lang="en-US"/>
           </a:p>
         </p:txBody>
       </p:sp>
@@ -2117,7 +2117,7 @@
           <a:p>
             <a:fld id="{78C97017-6FC3-485B-9764-EAC9E56C1D49}" type="datetimeFigureOut">
               <a:rPr lang="en-US" smtClean="0"/>
-              <a:t>10/16/2016</a:t>
+              <a:t>11/12/18</a:t>
             </a:fld>
             <a:endParaRPr lang="en-US"/>
           </a:p>
@@ -2211,10 +2211,9 @@
           <a:lstStyle/>
           <a:p>
             <a:r>
-              <a:rPr lang="en-US" smtClean="0"/>
+              <a:rPr lang="en-US"/>
               <a:t>Click to edit Master title style</a:t>
             </a:r>
-            <a:endParaRPr lang="en-US"/>
           </a:p>
         </p:txBody>
       </p:sp>
@@ -2235,7 +2234,7 @@
           <a:p>
             <a:fld id="{78C97017-6FC3-485B-9764-EAC9E56C1D49}" type="datetimeFigureOut">
               <a:rPr lang="en-US" smtClean="0"/>
-              <a:t>10/16/2016</a:t>
+              <a:t>11/12/18</a:t>
             </a:fld>
             <a:endParaRPr lang="en-US"/>
           </a:p>
@@ -2330,7 +2329,7 @@
           <a:p>
             <a:fld id="{78C97017-6FC3-485B-9764-EAC9E56C1D49}" type="datetimeFigureOut">
               <a:rPr lang="en-US" smtClean="0"/>
-              <a:t>10/16/2016</a:t>
+              <a:t>11/12/18</a:t>
             </a:fld>
             <a:endParaRPr lang="en-US"/>
           </a:p>
@@ -2433,10 +2432,9 @@
           </a:lstStyle>
           <a:p>
             <a:r>
-              <a:rPr lang="en-US" smtClean="0"/>
+              <a:rPr lang="en-US"/>
               <a:t>Click to edit Master title style</a:t>
             </a:r>
-            <a:endParaRPr lang="en-US"/>
           </a:p>
         </p:txBody>
       </p:sp>
@@ -2490,38 +2488,37 @@
           <a:p>
             <a:pPr lvl="0"/>
             <a:r>
-              <a:rPr lang="en-US" smtClean="0"/>
+              <a:rPr lang="en-US"/>
               <a:t>Click to edit Master text styles</a:t>
             </a:r>
           </a:p>
           <a:p>
             <a:pPr lvl="1"/>
             <a:r>
-              <a:rPr lang="en-US" smtClean="0"/>
+              <a:rPr lang="en-US"/>
               <a:t>Second level</a:t>
             </a:r>
           </a:p>
           <a:p>
             <a:pPr lvl="2"/>
             <a:r>
-              <a:rPr lang="en-US" smtClean="0"/>
+              <a:rPr lang="en-US"/>
               <a:t>Third level</a:t>
             </a:r>
           </a:p>
           <a:p>
             <a:pPr lvl="3"/>
             <a:r>
-              <a:rPr lang="en-US" smtClean="0"/>
+              <a:rPr lang="en-US"/>
               <a:t>Fourth level</a:t>
             </a:r>
           </a:p>
           <a:p>
             <a:pPr lvl="4"/>
             <a:r>
-              <a:rPr lang="en-US" smtClean="0"/>
+              <a:rPr lang="en-US"/>
               <a:t>Fifth level</a:t>
             </a:r>
-            <a:endParaRPr lang="en-US"/>
           </a:p>
         </p:txBody>
       </p:sp>
@@ -2584,7 +2581,7 @@
           <a:p>
             <a:pPr lvl="0"/>
             <a:r>
-              <a:rPr lang="en-US" smtClean="0"/>
+              <a:rPr lang="en-US"/>
               <a:t>Click to edit Master text styles</a:t>
             </a:r>
           </a:p>
@@ -2607,7 +2604,7 @@
           <a:p>
             <a:fld id="{78C97017-6FC3-485B-9764-EAC9E56C1D49}" type="datetimeFigureOut">
               <a:rPr lang="en-US" smtClean="0"/>
-              <a:t>10/16/2016</a:t>
+              <a:t>11/12/18</a:t>
             </a:fld>
             <a:endParaRPr lang="en-US"/>
           </a:p>
@@ -2710,10 +2707,9 @@
           </a:lstStyle>
           <a:p>
             <a:r>
-              <a:rPr lang="en-US" smtClean="0"/>
+              <a:rPr lang="en-US"/>
               <a:t>Click to edit Master title style</a:t>
             </a:r>
-            <a:endParaRPr lang="en-US"/>
           </a:p>
         </p:txBody>
       </p:sp>
@@ -2837,7 +2833,7 @@
           <a:p>
             <a:pPr lvl="0"/>
             <a:r>
-              <a:rPr lang="en-US" smtClean="0"/>
+              <a:rPr lang="en-US"/>
               <a:t>Click to edit Master text styles</a:t>
             </a:r>
           </a:p>
@@ -2860,7 +2856,7 @@
           <a:p>
             <a:fld id="{78C97017-6FC3-485B-9764-EAC9E56C1D49}" type="datetimeFigureOut">
               <a:rPr lang="en-US" smtClean="0"/>
-              <a:t>10/16/2016</a:t>
+              <a:t>11/12/18</a:t>
             </a:fld>
             <a:endParaRPr lang="en-US"/>
           </a:p>
@@ -2969,10 +2965,9 @@
           <a:lstStyle/>
           <a:p>
             <a:r>
-              <a:rPr lang="en-US" smtClean="0"/>
+              <a:rPr lang="en-US"/>
               <a:t>Click to edit Master title style</a:t>
             </a:r>
-            <a:endParaRPr lang="en-US"/>
           </a:p>
         </p:txBody>
       </p:sp>
@@ -3003,38 +2998,37 @@
           <a:p>
             <a:pPr lvl="0"/>
             <a:r>
-              <a:rPr lang="en-US" smtClean="0"/>
+              <a:rPr lang="en-US"/>
               <a:t>Click to edit Master text styles</a:t>
             </a:r>
           </a:p>
           <a:p>
             <a:pPr lvl="1"/>
             <a:r>
-              <a:rPr lang="en-US" smtClean="0"/>
+              <a:rPr lang="en-US"/>
               <a:t>Second level</a:t>
             </a:r>
           </a:p>
           <a:p>
             <a:pPr lvl="2"/>
             <a:r>
-              <a:rPr lang="en-US" smtClean="0"/>
+              <a:rPr lang="en-US"/>
               <a:t>Third level</a:t>
             </a:r>
           </a:p>
           <a:p>
             <a:pPr lvl="3"/>
             <a:r>
-              <a:rPr lang="en-US" smtClean="0"/>
+              <a:rPr lang="en-US"/>
               <a:t>Fourth level</a:t>
             </a:r>
           </a:p>
           <a:p>
             <a:pPr lvl="4"/>
             <a:r>
-              <a:rPr lang="en-US" smtClean="0"/>
+              <a:rPr lang="en-US"/>
               <a:t>Fifth level</a:t>
             </a:r>
-            <a:endParaRPr lang="en-US"/>
           </a:p>
         </p:txBody>
       </p:sp>
@@ -3073,7 +3067,7 @@
           <a:p>
             <a:fld id="{78C97017-6FC3-485B-9764-EAC9E56C1D49}" type="datetimeFigureOut">
               <a:rPr lang="en-US" smtClean="0"/>
-              <a:t>10/16/2016</a:t>
+              <a:t>11/12/18</a:t>
             </a:fld>
             <a:endParaRPr lang="en-US"/>
           </a:p>
@@ -3456,8 +3450,8 @@
         </p:nvSpPr>
         <p:spPr>
           <a:xfrm>
-            <a:off x="1119865" y="2086382"/>
-            <a:ext cx="7871735" cy="1723618"/>
+            <a:off x="1003721" y="2079376"/>
+            <a:ext cx="8064079" cy="3019018"/>
           </a:xfrm>
           <a:prstGeom prst="roundRect">
             <a:avLst>
@@ -3494,7 +3488,7 @@
           <a:lstStyle/>
           <a:p>
             <a:r>
-              <a:rPr lang="en-US" sz="1200" b="1" dirty="0" smtClean="0">
+              <a:rPr lang="en-US" sz="1200" b="1" dirty="0">
                 <a:solidFill>
                   <a:schemeClr val="accent6">
                     <a:lumMod val="75000"/>
@@ -3561,7 +3555,7 @@
           <a:p>
             <a:pPr algn="ctr"/>
             <a:r>
-              <a:rPr lang="en-US" sz="1050" dirty="0" smtClean="0">
+              <a:rPr lang="en-US" sz="1050" dirty="0">
                 <a:solidFill>
                   <a:schemeClr val="bg1"/>
                 </a:solidFill>
@@ -3569,14 +3563,14 @@
               <a:t>&lt;&lt;interface&gt;&gt;</a:t>
             </a:r>
             <a:br>
-              <a:rPr lang="en-US" sz="1050" dirty="0" smtClean="0">
+              <a:rPr lang="en-US" sz="1050" dirty="0">
                 <a:solidFill>
                   <a:schemeClr val="bg1"/>
                 </a:solidFill>
               </a:rPr>
             </a:br>
             <a:r>
-              <a:rPr lang="en-US" sz="1050" dirty="0" err="1" smtClean="0">
+              <a:rPr lang="en-US" sz="1050" dirty="0" err="1">
                 <a:solidFill>
                   <a:schemeClr val="bg1"/>
                 </a:solidFill>
@@ -3639,7 +3633,7 @@
           <a:p>
             <a:pPr algn="ctr"/>
             <a:r>
-              <a:rPr lang="en-US" sz="1050" dirty="0" err="1" smtClean="0">
+              <a:rPr lang="en-US" sz="1050" dirty="0" err="1">
                 <a:solidFill>
                   <a:schemeClr val="bg1"/>
                 </a:solidFill>
@@ -3713,7 +3707,7 @@
           <a:p>
             <a:pPr algn="ctr"/>
             <a:r>
-              <a:rPr lang="en-US" sz="1050" dirty="0" smtClean="0">
+              <a:rPr lang="en-US" sz="1050" dirty="0">
                 <a:solidFill>
                   <a:schemeClr val="bg1"/>
                 </a:solidFill>
@@ -4147,7 +4141,7 @@
           <a:p>
             <a:pPr algn="ctr"/>
             <a:r>
-              <a:rPr lang="en-US" sz="1050" b="1" dirty="0" err="1" smtClean="0">
+              <a:rPr lang="en-US" sz="1050" b="1" dirty="0" err="1">
                 <a:solidFill>
                   <a:schemeClr val="accent6">
                     <a:lumMod val="75000"/>
@@ -4156,18 +4150,8 @@
               </a:rPr>
               <a:t>XmlAddressBook</a:t>
             </a:r>
-            <a:r>
-              <a:rPr lang="en-US" sz="1050" b="1" dirty="0" smtClean="0">
-                <a:solidFill>
-                  <a:schemeClr val="accent6">
-                    <a:lumMod val="75000"/>
-                  </a:schemeClr>
-                </a:solidFill>
-              </a:rPr>
-              <a:t/>
-            </a:r>
             <a:br>
-              <a:rPr lang="en-US" sz="1050" b="1" dirty="0" smtClean="0">
+              <a:rPr lang="en-US" sz="1050" b="1" dirty="0">
                 <a:solidFill>
                   <a:schemeClr val="accent6">
                     <a:lumMod val="75000"/>
@@ -4176,7 +4160,7 @@
               </a:rPr>
             </a:br>
             <a:r>
-              <a:rPr lang="en-US" sz="1050" b="1" dirty="0" smtClean="0">
+              <a:rPr lang="en-US" sz="1050" b="1" dirty="0">
                 <a:solidFill>
                   <a:schemeClr val="accent6">
                     <a:lumMod val="75000"/>
@@ -4243,7 +4227,7 @@
           <a:p>
             <a:pPr algn="ctr"/>
             <a:r>
-              <a:rPr lang="en-US" sz="1050" dirty="0" smtClean="0">
+              <a:rPr lang="en-US" sz="1050" dirty="0">
                 <a:solidFill>
                   <a:schemeClr val="bg1"/>
                 </a:solidFill>
@@ -4251,14 +4235,14 @@
               <a:t>&lt;&lt;interface&gt;&gt;</a:t>
             </a:r>
             <a:br>
-              <a:rPr lang="en-US" sz="1050" dirty="0" smtClean="0">
+              <a:rPr lang="en-US" sz="1050" dirty="0">
                 <a:solidFill>
                   <a:schemeClr val="bg1"/>
                 </a:solidFill>
               </a:rPr>
             </a:br>
             <a:r>
-              <a:rPr lang="en-US" sz="1050" dirty="0" err="1" smtClean="0">
+              <a:rPr lang="en-US" sz="1050" dirty="0" err="1">
                 <a:solidFill>
                   <a:schemeClr val="bg1"/>
                 </a:solidFill>
@@ -4516,30 +4500,22 @@
           <a:p>
             <a:pPr algn="ctr"/>
             <a:r>
-              <a:rPr lang="en-US" sz="1050" dirty="0" err="1" smtClean="0">
+              <a:rPr lang="en-US" sz="1050" dirty="0" err="1">
                 <a:solidFill>
                   <a:schemeClr val="bg1"/>
                 </a:solidFill>
               </a:rPr>
               <a:t>JsonUserPrefs</a:t>
             </a:r>
-            <a:r>
-              <a:rPr lang="en-US" sz="1050" dirty="0" smtClean="0">
-                <a:solidFill>
-                  <a:schemeClr val="bg1"/>
-                </a:solidFill>
-              </a:rPr>
-              <a:t/>
-            </a:r>
             <a:br>
-              <a:rPr lang="en-US" sz="1050" dirty="0" smtClean="0">
+              <a:rPr lang="en-US" sz="1050" dirty="0">
                 <a:solidFill>
                   <a:schemeClr val="bg1"/>
                 </a:solidFill>
               </a:rPr>
             </a:br>
             <a:r>
-              <a:rPr lang="en-US" sz="1050" dirty="0" smtClean="0">
+              <a:rPr lang="en-US" sz="1050" dirty="0">
                 <a:solidFill>
                   <a:schemeClr val="bg1"/>
                 </a:solidFill>
@@ -4591,7 +4567,7 @@
           <a:p>
             <a:pPr algn="ctr"/>
             <a:r>
-              <a:rPr lang="en-US" sz="1050" b="1" dirty="0" err="1" smtClean="0">
+              <a:rPr lang="en-US" sz="1050" b="1" dirty="0" err="1">
                 <a:solidFill>
                   <a:schemeClr val="accent6">
                     <a:lumMod val="75000"/>
@@ -4600,18 +4576,8 @@
               </a:rPr>
               <a:t>XmlSerializable</a:t>
             </a:r>
-            <a:r>
-              <a:rPr lang="en-US" sz="1050" b="1" dirty="0" smtClean="0">
-                <a:solidFill>
-                  <a:schemeClr val="accent6">
-                    <a:lumMod val="75000"/>
-                  </a:schemeClr>
-                </a:solidFill>
-              </a:rPr>
-              <a:t/>
-            </a:r>
             <a:br>
-              <a:rPr lang="en-US" sz="1050" b="1" dirty="0" smtClean="0">
+              <a:rPr lang="en-US" sz="1050" b="1" dirty="0">
                 <a:solidFill>
                   <a:schemeClr val="accent6">
                     <a:lumMod val="75000"/>
@@ -4620,7 +4586,7 @@
               </a:rPr>
             </a:br>
             <a:r>
-              <a:rPr lang="en-US" sz="1050" b="1" dirty="0" err="1" smtClean="0">
+              <a:rPr lang="en-US" sz="1050" b="1" dirty="0" err="1">
                 <a:solidFill>
                   <a:schemeClr val="accent6">
                     <a:lumMod val="75000"/>
@@ -4650,7 +4616,7 @@
         </p:nvCxnSpPr>
         <p:spPr>
           <a:xfrm rot="5400000" flipH="1" flipV="1">
-            <a:off x="8077993" y="2992020"/>
+            <a:off x="8077993" y="2724164"/>
             <a:ext cx="335208" cy="12700"/>
           </a:xfrm>
           <a:prstGeom prst="bentConnector3">
@@ -4688,7 +4654,7 @@
         </p:nvSpPr>
         <p:spPr>
           <a:xfrm>
-            <a:off x="7615738" y="2477656"/>
+            <a:off x="7615738" y="2209800"/>
             <a:ext cx="1259718" cy="346760"/>
           </a:xfrm>
           <a:prstGeom prst="rect">
@@ -4717,7 +4683,7 @@
           <a:p>
             <a:pPr algn="ctr"/>
             <a:r>
-              <a:rPr lang="en-US" sz="1050" b="1" dirty="0" err="1" smtClean="0">
+              <a:rPr lang="en-US" sz="1050" b="1" dirty="0" err="1">
                 <a:solidFill>
                   <a:schemeClr val="accent6">
                     <a:lumMod val="75000"/>
@@ -4744,7 +4710,7 @@
         </p:nvSpPr>
         <p:spPr>
           <a:xfrm>
-            <a:off x="7615738" y="3159624"/>
+            <a:off x="7615738" y="2891768"/>
             <a:ext cx="1259718" cy="346760"/>
           </a:xfrm>
           <a:prstGeom prst="rect">
@@ -4773,7 +4739,7 @@
           <a:p>
             <a:pPr algn="ctr"/>
             <a:r>
-              <a:rPr lang="en-US" sz="1050" b="1" dirty="0" err="1" smtClean="0">
+              <a:rPr lang="en-US" sz="1050" b="1" dirty="0" err="1">
                 <a:solidFill>
                   <a:schemeClr val="accent6">
                     <a:lumMod val="75000"/>
@@ -4803,8 +4769,246 @@
         </p:nvCxnSpPr>
         <p:spPr>
           <a:xfrm flipV="1">
-            <a:off x="7220507" y="3333004"/>
-            <a:ext cx="395231" cy="786"/>
+            <a:off x="7220507" y="3065148"/>
+            <a:ext cx="395231" cy="268642"/>
+          </a:xfrm>
+          <a:prstGeom prst="bentConnector3">
+            <a:avLst>
+              <a:gd name="adj1" fmla="val 50000"/>
+            </a:avLst>
+          </a:prstGeom>
+          <a:ln w="19050">
+            <a:prstDash val="sysDot"/>
+            <a:headEnd type="none" w="med" len="med"/>
+            <a:tailEnd type="arrow" w="med" len="med"/>
+          </a:ln>
+          <a:effectLst/>
+        </p:spPr>
+        <p:style>
+          <a:lnRef idx="1">
+            <a:schemeClr val="accent6"/>
+          </a:lnRef>
+          <a:fillRef idx="2">
+            <a:schemeClr val="accent6"/>
+          </a:fillRef>
+          <a:effectRef idx="1">
+            <a:schemeClr val="accent6"/>
+          </a:effectRef>
+          <a:fontRef idx="minor">
+            <a:schemeClr val="dk1"/>
+          </a:fontRef>
+        </p:style>
+      </p:cxnSp>
+      <p:sp>
+        <p:nvSpPr>
+          <p:cNvPr id="26" name="Rectangle 8">
+            <a:extLst>
+              <a:ext uri="{FF2B5EF4-FFF2-40B4-BE49-F238E27FC236}">
+                <a16:creationId xmlns:a16="http://schemas.microsoft.com/office/drawing/2014/main" id="{BC6CD1C5-E184-BB4C-9F0D-850174CDDE4F}"/>
+              </a:ext>
+            </a:extLst>
+          </p:cNvPr>
+          <p:cNvSpPr/>
+          <p:nvPr/>
+        </p:nvSpPr>
+        <p:spPr>
+          <a:xfrm>
+            <a:off x="7609388" y="3841592"/>
+            <a:ext cx="1259718" cy="346760"/>
+          </a:xfrm>
+          <a:prstGeom prst="rect">
+            <a:avLst/>
+          </a:prstGeom>
+          <a:ln w="19050"/>
+          <a:effectLst/>
+        </p:spPr>
+        <p:style>
+          <a:lnRef idx="1">
+            <a:schemeClr val="accent6"/>
+          </a:lnRef>
+          <a:fillRef idx="2">
+            <a:schemeClr val="accent6"/>
+          </a:fillRef>
+          <a:effectRef idx="1">
+            <a:schemeClr val="accent6"/>
+          </a:effectRef>
+          <a:fontRef idx="minor">
+            <a:schemeClr val="dk1"/>
+          </a:fontRef>
+        </p:style>
+        <p:txBody>
+          <a:bodyPr rtlCol="0" anchor="ctr"/>
+          <a:lstStyle/>
+          <a:p>
+            <a:pPr algn="ctr"/>
+            <a:r>
+              <a:rPr lang="en-US" sz="1050" b="1" dirty="0" err="1">
+                <a:solidFill>
+                  <a:schemeClr val="accent6">
+                    <a:lumMod val="75000"/>
+                  </a:schemeClr>
+                </a:solidFill>
+              </a:rPr>
+              <a:t>XmlAdaptedGroup</a:t>
+            </a:r>
+            <a:endParaRPr lang="en-SG" sz="1050" b="1" dirty="0">
+              <a:solidFill>
+                <a:schemeClr val="accent6">
+                  <a:lumMod val="75000"/>
+                </a:schemeClr>
+              </a:solidFill>
+            </a:endParaRPr>
+          </a:p>
+        </p:txBody>
+      </p:sp>
+      <p:cxnSp>
+        <p:nvCxnSpPr>
+          <p:cNvPr id="27" name="Elbow Connector 122">
+            <a:extLst>
+              <a:ext uri="{FF2B5EF4-FFF2-40B4-BE49-F238E27FC236}">
+                <a16:creationId xmlns:a16="http://schemas.microsoft.com/office/drawing/2014/main" id="{99E16E78-7566-F74C-AA55-F1AD0F2DD871}"/>
+              </a:ext>
+            </a:extLst>
+          </p:cNvPr>
+          <p:cNvCxnSpPr>
+            <a:cxnSpLocks/>
+            <a:stCxn id="66" idx="3"/>
+            <a:endCxn id="26" idx="0"/>
+          </p:cNvCxnSpPr>
+          <p:nvPr/>
+        </p:nvCxnSpPr>
+        <p:spPr>
+          <a:xfrm>
+            <a:off x="7220507" y="3333790"/>
+            <a:ext cx="1018740" cy="507802"/>
+          </a:xfrm>
+          <a:prstGeom prst="bentConnector2">
+            <a:avLst/>
+          </a:prstGeom>
+          <a:ln w="19050">
+            <a:prstDash val="sysDot"/>
+            <a:headEnd type="none" w="med" len="med"/>
+            <a:tailEnd type="arrow" w="med" len="med"/>
+          </a:ln>
+          <a:effectLst/>
+        </p:spPr>
+        <p:style>
+          <a:lnRef idx="1">
+            <a:schemeClr val="accent6"/>
+          </a:lnRef>
+          <a:fillRef idx="2">
+            <a:schemeClr val="accent6"/>
+          </a:fillRef>
+          <a:effectRef idx="1">
+            <a:schemeClr val="accent6"/>
+          </a:effectRef>
+          <a:fontRef idx="minor">
+            <a:schemeClr val="dk1"/>
+          </a:fontRef>
+        </p:style>
+      </p:cxnSp>
+      <p:sp>
+        <p:nvSpPr>
+          <p:cNvPr id="36" name="Rectangle 8">
+            <a:extLst>
+              <a:ext uri="{FF2B5EF4-FFF2-40B4-BE49-F238E27FC236}">
+                <a16:creationId xmlns:a16="http://schemas.microsoft.com/office/drawing/2014/main" id="{D175B004-7B42-5A45-80E3-83770E029563}"/>
+              </a:ext>
+            </a:extLst>
+          </p:cNvPr>
+          <p:cNvSpPr/>
+          <p:nvPr/>
+        </p:nvSpPr>
+        <p:spPr>
+          <a:xfrm>
+            <a:off x="7609388" y="4473496"/>
+            <a:ext cx="1259718" cy="346760"/>
+          </a:xfrm>
+          <a:prstGeom prst="rect">
+            <a:avLst/>
+          </a:prstGeom>
+          <a:ln w="19050"/>
+          <a:effectLst/>
+        </p:spPr>
+        <p:style>
+          <a:lnRef idx="1">
+            <a:schemeClr val="accent6"/>
+          </a:lnRef>
+          <a:fillRef idx="2">
+            <a:schemeClr val="accent6"/>
+          </a:fillRef>
+          <a:effectRef idx="1">
+            <a:schemeClr val="accent6"/>
+          </a:effectRef>
+          <a:fontRef idx="minor">
+            <a:schemeClr val="dk1"/>
+          </a:fontRef>
+        </p:style>
+        <p:txBody>
+          <a:bodyPr rtlCol="0" anchor="ctr"/>
+          <a:lstStyle/>
+          <a:p>
+            <a:pPr algn="ctr"/>
+            <a:r>
+              <a:rPr lang="en-US" sz="1050" b="1" dirty="0" err="1">
+                <a:solidFill>
+                  <a:schemeClr val="accent6">
+                    <a:lumMod val="75000"/>
+                  </a:schemeClr>
+                </a:solidFill>
+              </a:rPr>
+              <a:t>XmlAdapted</a:t>
+            </a:r>
+            <a:endParaRPr lang="en-US" sz="1050" b="1" dirty="0">
+              <a:solidFill>
+                <a:schemeClr val="accent6">
+                  <a:lumMod val="75000"/>
+                </a:schemeClr>
+              </a:solidFill>
+            </a:endParaRPr>
+          </a:p>
+          <a:p>
+            <a:pPr algn="ctr"/>
+            <a:r>
+              <a:rPr lang="en-US" sz="1050" b="1" dirty="0">
+                <a:solidFill>
+                  <a:schemeClr val="accent6">
+                    <a:lumMod val="75000"/>
+                  </a:schemeClr>
+                </a:solidFill>
+              </a:rPr>
+              <a:t>Meeting</a:t>
+            </a:r>
+            <a:endParaRPr lang="en-SG" sz="1050" b="1" dirty="0">
+              <a:solidFill>
+                <a:schemeClr val="accent6">
+                  <a:lumMod val="75000"/>
+                </a:schemeClr>
+              </a:solidFill>
+            </a:endParaRPr>
+          </a:p>
+        </p:txBody>
+      </p:sp>
+      <p:cxnSp>
+        <p:nvCxnSpPr>
+          <p:cNvPr id="37" name="Elbow Connector 122">
+            <a:extLst>
+              <a:ext uri="{FF2B5EF4-FFF2-40B4-BE49-F238E27FC236}">
+                <a16:creationId xmlns:a16="http://schemas.microsoft.com/office/drawing/2014/main" id="{CBFB0C81-22C0-384B-B424-C8E7DF47A45B}"/>
+              </a:ext>
+            </a:extLst>
+          </p:cNvPr>
+          <p:cNvCxnSpPr>
+            <a:cxnSpLocks/>
+            <a:stCxn id="26" idx="2"/>
+            <a:endCxn id="36" idx="0"/>
+          </p:cNvCxnSpPr>
+          <p:nvPr/>
+        </p:nvCxnSpPr>
+        <p:spPr>
+          <a:xfrm rot="5400000">
+            <a:off x="8096675" y="4330924"/>
+            <a:ext cx="285144" cy="12700"/>
           </a:xfrm>
           <a:prstGeom prst="bentConnector3">
             <a:avLst>
@@ -4843,13 +5047,6 @@
   <p:clrMapOvr>
     <a:masterClrMapping/>
   </p:clrMapOvr>
-  <p:timing>
-    <p:tnLst>
-      <p:par>
-        <p:cTn id="1" dur="indefinite" restart="never" nodeType="tmRoot"/>
-      </p:par>
-    </p:tnLst>
-  </p:timing>
 </p:sld>
 </file>
 

</xml_diff>

<commit_message>
Update DG and portfolio (#221)
- Tweak wording and fix typos for my portion of DG and portfolio.
- Update size of some images.
- Change block format in `README.adoc`.
- Add manual testing for `setup`.
</commit_message>
<xml_diff>
--- a/docs/diagrams/StorageComponentClassDiagram.pptx
+++ b/docs/diagrams/StorageComponentClassDiagram.pptx
@@ -208,7 +208,7 @@
           <a:p>
             <a:fld id="{F5CC4B3F-88C1-4FFA-B1B6-F41C21DC6924}" type="datetimeFigureOut">
               <a:rPr lang="en-US" smtClean="0"/>
-              <a:t>11/10/2018</a:t>
+              <a:t>11/12/2018</a:t>
             </a:fld>
             <a:endParaRPr lang="en-US"/>
           </a:p>
@@ -654,7 +654,7 @@
           <a:p>
             <a:fld id="{78C97017-6FC3-485B-9764-EAC9E56C1D49}" type="datetimeFigureOut">
               <a:rPr lang="en-US" smtClean="0"/>
-              <a:t>11/10/2018</a:t>
+              <a:t>11/12/2018</a:t>
             </a:fld>
             <a:endParaRPr lang="en-US"/>
           </a:p>
@@ -822,7 +822,7 @@
           <a:p>
             <a:fld id="{78C97017-6FC3-485B-9764-EAC9E56C1D49}" type="datetimeFigureOut">
               <a:rPr lang="en-US" smtClean="0"/>
-              <a:t>11/10/2018</a:t>
+              <a:t>11/12/2018</a:t>
             </a:fld>
             <a:endParaRPr lang="en-US"/>
           </a:p>
@@ -1000,7 +1000,7 @@
           <a:p>
             <a:fld id="{78C97017-6FC3-485B-9764-EAC9E56C1D49}" type="datetimeFigureOut">
               <a:rPr lang="en-US" smtClean="0"/>
-              <a:t>11/10/2018</a:t>
+              <a:t>11/12/2018</a:t>
             </a:fld>
             <a:endParaRPr lang="en-US"/>
           </a:p>
@@ -1168,7 +1168,7 @@
           <a:p>
             <a:fld id="{78C97017-6FC3-485B-9764-EAC9E56C1D49}" type="datetimeFigureOut">
               <a:rPr lang="en-US" smtClean="0"/>
-              <a:t>11/10/2018</a:t>
+              <a:t>11/12/2018</a:t>
             </a:fld>
             <a:endParaRPr lang="en-US"/>
           </a:p>
@@ -1413,7 +1413,7 @@
           <a:p>
             <a:fld id="{78C97017-6FC3-485B-9764-EAC9E56C1D49}" type="datetimeFigureOut">
               <a:rPr lang="en-US" smtClean="0"/>
-              <a:t>11/10/2018</a:t>
+              <a:t>11/12/2018</a:t>
             </a:fld>
             <a:endParaRPr lang="en-US"/>
           </a:p>
@@ -1698,7 +1698,7 @@
           <a:p>
             <a:fld id="{78C97017-6FC3-485B-9764-EAC9E56C1D49}" type="datetimeFigureOut">
               <a:rPr lang="en-US" smtClean="0"/>
-              <a:t>11/10/2018</a:t>
+              <a:t>11/12/2018</a:t>
             </a:fld>
             <a:endParaRPr lang="en-US"/>
           </a:p>
@@ -2117,7 +2117,7 @@
           <a:p>
             <a:fld id="{78C97017-6FC3-485B-9764-EAC9E56C1D49}" type="datetimeFigureOut">
               <a:rPr lang="en-US" smtClean="0"/>
-              <a:t>11/10/2018</a:t>
+              <a:t>11/12/2018</a:t>
             </a:fld>
             <a:endParaRPr lang="en-US"/>
           </a:p>
@@ -2234,7 +2234,7 @@
           <a:p>
             <a:fld id="{78C97017-6FC3-485B-9764-EAC9E56C1D49}" type="datetimeFigureOut">
               <a:rPr lang="en-US" smtClean="0"/>
-              <a:t>11/10/2018</a:t>
+              <a:t>11/12/2018</a:t>
             </a:fld>
             <a:endParaRPr lang="en-US"/>
           </a:p>
@@ -2329,7 +2329,7 @@
           <a:p>
             <a:fld id="{78C97017-6FC3-485B-9764-EAC9E56C1D49}" type="datetimeFigureOut">
               <a:rPr lang="en-US" smtClean="0"/>
-              <a:t>11/10/2018</a:t>
+              <a:t>11/12/2018</a:t>
             </a:fld>
             <a:endParaRPr lang="en-US"/>
           </a:p>
@@ -2604,7 +2604,7 @@
           <a:p>
             <a:fld id="{78C97017-6FC3-485B-9764-EAC9E56C1D49}" type="datetimeFigureOut">
               <a:rPr lang="en-US" smtClean="0"/>
-              <a:t>11/10/2018</a:t>
+              <a:t>11/12/2018</a:t>
             </a:fld>
             <a:endParaRPr lang="en-US"/>
           </a:p>
@@ -2856,7 +2856,7 @@
           <a:p>
             <a:fld id="{78C97017-6FC3-485B-9764-EAC9E56C1D49}" type="datetimeFigureOut">
               <a:rPr lang="en-US" smtClean="0"/>
-              <a:t>11/10/2018</a:t>
+              <a:t>11/12/2018</a:t>
             </a:fld>
             <a:endParaRPr lang="en-US"/>
           </a:p>
@@ -3067,7 +3067,7 @@
           <a:p>
             <a:fld id="{78C97017-6FC3-485B-9764-EAC9E56C1D49}" type="datetimeFigureOut">
               <a:rPr lang="en-US" smtClean="0"/>
-              <a:t>11/10/2018</a:t>
+              <a:t>11/12/2018</a:t>
             </a:fld>
             <a:endParaRPr lang="en-US"/>
           </a:p>
@@ -4596,7 +4596,7 @@
                   </a:schemeClr>
                 </a:solidFill>
               </a:rPr>
-              <a:t>AddressBook</a:t>
+              <a:t>ModulePlanner</a:t>
             </a:r>
             <a:endParaRPr lang="en-SG" sz="1050" b="1" dirty="0">
               <a:solidFill>

</xml_diff>